<commit_message>
Fix handling xy-chart csv
</commit_message>
<xml_diff>
--- a/test/data/in.pptx
+++ b/test/data/in.pptx
@@ -160,7 +160,6 @@
           </a:p>
         </c:rich>
       </c:tx>
-      <c:layout/>
       <c:overlay val="0"/>
       <c:spPr>
         <a:noFill/>
@@ -631,7 +630,6 @@
     </c:plotArea>
     <c:legend>
       <c:legendPos val="b"/>
-      <c:layout/>
       <c:overlay val="0"/>
       <c:spPr>
         <a:noFill/>
@@ -733,7 +731,6 @@
           </a:p>
         </c:rich>
       </c:tx>
-      <c:layout/>
       <c:overlay val="0"/>
       <c:spPr>
         <a:noFill/>
@@ -1206,7 +1203,6 @@
     </c:plotArea>
     <c:legend>
       <c:legendPos val="b"/>
-      <c:layout/>
       <c:overlay val="0"/>
       <c:spPr>
         <a:noFill/>
@@ -1309,21 +1305,17 @@
               <a:t>}</a:t>
             </a:r>
             <a:r>
-              <a:rPr lang="en-US" altLang="ja-JP" dirty="0" err="1" smtClean="0"/>
-              <a:t>updown</a:t>
-            </a:r>
-            <a:endParaRPr lang="ja-JP" altLang="en-US" dirty="0"/>
+              <a:rPr lang="ja-JP" altLang="en-US" dirty="0" smtClean="0"/>
+              <a:t>グラフ </a:t>
+            </a:r>
+            <a:r>
+              <a:rPr lang="ja-JP" altLang="en-US" dirty="0"/>
+              <a:t>タイトル</a:t>
+            </a:r>
           </a:p>
         </c:rich>
       </c:tx>
-      <c:layout>
-        <c:manualLayout>
-          <c:xMode val="edge"/>
-          <c:yMode val="edge"/>
-          <c:x val="3.9441249676668941E-2"/>
-          <c:y val="7.5342578651688044E-2"/>
-        </c:manualLayout>
-      </c:layout>
+      <c:layout/>
       <c:overlay val="0"/>
       <c:spPr>
         <a:noFill/>
@@ -1355,192 +1347,20 @@
     </c:title>
     <c:autoTitleDeleted val="0"/>
     <c:plotArea>
-      <c:layout>
-        <c:manualLayout>
-          <c:layoutTarget val="inner"/>
-          <c:xMode val="edge"/>
-          <c:yMode val="edge"/>
-          <c:x val="0.23329791680584891"/>
-          <c:y val="0.31736461803133775"/>
-          <c:w val="0.72773983455728053"/>
-          <c:h val="0.50458019545244115"/>
-        </c:manualLayout>
-      </c:layout>
-      <c:barChart>
-        <c:barDir val="bar"/>
-        <c:grouping val="clustered"/>
-        <c:varyColors val="0"/>
-        <c:ser>
-          <c:idx val="3"/>
-          <c:order val="4"/>
-          <c:tx>
-            <c:strRef>
-              <c:f>Sheet1!$G$1</c:f>
-              <c:strCache>
-                <c:ptCount val="1"/>
-                <c:pt idx="0">
-                  <c:v>dummy</c:v>
-                </c:pt>
-              </c:strCache>
-            </c:strRef>
-          </c:tx>
-          <c:spPr>
-            <a:solidFill>
-              <a:schemeClr val="accent4"/>
-            </a:solidFill>
-            <a:ln>
-              <a:noFill/>
-            </a:ln>
-            <a:effectLst/>
-          </c:spPr>
-          <c:invertIfNegative val="0"/>
-          <c:cat>
-            <c:strRef>
-              <c:f>Sheet1!$B$2:$B$5</c:f>
-              <c:strCache>
-                <c:ptCount val="4"/>
-                <c:pt idx="0">
-                  <c:v>A</c:v>
-                </c:pt>
-                <c:pt idx="1">
-                  <c:v>B</c:v>
-                </c:pt>
-                <c:pt idx="2">
-                  <c:v>C</c:v>
-                </c:pt>
-                <c:pt idx="3">
-                  <c:v>D</c:v>
-                </c:pt>
-              </c:strCache>
-            </c:strRef>
-          </c:cat>
-          <c:val>
-            <c:numRef>
-              <c:f>Sheet1!$G$2:$G$5</c:f>
-              <c:numCache>
-                <c:formatCode>General</c:formatCode>
-                <c:ptCount val="4"/>
-                <c:pt idx="0">
-                  <c:v>0</c:v>
-                </c:pt>
-                <c:pt idx="1">
-                  <c:v>0</c:v>
-                </c:pt>
-                <c:pt idx="2">
-                  <c:v>0</c:v>
-                </c:pt>
-                <c:pt idx="3">
-                  <c:v>0</c:v>
-                </c:pt>
-              </c:numCache>
-            </c:numRef>
-          </c:val>
-          <c:extLst>
-            <c:ext xmlns:c16="http://schemas.microsoft.com/office/drawing/2014/chart" uri="{C3380CC4-5D6E-409C-BE32-E72D297353CC}">
-              <c16:uniqueId val="{00000000-D429-4898-A600-E766B58067C0}"/>
-            </c:ext>
-          </c:extLst>
-        </c:ser>
-        <c:dLbls>
-          <c:showLegendKey val="0"/>
-          <c:showVal val="0"/>
-          <c:showCatName val="0"/>
-          <c:showSerName val="0"/>
-          <c:showPercent val="0"/>
-          <c:showBubbleSize val="0"/>
-        </c:dLbls>
-        <c:gapWidth val="150"/>
-        <c:axId val="301710368"/>
-        <c:axId val="301709952"/>
-      </c:barChart>
+      <c:layout/>
       <c:scatterChart>
         <c:scatterStyle val="lineMarker"/>
         <c:varyColors val="0"/>
         <c:ser>
-          <c:idx val="4"/>
+          <c:idx val="0"/>
           <c:order val="0"/>
           <c:tx>
             <c:strRef>
-              <c:f>Sheet1!$C$1</c:f>
+              <c:f>Sheet1!$B$1</c:f>
               <c:strCache>
                 <c:ptCount val="1"/>
                 <c:pt idx="0">
                   <c:v>X0</c:v>
-                </c:pt>
-              </c:strCache>
-            </c:strRef>
-          </c:tx>
-          <c:spPr>
-            <a:ln w="19050" cap="rnd">
-              <a:solidFill>
-                <a:schemeClr val="accent5"/>
-              </a:solidFill>
-              <a:round/>
-            </a:ln>
-            <a:effectLst/>
-          </c:spPr>
-          <c:marker>
-            <c:symbol val="none"/>
-          </c:marker>
-          <c:xVal>
-            <c:numRef>
-              <c:f>Sheet1!$C$2:$C$5</c:f>
-              <c:numCache>
-                <c:formatCode>General</c:formatCode>
-                <c:ptCount val="4"/>
-                <c:pt idx="0">
-                  <c:v>3.767073279747613</c:v>
-                </c:pt>
-                <c:pt idx="1">
-                  <c:v>1.7893850330151055</c:v>
-                </c:pt>
-                <c:pt idx="2">
-                  <c:v>1.2544178871803062</c:v>
-                </c:pt>
-                <c:pt idx="3">
-                  <c:v>1.8484019676530576</c:v>
-                </c:pt>
-              </c:numCache>
-            </c:numRef>
-          </c:xVal>
-          <c:yVal>
-            <c:numRef>
-              <c:f>Sheet1!$A$2:$A$5</c:f>
-              <c:numCache>
-                <c:formatCode>General</c:formatCode>
-                <c:ptCount val="4"/>
-                <c:pt idx="0">
-                  <c:v>4</c:v>
-                </c:pt>
-                <c:pt idx="1">
-                  <c:v>3</c:v>
-                </c:pt>
-                <c:pt idx="2">
-                  <c:v>2</c:v>
-                </c:pt>
-                <c:pt idx="3">
-                  <c:v>1</c:v>
-                </c:pt>
-              </c:numCache>
-            </c:numRef>
-          </c:yVal>
-          <c:smooth val="0"/>
-          <c:extLst>
-            <c:ext xmlns:c16="http://schemas.microsoft.com/office/drawing/2014/chart" uri="{C3380CC4-5D6E-409C-BE32-E72D297353CC}">
-              <c16:uniqueId val="{00000001-D429-4898-A600-E766B58067C0}"/>
-            </c:ext>
-          </c:extLst>
-        </c:ser>
-        <c:ser>
-          <c:idx val="0"/>
-          <c:order val="1"/>
-          <c:tx>
-            <c:strRef>
-              <c:f>Sheet1!$D$1</c:f>
-              <c:strCache>
-                <c:ptCount val="1"/>
-                <c:pt idx="0">
-                  <c:v>X1</c:v>
                 </c:pt>
               </c:strCache>
             </c:strRef>
@@ -1555,46 +1375,52 @@
             <a:effectLst/>
           </c:spPr>
           <c:marker>
-            <c:symbol val="none"/>
+            <c:symbol val="circle"/>
+            <c:size val="5"/>
+            <c:spPr>
+              <a:solidFill>
+                <a:schemeClr val="accent1"/>
+              </a:solidFill>
+              <a:ln w="9525">
+                <a:solidFill>
+                  <a:schemeClr val="accent1"/>
+                </a:solidFill>
+              </a:ln>
+              <a:effectLst/>
+            </c:spPr>
           </c:marker>
           <c:xVal>
             <c:numRef>
-              <c:f>Sheet1!$D$2:$D$5</c:f>
+              <c:f>Sheet1!$B$2:$B$4</c:f>
               <c:numCache>
                 <c:formatCode>General</c:formatCode>
-                <c:ptCount val="4"/>
+                <c:ptCount val="3"/>
                 <c:pt idx="0">
-                  <c:v>0.2511052911649142</c:v>
+                  <c:v>2.7</c:v>
                 </c:pt>
                 <c:pt idx="1">
-                  <c:v>1.0767603455124808</c:v>
+                  <c:v>3.2</c:v>
                 </c:pt>
                 <c:pt idx="2">
-                  <c:v>4.0641309532065515</c:v>
-                </c:pt>
-                <c:pt idx="3">
-                  <c:v>4.4114576309144642</c:v>
+                  <c:v>0.8</c:v>
                 </c:pt>
               </c:numCache>
             </c:numRef>
           </c:xVal>
           <c:yVal>
             <c:numRef>
-              <c:f>Sheet1!$A$2:$A$5</c:f>
+              <c:f>Sheet1!$A$2:$A$4</c:f>
               <c:numCache>
                 <c:formatCode>General</c:formatCode>
-                <c:ptCount val="4"/>
+                <c:ptCount val="3"/>
                 <c:pt idx="0">
-                  <c:v>4</c:v>
+                  <c:v>10</c:v>
                 </c:pt>
                 <c:pt idx="1">
-                  <c:v>3</c:v>
+                  <c:v>20</c:v>
                 </c:pt>
                 <c:pt idx="2">
-                  <c:v>2</c:v>
-                </c:pt>
-                <c:pt idx="3">
-                  <c:v>1</c:v>
+                  <c:v>30</c:v>
                 </c:pt>
               </c:numCache>
             </c:numRef>
@@ -1602,20 +1428,20 @@
           <c:smooth val="0"/>
           <c:extLst>
             <c:ext xmlns:c16="http://schemas.microsoft.com/office/drawing/2014/chart" uri="{C3380CC4-5D6E-409C-BE32-E72D297353CC}">
-              <c16:uniqueId val="{00000002-D429-4898-A600-E766B58067C0}"/>
+              <c16:uniqueId val="{00000000-343C-4453-9BBC-677A95A25A5A}"/>
             </c:ext>
           </c:extLst>
         </c:ser>
         <c:ser>
           <c:idx val="1"/>
-          <c:order val="2"/>
+          <c:order val="1"/>
           <c:tx>
             <c:strRef>
-              <c:f>Sheet1!$E$1</c:f>
+              <c:f>Sheet1!$C$1</c:f>
               <c:strCache>
                 <c:ptCount val="1"/>
                 <c:pt idx="0">
-                  <c:v>X2</c:v>
+                  <c:v>X1</c:v>
                 </c:pt>
               </c:strCache>
             </c:strRef>
@@ -1630,46 +1456,52 @@
             <a:effectLst/>
           </c:spPr>
           <c:marker>
-            <c:symbol val="none"/>
+            <c:symbol val="circle"/>
+            <c:size val="5"/>
+            <c:spPr>
+              <a:solidFill>
+                <a:schemeClr val="accent2"/>
+              </a:solidFill>
+              <a:ln w="9525">
+                <a:solidFill>
+                  <a:schemeClr val="accent2"/>
+                </a:solidFill>
+              </a:ln>
+              <a:effectLst/>
+            </c:spPr>
           </c:marker>
           <c:xVal>
             <c:numRef>
-              <c:f>Sheet1!$E$2:$E$5</c:f>
+              <c:f>Sheet1!$C$2:$C$4</c:f>
               <c:numCache>
                 <c:formatCode>General</c:formatCode>
-                <c:ptCount val="4"/>
+                <c:ptCount val="3"/>
                 <c:pt idx="0">
-                  <c:v>3.7538958848064889</c:v>
+                  <c:v>3</c:v>
                 </c:pt>
                 <c:pt idx="1">
-                  <c:v>0.2475580568820307</c:v>
+                  <c:v>4</c:v>
                 </c:pt>
                 <c:pt idx="2">
-                  <c:v>2.5435097776002276</c:v>
-                </c:pt>
-                <c:pt idx="3">
-                  <c:v>1.2357752234076185</c:v>
+                  <c:v>5</c:v>
                 </c:pt>
               </c:numCache>
             </c:numRef>
           </c:xVal>
           <c:yVal>
             <c:numRef>
-              <c:f>Sheet1!$A$2:$A$5</c:f>
+              <c:f>Sheet1!$A$2:$A$4</c:f>
               <c:numCache>
                 <c:formatCode>General</c:formatCode>
-                <c:ptCount val="4"/>
+                <c:ptCount val="3"/>
                 <c:pt idx="0">
-                  <c:v>4</c:v>
+                  <c:v>10</c:v>
                 </c:pt>
                 <c:pt idx="1">
-                  <c:v>3</c:v>
+                  <c:v>20</c:v>
                 </c:pt>
                 <c:pt idx="2">
-                  <c:v>2</c:v>
-                </c:pt>
-                <c:pt idx="3">
-                  <c:v>1</c:v>
+                  <c:v>30</c:v>
                 </c:pt>
               </c:numCache>
             </c:numRef>
@@ -1677,20 +1509,20 @@
           <c:smooth val="0"/>
           <c:extLst>
             <c:ext xmlns:c16="http://schemas.microsoft.com/office/drawing/2014/chart" uri="{C3380CC4-5D6E-409C-BE32-E72D297353CC}">
-              <c16:uniqueId val="{00000003-D429-4898-A600-E766B58067C0}"/>
+              <c16:uniqueId val="{00000001-343C-4453-9BBC-677A95A25A5A}"/>
             </c:ext>
           </c:extLst>
         </c:ser>
         <c:ser>
           <c:idx val="2"/>
-          <c:order val="3"/>
+          <c:order val="2"/>
           <c:tx>
             <c:strRef>
-              <c:f>Sheet1!$F$1</c:f>
+              <c:f>Sheet1!$D$1</c:f>
               <c:strCache>
                 <c:ptCount val="1"/>
                 <c:pt idx="0">
-                  <c:v>X3</c:v>
+                  <c:v>X2</c:v>
                 </c:pt>
               </c:strCache>
             </c:strRef>
@@ -1705,46 +1537,52 @@
             <a:effectLst/>
           </c:spPr>
           <c:marker>
-            <c:symbol val="none"/>
+            <c:symbol val="circle"/>
+            <c:size val="5"/>
+            <c:spPr>
+              <a:solidFill>
+                <a:schemeClr val="accent3"/>
+              </a:solidFill>
+              <a:ln w="9525">
+                <a:solidFill>
+                  <a:schemeClr val="accent3"/>
+                </a:solidFill>
+              </a:ln>
+              <a:effectLst/>
+            </c:spPr>
           </c:marker>
           <c:xVal>
             <c:numRef>
-              <c:f>Sheet1!$F$2:$F$5</c:f>
+              <c:f>Sheet1!$D$2:$D$4</c:f>
               <c:numCache>
                 <c:formatCode>General</c:formatCode>
-                <c:ptCount val="4"/>
+                <c:ptCount val="3"/>
                 <c:pt idx="0">
-                  <c:v>1.4600645439017912</c:v>
+                  <c:v>3</c:v>
                 </c:pt>
                 <c:pt idx="1">
-                  <c:v>0.55860154680779817</c:v>
+                  <c:v>3</c:v>
                 </c:pt>
                 <c:pt idx="2">
-                  <c:v>2.0640944204012963</c:v>
-                </c:pt>
-                <c:pt idx="3">
-                  <c:v>0.8827966448004454</c:v>
+                  <c:v>3</c:v>
                 </c:pt>
               </c:numCache>
             </c:numRef>
           </c:xVal>
           <c:yVal>
             <c:numRef>
-              <c:f>Sheet1!$A$2:$A$5</c:f>
+              <c:f>Sheet1!$A$2:$A$4</c:f>
               <c:numCache>
                 <c:formatCode>General</c:formatCode>
-                <c:ptCount val="4"/>
+                <c:ptCount val="3"/>
                 <c:pt idx="0">
-                  <c:v>4</c:v>
+                  <c:v>10</c:v>
                 </c:pt>
                 <c:pt idx="1">
-                  <c:v>3</c:v>
+                  <c:v>20</c:v>
                 </c:pt>
                 <c:pt idx="2">
-                  <c:v>2</c:v>
-                </c:pt>
-                <c:pt idx="3">
-                  <c:v>1</c:v>
+                  <c:v>30</c:v>
                 </c:pt>
               </c:numCache>
             </c:numRef>
@@ -1752,7 +1590,7 @@
           <c:smooth val="0"/>
           <c:extLst>
             <c:ext xmlns:c16="http://schemas.microsoft.com/office/drawing/2014/chart" uri="{C3380CC4-5D6E-409C-BE32-E72D297353CC}">
-              <c16:uniqueId val="{00000004-D429-4898-A600-E766B58067C0}"/>
+              <c16:uniqueId val="{00000002-343C-4453-9BBC-677A95A25A5A}"/>
             </c:ext>
           </c:extLst>
         </c:ser>
@@ -1764,11 +1602,73 @@
           <c:showPercent val="0"/>
           <c:showBubbleSize val="0"/>
         </c:dLbls>
-        <c:axId val="422961424"/>
-        <c:axId val="422961840"/>
+        <c:axId val="226191760"/>
+        <c:axId val="226190928"/>
       </c:scatterChart>
-      <c:catAx>
-        <c:axId val="301710368"/>
+      <c:valAx>
+        <c:axId val="226191760"/>
+        <c:scaling>
+          <c:orientation val="minMax"/>
+        </c:scaling>
+        <c:delete val="0"/>
+        <c:axPos val="b"/>
+        <c:majorGridlines>
+          <c:spPr>
+            <a:ln w="9525" cap="flat" cmpd="sng" algn="ctr">
+              <a:solidFill>
+                <a:schemeClr val="tx1">
+                  <a:lumMod val="15000"/>
+                  <a:lumOff val="85000"/>
+                </a:schemeClr>
+              </a:solidFill>
+              <a:round/>
+            </a:ln>
+            <a:effectLst/>
+          </c:spPr>
+        </c:majorGridlines>
+        <c:numFmt formatCode="General" sourceLinked="1"/>
+        <c:majorTickMark val="none"/>
+        <c:minorTickMark val="none"/>
+        <c:tickLblPos val="nextTo"/>
+        <c:spPr>
+          <a:noFill/>
+          <a:ln w="9525" cap="flat" cmpd="sng" algn="ctr">
+            <a:solidFill>
+              <a:schemeClr val="tx1">
+                <a:lumMod val="25000"/>
+                <a:lumOff val="75000"/>
+              </a:schemeClr>
+            </a:solidFill>
+            <a:round/>
+          </a:ln>
+          <a:effectLst/>
+        </c:spPr>
+        <c:txPr>
+          <a:bodyPr rot="-60000000" spcFirstLastPara="1" vertOverflow="ellipsis" vert="horz" wrap="square" anchor="ctr" anchorCtr="1"/>
+          <a:lstStyle/>
+          <a:p>
+            <a:pPr>
+              <a:defRPr sz="1197" b="0" i="0" u="none" strike="noStrike" kern="1200" baseline="0">
+                <a:solidFill>
+                  <a:schemeClr val="tx1">
+                    <a:lumMod val="65000"/>
+                    <a:lumOff val="35000"/>
+                  </a:schemeClr>
+                </a:solidFill>
+                <a:latin typeface="+mn-lt"/>
+                <a:ea typeface="+mn-ea"/>
+                <a:cs typeface="+mn-cs"/>
+              </a:defRPr>
+            </a:pPr>
+            <a:endParaRPr lang="ja-JP"/>
+          </a:p>
+        </c:txPr>
+        <c:crossAx val="226190928"/>
+        <c:crosses val="autoZero"/>
+        <c:crossBetween val="midCat"/>
+      </c:valAx>
+      <c:valAx>
+        <c:axId val="226190928"/>
         <c:scaling>
           <c:orientation val="minMax"/>
         </c:scaling>
@@ -1825,145 +1725,7 @@
             <a:endParaRPr lang="ja-JP"/>
           </a:p>
         </c:txPr>
-        <c:crossAx val="301709952"/>
-        <c:crosses val="autoZero"/>
-        <c:auto val="1"/>
-        <c:lblAlgn val="ctr"/>
-        <c:lblOffset val="100"/>
-        <c:noMultiLvlLbl val="0"/>
-      </c:catAx>
-      <c:valAx>
-        <c:axId val="301709952"/>
-        <c:scaling>
-          <c:orientation val="minMax"/>
-        </c:scaling>
-        <c:delete val="0"/>
-        <c:axPos val="b"/>
-        <c:majorGridlines>
-          <c:spPr>
-            <a:ln w="9525" cap="flat" cmpd="sng" algn="ctr">
-              <a:solidFill>
-                <a:schemeClr val="tx1">
-                  <a:lumMod val="15000"/>
-                  <a:lumOff val="85000"/>
-                </a:schemeClr>
-              </a:solidFill>
-              <a:round/>
-            </a:ln>
-            <a:effectLst/>
-          </c:spPr>
-        </c:majorGridlines>
-        <c:minorGridlines>
-          <c:spPr>
-            <a:ln w="9525" cap="flat" cmpd="sng" algn="ctr">
-              <a:noFill/>
-              <a:round/>
-            </a:ln>
-            <a:effectLst/>
-          </c:spPr>
-        </c:minorGridlines>
-        <c:numFmt formatCode="General" sourceLinked="1"/>
-        <c:majorTickMark val="in"/>
-        <c:minorTickMark val="none"/>
-        <c:tickLblPos val="nextTo"/>
-        <c:spPr>
-          <a:noFill/>
-          <a:ln w="9525" cap="flat" cmpd="sng" algn="ctr">
-            <a:solidFill>
-              <a:schemeClr val="tx1">
-                <a:lumMod val="25000"/>
-                <a:lumOff val="75000"/>
-              </a:schemeClr>
-            </a:solidFill>
-            <a:round/>
-          </a:ln>
-          <a:effectLst/>
-        </c:spPr>
-        <c:txPr>
-          <a:bodyPr rot="-60000000" spcFirstLastPara="1" vertOverflow="ellipsis" vert="horz" wrap="square" anchor="ctr" anchorCtr="1"/>
-          <a:lstStyle/>
-          <a:p>
-            <a:pPr>
-              <a:defRPr sz="1197" b="0" i="0" u="none" strike="noStrike" kern="1200" baseline="0">
-                <a:solidFill>
-                  <a:schemeClr val="tx1">
-                    <a:lumMod val="65000"/>
-                    <a:lumOff val="35000"/>
-                  </a:schemeClr>
-                </a:solidFill>
-                <a:latin typeface="+mn-lt"/>
-                <a:ea typeface="+mn-ea"/>
-                <a:cs typeface="+mn-cs"/>
-              </a:defRPr>
-            </a:pPr>
-            <a:endParaRPr lang="ja-JP"/>
-          </a:p>
-        </c:txPr>
-        <c:crossAx val="301710368"/>
-        <c:crosses val="autoZero"/>
-        <c:crossBetween val="between"/>
-        <c:majorUnit val="1"/>
-      </c:valAx>
-      <c:valAx>
-        <c:axId val="422961840"/>
-        <c:scaling>
-          <c:orientation val="minMax"/>
-        </c:scaling>
-        <c:delete val="0"/>
-        <c:axPos val="r"/>
-        <c:numFmt formatCode="General" sourceLinked="1"/>
-        <c:majorTickMark val="out"/>
-        <c:minorTickMark val="none"/>
-        <c:tickLblPos val="nextTo"/>
-        <c:spPr>
-          <a:noFill/>
-          <a:ln w="9525" cap="flat" cmpd="sng" algn="ctr">
-            <a:solidFill>
-              <a:schemeClr val="tx1">
-                <a:lumMod val="25000"/>
-                <a:lumOff val="75000"/>
-              </a:schemeClr>
-            </a:solidFill>
-            <a:round/>
-          </a:ln>
-          <a:effectLst/>
-        </c:spPr>
-        <c:txPr>
-          <a:bodyPr rot="-60000000" spcFirstLastPara="1" vertOverflow="ellipsis" vert="horz" wrap="square" anchor="ctr" anchorCtr="1"/>
-          <a:lstStyle/>
-          <a:p>
-            <a:pPr>
-              <a:defRPr sz="1197" b="0" i="0" u="none" strike="noStrike" kern="1200" baseline="0">
-                <a:solidFill>
-                  <a:schemeClr val="tx1">
-                    <a:lumMod val="65000"/>
-                    <a:lumOff val="35000"/>
-                  </a:schemeClr>
-                </a:solidFill>
-                <a:latin typeface="+mn-lt"/>
-                <a:ea typeface="+mn-ea"/>
-                <a:cs typeface="+mn-cs"/>
-              </a:defRPr>
-            </a:pPr>
-            <a:endParaRPr lang="ja-JP"/>
-          </a:p>
-        </c:txPr>
-        <c:crossAx val="422961424"/>
-        <c:crosses val="max"/>
-        <c:crossBetween val="midCat"/>
-      </c:valAx>
-      <c:valAx>
-        <c:axId val="422961424"/>
-        <c:scaling>
-          <c:orientation val="minMax"/>
-        </c:scaling>
-        <c:delete val="1"/>
-        <c:axPos val="b"/>
-        <c:numFmt formatCode="General" sourceLinked="1"/>
-        <c:majorTickMark val="out"/>
-        <c:minorTickMark val="none"/>
-        <c:tickLblPos val="nextTo"/>
-        <c:crossAx val="422961840"/>
+        <c:crossAx val="226191760"/>
         <c:crosses val="autoZero"/>
         <c:crossBetween val="midCat"/>
       </c:valAx>
@@ -1977,20 +1739,7 @@
     </c:plotArea>
     <c:legend>
       <c:legendPos val="t"/>
-      <c:legendEntry>
-        <c:idx val="0"/>
-        <c:delete val="1"/>
-      </c:legendEntry>
-      <c:layout>
-        <c:manualLayout>
-          <c:xMode val="edge"/>
-          <c:yMode val="edge"/>
-          <c:x val="0.3622881646273256"/>
-          <c:y val="0.10951565023850088"/>
-          <c:w val="0.57183880726385694"/>
-          <c:h val="0.10213663963273663"/>
-        </c:manualLayout>
-      </c:layout>
+      <c:layout/>
       <c:overlay val="0"/>
       <c:spPr>
         <a:noFill/>
@@ -2004,7 +1753,7 @@
         <a:lstStyle/>
         <a:p>
           <a:pPr>
-            <a:defRPr sz="800" b="0" i="0" u="none" strike="noStrike" kern="1200" baseline="0">
+            <a:defRPr sz="1197" b="0" i="0" u="none" strike="noStrike" kern="1200" baseline="0">
               <a:solidFill>
                 <a:schemeClr val="tx1">
                   <a:lumMod val="65000"/>
@@ -2062,40 +1811,7 @@
   </mc:AlternateContent>
   <c:chart>
     <c:title>
-      <c:tx>
-        <c:rich>
-          <a:bodyPr rot="0" spcFirstLastPara="1" vertOverflow="ellipsis" vert="horz" wrap="square" anchor="ctr" anchorCtr="1"/>
-          <a:lstStyle/>
-          <a:p>
-            <a:pPr>
-              <a:defRPr sz="1862" b="0" i="0" u="none" strike="noStrike" kern="1200" spc="0" baseline="0">
-                <a:solidFill>
-                  <a:schemeClr val="tx1">
-                    <a:lumMod val="65000"/>
-                    <a:lumOff val="35000"/>
-                  </a:schemeClr>
-                </a:solidFill>
-                <a:latin typeface="+mn-lt"/>
-                <a:ea typeface="+mn-ea"/>
-                <a:cs typeface="+mn-cs"/>
-              </a:defRPr>
-            </a:pPr>
-            <a:r>
-              <a:rPr lang="en-US" altLang="ja-JP" smtClean="0"/>
-              <a:t>updown</a:t>
-            </a:r>
-            <a:endParaRPr lang="ja-JP" altLang="en-US" dirty="0"/>
-          </a:p>
-        </c:rich>
-      </c:tx>
-      <c:layout>
-        <c:manualLayout>
-          <c:xMode val="edge"/>
-          <c:yMode val="edge"/>
-          <c:x val="3.9441249676668941E-2"/>
-          <c:y val="7.5342578651688044E-2"/>
-        </c:manualLayout>
-      </c:layout>
+      <c:layout/>
       <c:overlay val="0"/>
       <c:spPr>
         <a:noFill/>
@@ -2127,192 +1843,20 @@
     </c:title>
     <c:autoTitleDeleted val="0"/>
     <c:plotArea>
-      <c:layout>
-        <c:manualLayout>
-          <c:layoutTarget val="inner"/>
-          <c:xMode val="edge"/>
-          <c:yMode val="edge"/>
-          <c:x val="0.23329791680584891"/>
-          <c:y val="0.31736461803133775"/>
-          <c:w val="0.72773983455728053"/>
-          <c:h val="0.50458019545244115"/>
-        </c:manualLayout>
-      </c:layout>
-      <c:barChart>
-        <c:barDir val="bar"/>
-        <c:grouping val="clustered"/>
-        <c:varyColors val="0"/>
-        <c:ser>
-          <c:idx val="3"/>
-          <c:order val="4"/>
-          <c:tx>
-            <c:strRef>
-              <c:f>Sheet1!$G$1</c:f>
-              <c:strCache>
-                <c:ptCount val="1"/>
-                <c:pt idx="0">
-                  <c:v>dummy</c:v>
-                </c:pt>
-              </c:strCache>
-            </c:strRef>
-          </c:tx>
-          <c:spPr>
-            <a:solidFill>
-              <a:schemeClr val="accent4"/>
-            </a:solidFill>
-            <a:ln>
-              <a:noFill/>
-            </a:ln>
-            <a:effectLst/>
-          </c:spPr>
-          <c:invertIfNegative val="0"/>
-          <c:cat>
-            <c:strRef>
-              <c:f>Sheet1!$B$2:$B$5</c:f>
-              <c:strCache>
-                <c:ptCount val="4"/>
-                <c:pt idx="0">
-                  <c:v>cost</c:v>
-                </c:pt>
-                <c:pt idx="1">
-                  <c:v>taste</c:v>
-                </c:pt>
-                <c:pt idx="2">
-                  <c:v>location</c:v>
-                </c:pt>
-                <c:pt idx="3">
-                  <c:v>comfort</c:v>
-                </c:pt>
-              </c:strCache>
-            </c:strRef>
-          </c:cat>
-          <c:val>
-            <c:numRef>
-              <c:f>Sheet1!$G$2:$G$5</c:f>
-              <c:numCache>
-                <c:formatCode>General</c:formatCode>
-                <c:ptCount val="4"/>
-                <c:pt idx="0">
-                  <c:v>0</c:v>
-                </c:pt>
-                <c:pt idx="1">
-                  <c:v>0</c:v>
-                </c:pt>
-                <c:pt idx="2">
-                  <c:v>0</c:v>
-                </c:pt>
-                <c:pt idx="3">
-                  <c:v>0</c:v>
-                </c:pt>
-              </c:numCache>
-            </c:numRef>
-          </c:val>
-          <c:extLst>
-            <c:ext xmlns:c16="http://schemas.microsoft.com/office/drawing/2014/chart" uri="{C3380CC4-5D6E-409C-BE32-E72D297353CC}">
-              <c16:uniqueId val="{00000000-CED2-415F-A426-3ABADF6AE933}"/>
-            </c:ext>
-          </c:extLst>
-        </c:ser>
-        <c:dLbls>
-          <c:showLegendKey val="0"/>
-          <c:showVal val="0"/>
-          <c:showCatName val="0"/>
-          <c:showSerName val="0"/>
-          <c:showPercent val="0"/>
-          <c:showBubbleSize val="0"/>
-        </c:dLbls>
-        <c:gapWidth val="150"/>
-        <c:axId val="301710368"/>
-        <c:axId val="301709952"/>
-      </c:barChart>
+      <c:layout/>
       <c:scatterChart>
         <c:scatterStyle val="lineMarker"/>
         <c:varyColors val="0"/>
         <c:ser>
-          <c:idx val="4"/>
+          <c:idx val="0"/>
           <c:order val="0"/>
           <c:tx>
             <c:strRef>
-              <c:f>Sheet1!$C$1</c:f>
+              <c:f>Sheet1!$B$1</c:f>
               <c:strCache>
                 <c:ptCount val="1"/>
                 <c:pt idx="0">
-                  <c:v>shop0</c:v>
-                </c:pt>
-              </c:strCache>
-            </c:strRef>
-          </c:tx>
-          <c:spPr>
-            <a:ln w="19050" cap="rnd">
-              <a:solidFill>
-                <a:schemeClr val="accent5"/>
-              </a:solidFill>
-              <a:round/>
-            </a:ln>
-            <a:effectLst/>
-          </c:spPr>
-          <c:marker>
-            <c:symbol val="none"/>
-          </c:marker>
-          <c:xVal>
-            <c:numRef>
-              <c:f>Sheet1!$C$2:$C$5</c:f>
-              <c:numCache>
-                <c:formatCode>General</c:formatCode>
-                <c:ptCount val="4"/>
-                <c:pt idx="0">
-                  <c:v>1</c:v>
-                </c:pt>
-                <c:pt idx="1">
-                  <c:v>2</c:v>
-                </c:pt>
-                <c:pt idx="2">
-                  <c:v>1</c:v>
-                </c:pt>
-                <c:pt idx="3">
-                  <c:v>1</c:v>
-                </c:pt>
-              </c:numCache>
-            </c:numRef>
-          </c:xVal>
-          <c:yVal>
-            <c:numRef>
-              <c:f>Sheet1!$A$2:$A$5</c:f>
-              <c:numCache>
-                <c:formatCode>General</c:formatCode>
-                <c:ptCount val="4"/>
-                <c:pt idx="0">
-                  <c:v>4</c:v>
-                </c:pt>
-                <c:pt idx="1">
-                  <c:v>3</c:v>
-                </c:pt>
-                <c:pt idx="2">
-                  <c:v>2</c:v>
-                </c:pt>
-                <c:pt idx="3">
-                  <c:v>1</c:v>
-                </c:pt>
-              </c:numCache>
-            </c:numRef>
-          </c:yVal>
-          <c:smooth val="0"/>
-          <c:extLst>
-            <c:ext xmlns:c16="http://schemas.microsoft.com/office/drawing/2014/chart" uri="{C3380CC4-5D6E-409C-BE32-E72D297353CC}">
-              <c16:uniqueId val="{00000001-CED2-415F-A426-3ABADF6AE933}"/>
-            </c:ext>
-          </c:extLst>
-        </c:ser>
-        <c:ser>
-          <c:idx val="0"/>
-          <c:order val="1"/>
-          <c:tx>
-            <c:strRef>
-              <c:f>Sheet1!$D$1</c:f>
-              <c:strCache>
-                <c:ptCount val="1"/>
-                <c:pt idx="0">
-                  <c:v>shop1</c:v>
+                  <c:v>X0</c:v>
                 </c:pt>
               </c:strCache>
             </c:strRef>
@@ -2327,46 +1871,52 @@
             <a:effectLst/>
           </c:spPr>
           <c:marker>
-            <c:symbol val="none"/>
+            <c:symbol val="circle"/>
+            <c:size val="5"/>
+            <c:spPr>
+              <a:solidFill>
+                <a:schemeClr val="accent1"/>
+              </a:solidFill>
+              <a:ln w="9525">
+                <a:solidFill>
+                  <a:schemeClr val="accent1"/>
+                </a:solidFill>
+              </a:ln>
+              <a:effectLst/>
+            </c:spPr>
           </c:marker>
           <c:xVal>
             <c:numRef>
-              <c:f>Sheet1!$D$2:$D$5</c:f>
+              <c:f>Sheet1!$B$2:$B$4</c:f>
               <c:numCache>
                 <c:formatCode>General</c:formatCode>
-                <c:ptCount val="4"/>
+                <c:ptCount val="3"/>
                 <c:pt idx="0">
+                  <c:v>1</c:v>
+                </c:pt>
+                <c:pt idx="1">
                   <c:v>2</c:v>
                 </c:pt>
-                <c:pt idx="1">
-                  <c:v>3</c:v>
-                </c:pt>
                 <c:pt idx="2">
-                  <c:v>2</c:v>
-                </c:pt>
-                <c:pt idx="3">
-                  <c:v>2</c:v>
+                  <c:v>1</c:v>
                 </c:pt>
               </c:numCache>
             </c:numRef>
           </c:xVal>
           <c:yVal>
             <c:numRef>
-              <c:f>Sheet1!$A$2:$A$5</c:f>
+              <c:f>Sheet1!$A$2:$A$4</c:f>
               <c:numCache>
                 <c:formatCode>General</c:formatCode>
-                <c:ptCount val="4"/>
+                <c:ptCount val="3"/>
                 <c:pt idx="0">
-                  <c:v>4</c:v>
+                  <c:v>10</c:v>
                 </c:pt>
                 <c:pt idx="1">
-                  <c:v>3</c:v>
+                  <c:v>20</c:v>
                 </c:pt>
                 <c:pt idx="2">
-                  <c:v>2</c:v>
-                </c:pt>
-                <c:pt idx="3">
-                  <c:v>1</c:v>
+                  <c:v>30</c:v>
                 </c:pt>
               </c:numCache>
             </c:numRef>
@@ -2374,20 +1924,20 @@
           <c:smooth val="0"/>
           <c:extLst>
             <c:ext xmlns:c16="http://schemas.microsoft.com/office/drawing/2014/chart" uri="{C3380CC4-5D6E-409C-BE32-E72D297353CC}">
-              <c16:uniqueId val="{00000002-CED2-415F-A426-3ABADF6AE933}"/>
+              <c16:uniqueId val="{00000000-0A00-48AF-88C0-BD6ABC168BD7}"/>
             </c:ext>
           </c:extLst>
         </c:ser>
         <c:ser>
           <c:idx val="1"/>
-          <c:order val="2"/>
+          <c:order val="1"/>
           <c:tx>
             <c:strRef>
-              <c:f>Sheet1!$E$1</c:f>
+              <c:f>Sheet1!$C$1</c:f>
               <c:strCache>
                 <c:ptCount val="1"/>
                 <c:pt idx="0">
-                  <c:v>shop2</c:v>
+                  <c:v>X1</c:v>
                 </c:pt>
               </c:strCache>
             </c:strRef>
@@ -2402,46 +1952,52 @@
             <a:effectLst/>
           </c:spPr>
           <c:marker>
-            <c:symbol val="none"/>
+            <c:symbol val="circle"/>
+            <c:size val="5"/>
+            <c:spPr>
+              <a:solidFill>
+                <a:schemeClr val="accent2"/>
+              </a:solidFill>
+              <a:ln w="9525">
+                <a:solidFill>
+                  <a:schemeClr val="accent2"/>
+                </a:solidFill>
+              </a:ln>
+              <a:effectLst/>
+            </c:spPr>
           </c:marker>
           <c:xVal>
             <c:numRef>
-              <c:f>Sheet1!$E$2:$E$5</c:f>
+              <c:f>Sheet1!$C$2:$C$4</c:f>
               <c:numCache>
                 <c:formatCode>General</c:formatCode>
-                <c:ptCount val="4"/>
+                <c:ptCount val="3"/>
                 <c:pt idx="0">
+                  <c:v>2</c:v>
+                </c:pt>
+                <c:pt idx="1">
                   <c:v>3</c:v>
                 </c:pt>
-                <c:pt idx="1">
-                  <c:v>4</c:v>
-                </c:pt>
                 <c:pt idx="2">
-                  <c:v>3</c:v>
-                </c:pt>
-                <c:pt idx="3">
-                  <c:v>3</c:v>
+                  <c:v>2</c:v>
                 </c:pt>
               </c:numCache>
             </c:numRef>
           </c:xVal>
           <c:yVal>
             <c:numRef>
-              <c:f>Sheet1!$A$2:$A$5</c:f>
+              <c:f>Sheet1!$A$2:$A$4</c:f>
               <c:numCache>
                 <c:formatCode>General</c:formatCode>
-                <c:ptCount val="4"/>
+                <c:ptCount val="3"/>
                 <c:pt idx="0">
-                  <c:v>4</c:v>
+                  <c:v>10</c:v>
                 </c:pt>
                 <c:pt idx="1">
-                  <c:v>3</c:v>
+                  <c:v>20</c:v>
                 </c:pt>
                 <c:pt idx="2">
-                  <c:v>2</c:v>
-                </c:pt>
-                <c:pt idx="3">
-                  <c:v>1</c:v>
+                  <c:v>30</c:v>
                 </c:pt>
               </c:numCache>
             </c:numRef>
@@ -2449,20 +2005,20 @@
           <c:smooth val="0"/>
           <c:extLst>
             <c:ext xmlns:c16="http://schemas.microsoft.com/office/drawing/2014/chart" uri="{C3380CC4-5D6E-409C-BE32-E72D297353CC}">
-              <c16:uniqueId val="{00000003-CED2-415F-A426-3ABADF6AE933}"/>
+              <c16:uniqueId val="{00000001-0A00-48AF-88C0-BD6ABC168BD7}"/>
             </c:ext>
           </c:extLst>
         </c:ser>
         <c:ser>
           <c:idx val="2"/>
-          <c:order val="3"/>
+          <c:order val="2"/>
           <c:tx>
             <c:strRef>
-              <c:f>Sheet1!$F$1</c:f>
+              <c:f>Sheet1!$D$1</c:f>
               <c:strCache>
                 <c:ptCount val="1"/>
                 <c:pt idx="0">
-                  <c:v>shop3</c:v>
+                  <c:v>X2</c:v>
                 </c:pt>
               </c:strCache>
             </c:strRef>
@@ -2477,46 +2033,52 @@
             <a:effectLst/>
           </c:spPr>
           <c:marker>
-            <c:symbol val="none"/>
+            <c:symbol val="circle"/>
+            <c:size val="5"/>
+            <c:spPr>
+              <a:solidFill>
+                <a:schemeClr val="accent3"/>
+              </a:solidFill>
+              <a:ln w="9525">
+                <a:solidFill>
+                  <a:schemeClr val="accent3"/>
+                </a:solidFill>
+              </a:ln>
+              <a:effectLst/>
+            </c:spPr>
           </c:marker>
           <c:xVal>
             <c:numRef>
-              <c:f>Sheet1!$F$2:$F$5</c:f>
+              <c:f>Sheet1!$D$2:$D$4</c:f>
               <c:numCache>
                 <c:formatCode>General</c:formatCode>
-                <c:ptCount val="4"/>
+                <c:ptCount val="3"/>
                 <c:pt idx="0">
+                  <c:v>3</c:v>
+                </c:pt>
+                <c:pt idx="1">
                   <c:v>4</c:v>
                 </c:pt>
-                <c:pt idx="1">
-                  <c:v>5</c:v>
-                </c:pt>
                 <c:pt idx="2">
-                  <c:v>4</c:v>
-                </c:pt>
-                <c:pt idx="3">
-                  <c:v>4</c:v>
+                  <c:v>3</c:v>
                 </c:pt>
               </c:numCache>
             </c:numRef>
           </c:xVal>
           <c:yVal>
             <c:numRef>
-              <c:f>Sheet1!$A$2:$A$5</c:f>
+              <c:f>Sheet1!$A$2:$A$4</c:f>
               <c:numCache>
                 <c:formatCode>General</c:formatCode>
-                <c:ptCount val="4"/>
+                <c:ptCount val="3"/>
                 <c:pt idx="0">
-                  <c:v>4</c:v>
+                  <c:v>10</c:v>
                 </c:pt>
                 <c:pt idx="1">
-                  <c:v>3</c:v>
+                  <c:v>20</c:v>
                 </c:pt>
                 <c:pt idx="2">
-                  <c:v>2</c:v>
-                </c:pt>
-                <c:pt idx="3">
-                  <c:v>1</c:v>
+                  <c:v>30</c:v>
                 </c:pt>
               </c:numCache>
             </c:numRef>
@@ -2524,7 +2086,7 @@
           <c:smooth val="0"/>
           <c:extLst>
             <c:ext xmlns:c16="http://schemas.microsoft.com/office/drawing/2014/chart" uri="{C3380CC4-5D6E-409C-BE32-E72D297353CC}">
-              <c16:uniqueId val="{00000004-CED2-415F-A426-3ABADF6AE933}"/>
+              <c16:uniqueId val="{00000002-0A00-48AF-88C0-BD6ABC168BD7}"/>
             </c:ext>
           </c:extLst>
         </c:ser>
@@ -2536,11 +2098,73 @@
           <c:showPercent val="0"/>
           <c:showBubbleSize val="0"/>
         </c:dLbls>
-        <c:axId val="422961424"/>
-        <c:axId val="422961840"/>
+        <c:axId val="226191760"/>
+        <c:axId val="226190928"/>
       </c:scatterChart>
-      <c:catAx>
-        <c:axId val="301710368"/>
+      <c:valAx>
+        <c:axId val="226191760"/>
+        <c:scaling>
+          <c:orientation val="minMax"/>
+        </c:scaling>
+        <c:delete val="0"/>
+        <c:axPos val="b"/>
+        <c:majorGridlines>
+          <c:spPr>
+            <a:ln w="9525" cap="flat" cmpd="sng" algn="ctr">
+              <a:solidFill>
+                <a:schemeClr val="tx1">
+                  <a:lumMod val="15000"/>
+                  <a:lumOff val="85000"/>
+                </a:schemeClr>
+              </a:solidFill>
+              <a:round/>
+            </a:ln>
+            <a:effectLst/>
+          </c:spPr>
+        </c:majorGridlines>
+        <c:numFmt formatCode="General" sourceLinked="1"/>
+        <c:majorTickMark val="none"/>
+        <c:minorTickMark val="none"/>
+        <c:tickLblPos val="nextTo"/>
+        <c:spPr>
+          <a:noFill/>
+          <a:ln w="9525" cap="flat" cmpd="sng" algn="ctr">
+            <a:solidFill>
+              <a:schemeClr val="tx1">
+                <a:lumMod val="25000"/>
+                <a:lumOff val="75000"/>
+              </a:schemeClr>
+            </a:solidFill>
+            <a:round/>
+          </a:ln>
+          <a:effectLst/>
+        </c:spPr>
+        <c:txPr>
+          <a:bodyPr rot="-60000000" spcFirstLastPara="1" vertOverflow="ellipsis" vert="horz" wrap="square" anchor="ctr" anchorCtr="1"/>
+          <a:lstStyle/>
+          <a:p>
+            <a:pPr>
+              <a:defRPr sz="1197" b="0" i="0" u="none" strike="noStrike" kern="1200" baseline="0">
+                <a:solidFill>
+                  <a:schemeClr val="tx1">
+                    <a:lumMod val="65000"/>
+                    <a:lumOff val="35000"/>
+                  </a:schemeClr>
+                </a:solidFill>
+                <a:latin typeface="+mn-lt"/>
+                <a:ea typeface="+mn-ea"/>
+                <a:cs typeface="+mn-cs"/>
+              </a:defRPr>
+            </a:pPr>
+            <a:endParaRPr lang="ja-JP"/>
+          </a:p>
+        </c:txPr>
+        <c:crossAx val="226190928"/>
+        <c:crosses val="autoZero"/>
+        <c:crossBetween val="midCat"/>
+      </c:valAx>
+      <c:valAx>
+        <c:axId val="226190928"/>
         <c:scaling>
           <c:orientation val="minMax"/>
         </c:scaling>
@@ -2597,145 +2221,7 @@
             <a:endParaRPr lang="ja-JP"/>
           </a:p>
         </c:txPr>
-        <c:crossAx val="301709952"/>
-        <c:crosses val="autoZero"/>
-        <c:auto val="1"/>
-        <c:lblAlgn val="ctr"/>
-        <c:lblOffset val="100"/>
-        <c:noMultiLvlLbl val="0"/>
-      </c:catAx>
-      <c:valAx>
-        <c:axId val="301709952"/>
-        <c:scaling>
-          <c:orientation val="minMax"/>
-        </c:scaling>
-        <c:delete val="0"/>
-        <c:axPos val="b"/>
-        <c:majorGridlines>
-          <c:spPr>
-            <a:ln w="9525" cap="flat" cmpd="sng" algn="ctr">
-              <a:solidFill>
-                <a:schemeClr val="tx1">
-                  <a:lumMod val="15000"/>
-                  <a:lumOff val="85000"/>
-                </a:schemeClr>
-              </a:solidFill>
-              <a:round/>
-            </a:ln>
-            <a:effectLst/>
-          </c:spPr>
-        </c:majorGridlines>
-        <c:minorGridlines>
-          <c:spPr>
-            <a:ln w="9525" cap="flat" cmpd="sng" algn="ctr">
-              <a:noFill/>
-              <a:round/>
-            </a:ln>
-            <a:effectLst/>
-          </c:spPr>
-        </c:minorGridlines>
-        <c:numFmt formatCode="General" sourceLinked="1"/>
-        <c:majorTickMark val="in"/>
-        <c:minorTickMark val="none"/>
-        <c:tickLblPos val="nextTo"/>
-        <c:spPr>
-          <a:noFill/>
-          <a:ln w="9525" cap="flat" cmpd="sng" algn="ctr">
-            <a:solidFill>
-              <a:schemeClr val="tx1">
-                <a:lumMod val="25000"/>
-                <a:lumOff val="75000"/>
-              </a:schemeClr>
-            </a:solidFill>
-            <a:round/>
-          </a:ln>
-          <a:effectLst/>
-        </c:spPr>
-        <c:txPr>
-          <a:bodyPr rot="-60000000" spcFirstLastPara="1" vertOverflow="ellipsis" vert="horz" wrap="square" anchor="ctr" anchorCtr="1"/>
-          <a:lstStyle/>
-          <a:p>
-            <a:pPr>
-              <a:defRPr sz="1197" b="0" i="0" u="none" strike="noStrike" kern="1200" baseline="0">
-                <a:solidFill>
-                  <a:schemeClr val="tx1">
-                    <a:lumMod val="65000"/>
-                    <a:lumOff val="35000"/>
-                  </a:schemeClr>
-                </a:solidFill>
-                <a:latin typeface="+mn-lt"/>
-                <a:ea typeface="+mn-ea"/>
-                <a:cs typeface="+mn-cs"/>
-              </a:defRPr>
-            </a:pPr>
-            <a:endParaRPr lang="ja-JP"/>
-          </a:p>
-        </c:txPr>
-        <c:crossAx val="301710368"/>
-        <c:crosses val="autoZero"/>
-        <c:crossBetween val="between"/>
-        <c:majorUnit val="1"/>
-      </c:valAx>
-      <c:valAx>
-        <c:axId val="422961840"/>
-        <c:scaling>
-          <c:orientation val="minMax"/>
-        </c:scaling>
-        <c:delete val="0"/>
-        <c:axPos val="r"/>
-        <c:numFmt formatCode="General" sourceLinked="1"/>
-        <c:majorTickMark val="out"/>
-        <c:minorTickMark val="none"/>
-        <c:tickLblPos val="nextTo"/>
-        <c:spPr>
-          <a:noFill/>
-          <a:ln w="9525" cap="flat" cmpd="sng" algn="ctr">
-            <a:solidFill>
-              <a:schemeClr val="tx1">
-                <a:lumMod val="25000"/>
-                <a:lumOff val="75000"/>
-              </a:schemeClr>
-            </a:solidFill>
-            <a:round/>
-          </a:ln>
-          <a:effectLst/>
-        </c:spPr>
-        <c:txPr>
-          <a:bodyPr rot="-60000000" spcFirstLastPara="1" vertOverflow="ellipsis" vert="horz" wrap="square" anchor="ctr" anchorCtr="1"/>
-          <a:lstStyle/>
-          <a:p>
-            <a:pPr>
-              <a:defRPr sz="1197" b="0" i="0" u="none" strike="noStrike" kern="1200" baseline="0">
-                <a:solidFill>
-                  <a:schemeClr val="tx1">
-                    <a:lumMod val="65000"/>
-                    <a:lumOff val="35000"/>
-                  </a:schemeClr>
-                </a:solidFill>
-                <a:latin typeface="+mn-lt"/>
-                <a:ea typeface="+mn-ea"/>
-                <a:cs typeface="+mn-cs"/>
-              </a:defRPr>
-            </a:pPr>
-            <a:endParaRPr lang="ja-JP"/>
-          </a:p>
-        </c:txPr>
-        <c:crossAx val="422961424"/>
-        <c:crosses val="max"/>
-        <c:crossBetween val="midCat"/>
-      </c:valAx>
-      <c:valAx>
-        <c:axId val="422961424"/>
-        <c:scaling>
-          <c:orientation val="minMax"/>
-        </c:scaling>
-        <c:delete val="1"/>
-        <c:axPos val="b"/>
-        <c:numFmt formatCode="General" sourceLinked="1"/>
-        <c:majorTickMark val="out"/>
-        <c:minorTickMark val="none"/>
-        <c:tickLblPos val="nextTo"/>
-        <c:crossAx val="422961840"/>
+        <c:crossAx val="226191760"/>
         <c:crosses val="autoZero"/>
         <c:crossBetween val="midCat"/>
       </c:valAx>
@@ -2749,20 +2235,7 @@
     </c:plotArea>
     <c:legend>
       <c:legendPos val="t"/>
-      <c:legendEntry>
-        <c:idx val="0"/>
-        <c:delete val="1"/>
-      </c:legendEntry>
-      <c:layout>
-        <c:manualLayout>
-          <c:xMode val="edge"/>
-          <c:yMode val="edge"/>
-          <c:x val="0.3622881646273256"/>
-          <c:y val="0.10951565023850088"/>
-          <c:w val="0.57183880726385694"/>
-          <c:h val="0.10213663963273663"/>
-        </c:manualLayout>
-      </c:layout>
+      <c:layout/>
       <c:overlay val="0"/>
       <c:spPr>
         <a:noFill/>
@@ -2776,7 +2249,7 @@
         <a:lstStyle/>
         <a:p>
           <a:pPr>
-            <a:defRPr sz="800" b="0" i="0" u="none" strike="noStrike" kern="1200" baseline="0">
+            <a:defRPr sz="1197" b="0" i="0" u="none" strike="noStrike" kern="1200" baseline="0">
               <a:solidFill>
                 <a:schemeClr val="tx1">
                   <a:lumMod val="65000"/>
@@ -5148,7 +4621,7 @@
           <a:p>
             <a:fld id="{216FD8EB-7C38-4D9D-8BDF-3ABF2096B376}" type="datetimeFigureOut">
               <a:rPr kumimoji="1" lang="ja-JP" altLang="en-US" smtClean="0"/>
-              <a:t>2017/6/9</a:t>
+              <a:t>2017/6/13</a:t>
             </a:fld>
             <a:endParaRPr kumimoji="1" lang="ja-JP" altLang="en-US"/>
           </a:p>
@@ -5350,7 +4823,7 @@
           <a:p>
             <a:fld id="{216FD8EB-7C38-4D9D-8BDF-3ABF2096B376}" type="datetimeFigureOut">
               <a:rPr kumimoji="1" lang="ja-JP" altLang="en-US" smtClean="0"/>
-              <a:t>2017/6/9</a:t>
+              <a:t>2017/6/13</a:t>
             </a:fld>
             <a:endParaRPr kumimoji="1" lang="ja-JP" altLang="en-US"/>
           </a:p>
@@ -5562,7 +5035,7 @@
           <a:p>
             <a:fld id="{216FD8EB-7C38-4D9D-8BDF-3ABF2096B376}" type="datetimeFigureOut">
               <a:rPr kumimoji="1" lang="ja-JP" altLang="en-US" smtClean="0"/>
-              <a:t>2017/6/9</a:t>
+              <a:t>2017/6/13</a:t>
             </a:fld>
             <a:endParaRPr kumimoji="1" lang="ja-JP" altLang="en-US"/>
           </a:p>
@@ -5764,7 +5237,7 @@
           <a:p>
             <a:fld id="{216FD8EB-7C38-4D9D-8BDF-3ABF2096B376}" type="datetimeFigureOut">
               <a:rPr kumimoji="1" lang="ja-JP" altLang="en-US" smtClean="0"/>
-              <a:t>2017/6/9</a:t>
+              <a:t>2017/6/13</a:t>
             </a:fld>
             <a:endParaRPr kumimoji="1" lang="ja-JP" altLang="en-US"/>
           </a:p>
@@ -6010,7 +5483,7 @@
           <a:p>
             <a:fld id="{216FD8EB-7C38-4D9D-8BDF-3ABF2096B376}" type="datetimeFigureOut">
               <a:rPr kumimoji="1" lang="ja-JP" altLang="en-US" smtClean="0"/>
-              <a:t>2017/6/9</a:t>
+              <a:t>2017/6/13</a:t>
             </a:fld>
             <a:endParaRPr kumimoji="1" lang="ja-JP" altLang="en-US"/>
           </a:p>
@@ -6306,7 +5779,7 @@
           <a:p>
             <a:fld id="{216FD8EB-7C38-4D9D-8BDF-3ABF2096B376}" type="datetimeFigureOut">
               <a:rPr kumimoji="1" lang="ja-JP" altLang="en-US" smtClean="0"/>
-              <a:t>2017/6/9</a:t>
+              <a:t>2017/6/13</a:t>
             </a:fld>
             <a:endParaRPr kumimoji="1" lang="ja-JP" altLang="en-US"/>
           </a:p>
@@ -6737,7 +6210,7 @@
           <a:p>
             <a:fld id="{216FD8EB-7C38-4D9D-8BDF-3ABF2096B376}" type="datetimeFigureOut">
               <a:rPr kumimoji="1" lang="ja-JP" altLang="en-US" smtClean="0"/>
-              <a:t>2017/6/9</a:t>
+              <a:t>2017/6/13</a:t>
             </a:fld>
             <a:endParaRPr kumimoji="1" lang="ja-JP" altLang="en-US"/>
           </a:p>
@@ -6855,7 +6328,7 @@
           <a:p>
             <a:fld id="{216FD8EB-7C38-4D9D-8BDF-3ABF2096B376}" type="datetimeFigureOut">
               <a:rPr kumimoji="1" lang="ja-JP" altLang="en-US" smtClean="0"/>
-              <a:t>2017/6/9</a:t>
+              <a:t>2017/6/13</a:t>
             </a:fld>
             <a:endParaRPr kumimoji="1" lang="ja-JP" altLang="en-US"/>
           </a:p>
@@ -6950,7 +6423,7 @@
           <a:p>
             <a:fld id="{216FD8EB-7C38-4D9D-8BDF-3ABF2096B376}" type="datetimeFigureOut">
               <a:rPr kumimoji="1" lang="ja-JP" altLang="en-US" smtClean="0"/>
-              <a:t>2017/6/9</a:t>
+              <a:t>2017/6/13</a:t>
             </a:fld>
             <a:endParaRPr kumimoji="1" lang="ja-JP" altLang="en-US"/>
           </a:p>
@@ -7259,7 +6732,7 @@
           <a:p>
             <a:fld id="{216FD8EB-7C38-4D9D-8BDF-3ABF2096B376}" type="datetimeFigureOut">
               <a:rPr kumimoji="1" lang="ja-JP" altLang="en-US" smtClean="0"/>
-              <a:t>2017/6/9</a:t>
+              <a:t>2017/6/13</a:t>
             </a:fld>
             <a:endParaRPr kumimoji="1" lang="ja-JP" altLang="en-US"/>
           </a:p>
@@ -7512,7 +6985,7 @@
           <a:p>
             <a:fld id="{216FD8EB-7C38-4D9D-8BDF-3ABF2096B376}" type="datetimeFigureOut">
               <a:rPr kumimoji="1" lang="ja-JP" altLang="en-US" smtClean="0"/>
-              <a:t>2017/6/9</a:t>
+              <a:t>2017/6/13</a:t>
             </a:fld>
             <a:endParaRPr kumimoji="1" lang="ja-JP" altLang="en-US"/>
           </a:p>
@@ -7757,7 +7230,7 @@
           <a:p>
             <a:fld id="{216FD8EB-7C38-4D9D-8BDF-3ABF2096B376}" type="datetimeFigureOut">
               <a:rPr kumimoji="1" lang="ja-JP" altLang="en-US" smtClean="0"/>
-              <a:t>2017/6/9</a:t>
+              <a:t>2017/6/13</a:t>
             </a:fld>
             <a:endParaRPr kumimoji="1" lang="ja-JP" altLang="en-US"/>
           </a:p>
@@ -9153,50 +8626,6 @@
           </a:p>
         </p:txBody>
       </p:sp>
-      <p:graphicFrame>
-        <p:nvGraphicFramePr>
-          <p:cNvPr id="4" name="グラフ 3"/>
-          <p:cNvGraphicFramePr/>
-          <p:nvPr>
-            <p:extLst>
-              <p:ext uri="{D42A27DB-BD31-4B8C-83A1-F6EECF244321}">
-                <p14:modId xmlns:p14="http://schemas.microsoft.com/office/powerpoint/2010/main" val="1709469044"/>
-              </p:ext>
-            </p:extLst>
-          </p:nvPr>
-        </p:nvGraphicFramePr>
-        <p:xfrm>
-          <a:off x="879483" y="2052738"/>
-          <a:ext cx="4670136" cy="4462735"/>
-        </p:xfrm>
-        <a:graphic>
-          <a:graphicData uri="http://schemas.openxmlformats.org/drawingml/2006/chart">
-            <c:chart xmlns:c="http://schemas.openxmlformats.org/drawingml/2006/chart" xmlns:r="http://schemas.openxmlformats.org/officeDocument/2006/relationships" r:id="rId2"/>
-          </a:graphicData>
-        </a:graphic>
-      </p:graphicFrame>
-      <p:graphicFrame>
-        <p:nvGraphicFramePr>
-          <p:cNvPr id="5" name="グラフ 4"/>
-          <p:cNvGraphicFramePr/>
-          <p:nvPr>
-            <p:extLst>
-              <p:ext uri="{D42A27DB-BD31-4B8C-83A1-F6EECF244321}">
-                <p14:modId xmlns:p14="http://schemas.microsoft.com/office/powerpoint/2010/main" val="2121790539"/>
-              </p:ext>
-            </p:extLst>
-          </p:nvPr>
-        </p:nvGraphicFramePr>
-        <p:xfrm>
-          <a:off x="6096000" y="2020388"/>
-          <a:ext cx="4670136" cy="4462735"/>
-        </p:xfrm>
-        <a:graphic>
-          <a:graphicData uri="http://schemas.openxmlformats.org/drawingml/2006/chart">
-            <c:chart xmlns:c="http://schemas.openxmlformats.org/drawingml/2006/chart" xmlns:r="http://schemas.openxmlformats.org/officeDocument/2006/relationships" r:id="rId3"/>
-          </a:graphicData>
-        </a:graphic>
-      </p:graphicFrame>
       <p:sp>
         <p:nvSpPr>
           <p:cNvPr id="6" name="テキスト ボックス 5"/>
@@ -9257,6 +8686,79 @@
           </a:p>
         </p:txBody>
       </p:sp>
+      <p:sp>
+        <p:nvSpPr>
+          <p:cNvPr id="8" name="正方形/長方形 7"/>
+          <p:cNvSpPr/>
+          <p:nvPr/>
+        </p:nvSpPr>
+        <p:spPr>
+          <a:xfrm>
+            <a:off x="0" y="9033"/>
+            <a:ext cx="752129" cy="369332"/>
+          </a:xfrm>
+          <a:prstGeom prst="rect">
+            <a:avLst/>
+          </a:prstGeom>
+        </p:spPr>
+        <p:txBody>
+          <a:bodyPr wrap="none">
+            <a:spAutoFit/>
+          </a:bodyPr>
+          <a:lstStyle/>
+          <a:p>
+            <a:r>
+              <a:rPr lang="en-US" altLang="ja-JP" dirty="0" smtClean="0"/>
+              <a:t>{id:3}</a:t>
+            </a:r>
+            <a:endParaRPr lang="ja-JP" altLang="en-US" dirty="0"/>
+          </a:p>
+        </p:txBody>
+      </p:sp>
+      <p:graphicFrame>
+        <p:nvGraphicFramePr>
+          <p:cNvPr id="14" name="グラフ 13"/>
+          <p:cNvGraphicFramePr/>
+          <p:nvPr>
+            <p:extLst>
+              <p:ext uri="{D42A27DB-BD31-4B8C-83A1-F6EECF244321}">
+                <p14:modId xmlns:p14="http://schemas.microsoft.com/office/powerpoint/2010/main" val="4139211845"/>
+              </p:ext>
+            </p:extLst>
+          </p:nvPr>
+        </p:nvGraphicFramePr>
+        <p:xfrm>
+          <a:off x="752129" y="2060019"/>
+          <a:ext cx="5253816" cy="4081008"/>
+        </p:xfrm>
+        <a:graphic>
+          <a:graphicData uri="http://schemas.openxmlformats.org/drawingml/2006/chart">
+            <c:chart xmlns:c="http://schemas.openxmlformats.org/drawingml/2006/chart" xmlns:r="http://schemas.openxmlformats.org/officeDocument/2006/relationships" r:id="rId2"/>
+          </a:graphicData>
+        </a:graphic>
+      </p:graphicFrame>
+      <p:graphicFrame>
+        <p:nvGraphicFramePr>
+          <p:cNvPr id="15" name="グラフ 14"/>
+          <p:cNvGraphicFramePr/>
+          <p:nvPr>
+            <p:extLst>
+              <p:ext uri="{D42A27DB-BD31-4B8C-83A1-F6EECF244321}">
+                <p14:modId xmlns:p14="http://schemas.microsoft.com/office/powerpoint/2010/main" val="2870788977"/>
+              </p:ext>
+            </p:extLst>
+          </p:nvPr>
+        </p:nvGraphicFramePr>
+        <p:xfrm>
+          <a:off x="6224451" y="2060019"/>
+          <a:ext cx="5253816" cy="4081008"/>
+        </p:xfrm>
+        <a:graphic>
+          <a:graphicData uri="http://schemas.openxmlformats.org/drawingml/2006/chart">
+            <c:chart xmlns:c="http://schemas.openxmlformats.org/drawingml/2006/chart" xmlns:r="http://schemas.openxmlformats.org/officeDocument/2006/relationships" r:id="rId3"/>
+          </a:graphicData>
+        </a:graphic>
+      </p:graphicFrame>
     </p:spTree>
     <p:extLst>
       <p:ext uri="{BB962C8B-B14F-4D97-AF65-F5344CB8AC3E}">

</xml_diff>

<commit_message>
Remove all unused slides after editing
</commit_message>
<xml_diff>
--- a/test/data/in.pptx
+++ b/test/data/in.pptx
@@ -9,6 +9,7 @@
     <p:sldId id="258" r:id="rId3"/>
     <p:sldId id="260" r:id="rId4"/>
     <p:sldId id="261" r:id="rId5"/>
+    <p:sldId id="262" r:id="rId6"/>
   </p:sldIdLst>
   <p:sldSz cx="12192000" cy="6858000"/>
   <p:notesSz cx="6858000" cy="9144000"/>
@@ -4621,7 +4622,7 @@
           <a:p>
             <a:fld id="{216FD8EB-7C38-4D9D-8BDF-3ABF2096B376}" type="datetimeFigureOut">
               <a:rPr kumimoji="1" lang="ja-JP" altLang="en-US" smtClean="0"/>
-              <a:t>2017/6/13</a:t>
+              <a:t>2017/6/26</a:t>
             </a:fld>
             <a:endParaRPr kumimoji="1" lang="ja-JP" altLang="en-US"/>
           </a:p>
@@ -4823,7 +4824,7 @@
           <a:p>
             <a:fld id="{216FD8EB-7C38-4D9D-8BDF-3ABF2096B376}" type="datetimeFigureOut">
               <a:rPr kumimoji="1" lang="ja-JP" altLang="en-US" smtClean="0"/>
-              <a:t>2017/6/13</a:t>
+              <a:t>2017/6/26</a:t>
             </a:fld>
             <a:endParaRPr kumimoji="1" lang="ja-JP" altLang="en-US"/>
           </a:p>
@@ -5035,7 +5036,7 @@
           <a:p>
             <a:fld id="{216FD8EB-7C38-4D9D-8BDF-3ABF2096B376}" type="datetimeFigureOut">
               <a:rPr kumimoji="1" lang="ja-JP" altLang="en-US" smtClean="0"/>
-              <a:t>2017/6/13</a:t>
+              <a:t>2017/6/26</a:t>
             </a:fld>
             <a:endParaRPr kumimoji="1" lang="ja-JP" altLang="en-US"/>
           </a:p>
@@ -5237,7 +5238,7 @@
           <a:p>
             <a:fld id="{216FD8EB-7C38-4D9D-8BDF-3ABF2096B376}" type="datetimeFigureOut">
               <a:rPr kumimoji="1" lang="ja-JP" altLang="en-US" smtClean="0"/>
-              <a:t>2017/6/13</a:t>
+              <a:t>2017/6/26</a:t>
             </a:fld>
             <a:endParaRPr kumimoji="1" lang="ja-JP" altLang="en-US"/>
           </a:p>
@@ -5483,7 +5484,7 @@
           <a:p>
             <a:fld id="{216FD8EB-7C38-4D9D-8BDF-3ABF2096B376}" type="datetimeFigureOut">
               <a:rPr kumimoji="1" lang="ja-JP" altLang="en-US" smtClean="0"/>
-              <a:t>2017/6/13</a:t>
+              <a:t>2017/6/26</a:t>
             </a:fld>
             <a:endParaRPr kumimoji="1" lang="ja-JP" altLang="en-US"/>
           </a:p>
@@ -5779,7 +5780,7 @@
           <a:p>
             <a:fld id="{216FD8EB-7C38-4D9D-8BDF-3ABF2096B376}" type="datetimeFigureOut">
               <a:rPr kumimoji="1" lang="ja-JP" altLang="en-US" smtClean="0"/>
-              <a:t>2017/6/13</a:t>
+              <a:t>2017/6/26</a:t>
             </a:fld>
             <a:endParaRPr kumimoji="1" lang="ja-JP" altLang="en-US"/>
           </a:p>
@@ -6210,7 +6211,7 @@
           <a:p>
             <a:fld id="{216FD8EB-7C38-4D9D-8BDF-3ABF2096B376}" type="datetimeFigureOut">
               <a:rPr kumimoji="1" lang="ja-JP" altLang="en-US" smtClean="0"/>
-              <a:t>2017/6/13</a:t>
+              <a:t>2017/6/26</a:t>
             </a:fld>
             <a:endParaRPr kumimoji="1" lang="ja-JP" altLang="en-US"/>
           </a:p>
@@ -6328,7 +6329,7 @@
           <a:p>
             <a:fld id="{216FD8EB-7C38-4D9D-8BDF-3ABF2096B376}" type="datetimeFigureOut">
               <a:rPr kumimoji="1" lang="ja-JP" altLang="en-US" smtClean="0"/>
-              <a:t>2017/6/13</a:t>
+              <a:t>2017/6/26</a:t>
             </a:fld>
             <a:endParaRPr kumimoji="1" lang="ja-JP" altLang="en-US"/>
           </a:p>
@@ -6423,7 +6424,7 @@
           <a:p>
             <a:fld id="{216FD8EB-7C38-4D9D-8BDF-3ABF2096B376}" type="datetimeFigureOut">
               <a:rPr kumimoji="1" lang="ja-JP" altLang="en-US" smtClean="0"/>
-              <a:t>2017/6/13</a:t>
+              <a:t>2017/6/26</a:t>
             </a:fld>
             <a:endParaRPr kumimoji="1" lang="ja-JP" altLang="en-US"/>
           </a:p>
@@ -6732,7 +6733,7 @@
           <a:p>
             <a:fld id="{216FD8EB-7C38-4D9D-8BDF-3ABF2096B376}" type="datetimeFigureOut">
               <a:rPr kumimoji="1" lang="ja-JP" altLang="en-US" smtClean="0"/>
-              <a:t>2017/6/13</a:t>
+              <a:t>2017/6/26</a:t>
             </a:fld>
             <a:endParaRPr kumimoji="1" lang="ja-JP" altLang="en-US"/>
           </a:p>
@@ -6985,7 +6986,7 @@
           <a:p>
             <a:fld id="{216FD8EB-7C38-4D9D-8BDF-3ABF2096B376}" type="datetimeFigureOut">
               <a:rPr kumimoji="1" lang="ja-JP" altLang="en-US" smtClean="0"/>
-              <a:t>2017/6/13</a:t>
+              <a:t>2017/6/26</a:t>
             </a:fld>
             <a:endParaRPr kumimoji="1" lang="ja-JP" altLang="en-US"/>
           </a:p>
@@ -7230,7 +7231,7 @@
           <a:p>
             <a:fld id="{216FD8EB-7C38-4D9D-8BDF-3ABF2096B376}" type="datetimeFigureOut">
               <a:rPr kumimoji="1" lang="ja-JP" altLang="en-US" smtClean="0"/>
-              <a:t>2017/6/13</a:t>
+              <a:t>2017/6/26</a:t>
             </a:fld>
             <a:endParaRPr kumimoji="1" lang="ja-JP" altLang="en-US"/>
           </a:p>
@@ -8759,10 +8760,159 @@
           </a:graphicData>
         </a:graphic>
       </p:graphicFrame>
+      <p:sp>
+        <p:nvSpPr>
+          <p:cNvPr id="3" name="正方形/長方形 2"/>
+          <p:cNvSpPr/>
+          <p:nvPr/>
+        </p:nvSpPr>
+        <p:spPr>
+          <a:xfrm>
+            <a:off x="4503256" y="3244334"/>
+            <a:ext cx="3185487" cy="369332"/>
+          </a:xfrm>
+          <a:prstGeom prst="rect">
+            <a:avLst/>
+          </a:prstGeom>
+        </p:spPr>
+        <p:txBody>
+          <a:bodyPr wrap="none">
+            <a:spAutoFit/>
+          </a:bodyPr>
+          <a:lstStyle/>
+          <a:p>
+            <a:r>
+              <a:rPr lang="ja-JP" altLang="en-US" dirty="0"/>
+              <a:t>remove_all_slides_having_id</a:t>
+            </a:r>
+          </a:p>
+        </p:txBody>
+      </p:sp>
     </p:spTree>
     <p:extLst>
       <p:ext uri="{BB962C8B-B14F-4D97-AF65-F5344CB8AC3E}">
         <p14:creationId xmlns:p14="http://schemas.microsoft.com/office/powerpoint/2010/main" val="802619964"/>
+      </p:ext>
+    </p:extLst>
+  </p:cSld>
+  <p:clrMapOvr>
+    <a:masterClrMapping/>
+  </p:clrMapOvr>
+</p:sld>
+</file>
+
+<file path=ppt/slides/slide5.xml><?xml version="1.0" encoding="utf-8"?>
+<p:sld xmlns:a="http://schemas.openxmlformats.org/drawingml/2006/main" xmlns:r="http://schemas.openxmlformats.org/officeDocument/2006/relationships" xmlns:p="http://schemas.openxmlformats.org/presentationml/2006/main">
+  <p:cSld>
+    <p:spTree>
+      <p:nvGrpSpPr>
+        <p:cNvPr id="1" name=""/>
+        <p:cNvGrpSpPr/>
+        <p:nvPr/>
+      </p:nvGrpSpPr>
+      <p:grpSpPr>
+        <a:xfrm>
+          <a:off x="0" y="0"/>
+          <a:ext cx="0" cy="0"/>
+          <a:chOff x="0" y="0"/>
+          <a:chExt cx="0" cy="0"/>
+        </a:xfrm>
+      </p:grpSpPr>
+      <p:sp>
+        <p:nvSpPr>
+          <p:cNvPr id="2" name="タイトル 1"/>
+          <p:cNvSpPr>
+            <a:spLocks noGrp="1"/>
+          </p:cNvSpPr>
+          <p:nvPr>
+            <p:ph type="ctrTitle"/>
+          </p:nvPr>
+        </p:nvSpPr>
+        <p:spPr/>
+        <p:txBody>
+          <a:bodyPr/>
+          <a:lstStyle/>
+          <a:p>
+            <a:r>
+              <a:rPr kumimoji="1" lang="en-US" altLang="ja-JP" dirty="0" err="1" smtClean="0"/>
+              <a:t>Ppt</a:t>
+            </a:r>
+            <a:r>
+              <a:rPr kumimoji="1" lang="en-US" altLang="ja-JP" dirty="0" smtClean="0"/>
+              <a:t>-template test</a:t>
+            </a:r>
+            <a:endParaRPr kumimoji="1" lang="ja-JP" altLang="en-US" dirty="0"/>
+          </a:p>
+        </p:txBody>
+      </p:sp>
+      <p:sp>
+        <p:nvSpPr>
+          <p:cNvPr id="3" name="サブタイトル 2"/>
+          <p:cNvSpPr>
+            <a:spLocks noGrp="1"/>
+          </p:cNvSpPr>
+          <p:nvPr>
+            <p:ph type="subTitle" idx="1"/>
+          </p:nvPr>
+        </p:nvSpPr>
+        <p:spPr/>
+        <p:txBody>
+          <a:bodyPr/>
+          <a:lstStyle/>
+          <a:p>
+            <a:r>
+              <a:rPr lang="en-US" altLang="ja-JP" dirty="0" smtClean="0"/>
+              <a:t>This </a:t>
+            </a:r>
+            <a:r>
+              <a:rPr lang="en-US" altLang="ja-JP" smtClean="0"/>
+              <a:t>slide will be removed</a:t>
+            </a:r>
+            <a:endParaRPr kumimoji="1" lang="ja-JP" altLang="en-US"/>
+          </a:p>
+        </p:txBody>
+      </p:sp>
+      <p:sp>
+        <p:nvSpPr>
+          <p:cNvPr id="4" name="正方形/長方形 3"/>
+          <p:cNvSpPr/>
+          <p:nvPr/>
+        </p:nvSpPr>
+        <p:spPr>
+          <a:xfrm>
+            <a:off x="0" y="9033"/>
+            <a:ext cx="1838965" cy="369332"/>
+          </a:xfrm>
+          <a:prstGeom prst="rect">
+            <a:avLst/>
+          </a:prstGeom>
+        </p:spPr>
+        <p:txBody>
+          <a:bodyPr wrap="none">
+            <a:spAutoFit/>
+          </a:bodyPr>
+          <a:lstStyle/>
+          <a:p>
+            <a:r>
+              <a:rPr lang="en-US" altLang="ja-JP" dirty="0" smtClean="0"/>
+              <a:t>{</a:t>
+            </a:r>
+            <a:r>
+              <a:rPr lang="en-US" altLang="ja-JP" dirty="0" err="1" smtClean="0"/>
+              <a:t>id:never_used</a:t>
+            </a:r>
+            <a:r>
+              <a:rPr lang="en-US" altLang="ja-JP" dirty="0" smtClean="0"/>
+              <a:t>}</a:t>
+            </a:r>
+            <a:endParaRPr lang="ja-JP" altLang="en-US" dirty="0"/>
+          </a:p>
+        </p:txBody>
+      </p:sp>
+    </p:spTree>
+    <p:extLst>
+      <p:ext uri="{BB962C8B-B14F-4D97-AF65-F5344CB8AC3E}">
+        <p14:creationId xmlns:p14="http://schemas.microsoft.com/office/powerpoint/2010/main" val="3535598199"/>
       </p:ext>
     </p:extLst>
   </p:cSld>

</xml_diff>

<commit_message>
Refactor: separate csv load logic from the chart handling function
</commit_message>
<xml_diff>
--- a/test/data/in.pptx
+++ b/test/data/in.pptx
@@ -9,7 +9,9 @@
     <p:sldId id="258" r:id="rId3"/>
     <p:sldId id="260" r:id="rId4"/>
     <p:sldId id="261" r:id="rId5"/>
-    <p:sldId id="262" r:id="rId6"/>
+    <p:sldId id="263" r:id="rId6"/>
+    <p:sldId id="264" r:id="rId7"/>
+    <p:sldId id="262" r:id="rId8"/>
   </p:sldIdLst>
   <p:sldSz cx="12192000" cy="6858000"/>
   <p:notesSz cx="6858000" cy="9144000"/>
@@ -161,6 +163,7 @@
           </a:p>
         </c:rich>
       </c:tx>
+      <c:layout/>
       <c:overlay val="0"/>
       <c:spPr>
         <a:noFill/>
@@ -631,6 +634,7 @@
     </c:plotArea>
     <c:legend>
       <c:legendPos val="b"/>
+      <c:layout/>
       <c:overlay val="0"/>
       <c:spPr>
         <a:noFill/>
@@ -732,6 +736,7 @@
           </a:p>
         </c:rich>
       </c:tx>
+      <c:layout/>
       <c:overlay val="0"/>
       <c:spPr>
         <a:noFill/>
@@ -1204,6 +1209,7 @@
     </c:plotArea>
     <c:legend>
       <c:legendPos val="b"/>
+      <c:layout/>
       <c:overlay val="0"/>
       <c:spPr>
         <a:noFill/>
@@ -2236,6 +2242,1154 @@
     </c:plotArea>
     <c:legend>
       <c:legendPos val="t"/>
+      <c:layout/>
+      <c:overlay val="0"/>
+      <c:spPr>
+        <a:noFill/>
+        <a:ln>
+          <a:noFill/>
+        </a:ln>
+        <a:effectLst/>
+      </c:spPr>
+      <c:txPr>
+        <a:bodyPr rot="0" spcFirstLastPara="1" vertOverflow="ellipsis" vert="horz" wrap="square" anchor="ctr" anchorCtr="1"/>
+        <a:lstStyle/>
+        <a:p>
+          <a:pPr>
+            <a:defRPr sz="1197" b="0" i="0" u="none" strike="noStrike" kern="1200" baseline="0">
+              <a:solidFill>
+                <a:schemeClr val="tx1">
+                  <a:lumMod val="65000"/>
+                  <a:lumOff val="35000"/>
+                </a:schemeClr>
+              </a:solidFill>
+              <a:latin typeface="+mn-lt"/>
+              <a:ea typeface="+mn-ea"/>
+              <a:cs typeface="+mn-cs"/>
+            </a:defRPr>
+          </a:pPr>
+          <a:endParaRPr lang="ja-JP"/>
+        </a:p>
+      </c:txPr>
+    </c:legend>
+    <c:plotVisOnly val="1"/>
+    <c:dispBlanksAs val="gap"/>
+    <c:showDLblsOverMax val="0"/>
+  </c:chart>
+  <c:spPr>
+    <a:noFill/>
+    <a:ln>
+      <a:noFill/>
+    </a:ln>
+    <a:effectLst/>
+  </c:spPr>
+  <c:txPr>
+    <a:bodyPr/>
+    <a:lstStyle/>
+    <a:p>
+      <a:pPr>
+        <a:defRPr/>
+      </a:pPr>
+      <a:endParaRPr lang="ja-JP"/>
+    </a:p>
+  </c:txPr>
+  <c:externalData r:id="rId3">
+    <c:autoUpdate val="0"/>
+  </c:externalData>
+</c:chartSpace>
+</file>
+
+<file path=ppt/charts/chart5.xml><?xml version="1.0" encoding="utf-8"?>
+<c:chartSpace xmlns:c="http://schemas.openxmlformats.org/drawingml/2006/chart" xmlns:a="http://schemas.openxmlformats.org/drawingml/2006/main" xmlns:r="http://schemas.openxmlformats.org/officeDocument/2006/relationships" xmlns:c16r2="http://schemas.microsoft.com/office/drawing/2015/06/chart">
+  <c:date1904 val="0"/>
+  <c:lang val="ja-JP"/>
+  <c:roundedCorners val="0"/>
+  <mc:AlternateContent xmlns:mc="http://schemas.openxmlformats.org/markup-compatibility/2006">
+    <mc:Choice xmlns:c14="http://schemas.microsoft.com/office/drawing/2007/8/2/chart" Requires="c14">
+      <c14:style val="102"/>
+    </mc:Choice>
+    <mc:Fallback>
+      <c:style val="2"/>
+    </mc:Fallback>
+  </mc:AlternateContent>
+  <c:chart>
+    <c:title>
+      <c:tx>
+        <c:rich>
+          <a:bodyPr rot="0" spcFirstLastPara="1" vertOverflow="ellipsis" vert="horz" wrap="square" anchor="ctr" anchorCtr="1"/>
+          <a:lstStyle/>
+          <a:p>
+            <a:pPr>
+              <a:defRPr sz="1862" b="0" i="0" u="none" strike="noStrike" kern="1200" spc="0" baseline="0">
+                <a:solidFill>
+                  <a:schemeClr val="tx1">
+                    <a:lumMod val="65000"/>
+                    <a:lumOff val="35000"/>
+                  </a:schemeClr>
+                </a:solidFill>
+                <a:latin typeface="+mn-lt"/>
+                <a:ea typeface="+mn-ea"/>
+                <a:cs typeface="+mn-cs"/>
+              </a:defRPr>
+            </a:pPr>
+            <a:r>
+              <a:rPr lang="en-US" altLang="ja-JP" dirty="0" smtClean="0"/>
+              <a:t>{chart}Sales</a:t>
+            </a:r>
+            <a:r>
+              <a:rPr lang="ja-JP" altLang="en-US" dirty="0" smtClean="0"/>
+              <a:t>販売</a:t>
+            </a:r>
+            <a:endParaRPr lang="ja-JP" altLang="en-US" dirty="0"/>
+          </a:p>
+        </c:rich>
+      </c:tx>
+      <c:layout/>
+      <c:overlay val="0"/>
+      <c:spPr>
+        <a:noFill/>
+        <a:ln>
+          <a:noFill/>
+        </a:ln>
+        <a:effectLst/>
+      </c:spPr>
+      <c:txPr>
+        <a:bodyPr rot="0" spcFirstLastPara="1" vertOverflow="ellipsis" vert="horz" wrap="square" anchor="ctr" anchorCtr="1"/>
+        <a:lstStyle/>
+        <a:p>
+          <a:pPr>
+            <a:defRPr sz="1862" b="0" i="0" u="none" strike="noStrike" kern="1200" spc="0" baseline="0">
+              <a:solidFill>
+                <a:schemeClr val="tx1">
+                  <a:lumMod val="65000"/>
+                  <a:lumOff val="35000"/>
+                </a:schemeClr>
+              </a:solidFill>
+              <a:latin typeface="+mn-lt"/>
+              <a:ea typeface="+mn-ea"/>
+              <a:cs typeface="+mn-cs"/>
+            </a:defRPr>
+          </a:pPr>
+          <a:endParaRPr lang="ja-JP"/>
+        </a:p>
+      </c:txPr>
+    </c:title>
+    <c:autoTitleDeleted val="0"/>
+    <c:plotArea>
+      <c:layout/>
+      <c:barChart>
+        <c:barDir val="col"/>
+        <c:grouping val="clustered"/>
+        <c:varyColors val="0"/>
+        <c:ser>
+          <c:idx val="0"/>
+          <c:order val="0"/>
+          <c:tx>
+            <c:strRef>
+              <c:f>Sheet1!$B$1</c:f>
+              <c:strCache>
+                <c:ptCount val="1"/>
+                <c:pt idx="0">
+                  <c:v>系列 1</c:v>
+                </c:pt>
+              </c:strCache>
+            </c:strRef>
+          </c:tx>
+          <c:spPr>
+            <a:solidFill>
+              <a:schemeClr val="accent1"/>
+            </a:solidFill>
+            <a:ln>
+              <a:noFill/>
+            </a:ln>
+            <a:effectLst/>
+          </c:spPr>
+          <c:invertIfNegative val="0"/>
+          <c:cat>
+            <c:strRef>
+              <c:f>Sheet1!$A$2:$A$5</c:f>
+              <c:strCache>
+                <c:ptCount val="4"/>
+                <c:pt idx="0">
+                  <c:v>分類 1</c:v>
+                </c:pt>
+                <c:pt idx="1">
+                  <c:v>分類 2</c:v>
+                </c:pt>
+                <c:pt idx="2">
+                  <c:v>分類 3</c:v>
+                </c:pt>
+                <c:pt idx="3">
+                  <c:v>分類 4</c:v>
+                </c:pt>
+              </c:strCache>
+            </c:strRef>
+          </c:cat>
+          <c:val>
+            <c:numRef>
+              <c:f>Sheet1!$B$2:$B$5</c:f>
+              <c:numCache>
+                <c:formatCode>General</c:formatCode>
+                <c:ptCount val="4"/>
+                <c:pt idx="0">
+                  <c:v>4.3</c:v>
+                </c:pt>
+                <c:pt idx="1">
+                  <c:v>2.5</c:v>
+                </c:pt>
+                <c:pt idx="2">
+                  <c:v>3.5</c:v>
+                </c:pt>
+                <c:pt idx="3">
+                  <c:v>4.5</c:v>
+                </c:pt>
+              </c:numCache>
+            </c:numRef>
+          </c:val>
+          <c:extLst>
+            <c:ext xmlns:c16="http://schemas.microsoft.com/office/drawing/2014/chart" uri="{C3380CC4-5D6E-409C-BE32-E72D297353CC}">
+              <c16:uniqueId val="{00000000-0326-4CA4-96E1-F416A1964CB4}"/>
+            </c:ext>
+          </c:extLst>
+        </c:ser>
+        <c:ser>
+          <c:idx val="1"/>
+          <c:order val="1"/>
+          <c:tx>
+            <c:strRef>
+              <c:f>Sheet1!$C$1</c:f>
+              <c:strCache>
+                <c:ptCount val="1"/>
+                <c:pt idx="0">
+                  <c:v>系列 2</c:v>
+                </c:pt>
+              </c:strCache>
+            </c:strRef>
+          </c:tx>
+          <c:spPr>
+            <a:solidFill>
+              <a:schemeClr val="accent2"/>
+            </a:solidFill>
+            <a:ln>
+              <a:noFill/>
+            </a:ln>
+            <a:effectLst/>
+          </c:spPr>
+          <c:invertIfNegative val="0"/>
+          <c:cat>
+            <c:strRef>
+              <c:f>Sheet1!$A$2:$A$5</c:f>
+              <c:strCache>
+                <c:ptCount val="4"/>
+                <c:pt idx="0">
+                  <c:v>分類 1</c:v>
+                </c:pt>
+                <c:pt idx="1">
+                  <c:v>分類 2</c:v>
+                </c:pt>
+                <c:pt idx="2">
+                  <c:v>分類 3</c:v>
+                </c:pt>
+                <c:pt idx="3">
+                  <c:v>分類 4</c:v>
+                </c:pt>
+              </c:strCache>
+            </c:strRef>
+          </c:cat>
+          <c:val>
+            <c:numRef>
+              <c:f>Sheet1!$C$2:$C$5</c:f>
+              <c:numCache>
+                <c:formatCode>General</c:formatCode>
+                <c:ptCount val="4"/>
+                <c:pt idx="0">
+                  <c:v>2.4</c:v>
+                </c:pt>
+                <c:pt idx="1">
+                  <c:v>4.4000000000000004</c:v>
+                </c:pt>
+                <c:pt idx="2">
+                  <c:v>1.8</c:v>
+                </c:pt>
+                <c:pt idx="3">
+                  <c:v>2.8</c:v>
+                </c:pt>
+              </c:numCache>
+            </c:numRef>
+          </c:val>
+          <c:extLst>
+            <c:ext xmlns:c16="http://schemas.microsoft.com/office/drawing/2014/chart" uri="{C3380CC4-5D6E-409C-BE32-E72D297353CC}">
+              <c16:uniqueId val="{00000001-0326-4CA4-96E1-F416A1964CB4}"/>
+            </c:ext>
+          </c:extLst>
+        </c:ser>
+        <c:dLbls>
+          <c:showLegendKey val="0"/>
+          <c:showVal val="0"/>
+          <c:showCatName val="0"/>
+          <c:showSerName val="0"/>
+          <c:showPercent val="0"/>
+          <c:showBubbleSize val="0"/>
+        </c:dLbls>
+        <c:gapWidth val="219"/>
+        <c:overlap val="-27"/>
+        <c:axId val="306136656"/>
+        <c:axId val="424804560"/>
+      </c:barChart>
+      <c:lineChart>
+        <c:grouping val="standard"/>
+        <c:varyColors val="0"/>
+        <c:ser>
+          <c:idx val="2"/>
+          <c:order val="2"/>
+          <c:tx>
+            <c:strRef>
+              <c:f>Sheet1!$D$1</c:f>
+              <c:strCache>
+                <c:ptCount val="1"/>
+                <c:pt idx="0">
+                  <c:v>系列 3</c:v>
+                </c:pt>
+              </c:strCache>
+            </c:strRef>
+          </c:tx>
+          <c:spPr>
+            <a:ln w="28575" cap="rnd">
+              <a:solidFill>
+                <a:schemeClr val="accent3"/>
+              </a:solidFill>
+              <a:round/>
+            </a:ln>
+            <a:effectLst/>
+          </c:spPr>
+          <c:marker>
+            <c:symbol val="circle"/>
+            <c:size val="5"/>
+            <c:spPr>
+              <a:solidFill>
+                <a:schemeClr val="accent3"/>
+              </a:solidFill>
+              <a:ln w="9525">
+                <a:solidFill>
+                  <a:schemeClr val="accent3"/>
+                </a:solidFill>
+              </a:ln>
+              <a:effectLst/>
+            </c:spPr>
+          </c:marker>
+          <c:cat>
+            <c:strRef>
+              <c:f>Sheet1!$A$2:$A$5</c:f>
+              <c:strCache>
+                <c:ptCount val="4"/>
+                <c:pt idx="0">
+                  <c:v>分類 1</c:v>
+                </c:pt>
+                <c:pt idx="1">
+                  <c:v>分類 2</c:v>
+                </c:pt>
+                <c:pt idx="2">
+                  <c:v>分類 3</c:v>
+                </c:pt>
+                <c:pt idx="3">
+                  <c:v>分類 4</c:v>
+                </c:pt>
+              </c:strCache>
+            </c:strRef>
+          </c:cat>
+          <c:val>
+            <c:numRef>
+              <c:f>Sheet1!$D$2:$D$5</c:f>
+              <c:numCache>
+                <c:formatCode>General</c:formatCode>
+                <c:ptCount val="4"/>
+                <c:pt idx="0">
+                  <c:v>2</c:v>
+                </c:pt>
+                <c:pt idx="1">
+                  <c:v>2</c:v>
+                </c:pt>
+                <c:pt idx="2">
+                  <c:v>3</c:v>
+                </c:pt>
+                <c:pt idx="3">
+                  <c:v>5</c:v>
+                </c:pt>
+              </c:numCache>
+            </c:numRef>
+          </c:val>
+          <c:smooth val="0"/>
+          <c:extLst>
+            <c:ext xmlns:c16="http://schemas.microsoft.com/office/drawing/2014/chart" uri="{C3380CC4-5D6E-409C-BE32-E72D297353CC}">
+              <c16:uniqueId val="{00000002-0326-4CA4-96E1-F416A1964CB4}"/>
+            </c:ext>
+          </c:extLst>
+        </c:ser>
+        <c:dLbls>
+          <c:showLegendKey val="0"/>
+          <c:showVal val="0"/>
+          <c:showCatName val="0"/>
+          <c:showSerName val="0"/>
+          <c:showPercent val="0"/>
+          <c:showBubbleSize val="0"/>
+        </c:dLbls>
+        <c:marker val="1"/>
+        <c:smooth val="0"/>
+        <c:axId val="308281872"/>
+        <c:axId val="209466448"/>
+      </c:lineChart>
+      <c:catAx>
+        <c:axId val="306136656"/>
+        <c:scaling>
+          <c:orientation val="minMax"/>
+        </c:scaling>
+        <c:delete val="0"/>
+        <c:axPos val="b"/>
+        <c:numFmt formatCode="General" sourceLinked="1"/>
+        <c:majorTickMark val="none"/>
+        <c:minorTickMark val="none"/>
+        <c:tickLblPos val="nextTo"/>
+        <c:spPr>
+          <a:noFill/>
+          <a:ln w="9525" cap="flat" cmpd="sng" algn="ctr">
+            <a:solidFill>
+              <a:schemeClr val="tx1">
+                <a:lumMod val="15000"/>
+                <a:lumOff val="85000"/>
+              </a:schemeClr>
+            </a:solidFill>
+            <a:round/>
+          </a:ln>
+          <a:effectLst/>
+        </c:spPr>
+        <c:txPr>
+          <a:bodyPr rot="-60000000" spcFirstLastPara="1" vertOverflow="ellipsis" vert="horz" wrap="square" anchor="ctr" anchorCtr="1"/>
+          <a:lstStyle/>
+          <a:p>
+            <a:pPr>
+              <a:defRPr sz="1197" b="0" i="0" u="none" strike="noStrike" kern="1200" baseline="0">
+                <a:solidFill>
+                  <a:schemeClr val="tx1">
+                    <a:lumMod val="65000"/>
+                    <a:lumOff val="35000"/>
+                  </a:schemeClr>
+                </a:solidFill>
+                <a:latin typeface="+mn-lt"/>
+                <a:ea typeface="+mn-ea"/>
+                <a:cs typeface="+mn-cs"/>
+              </a:defRPr>
+            </a:pPr>
+            <a:endParaRPr lang="ja-JP"/>
+          </a:p>
+        </c:txPr>
+        <c:crossAx val="424804560"/>
+        <c:crosses val="autoZero"/>
+        <c:auto val="1"/>
+        <c:lblAlgn val="ctr"/>
+        <c:lblOffset val="100"/>
+        <c:noMultiLvlLbl val="0"/>
+      </c:catAx>
+      <c:valAx>
+        <c:axId val="424804560"/>
+        <c:scaling>
+          <c:orientation val="minMax"/>
+        </c:scaling>
+        <c:delete val="0"/>
+        <c:axPos val="l"/>
+        <c:majorGridlines>
+          <c:spPr>
+            <a:ln w="9525" cap="flat" cmpd="sng" algn="ctr">
+              <a:solidFill>
+                <a:schemeClr val="tx1">
+                  <a:lumMod val="15000"/>
+                  <a:lumOff val="85000"/>
+                </a:schemeClr>
+              </a:solidFill>
+              <a:round/>
+            </a:ln>
+            <a:effectLst/>
+          </c:spPr>
+        </c:majorGridlines>
+        <c:numFmt formatCode="General" sourceLinked="1"/>
+        <c:majorTickMark val="none"/>
+        <c:minorTickMark val="none"/>
+        <c:tickLblPos val="nextTo"/>
+        <c:spPr>
+          <a:noFill/>
+          <a:ln>
+            <a:noFill/>
+          </a:ln>
+          <a:effectLst/>
+        </c:spPr>
+        <c:txPr>
+          <a:bodyPr rot="-60000000" spcFirstLastPara="1" vertOverflow="ellipsis" vert="horz" wrap="square" anchor="ctr" anchorCtr="1"/>
+          <a:lstStyle/>
+          <a:p>
+            <a:pPr>
+              <a:defRPr sz="1197" b="0" i="0" u="none" strike="noStrike" kern="1200" baseline="0">
+                <a:solidFill>
+                  <a:schemeClr val="tx1">
+                    <a:lumMod val="65000"/>
+                    <a:lumOff val="35000"/>
+                  </a:schemeClr>
+                </a:solidFill>
+                <a:latin typeface="+mn-lt"/>
+                <a:ea typeface="+mn-ea"/>
+                <a:cs typeface="+mn-cs"/>
+              </a:defRPr>
+            </a:pPr>
+            <a:endParaRPr lang="ja-JP"/>
+          </a:p>
+        </c:txPr>
+        <c:crossAx val="306136656"/>
+        <c:crosses val="autoZero"/>
+        <c:crossBetween val="between"/>
+      </c:valAx>
+      <c:valAx>
+        <c:axId val="209466448"/>
+        <c:scaling>
+          <c:orientation val="minMax"/>
+        </c:scaling>
+        <c:delete val="0"/>
+        <c:axPos val="r"/>
+        <c:numFmt formatCode="0%" sourceLinked="0"/>
+        <c:majorTickMark val="out"/>
+        <c:minorTickMark val="none"/>
+        <c:tickLblPos val="nextTo"/>
+        <c:spPr>
+          <a:noFill/>
+          <a:ln>
+            <a:noFill/>
+          </a:ln>
+          <a:effectLst/>
+        </c:spPr>
+        <c:txPr>
+          <a:bodyPr rot="-60000000" spcFirstLastPara="1" vertOverflow="ellipsis" vert="horz" wrap="square" anchor="ctr" anchorCtr="1"/>
+          <a:lstStyle/>
+          <a:p>
+            <a:pPr>
+              <a:defRPr sz="1197" b="0" i="0" u="none" strike="noStrike" kern="1200" baseline="0">
+                <a:solidFill>
+                  <a:schemeClr val="tx1">
+                    <a:lumMod val="65000"/>
+                    <a:lumOff val="35000"/>
+                  </a:schemeClr>
+                </a:solidFill>
+                <a:latin typeface="+mn-lt"/>
+                <a:ea typeface="+mn-ea"/>
+                <a:cs typeface="+mn-cs"/>
+              </a:defRPr>
+            </a:pPr>
+            <a:endParaRPr lang="ja-JP"/>
+          </a:p>
+        </c:txPr>
+        <c:crossAx val="308281872"/>
+        <c:crosses val="max"/>
+        <c:crossBetween val="between"/>
+      </c:valAx>
+      <c:catAx>
+        <c:axId val="308281872"/>
+        <c:scaling>
+          <c:orientation val="minMax"/>
+        </c:scaling>
+        <c:delete val="1"/>
+        <c:axPos val="b"/>
+        <c:numFmt formatCode="General" sourceLinked="1"/>
+        <c:majorTickMark val="out"/>
+        <c:minorTickMark val="none"/>
+        <c:tickLblPos val="nextTo"/>
+        <c:crossAx val="209466448"/>
+        <c:crosses val="autoZero"/>
+        <c:auto val="1"/>
+        <c:lblAlgn val="ctr"/>
+        <c:lblOffset val="100"/>
+        <c:noMultiLvlLbl val="0"/>
+      </c:catAx>
+      <c:spPr>
+        <a:noFill/>
+        <a:ln>
+          <a:noFill/>
+        </a:ln>
+        <a:effectLst/>
+      </c:spPr>
+    </c:plotArea>
+    <c:legend>
+      <c:legendPos val="b"/>
+      <c:layout/>
+      <c:overlay val="0"/>
+      <c:spPr>
+        <a:noFill/>
+        <a:ln>
+          <a:noFill/>
+        </a:ln>
+        <a:effectLst/>
+      </c:spPr>
+      <c:txPr>
+        <a:bodyPr rot="0" spcFirstLastPara="1" vertOverflow="ellipsis" vert="horz" wrap="square" anchor="ctr" anchorCtr="1"/>
+        <a:lstStyle/>
+        <a:p>
+          <a:pPr>
+            <a:defRPr sz="1197" b="0" i="0" u="none" strike="noStrike" kern="1200" baseline="0">
+              <a:solidFill>
+                <a:schemeClr val="tx1">
+                  <a:lumMod val="65000"/>
+                  <a:lumOff val="35000"/>
+                </a:schemeClr>
+              </a:solidFill>
+              <a:latin typeface="+mn-lt"/>
+              <a:ea typeface="+mn-ea"/>
+              <a:cs typeface="+mn-cs"/>
+            </a:defRPr>
+          </a:pPr>
+          <a:endParaRPr lang="ja-JP"/>
+        </a:p>
+      </c:txPr>
+    </c:legend>
+    <c:plotVisOnly val="1"/>
+    <c:dispBlanksAs val="gap"/>
+    <c:showDLblsOverMax val="0"/>
+  </c:chart>
+  <c:spPr>
+    <a:noFill/>
+    <a:ln>
+      <a:noFill/>
+    </a:ln>
+    <a:effectLst/>
+  </c:spPr>
+  <c:txPr>
+    <a:bodyPr/>
+    <a:lstStyle/>
+    <a:p>
+      <a:pPr>
+        <a:defRPr/>
+      </a:pPr>
+      <a:endParaRPr lang="ja-JP"/>
+    </a:p>
+  </c:txPr>
+  <c:externalData r:id="rId3">
+    <c:autoUpdate val="0"/>
+  </c:externalData>
+</c:chartSpace>
+</file>
+
+<file path=ppt/charts/chart6.xml><?xml version="1.0" encoding="utf-8"?>
+<c:chartSpace xmlns:c="http://schemas.openxmlformats.org/drawingml/2006/chart" xmlns:a="http://schemas.openxmlformats.org/drawingml/2006/main" xmlns:r="http://schemas.openxmlformats.org/officeDocument/2006/relationships" xmlns:c16r2="http://schemas.microsoft.com/office/drawing/2015/06/chart">
+  <c:date1904 val="0"/>
+  <c:lang val="ja-JP"/>
+  <c:roundedCorners val="0"/>
+  <mc:AlternateContent xmlns:mc="http://schemas.openxmlformats.org/markup-compatibility/2006">
+    <mc:Choice xmlns:c14="http://schemas.microsoft.com/office/drawing/2007/8/2/chart" Requires="c14">
+      <c14:style val="102"/>
+    </mc:Choice>
+    <mc:Fallback>
+      <c:style val="2"/>
+    </mc:Fallback>
+  </mc:AlternateContent>
+  <c:chart>
+    <c:title>
+      <c:tx>
+        <c:rich>
+          <a:bodyPr rot="0" spcFirstLastPara="1" vertOverflow="ellipsis" vert="horz" wrap="square" anchor="ctr" anchorCtr="1"/>
+          <a:lstStyle/>
+          <a:p>
+            <a:pPr>
+              <a:defRPr sz="1862" b="0" i="0" u="none" strike="noStrike" kern="1200" spc="0" baseline="0">
+                <a:solidFill>
+                  <a:schemeClr val="tx1">
+                    <a:lumMod val="65000"/>
+                    <a:lumOff val="35000"/>
+                  </a:schemeClr>
+                </a:solidFill>
+                <a:latin typeface="+mn-lt"/>
+                <a:ea typeface="+mn-ea"/>
+                <a:cs typeface="+mn-cs"/>
+              </a:defRPr>
+            </a:pPr>
+            <a:r>
+              <a:rPr lang="en-US" altLang="ja-JP" dirty="0" smtClean="0"/>
+              <a:t>Sales</a:t>
+            </a:r>
+            <a:r>
+              <a:rPr lang="ja-JP" altLang="en-US" dirty="0" smtClean="0"/>
+              <a:t>販売</a:t>
+            </a:r>
+            <a:endParaRPr lang="ja-JP" altLang="en-US" dirty="0"/>
+          </a:p>
+        </c:rich>
+      </c:tx>
+      <c:layout/>
+      <c:overlay val="0"/>
+      <c:spPr>
+        <a:noFill/>
+        <a:ln>
+          <a:noFill/>
+        </a:ln>
+        <a:effectLst/>
+      </c:spPr>
+      <c:txPr>
+        <a:bodyPr rot="0" spcFirstLastPara="1" vertOverflow="ellipsis" vert="horz" wrap="square" anchor="ctr" anchorCtr="1"/>
+        <a:lstStyle/>
+        <a:p>
+          <a:pPr>
+            <a:defRPr sz="1862" b="0" i="0" u="none" strike="noStrike" kern="1200" spc="0" baseline="0">
+              <a:solidFill>
+                <a:schemeClr val="tx1">
+                  <a:lumMod val="65000"/>
+                  <a:lumOff val="35000"/>
+                </a:schemeClr>
+              </a:solidFill>
+              <a:latin typeface="+mn-lt"/>
+              <a:ea typeface="+mn-ea"/>
+              <a:cs typeface="+mn-cs"/>
+            </a:defRPr>
+          </a:pPr>
+          <a:endParaRPr lang="ja-JP"/>
+        </a:p>
+      </c:txPr>
+    </c:title>
+    <c:autoTitleDeleted val="0"/>
+    <c:plotArea>
+      <c:layout/>
+      <c:barChart>
+        <c:barDir val="col"/>
+        <c:grouping val="clustered"/>
+        <c:varyColors val="0"/>
+        <c:ser>
+          <c:idx val="0"/>
+          <c:order val="0"/>
+          <c:tx>
+            <c:strRef>
+              <c:f>Sheet1!$B$1</c:f>
+              <c:strCache>
+                <c:ptCount val="1"/>
+                <c:pt idx="0">
+                  <c:v>売り上げ</c:v>
+                </c:pt>
+              </c:strCache>
+            </c:strRef>
+          </c:tx>
+          <c:spPr>
+            <a:solidFill>
+              <a:schemeClr val="accent1"/>
+            </a:solidFill>
+            <a:ln>
+              <a:noFill/>
+            </a:ln>
+            <a:effectLst/>
+          </c:spPr>
+          <c:invertIfNegative val="0"/>
+          <c:cat>
+            <c:strRef>
+              <c:f>Sheet1!$A$2:$A$5</c:f>
+              <c:strCache>
+                <c:ptCount val="4"/>
+                <c:pt idx="0">
+                  <c:v>春</c:v>
+                </c:pt>
+                <c:pt idx="1">
+                  <c:v>夏</c:v>
+                </c:pt>
+                <c:pt idx="2">
+                  <c:v>秋</c:v>
+                </c:pt>
+                <c:pt idx="3">
+                  <c:v>冬</c:v>
+                </c:pt>
+              </c:strCache>
+            </c:strRef>
+          </c:cat>
+          <c:val>
+            <c:numRef>
+              <c:f>Sheet1!$B$2:$B$5</c:f>
+              <c:numCache>
+                <c:formatCode>General</c:formatCode>
+                <c:ptCount val="4"/>
+                <c:pt idx="0">
+                  <c:v>100</c:v>
+                </c:pt>
+                <c:pt idx="1">
+                  <c:v>110</c:v>
+                </c:pt>
+                <c:pt idx="2">
+                  <c:v>120</c:v>
+                </c:pt>
+                <c:pt idx="3">
+                  <c:v>130</c:v>
+                </c:pt>
+              </c:numCache>
+            </c:numRef>
+          </c:val>
+          <c:extLst>
+            <c:ext xmlns:c16="http://schemas.microsoft.com/office/drawing/2014/chart" uri="{C3380CC4-5D6E-409C-BE32-E72D297353CC}">
+              <c16:uniqueId val="{00000000-4E85-4B38-93F8-D581561C12C5}"/>
+            </c:ext>
+          </c:extLst>
+        </c:ser>
+        <c:ser>
+          <c:idx val="1"/>
+          <c:order val="1"/>
+          <c:tx>
+            <c:strRef>
+              <c:f>Sheet1!$C$1</c:f>
+              <c:strCache>
+                <c:ptCount val="1"/>
+                <c:pt idx="0">
+                  <c:v>利益</c:v>
+                </c:pt>
+              </c:strCache>
+            </c:strRef>
+          </c:tx>
+          <c:spPr>
+            <a:solidFill>
+              <a:schemeClr val="accent2"/>
+            </a:solidFill>
+            <a:ln>
+              <a:noFill/>
+            </a:ln>
+            <a:effectLst/>
+          </c:spPr>
+          <c:invertIfNegative val="0"/>
+          <c:cat>
+            <c:strRef>
+              <c:f>Sheet1!$A$2:$A$5</c:f>
+              <c:strCache>
+                <c:ptCount val="4"/>
+                <c:pt idx="0">
+                  <c:v>春</c:v>
+                </c:pt>
+                <c:pt idx="1">
+                  <c:v>夏</c:v>
+                </c:pt>
+                <c:pt idx="2">
+                  <c:v>秋</c:v>
+                </c:pt>
+                <c:pt idx="3">
+                  <c:v>冬</c:v>
+                </c:pt>
+              </c:strCache>
+            </c:strRef>
+          </c:cat>
+          <c:val>
+            <c:numRef>
+              <c:f>Sheet1!$C$2:$C$5</c:f>
+              <c:numCache>
+                <c:formatCode>General</c:formatCode>
+                <c:ptCount val="4"/>
+                <c:pt idx="0">
+                  <c:v>50</c:v>
+                </c:pt>
+                <c:pt idx="1">
+                  <c:v>60</c:v>
+                </c:pt>
+                <c:pt idx="2">
+                  <c:v>70</c:v>
+                </c:pt>
+                <c:pt idx="3">
+                  <c:v>80</c:v>
+                </c:pt>
+              </c:numCache>
+            </c:numRef>
+          </c:val>
+          <c:extLst>
+            <c:ext xmlns:c16="http://schemas.microsoft.com/office/drawing/2014/chart" uri="{C3380CC4-5D6E-409C-BE32-E72D297353CC}">
+              <c16:uniqueId val="{00000001-4E85-4B38-93F8-D581561C12C5}"/>
+            </c:ext>
+          </c:extLst>
+        </c:ser>
+        <c:dLbls>
+          <c:showLegendKey val="0"/>
+          <c:showVal val="0"/>
+          <c:showCatName val="0"/>
+          <c:showSerName val="0"/>
+          <c:showPercent val="0"/>
+          <c:showBubbleSize val="0"/>
+        </c:dLbls>
+        <c:gapWidth val="219"/>
+        <c:overlap val="-27"/>
+        <c:axId val="306136656"/>
+        <c:axId val="424804560"/>
+      </c:barChart>
+      <c:lineChart>
+        <c:grouping val="standard"/>
+        <c:varyColors val="0"/>
+        <c:ser>
+          <c:idx val="2"/>
+          <c:order val="2"/>
+          <c:tx>
+            <c:strRef>
+              <c:f>Sheet1!$D$1</c:f>
+              <c:strCache>
+                <c:ptCount val="1"/>
+                <c:pt idx="0">
+                  <c:v>利益率</c:v>
+                </c:pt>
+              </c:strCache>
+            </c:strRef>
+          </c:tx>
+          <c:spPr>
+            <a:ln w="28575" cap="rnd">
+              <a:solidFill>
+                <a:schemeClr val="accent3"/>
+              </a:solidFill>
+              <a:round/>
+            </a:ln>
+            <a:effectLst/>
+          </c:spPr>
+          <c:marker>
+            <c:symbol val="circle"/>
+            <c:size val="5"/>
+            <c:spPr>
+              <a:solidFill>
+                <a:schemeClr val="accent3"/>
+              </a:solidFill>
+              <a:ln w="9525">
+                <a:solidFill>
+                  <a:schemeClr val="accent3"/>
+                </a:solidFill>
+              </a:ln>
+              <a:effectLst/>
+            </c:spPr>
+          </c:marker>
+          <c:cat>
+            <c:strRef>
+              <c:f>Sheet1!$A$2:$A$5</c:f>
+              <c:strCache>
+                <c:ptCount val="4"/>
+                <c:pt idx="0">
+                  <c:v>春</c:v>
+                </c:pt>
+                <c:pt idx="1">
+                  <c:v>夏</c:v>
+                </c:pt>
+                <c:pt idx="2">
+                  <c:v>秋</c:v>
+                </c:pt>
+                <c:pt idx="3">
+                  <c:v>冬</c:v>
+                </c:pt>
+              </c:strCache>
+            </c:strRef>
+          </c:cat>
+          <c:val>
+            <c:numRef>
+              <c:f>Sheet1!$D$2:$D$5</c:f>
+              <c:numCache>
+                <c:formatCode>General</c:formatCode>
+                <c:ptCount val="4"/>
+                <c:pt idx="0">
+                  <c:v>0.5</c:v>
+                </c:pt>
+                <c:pt idx="1">
+                  <c:v>0.54545454545454541</c:v>
+                </c:pt>
+                <c:pt idx="2">
+                  <c:v>0.58333333333333337</c:v>
+                </c:pt>
+                <c:pt idx="3">
+                  <c:v>0.61538461538461542</c:v>
+                </c:pt>
+              </c:numCache>
+            </c:numRef>
+          </c:val>
+          <c:smooth val="0"/>
+          <c:extLst>
+            <c:ext xmlns:c16="http://schemas.microsoft.com/office/drawing/2014/chart" uri="{C3380CC4-5D6E-409C-BE32-E72D297353CC}">
+              <c16:uniqueId val="{00000002-4E85-4B38-93F8-D581561C12C5}"/>
+            </c:ext>
+          </c:extLst>
+        </c:ser>
+        <c:dLbls>
+          <c:showLegendKey val="0"/>
+          <c:showVal val="0"/>
+          <c:showCatName val="0"/>
+          <c:showSerName val="0"/>
+          <c:showPercent val="0"/>
+          <c:showBubbleSize val="0"/>
+        </c:dLbls>
+        <c:marker val="1"/>
+        <c:smooth val="0"/>
+        <c:axId val="308751744"/>
+        <c:axId val="209467696"/>
+      </c:lineChart>
+      <c:catAx>
+        <c:axId val="306136656"/>
+        <c:scaling>
+          <c:orientation val="minMax"/>
+        </c:scaling>
+        <c:delete val="0"/>
+        <c:axPos val="b"/>
+        <c:numFmt formatCode="General" sourceLinked="1"/>
+        <c:majorTickMark val="none"/>
+        <c:minorTickMark val="none"/>
+        <c:tickLblPos val="nextTo"/>
+        <c:spPr>
+          <a:noFill/>
+          <a:ln w="9525" cap="flat" cmpd="sng" algn="ctr">
+            <a:solidFill>
+              <a:schemeClr val="tx1">
+                <a:lumMod val="15000"/>
+                <a:lumOff val="85000"/>
+              </a:schemeClr>
+            </a:solidFill>
+            <a:round/>
+          </a:ln>
+          <a:effectLst/>
+        </c:spPr>
+        <c:txPr>
+          <a:bodyPr rot="-60000000" spcFirstLastPara="1" vertOverflow="ellipsis" vert="horz" wrap="square" anchor="ctr" anchorCtr="1"/>
+          <a:lstStyle/>
+          <a:p>
+            <a:pPr>
+              <a:defRPr sz="1197" b="0" i="0" u="none" strike="noStrike" kern="1200" baseline="0">
+                <a:solidFill>
+                  <a:schemeClr val="tx1">
+                    <a:lumMod val="65000"/>
+                    <a:lumOff val="35000"/>
+                  </a:schemeClr>
+                </a:solidFill>
+                <a:latin typeface="+mn-lt"/>
+                <a:ea typeface="+mn-ea"/>
+                <a:cs typeface="+mn-cs"/>
+              </a:defRPr>
+            </a:pPr>
+            <a:endParaRPr lang="ja-JP"/>
+          </a:p>
+        </c:txPr>
+        <c:crossAx val="424804560"/>
+        <c:crosses val="autoZero"/>
+        <c:auto val="1"/>
+        <c:lblAlgn val="ctr"/>
+        <c:lblOffset val="100"/>
+        <c:noMultiLvlLbl val="0"/>
+      </c:catAx>
+      <c:valAx>
+        <c:axId val="424804560"/>
+        <c:scaling>
+          <c:orientation val="minMax"/>
+          <c:max val="150"/>
+          <c:min val="50"/>
+        </c:scaling>
+        <c:delete val="0"/>
+        <c:axPos val="l"/>
+        <c:majorGridlines>
+          <c:spPr>
+            <a:ln w="9525" cap="flat" cmpd="sng" algn="ctr">
+              <a:solidFill>
+                <a:schemeClr val="tx1">
+                  <a:lumMod val="15000"/>
+                  <a:lumOff val="85000"/>
+                </a:schemeClr>
+              </a:solidFill>
+              <a:round/>
+            </a:ln>
+            <a:effectLst/>
+          </c:spPr>
+        </c:majorGridlines>
+        <c:numFmt formatCode="General" sourceLinked="1"/>
+        <c:majorTickMark val="none"/>
+        <c:minorTickMark val="none"/>
+        <c:tickLblPos val="nextTo"/>
+        <c:spPr>
+          <a:noFill/>
+          <a:ln>
+            <a:noFill/>
+          </a:ln>
+          <a:effectLst/>
+        </c:spPr>
+        <c:txPr>
+          <a:bodyPr rot="-60000000" spcFirstLastPara="1" vertOverflow="ellipsis" vert="horz" wrap="square" anchor="ctr" anchorCtr="1"/>
+          <a:lstStyle/>
+          <a:p>
+            <a:pPr>
+              <a:defRPr sz="1197" b="0" i="0" u="none" strike="noStrike" kern="1200" baseline="0">
+                <a:solidFill>
+                  <a:schemeClr val="tx1">
+                    <a:lumMod val="65000"/>
+                    <a:lumOff val="35000"/>
+                  </a:schemeClr>
+                </a:solidFill>
+                <a:latin typeface="+mn-lt"/>
+                <a:ea typeface="+mn-ea"/>
+                <a:cs typeface="+mn-cs"/>
+              </a:defRPr>
+            </a:pPr>
+            <a:endParaRPr lang="ja-JP"/>
+          </a:p>
+        </c:txPr>
+        <c:crossAx val="306136656"/>
+        <c:crosses val="autoZero"/>
+        <c:crossBetween val="between"/>
+      </c:valAx>
+      <c:valAx>
+        <c:axId val="209467696"/>
+        <c:scaling>
+          <c:orientation val="minMax"/>
+        </c:scaling>
+        <c:delete val="0"/>
+        <c:axPos val="r"/>
+        <c:numFmt formatCode="0%" sourceLinked="0"/>
+        <c:majorTickMark val="out"/>
+        <c:minorTickMark val="none"/>
+        <c:tickLblPos val="nextTo"/>
+        <c:spPr>
+          <a:noFill/>
+          <a:ln>
+            <a:noFill/>
+          </a:ln>
+          <a:effectLst/>
+        </c:spPr>
+        <c:txPr>
+          <a:bodyPr rot="-60000000" spcFirstLastPara="1" vertOverflow="ellipsis" vert="horz" wrap="square" anchor="ctr" anchorCtr="1"/>
+          <a:lstStyle/>
+          <a:p>
+            <a:pPr>
+              <a:defRPr sz="1197" b="0" i="0" u="none" strike="noStrike" kern="1200" baseline="0">
+                <a:solidFill>
+                  <a:schemeClr val="tx1">
+                    <a:lumMod val="65000"/>
+                    <a:lumOff val="35000"/>
+                  </a:schemeClr>
+                </a:solidFill>
+                <a:latin typeface="+mn-lt"/>
+                <a:ea typeface="+mn-ea"/>
+                <a:cs typeface="+mn-cs"/>
+              </a:defRPr>
+            </a:pPr>
+            <a:endParaRPr lang="ja-JP"/>
+          </a:p>
+        </c:txPr>
+        <c:crossAx val="308751744"/>
+        <c:crosses val="max"/>
+        <c:crossBetween val="between"/>
+      </c:valAx>
+      <c:catAx>
+        <c:axId val="308751744"/>
+        <c:scaling>
+          <c:orientation val="minMax"/>
+        </c:scaling>
+        <c:delete val="1"/>
+        <c:axPos val="b"/>
+        <c:numFmt formatCode="General" sourceLinked="1"/>
+        <c:majorTickMark val="out"/>
+        <c:minorTickMark val="none"/>
+        <c:tickLblPos val="nextTo"/>
+        <c:crossAx val="209467696"/>
+        <c:crosses val="autoZero"/>
+        <c:auto val="1"/>
+        <c:lblAlgn val="ctr"/>
+        <c:lblOffset val="100"/>
+        <c:noMultiLvlLbl val="0"/>
+      </c:catAx>
+      <c:spPr>
+        <a:noFill/>
+        <a:ln>
+          <a:noFill/>
+        </a:ln>
+        <a:effectLst/>
+      </c:spPr>
+    </c:plotArea>
+    <c:legend>
+      <c:legendPos val="b"/>
       <c:layout/>
       <c:overlay val="0"/>
       <c:spPr>
@@ -2453,6 +3607,86 @@
 </cs:colorStyle>
 </file>
 
+<file path=ppt/charts/colors5.xml><?xml version="1.0" encoding="utf-8"?>
+<cs:colorStyle xmlns:cs="http://schemas.microsoft.com/office/drawing/2012/chartStyle" xmlns:a="http://schemas.openxmlformats.org/drawingml/2006/main" meth="cycle" id="10">
+  <a:schemeClr val="accent1"/>
+  <a:schemeClr val="accent2"/>
+  <a:schemeClr val="accent3"/>
+  <a:schemeClr val="accent4"/>
+  <a:schemeClr val="accent5"/>
+  <a:schemeClr val="accent6"/>
+  <cs:variation/>
+  <cs:variation>
+    <a:lumMod val="60000"/>
+  </cs:variation>
+  <cs:variation>
+    <a:lumMod val="80000"/>
+    <a:lumOff val="20000"/>
+  </cs:variation>
+  <cs:variation>
+    <a:lumMod val="80000"/>
+  </cs:variation>
+  <cs:variation>
+    <a:lumMod val="60000"/>
+    <a:lumOff val="40000"/>
+  </cs:variation>
+  <cs:variation>
+    <a:lumMod val="50000"/>
+  </cs:variation>
+  <cs:variation>
+    <a:lumMod val="70000"/>
+    <a:lumOff val="30000"/>
+  </cs:variation>
+  <cs:variation>
+    <a:lumMod val="70000"/>
+  </cs:variation>
+  <cs:variation>
+    <a:lumMod val="50000"/>
+    <a:lumOff val="50000"/>
+  </cs:variation>
+</cs:colorStyle>
+</file>
+
+<file path=ppt/charts/colors6.xml><?xml version="1.0" encoding="utf-8"?>
+<cs:colorStyle xmlns:cs="http://schemas.microsoft.com/office/drawing/2012/chartStyle" xmlns:a="http://schemas.openxmlformats.org/drawingml/2006/main" meth="cycle" id="10">
+  <a:schemeClr val="accent1"/>
+  <a:schemeClr val="accent2"/>
+  <a:schemeClr val="accent3"/>
+  <a:schemeClr val="accent4"/>
+  <a:schemeClr val="accent5"/>
+  <a:schemeClr val="accent6"/>
+  <cs:variation/>
+  <cs:variation>
+    <a:lumMod val="60000"/>
+  </cs:variation>
+  <cs:variation>
+    <a:lumMod val="80000"/>
+    <a:lumOff val="20000"/>
+  </cs:variation>
+  <cs:variation>
+    <a:lumMod val="80000"/>
+  </cs:variation>
+  <cs:variation>
+    <a:lumMod val="60000"/>
+    <a:lumOff val="40000"/>
+  </cs:variation>
+  <cs:variation>
+    <a:lumMod val="50000"/>
+  </cs:variation>
+  <cs:variation>
+    <a:lumMod val="70000"/>
+    <a:lumOff val="30000"/>
+  </cs:variation>
+  <cs:variation>
+    <a:lumMod val="70000"/>
+  </cs:variation>
+  <cs:variation>
+    <a:lumMod val="50000"/>
+    <a:lumOff val="50000"/>
+  </cs:variation>
+</cs:colorStyle>
+</file>
+
 <file path=ppt/charts/style1.xml><?xml version="1.0" encoding="utf-8"?>
 <cs:chartStyle xmlns:cs="http://schemas.microsoft.com/office/drawing/2012/chartStyle" xmlns:a="http://schemas.openxmlformats.org/drawingml/2006/main" id="201">
   <cs:axisTitle>
@@ -4472,6 +5706,1012 @@
         <a:round/>
       </a:ln>
     </cs:spPr>
+    <cs:defRPr sz="1197" kern="1200"/>
+  </cs:valueAxis>
+  <cs:wall>
+    <cs:lnRef idx="0"/>
+    <cs:fillRef idx="0"/>
+    <cs:effectRef idx="0"/>
+    <cs:fontRef idx="minor">
+      <a:schemeClr val="tx1"/>
+    </cs:fontRef>
+    <cs:spPr>
+      <a:noFill/>
+      <a:ln>
+        <a:noFill/>
+      </a:ln>
+    </cs:spPr>
+  </cs:wall>
+</cs:chartStyle>
+</file>
+
+<file path=ppt/charts/style5.xml><?xml version="1.0" encoding="utf-8"?>
+<cs:chartStyle xmlns:cs="http://schemas.microsoft.com/office/drawing/2012/chartStyle" xmlns:a="http://schemas.openxmlformats.org/drawingml/2006/main" id="201">
+  <cs:axisTitle>
+    <cs:lnRef idx="0"/>
+    <cs:fillRef idx="0"/>
+    <cs:effectRef idx="0"/>
+    <cs:fontRef idx="minor">
+      <a:schemeClr val="tx1">
+        <a:lumMod val="65000"/>
+        <a:lumOff val="35000"/>
+      </a:schemeClr>
+    </cs:fontRef>
+    <cs:defRPr sz="1330" kern="1200"/>
+  </cs:axisTitle>
+  <cs:categoryAxis>
+    <cs:lnRef idx="0"/>
+    <cs:fillRef idx="0"/>
+    <cs:effectRef idx="0"/>
+    <cs:fontRef idx="minor">
+      <a:schemeClr val="tx1">
+        <a:lumMod val="65000"/>
+        <a:lumOff val="35000"/>
+      </a:schemeClr>
+    </cs:fontRef>
+    <cs:spPr>
+      <a:ln w="9525" cap="flat" cmpd="sng" algn="ctr">
+        <a:solidFill>
+          <a:schemeClr val="tx1">
+            <a:lumMod val="15000"/>
+            <a:lumOff val="85000"/>
+          </a:schemeClr>
+        </a:solidFill>
+        <a:round/>
+      </a:ln>
+    </cs:spPr>
+    <cs:defRPr sz="1197" kern="1200"/>
+  </cs:categoryAxis>
+  <cs:chartArea mods="allowNoFillOverride allowNoLineOverride">
+    <cs:lnRef idx="0"/>
+    <cs:fillRef idx="0"/>
+    <cs:effectRef idx="0"/>
+    <cs:fontRef idx="minor">
+      <a:schemeClr val="tx1"/>
+    </cs:fontRef>
+    <cs:spPr>
+      <a:solidFill>
+        <a:schemeClr val="bg1"/>
+      </a:solidFill>
+      <a:ln w="9525" cap="flat" cmpd="sng" algn="ctr">
+        <a:solidFill>
+          <a:schemeClr val="tx1">
+            <a:lumMod val="15000"/>
+            <a:lumOff val="85000"/>
+          </a:schemeClr>
+        </a:solidFill>
+        <a:round/>
+      </a:ln>
+    </cs:spPr>
+    <cs:defRPr sz="1330" kern="1200"/>
+  </cs:chartArea>
+  <cs:dataLabel>
+    <cs:lnRef idx="0"/>
+    <cs:fillRef idx="0"/>
+    <cs:effectRef idx="0"/>
+    <cs:fontRef idx="minor">
+      <a:schemeClr val="tx1">
+        <a:lumMod val="75000"/>
+        <a:lumOff val="25000"/>
+      </a:schemeClr>
+    </cs:fontRef>
+    <cs:defRPr sz="1197" kern="1200"/>
+  </cs:dataLabel>
+  <cs:dataLabelCallout>
+    <cs:lnRef idx="0"/>
+    <cs:fillRef idx="0"/>
+    <cs:effectRef idx="0"/>
+    <cs:fontRef idx="minor">
+      <a:schemeClr val="dk1">
+        <a:lumMod val="65000"/>
+        <a:lumOff val="35000"/>
+      </a:schemeClr>
+    </cs:fontRef>
+    <cs:spPr>
+      <a:solidFill>
+        <a:schemeClr val="lt1"/>
+      </a:solidFill>
+      <a:ln>
+        <a:solidFill>
+          <a:schemeClr val="dk1">
+            <a:lumMod val="25000"/>
+            <a:lumOff val="75000"/>
+          </a:schemeClr>
+        </a:solidFill>
+      </a:ln>
+    </cs:spPr>
+    <cs:defRPr sz="1197" kern="1200"/>
+    <cs:bodyPr rot="0" spcFirstLastPara="1" vertOverflow="clip" horzOverflow="clip" vert="horz" wrap="square" lIns="36576" tIns="18288" rIns="36576" bIns="18288" anchor="ctr" anchorCtr="1">
+      <a:spAutoFit/>
+    </cs:bodyPr>
+  </cs:dataLabelCallout>
+  <cs:dataPoint>
+    <cs:lnRef idx="0"/>
+    <cs:fillRef idx="1">
+      <cs:styleClr val="auto"/>
+    </cs:fillRef>
+    <cs:effectRef idx="0"/>
+    <cs:fontRef idx="minor">
+      <a:schemeClr val="tx1"/>
+    </cs:fontRef>
+  </cs:dataPoint>
+  <cs:dataPoint3D>
+    <cs:lnRef idx="0"/>
+    <cs:fillRef idx="1">
+      <cs:styleClr val="auto"/>
+    </cs:fillRef>
+    <cs:effectRef idx="0"/>
+    <cs:fontRef idx="minor">
+      <a:schemeClr val="tx1"/>
+    </cs:fontRef>
+  </cs:dataPoint3D>
+  <cs:dataPointLine>
+    <cs:lnRef idx="0">
+      <cs:styleClr val="auto"/>
+    </cs:lnRef>
+    <cs:fillRef idx="1"/>
+    <cs:effectRef idx="0"/>
+    <cs:fontRef idx="minor">
+      <a:schemeClr val="tx1"/>
+    </cs:fontRef>
+    <cs:spPr>
+      <a:ln w="28575" cap="rnd">
+        <a:solidFill>
+          <a:schemeClr val="phClr"/>
+        </a:solidFill>
+        <a:round/>
+      </a:ln>
+    </cs:spPr>
+  </cs:dataPointLine>
+  <cs:dataPointMarker>
+    <cs:lnRef idx="0">
+      <cs:styleClr val="auto"/>
+    </cs:lnRef>
+    <cs:fillRef idx="1">
+      <cs:styleClr val="auto"/>
+    </cs:fillRef>
+    <cs:effectRef idx="0"/>
+    <cs:fontRef idx="minor">
+      <a:schemeClr val="tx1"/>
+    </cs:fontRef>
+    <cs:spPr>
+      <a:ln w="9525">
+        <a:solidFill>
+          <a:schemeClr val="phClr"/>
+        </a:solidFill>
+      </a:ln>
+    </cs:spPr>
+  </cs:dataPointMarker>
+  <cs:dataPointMarkerLayout symbol="circle" size="5"/>
+  <cs:dataPointWireframe>
+    <cs:lnRef idx="0">
+      <cs:styleClr val="auto"/>
+    </cs:lnRef>
+    <cs:fillRef idx="1"/>
+    <cs:effectRef idx="0"/>
+    <cs:fontRef idx="minor">
+      <a:schemeClr val="tx1"/>
+    </cs:fontRef>
+    <cs:spPr>
+      <a:ln w="9525" cap="rnd">
+        <a:solidFill>
+          <a:schemeClr val="phClr"/>
+        </a:solidFill>
+        <a:round/>
+      </a:ln>
+    </cs:spPr>
+  </cs:dataPointWireframe>
+  <cs:dataTable>
+    <cs:lnRef idx="0"/>
+    <cs:fillRef idx="0"/>
+    <cs:effectRef idx="0"/>
+    <cs:fontRef idx="minor">
+      <a:schemeClr val="tx1">
+        <a:lumMod val="65000"/>
+        <a:lumOff val="35000"/>
+      </a:schemeClr>
+    </cs:fontRef>
+    <cs:spPr>
+      <a:noFill/>
+      <a:ln w="9525" cap="flat" cmpd="sng" algn="ctr">
+        <a:solidFill>
+          <a:schemeClr val="tx1">
+            <a:lumMod val="15000"/>
+            <a:lumOff val="85000"/>
+          </a:schemeClr>
+        </a:solidFill>
+        <a:round/>
+      </a:ln>
+    </cs:spPr>
+    <cs:defRPr sz="1197" kern="1200"/>
+  </cs:dataTable>
+  <cs:downBar>
+    <cs:lnRef idx="0"/>
+    <cs:fillRef idx="0"/>
+    <cs:effectRef idx="0"/>
+    <cs:fontRef idx="minor">
+      <a:schemeClr val="dk1"/>
+    </cs:fontRef>
+    <cs:spPr>
+      <a:solidFill>
+        <a:schemeClr val="dk1">
+          <a:lumMod val="65000"/>
+          <a:lumOff val="35000"/>
+        </a:schemeClr>
+      </a:solidFill>
+      <a:ln w="9525">
+        <a:solidFill>
+          <a:schemeClr val="tx1">
+            <a:lumMod val="65000"/>
+            <a:lumOff val="35000"/>
+          </a:schemeClr>
+        </a:solidFill>
+      </a:ln>
+    </cs:spPr>
+  </cs:downBar>
+  <cs:dropLine>
+    <cs:lnRef idx="0"/>
+    <cs:fillRef idx="0"/>
+    <cs:effectRef idx="0"/>
+    <cs:fontRef idx="minor">
+      <a:schemeClr val="tx1"/>
+    </cs:fontRef>
+    <cs:spPr>
+      <a:ln w="9525" cap="flat" cmpd="sng" algn="ctr">
+        <a:solidFill>
+          <a:schemeClr val="tx1">
+            <a:lumMod val="35000"/>
+            <a:lumOff val="65000"/>
+          </a:schemeClr>
+        </a:solidFill>
+        <a:round/>
+      </a:ln>
+    </cs:spPr>
+  </cs:dropLine>
+  <cs:errorBar>
+    <cs:lnRef idx="0"/>
+    <cs:fillRef idx="0"/>
+    <cs:effectRef idx="0"/>
+    <cs:fontRef idx="minor">
+      <a:schemeClr val="tx1"/>
+    </cs:fontRef>
+    <cs:spPr>
+      <a:ln w="9525" cap="flat" cmpd="sng" algn="ctr">
+        <a:solidFill>
+          <a:schemeClr val="tx1">
+            <a:lumMod val="65000"/>
+            <a:lumOff val="35000"/>
+          </a:schemeClr>
+        </a:solidFill>
+        <a:round/>
+      </a:ln>
+    </cs:spPr>
+  </cs:errorBar>
+  <cs:floor>
+    <cs:lnRef idx="0"/>
+    <cs:fillRef idx="0"/>
+    <cs:effectRef idx="0"/>
+    <cs:fontRef idx="minor">
+      <a:schemeClr val="tx1"/>
+    </cs:fontRef>
+    <cs:spPr>
+      <a:noFill/>
+      <a:ln>
+        <a:noFill/>
+      </a:ln>
+    </cs:spPr>
+  </cs:floor>
+  <cs:gridlineMajor>
+    <cs:lnRef idx="0"/>
+    <cs:fillRef idx="0"/>
+    <cs:effectRef idx="0"/>
+    <cs:fontRef idx="minor">
+      <a:schemeClr val="tx1"/>
+    </cs:fontRef>
+    <cs:spPr>
+      <a:ln w="9525" cap="flat" cmpd="sng" algn="ctr">
+        <a:solidFill>
+          <a:schemeClr val="tx1">
+            <a:lumMod val="15000"/>
+            <a:lumOff val="85000"/>
+          </a:schemeClr>
+        </a:solidFill>
+        <a:round/>
+      </a:ln>
+    </cs:spPr>
+  </cs:gridlineMajor>
+  <cs:gridlineMinor>
+    <cs:lnRef idx="0"/>
+    <cs:fillRef idx="0"/>
+    <cs:effectRef idx="0"/>
+    <cs:fontRef idx="minor">
+      <a:schemeClr val="tx1"/>
+    </cs:fontRef>
+    <cs:spPr>
+      <a:ln w="9525" cap="flat" cmpd="sng" algn="ctr">
+        <a:solidFill>
+          <a:schemeClr val="tx1">
+            <a:lumMod val="5000"/>
+            <a:lumOff val="95000"/>
+          </a:schemeClr>
+        </a:solidFill>
+        <a:round/>
+      </a:ln>
+    </cs:spPr>
+  </cs:gridlineMinor>
+  <cs:hiLoLine>
+    <cs:lnRef idx="0"/>
+    <cs:fillRef idx="0"/>
+    <cs:effectRef idx="0"/>
+    <cs:fontRef idx="minor">
+      <a:schemeClr val="tx1"/>
+    </cs:fontRef>
+    <cs:spPr>
+      <a:ln w="9525" cap="flat" cmpd="sng" algn="ctr">
+        <a:solidFill>
+          <a:schemeClr val="tx1">
+            <a:lumMod val="75000"/>
+            <a:lumOff val="25000"/>
+          </a:schemeClr>
+        </a:solidFill>
+        <a:round/>
+      </a:ln>
+    </cs:spPr>
+  </cs:hiLoLine>
+  <cs:leaderLine>
+    <cs:lnRef idx="0"/>
+    <cs:fillRef idx="0"/>
+    <cs:effectRef idx="0"/>
+    <cs:fontRef idx="minor">
+      <a:schemeClr val="tx1"/>
+    </cs:fontRef>
+    <cs:spPr>
+      <a:ln w="9525" cap="flat" cmpd="sng" algn="ctr">
+        <a:solidFill>
+          <a:schemeClr val="tx1">
+            <a:lumMod val="35000"/>
+            <a:lumOff val="65000"/>
+          </a:schemeClr>
+        </a:solidFill>
+        <a:round/>
+      </a:ln>
+    </cs:spPr>
+  </cs:leaderLine>
+  <cs:legend>
+    <cs:lnRef idx="0"/>
+    <cs:fillRef idx="0"/>
+    <cs:effectRef idx="0"/>
+    <cs:fontRef idx="minor">
+      <a:schemeClr val="tx1">
+        <a:lumMod val="65000"/>
+        <a:lumOff val="35000"/>
+      </a:schemeClr>
+    </cs:fontRef>
+    <cs:defRPr sz="1197" kern="1200"/>
+  </cs:legend>
+  <cs:plotArea mods="allowNoFillOverride allowNoLineOverride">
+    <cs:lnRef idx="0"/>
+    <cs:fillRef idx="0"/>
+    <cs:effectRef idx="0"/>
+    <cs:fontRef idx="minor">
+      <a:schemeClr val="tx1"/>
+    </cs:fontRef>
+  </cs:plotArea>
+  <cs:plotArea3D mods="allowNoFillOverride allowNoLineOverride">
+    <cs:lnRef idx="0"/>
+    <cs:fillRef idx="0"/>
+    <cs:effectRef idx="0"/>
+    <cs:fontRef idx="minor">
+      <a:schemeClr val="tx1"/>
+    </cs:fontRef>
+  </cs:plotArea3D>
+  <cs:seriesAxis>
+    <cs:lnRef idx="0"/>
+    <cs:fillRef idx="0"/>
+    <cs:effectRef idx="0"/>
+    <cs:fontRef idx="minor">
+      <a:schemeClr val="tx1">
+        <a:lumMod val="65000"/>
+        <a:lumOff val="35000"/>
+      </a:schemeClr>
+    </cs:fontRef>
+    <cs:defRPr sz="1197" kern="1200"/>
+  </cs:seriesAxis>
+  <cs:seriesLine>
+    <cs:lnRef idx="0"/>
+    <cs:fillRef idx="0"/>
+    <cs:effectRef idx="0"/>
+    <cs:fontRef idx="minor">
+      <a:schemeClr val="tx1"/>
+    </cs:fontRef>
+    <cs:spPr>
+      <a:ln w="9525" cap="flat" cmpd="sng" algn="ctr">
+        <a:solidFill>
+          <a:schemeClr val="tx1">
+            <a:lumMod val="35000"/>
+            <a:lumOff val="65000"/>
+          </a:schemeClr>
+        </a:solidFill>
+        <a:round/>
+      </a:ln>
+    </cs:spPr>
+  </cs:seriesLine>
+  <cs:title>
+    <cs:lnRef idx="0"/>
+    <cs:fillRef idx="0"/>
+    <cs:effectRef idx="0"/>
+    <cs:fontRef idx="minor">
+      <a:schemeClr val="tx1">
+        <a:lumMod val="65000"/>
+        <a:lumOff val="35000"/>
+      </a:schemeClr>
+    </cs:fontRef>
+    <cs:defRPr sz="1862" b="0" kern="1200" spc="0" baseline="0"/>
+  </cs:title>
+  <cs:trendline>
+    <cs:lnRef idx="0">
+      <cs:styleClr val="auto"/>
+    </cs:lnRef>
+    <cs:fillRef idx="0"/>
+    <cs:effectRef idx="0"/>
+    <cs:fontRef idx="minor">
+      <a:schemeClr val="tx1"/>
+    </cs:fontRef>
+    <cs:spPr>
+      <a:ln w="19050" cap="rnd">
+        <a:solidFill>
+          <a:schemeClr val="phClr"/>
+        </a:solidFill>
+        <a:prstDash val="sysDot"/>
+      </a:ln>
+    </cs:spPr>
+  </cs:trendline>
+  <cs:trendlineLabel>
+    <cs:lnRef idx="0"/>
+    <cs:fillRef idx="0"/>
+    <cs:effectRef idx="0"/>
+    <cs:fontRef idx="minor">
+      <a:schemeClr val="tx1">
+        <a:lumMod val="65000"/>
+        <a:lumOff val="35000"/>
+      </a:schemeClr>
+    </cs:fontRef>
+    <cs:defRPr sz="1197" kern="1200"/>
+  </cs:trendlineLabel>
+  <cs:upBar>
+    <cs:lnRef idx="0"/>
+    <cs:fillRef idx="0"/>
+    <cs:effectRef idx="0"/>
+    <cs:fontRef idx="minor">
+      <a:schemeClr val="dk1"/>
+    </cs:fontRef>
+    <cs:spPr>
+      <a:solidFill>
+        <a:schemeClr val="lt1"/>
+      </a:solidFill>
+      <a:ln w="9525">
+        <a:solidFill>
+          <a:schemeClr val="tx1">
+            <a:lumMod val="15000"/>
+            <a:lumOff val="85000"/>
+          </a:schemeClr>
+        </a:solidFill>
+      </a:ln>
+    </cs:spPr>
+  </cs:upBar>
+  <cs:valueAxis>
+    <cs:lnRef idx="0"/>
+    <cs:fillRef idx="0"/>
+    <cs:effectRef idx="0"/>
+    <cs:fontRef idx="minor">
+      <a:schemeClr val="tx1">
+        <a:lumMod val="65000"/>
+        <a:lumOff val="35000"/>
+      </a:schemeClr>
+    </cs:fontRef>
+    <cs:defRPr sz="1197" kern="1200"/>
+  </cs:valueAxis>
+  <cs:wall>
+    <cs:lnRef idx="0"/>
+    <cs:fillRef idx="0"/>
+    <cs:effectRef idx="0"/>
+    <cs:fontRef idx="minor">
+      <a:schemeClr val="tx1"/>
+    </cs:fontRef>
+    <cs:spPr>
+      <a:noFill/>
+      <a:ln>
+        <a:noFill/>
+      </a:ln>
+    </cs:spPr>
+  </cs:wall>
+</cs:chartStyle>
+</file>
+
+<file path=ppt/charts/style6.xml><?xml version="1.0" encoding="utf-8"?>
+<cs:chartStyle xmlns:cs="http://schemas.microsoft.com/office/drawing/2012/chartStyle" xmlns:a="http://schemas.openxmlformats.org/drawingml/2006/main" id="201">
+  <cs:axisTitle>
+    <cs:lnRef idx="0"/>
+    <cs:fillRef idx="0"/>
+    <cs:effectRef idx="0"/>
+    <cs:fontRef idx="minor">
+      <a:schemeClr val="tx1">
+        <a:lumMod val="65000"/>
+        <a:lumOff val="35000"/>
+      </a:schemeClr>
+    </cs:fontRef>
+    <cs:defRPr sz="1330" kern="1200"/>
+  </cs:axisTitle>
+  <cs:categoryAxis>
+    <cs:lnRef idx="0"/>
+    <cs:fillRef idx="0"/>
+    <cs:effectRef idx="0"/>
+    <cs:fontRef idx="minor">
+      <a:schemeClr val="tx1">
+        <a:lumMod val="65000"/>
+        <a:lumOff val="35000"/>
+      </a:schemeClr>
+    </cs:fontRef>
+    <cs:spPr>
+      <a:ln w="9525" cap="flat" cmpd="sng" algn="ctr">
+        <a:solidFill>
+          <a:schemeClr val="tx1">
+            <a:lumMod val="15000"/>
+            <a:lumOff val="85000"/>
+          </a:schemeClr>
+        </a:solidFill>
+        <a:round/>
+      </a:ln>
+    </cs:spPr>
+    <cs:defRPr sz="1197" kern="1200"/>
+  </cs:categoryAxis>
+  <cs:chartArea mods="allowNoFillOverride allowNoLineOverride">
+    <cs:lnRef idx="0"/>
+    <cs:fillRef idx="0"/>
+    <cs:effectRef idx="0"/>
+    <cs:fontRef idx="minor">
+      <a:schemeClr val="tx1"/>
+    </cs:fontRef>
+    <cs:spPr>
+      <a:solidFill>
+        <a:schemeClr val="bg1"/>
+      </a:solidFill>
+      <a:ln w="9525" cap="flat" cmpd="sng" algn="ctr">
+        <a:solidFill>
+          <a:schemeClr val="tx1">
+            <a:lumMod val="15000"/>
+            <a:lumOff val="85000"/>
+          </a:schemeClr>
+        </a:solidFill>
+        <a:round/>
+      </a:ln>
+    </cs:spPr>
+    <cs:defRPr sz="1330" kern="1200"/>
+  </cs:chartArea>
+  <cs:dataLabel>
+    <cs:lnRef idx="0"/>
+    <cs:fillRef idx="0"/>
+    <cs:effectRef idx="0"/>
+    <cs:fontRef idx="minor">
+      <a:schemeClr val="tx1">
+        <a:lumMod val="75000"/>
+        <a:lumOff val="25000"/>
+      </a:schemeClr>
+    </cs:fontRef>
+    <cs:defRPr sz="1197" kern="1200"/>
+  </cs:dataLabel>
+  <cs:dataLabelCallout>
+    <cs:lnRef idx="0"/>
+    <cs:fillRef idx="0"/>
+    <cs:effectRef idx="0"/>
+    <cs:fontRef idx="minor">
+      <a:schemeClr val="dk1">
+        <a:lumMod val="65000"/>
+        <a:lumOff val="35000"/>
+      </a:schemeClr>
+    </cs:fontRef>
+    <cs:spPr>
+      <a:solidFill>
+        <a:schemeClr val="lt1"/>
+      </a:solidFill>
+      <a:ln>
+        <a:solidFill>
+          <a:schemeClr val="dk1">
+            <a:lumMod val="25000"/>
+            <a:lumOff val="75000"/>
+          </a:schemeClr>
+        </a:solidFill>
+      </a:ln>
+    </cs:spPr>
+    <cs:defRPr sz="1197" kern="1200"/>
+    <cs:bodyPr rot="0" spcFirstLastPara="1" vertOverflow="clip" horzOverflow="clip" vert="horz" wrap="square" lIns="36576" tIns="18288" rIns="36576" bIns="18288" anchor="ctr" anchorCtr="1">
+      <a:spAutoFit/>
+    </cs:bodyPr>
+  </cs:dataLabelCallout>
+  <cs:dataPoint>
+    <cs:lnRef idx="0"/>
+    <cs:fillRef idx="1">
+      <cs:styleClr val="auto"/>
+    </cs:fillRef>
+    <cs:effectRef idx="0"/>
+    <cs:fontRef idx="minor">
+      <a:schemeClr val="tx1"/>
+    </cs:fontRef>
+  </cs:dataPoint>
+  <cs:dataPoint3D>
+    <cs:lnRef idx="0"/>
+    <cs:fillRef idx="1">
+      <cs:styleClr val="auto"/>
+    </cs:fillRef>
+    <cs:effectRef idx="0"/>
+    <cs:fontRef idx="minor">
+      <a:schemeClr val="tx1"/>
+    </cs:fontRef>
+  </cs:dataPoint3D>
+  <cs:dataPointLine>
+    <cs:lnRef idx="0">
+      <cs:styleClr val="auto"/>
+    </cs:lnRef>
+    <cs:fillRef idx="1"/>
+    <cs:effectRef idx="0"/>
+    <cs:fontRef idx="minor">
+      <a:schemeClr val="tx1"/>
+    </cs:fontRef>
+    <cs:spPr>
+      <a:ln w="28575" cap="rnd">
+        <a:solidFill>
+          <a:schemeClr val="phClr"/>
+        </a:solidFill>
+        <a:round/>
+      </a:ln>
+    </cs:spPr>
+  </cs:dataPointLine>
+  <cs:dataPointMarker>
+    <cs:lnRef idx="0">
+      <cs:styleClr val="auto"/>
+    </cs:lnRef>
+    <cs:fillRef idx="1">
+      <cs:styleClr val="auto"/>
+    </cs:fillRef>
+    <cs:effectRef idx="0"/>
+    <cs:fontRef idx="minor">
+      <a:schemeClr val="tx1"/>
+    </cs:fontRef>
+    <cs:spPr>
+      <a:ln w="9525">
+        <a:solidFill>
+          <a:schemeClr val="phClr"/>
+        </a:solidFill>
+      </a:ln>
+    </cs:spPr>
+  </cs:dataPointMarker>
+  <cs:dataPointMarkerLayout symbol="circle" size="5"/>
+  <cs:dataPointWireframe>
+    <cs:lnRef idx="0">
+      <cs:styleClr val="auto"/>
+    </cs:lnRef>
+    <cs:fillRef idx="1"/>
+    <cs:effectRef idx="0"/>
+    <cs:fontRef idx="minor">
+      <a:schemeClr val="tx1"/>
+    </cs:fontRef>
+    <cs:spPr>
+      <a:ln w="9525" cap="rnd">
+        <a:solidFill>
+          <a:schemeClr val="phClr"/>
+        </a:solidFill>
+        <a:round/>
+      </a:ln>
+    </cs:spPr>
+  </cs:dataPointWireframe>
+  <cs:dataTable>
+    <cs:lnRef idx="0"/>
+    <cs:fillRef idx="0"/>
+    <cs:effectRef idx="0"/>
+    <cs:fontRef idx="minor">
+      <a:schemeClr val="tx1">
+        <a:lumMod val="65000"/>
+        <a:lumOff val="35000"/>
+      </a:schemeClr>
+    </cs:fontRef>
+    <cs:spPr>
+      <a:noFill/>
+      <a:ln w="9525" cap="flat" cmpd="sng" algn="ctr">
+        <a:solidFill>
+          <a:schemeClr val="tx1">
+            <a:lumMod val="15000"/>
+            <a:lumOff val="85000"/>
+          </a:schemeClr>
+        </a:solidFill>
+        <a:round/>
+      </a:ln>
+    </cs:spPr>
+    <cs:defRPr sz="1197" kern="1200"/>
+  </cs:dataTable>
+  <cs:downBar>
+    <cs:lnRef idx="0"/>
+    <cs:fillRef idx="0"/>
+    <cs:effectRef idx="0"/>
+    <cs:fontRef idx="minor">
+      <a:schemeClr val="dk1"/>
+    </cs:fontRef>
+    <cs:spPr>
+      <a:solidFill>
+        <a:schemeClr val="dk1">
+          <a:lumMod val="65000"/>
+          <a:lumOff val="35000"/>
+        </a:schemeClr>
+      </a:solidFill>
+      <a:ln w="9525">
+        <a:solidFill>
+          <a:schemeClr val="tx1">
+            <a:lumMod val="65000"/>
+            <a:lumOff val="35000"/>
+          </a:schemeClr>
+        </a:solidFill>
+      </a:ln>
+    </cs:spPr>
+  </cs:downBar>
+  <cs:dropLine>
+    <cs:lnRef idx="0"/>
+    <cs:fillRef idx="0"/>
+    <cs:effectRef idx="0"/>
+    <cs:fontRef idx="minor">
+      <a:schemeClr val="tx1"/>
+    </cs:fontRef>
+    <cs:spPr>
+      <a:ln w="9525" cap="flat" cmpd="sng" algn="ctr">
+        <a:solidFill>
+          <a:schemeClr val="tx1">
+            <a:lumMod val="35000"/>
+            <a:lumOff val="65000"/>
+          </a:schemeClr>
+        </a:solidFill>
+        <a:round/>
+      </a:ln>
+    </cs:spPr>
+  </cs:dropLine>
+  <cs:errorBar>
+    <cs:lnRef idx="0"/>
+    <cs:fillRef idx="0"/>
+    <cs:effectRef idx="0"/>
+    <cs:fontRef idx="minor">
+      <a:schemeClr val="tx1"/>
+    </cs:fontRef>
+    <cs:spPr>
+      <a:ln w="9525" cap="flat" cmpd="sng" algn="ctr">
+        <a:solidFill>
+          <a:schemeClr val="tx1">
+            <a:lumMod val="65000"/>
+            <a:lumOff val="35000"/>
+          </a:schemeClr>
+        </a:solidFill>
+        <a:round/>
+      </a:ln>
+    </cs:spPr>
+  </cs:errorBar>
+  <cs:floor>
+    <cs:lnRef idx="0"/>
+    <cs:fillRef idx="0"/>
+    <cs:effectRef idx="0"/>
+    <cs:fontRef idx="minor">
+      <a:schemeClr val="tx1"/>
+    </cs:fontRef>
+    <cs:spPr>
+      <a:noFill/>
+      <a:ln>
+        <a:noFill/>
+      </a:ln>
+    </cs:spPr>
+  </cs:floor>
+  <cs:gridlineMajor>
+    <cs:lnRef idx="0"/>
+    <cs:fillRef idx="0"/>
+    <cs:effectRef idx="0"/>
+    <cs:fontRef idx="minor">
+      <a:schemeClr val="tx1"/>
+    </cs:fontRef>
+    <cs:spPr>
+      <a:ln w="9525" cap="flat" cmpd="sng" algn="ctr">
+        <a:solidFill>
+          <a:schemeClr val="tx1">
+            <a:lumMod val="15000"/>
+            <a:lumOff val="85000"/>
+          </a:schemeClr>
+        </a:solidFill>
+        <a:round/>
+      </a:ln>
+    </cs:spPr>
+  </cs:gridlineMajor>
+  <cs:gridlineMinor>
+    <cs:lnRef idx="0"/>
+    <cs:fillRef idx="0"/>
+    <cs:effectRef idx="0"/>
+    <cs:fontRef idx="minor">
+      <a:schemeClr val="tx1"/>
+    </cs:fontRef>
+    <cs:spPr>
+      <a:ln w="9525" cap="flat" cmpd="sng" algn="ctr">
+        <a:solidFill>
+          <a:schemeClr val="tx1">
+            <a:lumMod val="5000"/>
+            <a:lumOff val="95000"/>
+          </a:schemeClr>
+        </a:solidFill>
+        <a:round/>
+      </a:ln>
+    </cs:spPr>
+  </cs:gridlineMinor>
+  <cs:hiLoLine>
+    <cs:lnRef idx="0"/>
+    <cs:fillRef idx="0"/>
+    <cs:effectRef idx="0"/>
+    <cs:fontRef idx="minor">
+      <a:schemeClr val="tx1"/>
+    </cs:fontRef>
+    <cs:spPr>
+      <a:ln w="9525" cap="flat" cmpd="sng" algn="ctr">
+        <a:solidFill>
+          <a:schemeClr val="tx1">
+            <a:lumMod val="75000"/>
+            <a:lumOff val="25000"/>
+          </a:schemeClr>
+        </a:solidFill>
+        <a:round/>
+      </a:ln>
+    </cs:spPr>
+  </cs:hiLoLine>
+  <cs:leaderLine>
+    <cs:lnRef idx="0"/>
+    <cs:fillRef idx="0"/>
+    <cs:effectRef idx="0"/>
+    <cs:fontRef idx="minor">
+      <a:schemeClr val="tx1"/>
+    </cs:fontRef>
+    <cs:spPr>
+      <a:ln w="9525" cap="flat" cmpd="sng" algn="ctr">
+        <a:solidFill>
+          <a:schemeClr val="tx1">
+            <a:lumMod val="35000"/>
+            <a:lumOff val="65000"/>
+          </a:schemeClr>
+        </a:solidFill>
+        <a:round/>
+      </a:ln>
+    </cs:spPr>
+  </cs:leaderLine>
+  <cs:legend>
+    <cs:lnRef idx="0"/>
+    <cs:fillRef idx="0"/>
+    <cs:effectRef idx="0"/>
+    <cs:fontRef idx="minor">
+      <a:schemeClr val="tx1">
+        <a:lumMod val="65000"/>
+        <a:lumOff val="35000"/>
+      </a:schemeClr>
+    </cs:fontRef>
+    <cs:defRPr sz="1197" kern="1200"/>
+  </cs:legend>
+  <cs:plotArea mods="allowNoFillOverride allowNoLineOverride">
+    <cs:lnRef idx="0"/>
+    <cs:fillRef idx="0"/>
+    <cs:effectRef idx="0"/>
+    <cs:fontRef idx="minor">
+      <a:schemeClr val="tx1"/>
+    </cs:fontRef>
+  </cs:plotArea>
+  <cs:plotArea3D mods="allowNoFillOverride allowNoLineOverride">
+    <cs:lnRef idx="0"/>
+    <cs:fillRef idx="0"/>
+    <cs:effectRef idx="0"/>
+    <cs:fontRef idx="minor">
+      <a:schemeClr val="tx1"/>
+    </cs:fontRef>
+  </cs:plotArea3D>
+  <cs:seriesAxis>
+    <cs:lnRef idx="0"/>
+    <cs:fillRef idx="0"/>
+    <cs:effectRef idx="0"/>
+    <cs:fontRef idx="minor">
+      <a:schemeClr val="tx1">
+        <a:lumMod val="65000"/>
+        <a:lumOff val="35000"/>
+      </a:schemeClr>
+    </cs:fontRef>
+    <cs:defRPr sz="1197" kern="1200"/>
+  </cs:seriesAxis>
+  <cs:seriesLine>
+    <cs:lnRef idx="0"/>
+    <cs:fillRef idx="0"/>
+    <cs:effectRef idx="0"/>
+    <cs:fontRef idx="minor">
+      <a:schemeClr val="tx1"/>
+    </cs:fontRef>
+    <cs:spPr>
+      <a:ln w="9525" cap="flat" cmpd="sng" algn="ctr">
+        <a:solidFill>
+          <a:schemeClr val="tx1">
+            <a:lumMod val="35000"/>
+            <a:lumOff val="65000"/>
+          </a:schemeClr>
+        </a:solidFill>
+        <a:round/>
+      </a:ln>
+    </cs:spPr>
+  </cs:seriesLine>
+  <cs:title>
+    <cs:lnRef idx="0"/>
+    <cs:fillRef idx="0"/>
+    <cs:effectRef idx="0"/>
+    <cs:fontRef idx="minor">
+      <a:schemeClr val="tx1">
+        <a:lumMod val="65000"/>
+        <a:lumOff val="35000"/>
+      </a:schemeClr>
+    </cs:fontRef>
+    <cs:defRPr sz="1862" b="0" kern="1200" spc="0" baseline="0"/>
+  </cs:title>
+  <cs:trendline>
+    <cs:lnRef idx="0">
+      <cs:styleClr val="auto"/>
+    </cs:lnRef>
+    <cs:fillRef idx="0"/>
+    <cs:effectRef idx="0"/>
+    <cs:fontRef idx="minor">
+      <a:schemeClr val="tx1"/>
+    </cs:fontRef>
+    <cs:spPr>
+      <a:ln w="19050" cap="rnd">
+        <a:solidFill>
+          <a:schemeClr val="phClr"/>
+        </a:solidFill>
+        <a:prstDash val="sysDot"/>
+      </a:ln>
+    </cs:spPr>
+  </cs:trendline>
+  <cs:trendlineLabel>
+    <cs:lnRef idx="0"/>
+    <cs:fillRef idx="0"/>
+    <cs:effectRef idx="0"/>
+    <cs:fontRef idx="minor">
+      <a:schemeClr val="tx1">
+        <a:lumMod val="65000"/>
+        <a:lumOff val="35000"/>
+      </a:schemeClr>
+    </cs:fontRef>
+    <cs:defRPr sz="1197" kern="1200"/>
+  </cs:trendlineLabel>
+  <cs:upBar>
+    <cs:lnRef idx="0"/>
+    <cs:fillRef idx="0"/>
+    <cs:effectRef idx="0"/>
+    <cs:fontRef idx="minor">
+      <a:schemeClr val="dk1"/>
+    </cs:fontRef>
+    <cs:spPr>
+      <a:solidFill>
+        <a:schemeClr val="lt1"/>
+      </a:solidFill>
+      <a:ln w="9525">
+        <a:solidFill>
+          <a:schemeClr val="tx1">
+            <a:lumMod val="15000"/>
+            <a:lumOff val="85000"/>
+          </a:schemeClr>
+        </a:solidFill>
+      </a:ln>
+    </cs:spPr>
+  </cs:upBar>
+  <cs:valueAxis>
+    <cs:lnRef idx="0"/>
+    <cs:fillRef idx="0"/>
+    <cs:effectRef idx="0"/>
+    <cs:fontRef idx="minor">
+      <a:schemeClr val="tx1">
+        <a:lumMod val="65000"/>
+        <a:lumOff val="35000"/>
+      </a:schemeClr>
+    </cs:fontRef>
     <cs:defRPr sz="1197" kern="1200"/>
   </cs:valueAxis>
   <cs:wall>
@@ -4622,7 +6862,7 @@
           <a:p>
             <a:fld id="{216FD8EB-7C38-4D9D-8BDF-3ABF2096B376}" type="datetimeFigureOut">
               <a:rPr kumimoji="1" lang="ja-JP" altLang="en-US" smtClean="0"/>
-              <a:t>2017/6/26</a:t>
+              <a:t>2017/6/27</a:t>
             </a:fld>
             <a:endParaRPr kumimoji="1" lang="ja-JP" altLang="en-US"/>
           </a:p>
@@ -4824,7 +7064,7 @@
           <a:p>
             <a:fld id="{216FD8EB-7C38-4D9D-8BDF-3ABF2096B376}" type="datetimeFigureOut">
               <a:rPr kumimoji="1" lang="ja-JP" altLang="en-US" smtClean="0"/>
-              <a:t>2017/6/26</a:t>
+              <a:t>2017/6/27</a:t>
             </a:fld>
             <a:endParaRPr kumimoji="1" lang="ja-JP" altLang="en-US"/>
           </a:p>
@@ -5036,7 +7276,7 @@
           <a:p>
             <a:fld id="{216FD8EB-7C38-4D9D-8BDF-3ABF2096B376}" type="datetimeFigureOut">
               <a:rPr kumimoji="1" lang="ja-JP" altLang="en-US" smtClean="0"/>
-              <a:t>2017/6/26</a:t>
+              <a:t>2017/6/27</a:t>
             </a:fld>
             <a:endParaRPr kumimoji="1" lang="ja-JP" altLang="en-US"/>
           </a:p>
@@ -5238,7 +7478,7 @@
           <a:p>
             <a:fld id="{216FD8EB-7C38-4D9D-8BDF-3ABF2096B376}" type="datetimeFigureOut">
               <a:rPr kumimoji="1" lang="ja-JP" altLang="en-US" smtClean="0"/>
-              <a:t>2017/6/26</a:t>
+              <a:t>2017/6/27</a:t>
             </a:fld>
             <a:endParaRPr kumimoji="1" lang="ja-JP" altLang="en-US"/>
           </a:p>
@@ -5484,7 +7724,7 @@
           <a:p>
             <a:fld id="{216FD8EB-7C38-4D9D-8BDF-3ABF2096B376}" type="datetimeFigureOut">
               <a:rPr kumimoji="1" lang="ja-JP" altLang="en-US" smtClean="0"/>
-              <a:t>2017/6/26</a:t>
+              <a:t>2017/6/27</a:t>
             </a:fld>
             <a:endParaRPr kumimoji="1" lang="ja-JP" altLang="en-US"/>
           </a:p>
@@ -5780,7 +8020,7 @@
           <a:p>
             <a:fld id="{216FD8EB-7C38-4D9D-8BDF-3ABF2096B376}" type="datetimeFigureOut">
               <a:rPr kumimoji="1" lang="ja-JP" altLang="en-US" smtClean="0"/>
-              <a:t>2017/6/26</a:t>
+              <a:t>2017/6/27</a:t>
             </a:fld>
             <a:endParaRPr kumimoji="1" lang="ja-JP" altLang="en-US"/>
           </a:p>
@@ -6211,7 +8451,7 @@
           <a:p>
             <a:fld id="{216FD8EB-7C38-4D9D-8BDF-3ABF2096B376}" type="datetimeFigureOut">
               <a:rPr kumimoji="1" lang="ja-JP" altLang="en-US" smtClean="0"/>
-              <a:t>2017/6/26</a:t>
+              <a:t>2017/6/27</a:t>
             </a:fld>
             <a:endParaRPr kumimoji="1" lang="ja-JP" altLang="en-US"/>
           </a:p>
@@ -6329,7 +8569,7 @@
           <a:p>
             <a:fld id="{216FD8EB-7C38-4D9D-8BDF-3ABF2096B376}" type="datetimeFigureOut">
               <a:rPr kumimoji="1" lang="ja-JP" altLang="en-US" smtClean="0"/>
-              <a:t>2017/6/26</a:t>
+              <a:t>2017/6/27</a:t>
             </a:fld>
             <a:endParaRPr kumimoji="1" lang="ja-JP" altLang="en-US"/>
           </a:p>
@@ -6424,7 +8664,7 @@
           <a:p>
             <a:fld id="{216FD8EB-7C38-4D9D-8BDF-3ABF2096B376}" type="datetimeFigureOut">
               <a:rPr kumimoji="1" lang="ja-JP" altLang="en-US" smtClean="0"/>
-              <a:t>2017/6/26</a:t>
+              <a:t>2017/6/27</a:t>
             </a:fld>
             <a:endParaRPr kumimoji="1" lang="ja-JP" altLang="en-US"/>
           </a:p>
@@ -6733,7 +8973,7 @@
           <a:p>
             <a:fld id="{216FD8EB-7C38-4D9D-8BDF-3ABF2096B376}" type="datetimeFigureOut">
               <a:rPr kumimoji="1" lang="ja-JP" altLang="en-US" smtClean="0"/>
-              <a:t>2017/6/26</a:t>
+              <a:t>2017/6/27</a:t>
             </a:fld>
             <a:endParaRPr kumimoji="1" lang="ja-JP" altLang="en-US"/>
           </a:p>
@@ -6986,7 +9226,7 @@
           <a:p>
             <a:fld id="{216FD8EB-7C38-4D9D-8BDF-3ABF2096B376}" type="datetimeFigureOut">
               <a:rPr kumimoji="1" lang="ja-JP" altLang="en-US" smtClean="0"/>
-              <a:t>2017/6/26</a:t>
+              <a:t>2017/6/27</a:t>
             </a:fld>
             <a:endParaRPr kumimoji="1" lang="ja-JP" altLang="en-US"/>
           </a:p>
@@ -7231,7 +9471,7 @@
           <a:p>
             <a:fld id="{216FD8EB-7C38-4D9D-8BDF-3ABF2096B376}" type="datetimeFigureOut">
               <a:rPr kumimoji="1" lang="ja-JP" altLang="en-US" smtClean="0"/>
-              <a:t>2017/6/26</a:t>
+              <a:t>2017/6/27</a:t>
             </a:fld>
             <a:endParaRPr kumimoji="1" lang="ja-JP" altLang="en-US"/>
           </a:p>
@@ -8760,34 +11000,6 @@
           </a:graphicData>
         </a:graphic>
       </p:graphicFrame>
-      <p:sp>
-        <p:nvSpPr>
-          <p:cNvPr id="3" name="正方形/長方形 2"/>
-          <p:cNvSpPr/>
-          <p:nvPr/>
-        </p:nvSpPr>
-        <p:spPr>
-          <a:xfrm>
-            <a:off x="4503256" y="3244334"/>
-            <a:ext cx="3185487" cy="369332"/>
-          </a:xfrm>
-          <a:prstGeom prst="rect">
-            <a:avLst/>
-          </a:prstGeom>
-        </p:spPr>
-        <p:txBody>
-          <a:bodyPr wrap="none">
-            <a:spAutoFit/>
-          </a:bodyPr>
-          <a:lstStyle/>
-          <a:p>
-            <a:r>
-              <a:rPr lang="ja-JP" altLang="en-US" dirty="0"/>
-              <a:t>remove_all_slides_having_id</a:t>
-            </a:r>
-          </a:p>
-        </p:txBody>
-      </p:sp>
     </p:spTree>
     <p:extLst>
       <p:ext uri="{BB962C8B-B14F-4D97-AF65-F5344CB8AC3E}">
@@ -8802,6 +11014,909 @@
 </file>
 
 <file path=ppt/slides/slide5.xml><?xml version="1.0" encoding="utf-8"?>
+<p:sld xmlns:a="http://schemas.openxmlformats.org/drawingml/2006/main" xmlns:r="http://schemas.openxmlformats.org/officeDocument/2006/relationships" xmlns:p="http://schemas.openxmlformats.org/presentationml/2006/main">
+  <p:cSld>
+    <p:spTree>
+      <p:nvGrpSpPr>
+        <p:cNvPr id="1" name=""/>
+        <p:cNvGrpSpPr/>
+        <p:nvPr/>
+      </p:nvGrpSpPr>
+      <p:grpSpPr>
+        <a:xfrm>
+          <a:off x="0" y="0"/>
+          <a:ext cx="0" cy="0"/>
+          <a:chOff x="0" y="0"/>
+          <a:chExt cx="0" cy="0"/>
+        </a:xfrm>
+      </p:grpSpPr>
+      <p:sp>
+        <p:nvSpPr>
+          <p:cNvPr id="2" name="タイトル 1"/>
+          <p:cNvSpPr>
+            <a:spLocks noGrp="1"/>
+          </p:cNvSpPr>
+          <p:nvPr>
+            <p:ph type="title"/>
+          </p:nvPr>
+        </p:nvSpPr>
+        <p:spPr/>
+        <p:txBody>
+          <a:bodyPr/>
+          <a:lstStyle/>
+          <a:p>
+            <a:r>
+              <a:rPr kumimoji="1" lang="en-US" altLang="ja-JP" dirty="0" smtClean="0"/>
+              <a:t>Test#3 – Charts from CSV-String</a:t>
+            </a:r>
+            <a:endParaRPr kumimoji="1" lang="ja-JP" altLang="en-US" dirty="0"/>
+          </a:p>
+        </p:txBody>
+      </p:sp>
+      <p:sp>
+        <p:nvSpPr>
+          <p:cNvPr id="13" name="正方形/長方形 12"/>
+          <p:cNvSpPr/>
+          <p:nvPr/>
+        </p:nvSpPr>
+        <p:spPr>
+          <a:xfrm>
+            <a:off x="0" y="9033"/>
+            <a:ext cx="752129" cy="369332"/>
+          </a:xfrm>
+          <a:prstGeom prst="rect">
+            <a:avLst/>
+          </a:prstGeom>
+        </p:spPr>
+        <p:txBody>
+          <a:bodyPr wrap="none">
+            <a:spAutoFit/>
+          </a:bodyPr>
+          <a:lstStyle/>
+          <a:p>
+            <a:r>
+              <a:rPr lang="en-US" altLang="ja-JP" smtClean="0"/>
+              <a:t>{id:4}</a:t>
+            </a:r>
+            <a:endParaRPr lang="ja-JP" altLang="en-US" dirty="0"/>
+          </a:p>
+        </p:txBody>
+      </p:sp>
+      <p:sp>
+        <p:nvSpPr>
+          <p:cNvPr id="17" name="テキスト ボックス 16"/>
+          <p:cNvSpPr txBox="1"/>
+          <p:nvPr/>
+        </p:nvSpPr>
+        <p:spPr>
+          <a:xfrm>
+            <a:off x="6224451" y="1690688"/>
+            <a:ext cx="1226618" cy="369332"/>
+          </a:xfrm>
+          <a:prstGeom prst="rect">
+            <a:avLst/>
+          </a:prstGeom>
+          <a:noFill/>
+        </p:spPr>
+        <p:txBody>
+          <a:bodyPr wrap="none" rtlCol="0">
+            <a:spAutoFit/>
+          </a:bodyPr>
+          <a:lstStyle/>
+          <a:p>
+            <a:r>
+              <a:rPr kumimoji="1" lang="en-US" altLang="ja-JP" b="1" dirty="0" smtClean="0"/>
+              <a:t>Expected</a:t>
+            </a:r>
+            <a:endParaRPr kumimoji="1" lang="ja-JP" altLang="en-US" b="1" dirty="0"/>
+          </a:p>
+        </p:txBody>
+      </p:sp>
+      <p:sp>
+        <p:nvSpPr>
+          <p:cNvPr id="18" name="テキスト ボックス 17"/>
+          <p:cNvSpPr txBox="1"/>
+          <p:nvPr/>
+        </p:nvSpPr>
+        <p:spPr>
+          <a:xfrm>
+            <a:off x="838200" y="1690688"/>
+            <a:ext cx="902811" cy="369332"/>
+          </a:xfrm>
+          <a:prstGeom prst="rect">
+            <a:avLst/>
+          </a:prstGeom>
+          <a:noFill/>
+        </p:spPr>
+        <p:txBody>
+          <a:bodyPr wrap="none" rtlCol="0">
+            <a:spAutoFit/>
+          </a:bodyPr>
+          <a:lstStyle/>
+          <a:p>
+            <a:r>
+              <a:rPr kumimoji="1" lang="en-US" altLang="ja-JP" b="1" dirty="0" smtClean="0"/>
+              <a:t>Result</a:t>
+            </a:r>
+            <a:endParaRPr kumimoji="1" lang="ja-JP" altLang="en-US" b="1" dirty="0"/>
+          </a:p>
+        </p:txBody>
+      </p:sp>
+      <p:graphicFrame>
+        <p:nvGraphicFramePr>
+          <p:cNvPr id="7" name="グラフ 6"/>
+          <p:cNvGraphicFramePr/>
+          <p:nvPr>
+            <p:extLst>
+              <p:ext uri="{D42A27DB-BD31-4B8C-83A1-F6EECF244321}">
+                <p14:modId xmlns:p14="http://schemas.microsoft.com/office/powerpoint/2010/main" val="2206170267"/>
+              </p:ext>
+            </p:extLst>
+          </p:nvPr>
+        </p:nvGraphicFramePr>
+        <p:xfrm>
+          <a:off x="838200" y="2318798"/>
+          <a:ext cx="4752703" cy="3716249"/>
+        </p:xfrm>
+        <a:graphic>
+          <a:graphicData uri="http://schemas.openxmlformats.org/drawingml/2006/chart">
+            <c:chart xmlns:c="http://schemas.openxmlformats.org/drawingml/2006/chart" xmlns:r="http://schemas.openxmlformats.org/officeDocument/2006/relationships" r:id="rId2"/>
+          </a:graphicData>
+        </a:graphic>
+      </p:graphicFrame>
+      <p:graphicFrame>
+        <p:nvGraphicFramePr>
+          <p:cNvPr id="8" name="グラフ 7"/>
+          <p:cNvGraphicFramePr/>
+          <p:nvPr>
+            <p:extLst/>
+          </p:nvPr>
+        </p:nvGraphicFramePr>
+        <p:xfrm>
+          <a:off x="6096000" y="2318797"/>
+          <a:ext cx="4752703" cy="3716249"/>
+        </p:xfrm>
+        <a:graphic>
+          <a:graphicData uri="http://schemas.openxmlformats.org/drawingml/2006/chart">
+            <c:chart xmlns:c="http://schemas.openxmlformats.org/drawingml/2006/chart" xmlns:r="http://schemas.openxmlformats.org/officeDocument/2006/relationships" r:id="rId3"/>
+          </a:graphicData>
+        </a:graphic>
+      </p:graphicFrame>
+    </p:spTree>
+    <p:extLst>
+      <p:ext uri="{BB962C8B-B14F-4D97-AF65-F5344CB8AC3E}">
+        <p14:creationId xmlns:p14="http://schemas.microsoft.com/office/powerpoint/2010/main" val="3476428113"/>
+      </p:ext>
+    </p:extLst>
+  </p:cSld>
+  <p:clrMapOvr>
+    <a:masterClrMapping/>
+  </p:clrMapOvr>
+</p:sld>
+</file>
+
+<file path=ppt/slides/slide6.xml><?xml version="1.0" encoding="utf-8"?>
+<p:sld xmlns:a="http://schemas.openxmlformats.org/drawingml/2006/main" xmlns:r="http://schemas.openxmlformats.org/officeDocument/2006/relationships" xmlns:p="http://schemas.openxmlformats.org/presentationml/2006/main">
+  <p:cSld>
+    <p:spTree>
+      <p:nvGrpSpPr>
+        <p:cNvPr id="1" name=""/>
+        <p:cNvGrpSpPr/>
+        <p:nvPr/>
+      </p:nvGrpSpPr>
+      <p:grpSpPr>
+        <a:xfrm>
+          <a:off x="0" y="0"/>
+          <a:ext cx="0" cy="0"/>
+          <a:chOff x="0" y="0"/>
+          <a:chExt cx="0" cy="0"/>
+        </a:xfrm>
+      </p:grpSpPr>
+      <p:sp>
+        <p:nvSpPr>
+          <p:cNvPr id="2" name="タイトル 1"/>
+          <p:cNvSpPr>
+            <a:spLocks noGrp="1"/>
+          </p:cNvSpPr>
+          <p:nvPr>
+            <p:ph type="title"/>
+          </p:nvPr>
+        </p:nvSpPr>
+        <p:spPr/>
+        <p:txBody>
+          <a:bodyPr/>
+          <a:lstStyle/>
+          <a:p>
+            <a:r>
+              <a:rPr kumimoji="1" lang="en-US" altLang="ja-JP" dirty="0" smtClean="0"/>
+              <a:t>Test#4 </a:t>
+            </a:r>
+            <a:r>
+              <a:rPr kumimoji="1" lang="en-US" altLang="ja-JP" dirty="0" smtClean="0"/>
+              <a:t>– </a:t>
+            </a:r>
+            <a:r>
+              <a:rPr kumimoji="1" lang="en-US" altLang="ja-JP" dirty="0" smtClean="0"/>
+              <a:t>Table </a:t>
+            </a:r>
+            <a:r>
+              <a:rPr kumimoji="1" lang="en-US" altLang="ja-JP" dirty="0" smtClean="0"/>
+              <a:t>from CSV-String</a:t>
+            </a:r>
+            <a:endParaRPr kumimoji="1" lang="ja-JP" altLang="en-US" dirty="0"/>
+          </a:p>
+        </p:txBody>
+      </p:sp>
+      <p:sp>
+        <p:nvSpPr>
+          <p:cNvPr id="13" name="正方形/長方形 12"/>
+          <p:cNvSpPr/>
+          <p:nvPr/>
+        </p:nvSpPr>
+        <p:spPr>
+          <a:xfrm>
+            <a:off x="0" y="9033"/>
+            <a:ext cx="752129" cy="369332"/>
+          </a:xfrm>
+          <a:prstGeom prst="rect">
+            <a:avLst/>
+          </a:prstGeom>
+        </p:spPr>
+        <p:txBody>
+          <a:bodyPr wrap="none">
+            <a:spAutoFit/>
+          </a:bodyPr>
+          <a:lstStyle/>
+          <a:p>
+            <a:r>
+              <a:rPr lang="en-US" altLang="ja-JP" dirty="0" smtClean="0"/>
+              <a:t>{</a:t>
+            </a:r>
+            <a:r>
+              <a:rPr lang="en-US" altLang="ja-JP" dirty="0" smtClean="0"/>
+              <a:t>id:5}</a:t>
+            </a:r>
+            <a:endParaRPr lang="ja-JP" altLang="en-US" dirty="0"/>
+          </a:p>
+        </p:txBody>
+      </p:sp>
+      <p:sp>
+        <p:nvSpPr>
+          <p:cNvPr id="17" name="テキスト ボックス 16"/>
+          <p:cNvSpPr txBox="1"/>
+          <p:nvPr/>
+        </p:nvSpPr>
+        <p:spPr>
+          <a:xfrm>
+            <a:off x="6224451" y="1690688"/>
+            <a:ext cx="1226618" cy="369332"/>
+          </a:xfrm>
+          <a:prstGeom prst="rect">
+            <a:avLst/>
+          </a:prstGeom>
+          <a:noFill/>
+        </p:spPr>
+        <p:txBody>
+          <a:bodyPr wrap="none" rtlCol="0">
+            <a:spAutoFit/>
+          </a:bodyPr>
+          <a:lstStyle/>
+          <a:p>
+            <a:r>
+              <a:rPr kumimoji="1" lang="en-US" altLang="ja-JP" b="1" dirty="0" smtClean="0"/>
+              <a:t>Expected</a:t>
+            </a:r>
+            <a:endParaRPr kumimoji="1" lang="ja-JP" altLang="en-US" b="1" dirty="0"/>
+          </a:p>
+        </p:txBody>
+      </p:sp>
+      <p:sp>
+        <p:nvSpPr>
+          <p:cNvPr id="18" name="テキスト ボックス 17"/>
+          <p:cNvSpPr txBox="1"/>
+          <p:nvPr/>
+        </p:nvSpPr>
+        <p:spPr>
+          <a:xfrm>
+            <a:off x="838200" y="1690688"/>
+            <a:ext cx="902811" cy="369332"/>
+          </a:xfrm>
+          <a:prstGeom prst="rect">
+            <a:avLst/>
+          </a:prstGeom>
+          <a:noFill/>
+        </p:spPr>
+        <p:txBody>
+          <a:bodyPr wrap="none" rtlCol="0">
+            <a:spAutoFit/>
+          </a:bodyPr>
+          <a:lstStyle/>
+          <a:p>
+            <a:r>
+              <a:rPr kumimoji="1" lang="en-US" altLang="ja-JP" b="1" dirty="0" smtClean="0"/>
+              <a:t>Result</a:t>
+            </a:r>
+            <a:endParaRPr kumimoji="1" lang="ja-JP" altLang="en-US" b="1" dirty="0"/>
+          </a:p>
+        </p:txBody>
+      </p:sp>
+      <p:graphicFrame>
+        <p:nvGraphicFramePr>
+          <p:cNvPr id="9" name="表 8"/>
+          <p:cNvGraphicFramePr>
+            <a:graphicFrameLocks noGrp="1"/>
+          </p:cNvGraphicFramePr>
+          <p:nvPr>
+            <p:extLst>
+              <p:ext uri="{D42A27DB-BD31-4B8C-83A1-F6EECF244321}">
+                <p14:modId xmlns:p14="http://schemas.microsoft.com/office/powerpoint/2010/main" val="1894400382"/>
+              </p:ext>
+            </p:extLst>
+          </p:nvPr>
+        </p:nvGraphicFramePr>
+        <p:xfrm>
+          <a:off x="838200" y="2583299"/>
+          <a:ext cx="4935584" cy="1483360"/>
+        </p:xfrm>
+        <a:graphic>
+          <a:graphicData uri="http://schemas.openxmlformats.org/drawingml/2006/table">
+            <a:tbl>
+              <a:tblPr firstRow="1" bandRow="1">
+                <a:tableStyleId>{5C22544A-7EE6-4342-B048-85BDC9FD1C3A}</a:tableStyleId>
+              </a:tblPr>
+              <a:tblGrid>
+                <a:gridCol w="1233896">
+                  <a:extLst>
+                    <a:ext uri="{9D8B030D-6E8A-4147-A177-3AD203B41FA5}">
+                      <a16:colId xmlns:a16="http://schemas.microsoft.com/office/drawing/2014/main" val="1741582164"/>
+                    </a:ext>
+                  </a:extLst>
+                </a:gridCol>
+                <a:gridCol w="1233896">
+                  <a:extLst>
+                    <a:ext uri="{9D8B030D-6E8A-4147-A177-3AD203B41FA5}">
+                      <a16:colId xmlns:a16="http://schemas.microsoft.com/office/drawing/2014/main" val="672458775"/>
+                    </a:ext>
+                  </a:extLst>
+                </a:gridCol>
+                <a:gridCol w="1233896">
+                  <a:extLst>
+                    <a:ext uri="{9D8B030D-6E8A-4147-A177-3AD203B41FA5}">
+                      <a16:colId xmlns:a16="http://schemas.microsoft.com/office/drawing/2014/main" val="4079400645"/>
+                    </a:ext>
+                  </a:extLst>
+                </a:gridCol>
+                <a:gridCol w="1233896">
+                  <a:extLst>
+                    <a:ext uri="{9D8B030D-6E8A-4147-A177-3AD203B41FA5}">
+                      <a16:colId xmlns:a16="http://schemas.microsoft.com/office/drawing/2014/main" val="3690840368"/>
+                    </a:ext>
+                  </a:extLst>
+                </a:gridCol>
+              </a:tblGrid>
+              <a:tr h="370840">
+                <a:tc>
+                  <a:txBody>
+                    <a:bodyPr/>
+                    <a:lstStyle/>
+                    <a:p>
+                      <a:r>
+                        <a:rPr kumimoji="1" lang="en-US" altLang="ja-JP" i="1" dirty="0" smtClean="0"/>
+                        <a:t>{table}</a:t>
+                      </a:r>
+                      <a:endParaRPr kumimoji="1" lang="ja-JP" altLang="en-US" i="1" dirty="0"/>
+                    </a:p>
+                  </a:txBody>
+                  <a:tcPr/>
+                </a:tc>
+                <a:tc>
+                  <a:txBody>
+                    <a:bodyPr/>
+                    <a:lstStyle/>
+                    <a:p>
+                      <a:pPr marL="0" marR="0" indent="0" algn="l" defTabSz="914400" rtl="0" eaLnBrk="1" fontAlgn="auto" latinLnBrk="0" hangingPunct="1">
+                        <a:lnSpc>
+                          <a:spcPct val="100000"/>
+                        </a:lnSpc>
+                        <a:spcBef>
+                          <a:spcPts val="0"/>
+                        </a:spcBef>
+                        <a:spcAft>
+                          <a:spcPts val="0"/>
+                        </a:spcAft>
+                        <a:buClrTx/>
+                        <a:buSzTx/>
+                        <a:buFontTx/>
+                        <a:buNone/>
+                        <a:tabLst/>
+                        <a:defRPr/>
+                      </a:pPr>
+                      <a:endParaRPr kumimoji="1" lang="ja-JP" altLang="en-US" i="1" dirty="0" smtClean="0"/>
+                    </a:p>
+                  </a:txBody>
+                  <a:tcPr/>
+                </a:tc>
+                <a:tc>
+                  <a:txBody>
+                    <a:bodyPr/>
+                    <a:lstStyle/>
+                    <a:p>
+                      <a:pPr marL="0" marR="0" indent="0" algn="l" defTabSz="914400" rtl="0" eaLnBrk="1" fontAlgn="auto" latinLnBrk="0" hangingPunct="1">
+                        <a:lnSpc>
+                          <a:spcPct val="100000"/>
+                        </a:lnSpc>
+                        <a:spcBef>
+                          <a:spcPts val="0"/>
+                        </a:spcBef>
+                        <a:spcAft>
+                          <a:spcPts val="0"/>
+                        </a:spcAft>
+                        <a:buClrTx/>
+                        <a:buSzTx/>
+                        <a:buFontTx/>
+                        <a:buNone/>
+                        <a:tabLst/>
+                        <a:defRPr/>
+                      </a:pPr>
+                      <a:endParaRPr kumimoji="1" lang="ja-JP" altLang="en-US" i="1" dirty="0" smtClean="0"/>
+                    </a:p>
+                  </a:txBody>
+                  <a:tcPr/>
+                </a:tc>
+                <a:tc>
+                  <a:txBody>
+                    <a:bodyPr/>
+                    <a:lstStyle/>
+                    <a:p>
+                      <a:pPr marL="0" marR="0" indent="0" algn="l" defTabSz="914400" rtl="0" eaLnBrk="1" fontAlgn="auto" latinLnBrk="0" hangingPunct="1">
+                        <a:lnSpc>
+                          <a:spcPct val="100000"/>
+                        </a:lnSpc>
+                        <a:spcBef>
+                          <a:spcPts val="0"/>
+                        </a:spcBef>
+                        <a:spcAft>
+                          <a:spcPts val="0"/>
+                        </a:spcAft>
+                        <a:buClrTx/>
+                        <a:buSzTx/>
+                        <a:buFontTx/>
+                        <a:buNone/>
+                        <a:tabLst/>
+                        <a:defRPr/>
+                      </a:pPr>
+                      <a:endParaRPr kumimoji="1" lang="ja-JP" altLang="en-US" i="1" dirty="0" smtClean="0"/>
+                    </a:p>
+                  </a:txBody>
+                  <a:tcPr/>
+                </a:tc>
+                <a:extLst>
+                  <a:ext uri="{0D108BD9-81ED-4DB2-BD59-A6C34878D82A}">
+                    <a16:rowId xmlns:a16="http://schemas.microsoft.com/office/drawing/2014/main" val="4117192445"/>
+                  </a:ext>
+                </a:extLst>
+              </a:tr>
+              <a:tr h="370840">
+                <a:tc>
+                  <a:txBody>
+                    <a:bodyPr/>
+                    <a:lstStyle/>
+                    <a:p>
+                      <a:endParaRPr kumimoji="1" lang="ja-JP" altLang="en-US"/>
+                    </a:p>
+                  </a:txBody>
+                  <a:tcPr/>
+                </a:tc>
+                <a:tc>
+                  <a:txBody>
+                    <a:bodyPr/>
+                    <a:lstStyle/>
+                    <a:p>
+                      <a:endParaRPr kumimoji="1" lang="ja-JP" altLang="en-US"/>
+                    </a:p>
+                  </a:txBody>
+                  <a:tcPr/>
+                </a:tc>
+                <a:tc>
+                  <a:txBody>
+                    <a:bodyPr/>
+                    <a:lstStyle/>
+                    <a:p>
+                      <a:endParaRPr kumimoji="1" lang="ja-JP" altLang="en-US"/>
+                    </a:p>
+                  </a:txBody>
+                  <a:tcPr/>
+                </a:tc>
+                <a:tc>
+                  <a:txBody>
+                    <a:bodyPr/>
+                    <a:lstStyle/>
+                    <a:p>
+                      <a:endParaRPr kumimoji="1" lang="ja-JP" altLang="en-US" dirty="0"/>
+                    </a:p>
+                  </a:txBody>
+                  <a:tcPr/>
+                </a:tc>
+                <a:extLst>
+                  <a:ext uri="{0D108BD9-81ED-4DB2-BD59-A6C34878D82A}">
+                    <a16:rowId xmlns:a16="http://schemas.microsoft.com/office/drawing/2014/main" val="1610589068"/>
+                  </a:ext>
+                </a:extLst>
+              </a:tr>
+              <a:tr h="370840">
+                <a:tc>
+                  <a:txBody>
+                    <a:bodyPr/>
+                    <a:lstStyle/>
+                    <a:p>
+                      <a:endParaRPr kumimoji="1" lang="ja-JP" altLang="en-US" dirty="0"/>
+                    </a:p>
+                  </a:txBody>
+                  <a:tcPr/>
+                </a:tc>
+                <a:tc>
+                  <a:txBody>
+                    <a:bodyPr/>
+                    <a:lstStyle/>
+                    <a:p>
+                      <a:endParaRPr kumimoji="1" lang="ja-JP" altLang="en-US" dirty="0"/>
+                    </a:p>
+                  </a:txBody>
+                  <a:tcPr/>
+                </a:tc>
+                <a:tc>
+                  <a:txBody>
+                    <a:bodyPr/>
+                    <a:lstStyle/>
+                    <a:p>
+                      <a:endParaRPr kumimoji="1" lang="ja-JP" altLang="en-US" dirty="0"/>
+                    </a:p>
+                  </a:txBody>
+                  <a:tcPr/>
+                </a:tc>
+                <a:tc>
+                  <a:txBody>
+                    <a:bodyPr/>
+                    <a:lstStyle/>
+                    <a:p>
+                      <a:endParaRPr kumimoji="1" lang="ja-JP" altLang="en-US" dirty="0"/>
+                    </a:p>
+                  </a:txBody>
+                  <a:tcPr/>
+                </a:tc>
+                <a:extLst>
+                  <a:ext uri="{0D108BD9-81ED-4DB2-BD59-A6C34878D82A}">
+                    <a16:rowId xmlns:a16="http://schemas.microsoft.com/office/drawing/2014/main" val="1222778306"/>
+                  </a:ext>
+                </a:extLst>
+              </a:tr>
+              <a:tr h="370840">
+                <a:tc>
+                  <a:txBody>
+                    <a:bodyPr/>
+                    <a:lstStyle/>
+                    <a:p>
+                      <a:endParaRPr kumimoji="1" lang="ja-JP" altLang="en-US" dirty="0"/>
+                    </a:p>
+                  </a:txBody>
+                  <a:tcPr/>
+                </a:tc>
+                <a:tc>
+                  <a:txBody>
+                    <a:bodyPr/>
+                    <a:lstStyle/>
+                    <a:p>
+                      <a:endParaRPr kumimoji="1" lang="ja-JP" altLang="en-US" dirty="0"/>
+                    </a:p>
+                  </a:txBody>
+                  <a:tcPr/>
+                </a:tc>
+                <a:tc>
+                  <a:txBody>
+                    <a:bodyPr/>
+                    <a:lstStyle/>
+                    <a:p>
+                      <a:endParaRPr kumimoji="1" lang="ja-JP" altLang="en-US" dirty="0"/>
+                    </a:p>
+                  </a:txBody>
+                  <a:tcPr/>
+                </a:tc>
+                <a:tc>
+                  <a:txBody>
+                    <a:bodyPr/>
+                    <a:lstStyle/>
+                    <a:p>
+                      <a:endParaRPr kumimoji="1" lang="ja-JP" altLang="en-US" dirty="0"/>
+                    </a:p>
+                  </a:txBody>
+                  <a:tcPr/>
+                </a:tc>
+                <a:extLst>
+                  <a:ext uri="{0D108BD9-81ED-4DB2-BD59-A6C34878D82A}">
+                    <a16:rowId xmlns:a16="http://schemas.microsoft.com/office/drawing/2014/main" val="4101371600"/>
+                  </a:ext>
+                </a:extLst>
+              </a:tr>
+            </a:tbl>
+          </a:graphicData>
+        </a:graphic>
+      </p:graphicFrame>
+      <p:graphicFrame>
+        <p:nvGraphicFramePr>
+          <p:cNvPr id="10" name="表 9"/>
+          <p:cNvGraphicFramePr>
+            <a:graphicFrameLocks noGrp="1"/>
+          </p:cNvGraphicFramePr>
+          <p:nvPr>
+            <p:extLst>
+              <p:ext uri="{D42A27DB-BD31-4B8C-83A1-F6EECF244321}">
+                <p14:modId xmlns:p14="http://schemas.microsoft.com/office/powerpoint/2010/main" val="3343633261"/>
+              </p:ext>
+            </p:extLst>
+          </p:nvPr>
+        </p:nvGraphicFramePr>
+        <p:xfrm>
+          <a:off x="6224451" y="2583299"/>
+          <a:ext cx="4757060" cy="1483360"/>
+        </p:xfrm>
+        <a:graphic>
+          <a:graphicData uri="http://schemas.openxmlformats.org/drawingml/2006/table">
+            <a:tbl>
+              <a:tblPr firstRow="1" bandRow="1">
+                <a:tableStyleId>{5C22544A-7EE6-4342-B048-85BDC9FD1C3A}</a:tableStyleId>
+              </a:tblPr>
+              <a:tblGrid>
+                <a:gridCol w="1189265">
+                  <a:extLst>
+                    <a:ext uri="{9D8B030D-6E8A-4147-A177-3AD203B41FA5}">
+                      <a16:colId xmlns:a16="http://schemas.microsoft.com/office/drawing/2014/main" val="1741582164"/>
+                    </a:ext>
+                  </a:extLst>
+                </a:gridCol>
+                <a:gridCol w="1189265">
+                  <a:extLst>
+                    <a:ext uri="{9D8B030D-6E8A-4147-A177-3AD203B41FA5}">
+                      <a16:colId xmlns:a16="http://schemas.microsoft.com/office/drawing/2014/main" val="672458775"/>
+                    </a:ext>
+                  </a:extLst>
+                </a:gridCol>
+                <a:gridCol w="1189265">
+                  <a:extLst>
+                    <a:ext uri="{9D8B030D-6E8A-4147-A177-3AD203B41FA5}">
+                      <a16:colId xmlns:a16="http://schemas.microsoft.com/office/drawing/2014/main" val="4079400645"/>
+                    </a:ext>
+                  </a:extLst>
+                </a:gridCol>
+                <a:gridCol w="1189265">
+                  <a:extLst>
+                    <a:ext uri="{9D8B030D-6E8A-4147-A177-3AD203B41FA5}">
+                      <a16:colId xmlns:a16="http://schemas.microsoft.com/office/drawing/2014/main" val="3690840368"/>
+                    </a:ext>
+                  </a:extLst>
+                </a:gridCol>
+              </a:tblGrid>
+              <a:tr h="370840">
+                <a:tc>
+                  <a:txBody>
+                    <a:bodyPr/>
+                    <a:lstStyle/>
+                    <a:p>
+                      <a:r>
+                        <a:rPr kumimoji="1" lang="en-US" altLang="ja-JP" i="1" dirty="0" smtClean="0"/>
+                        <a:t>Spring</a:t>
+                      </a:r>
+                      <a:endParaRPr kumimoji="1" lang="ja-JP" altLang="en-US" i="1" dirty="0"/>
+                    </a:p>
+                  </a:txBody>
+                  <a:tcPr/>
+                </a:tc>
+                <a:tc>
+                  <a:txBody>
+                    <a:bodyPr/>
+                    <a:lstStyle/>
+                    <a:p>
+                      <a:r>
+                        <a:rPr kumimoji="1" lang="en-US" altLang="ja-JP" i="1" dirty="0" smtClean="0"/>
+                        <a:t>Summer</a:t>
+                      </a:r>
+                      <a:endParaRPr kumimoji="1" lang="ja-JP" altLang="en-US" i="1" dirty="0"/>
+                    </a:p>
+                  </a:txBody>
+                  <a:tcPr/>
+                </a:tc>
+                <a:tc>
+                  <a:txBody>
+                    <a:bodyPr/>
+                    <a:lstStyle/>
+                    <a:p>
+                      <a:r>
+                        <a:rPr kumimoji="1" lang="en-US" altLang="ja-JP" i="1" dirty="0" smtClean="0"/>
+                        <a:t>Autumn</a:t>
+                      </a:r>
+                      <a:endParaRPr kumimoji="1" lang="ja-JP" altLang="en-US" i="1" dirty="0"/>
+                    </a:p>
+                  </a:txBody>
+                  <a:tcPr/>
+                </a:tc>
+                <a:tc>
+                  <a:txBody>
+                    <a:bodyPr/>
+                    <a:lstStyle/>
+                    <a:p>
+                      <a:r>
+                        <a:rPr kumimoji="1" lang="en-US" altLang="ja-JP" i="1" dirty="0" smtClean="0"/>
+                        <a:t>Winter</a:t>
+                      </a:r>
+                      <a:endParaRPr kumimoji="1" lang="ja-JP" altLang="en-US" i="1" dirty="0"/>
+                    </a:p>
+                  </a:txBody>
+                  <a:tcPr/>
+                </a:tc>
+                <a:extLst>
+                  <a:ext uri="{0D108BD9-81ED-4DB2-BD59-A6C34878D82A}">
+                    <a16:rowId xmlns:a16="http://schemas.microsoft.com/office/drawing/2014/main" val="4117192445"/>
+                  </a:ext>
+                </a:extLst>
+              </a:tr>
+              <a:tr h="370840">
+                <a:tc>
+                  <a:txBody>
+                    <a:bodyPr/>
+                    <a:lstStyle/>
+                    <a:p>
+                      <a:endParaRPr kumimoji="1" lang="ja-JP" altLang="en-US" dirty="0"/>
+                    </a:p>
+                  </a:txBody>
+                  <a:tcPr/>
+                </a:tc>
+                <a:tc>
+                  <a:txBody>
+                    <a:bodyPr/>
+                    <a:lstStyle/>
+                    <a:p>
+                      <a:endParaRPr kumimoji="1" lang="ja-JP" altLang="en-US" dirty="0"/>
+                    </a:p>
+                  </a:txBody>
+                  <a:tcPr/>
+                </a:tc>
+                <a:tc>
+                  <a:txBody>
+                    <a:bodyPr/>
+                    <a:lstStyle/>
+                    <a:p>
+                      <a:endParaRPr kumimoji="1" lang="ja-JP" altLang="en-US" dirty="0"/>
+                    </a:p>
+                  </a:txBody>
+                  <a:tcPr/>
+                </a:tc>
+                <a:tc>
+                  <a:txBody>
+                    <a:bodyPr/>
+                    <a:lstStyle/>
+                    <a:p>
+                      <a:endParaRPr kumimoji="1" lang="ja-JP" altLang="en-US" dirty="0"/>
+                    </a:p>
+                  </a:txBody>
+                  <a:tcPr/>
+                </a:tc>
+                <a:extLst>
+                  <a:ext uri="{0D108BD9-81ED-4DB2-BD59-A6C34878D82A}">
+                    <a16:rowId xmlns:a16="http://schemas.microsoft.com/office/drawing/2014/main" val="1610589068"/>
+                  </a:ext>
+                </a:extLst>
+              </a:tr>
+              <a:tr h="370840">
+                <a:tc>
+                  <a:txBody>
+                    <a:bodyPr/>
+                    <a:lstStyle/>
+                    <a:p>
+                      <a:endParaRPr kumimoji="1" lang="ja-JP" altLang="en-US" dirty="0"/>
+                    </a:p>
+                  </a:txBody>
+                  <a:tcPr/>
+                </a:tc>
+                <a:tc>
+                  <a:txBody>
+                    <a:bodyPr/>
+                    <a:lstStyle/>
+                    <a:p>
+                      <a:endParaRPr kumimoji="1" lang="ja-JP" altLang="en-US" dirty="0"/>
+                    </a:p>
+                  </a:txBody>
+                  <a:tcPr/>
+                </a:tc>
+                <a:tc>
+                  <a:txBody>
+                    <a:bodyPr/>
+                    <a:lstStyle/>
+                    <a:p>
+                      <a:endParaRPr kumimoji="1" lang="ja-JP" altLang="en-US" dirty="0"/>
+                    </a:p>
+                  </a:txBody>
+                  <a:tcPr/>
+                </a:tc>
+                <a:tc>
+                  <a:txBody>
+                    <a:bodyPr/>
+                    <a:lstStyle/>
+                    <a:p>
+                      <a:endParaRPr kumimoji="1" lang="ja-JP" altLang="en-US" dirty="0"/>
+                    </a:p>
+                  </a:txBody>
+                  <a:tcPr/>
+                </a:tc>
+                <a:extLst>
+                  <a:ext uri="{0D108BD9-81ED-4DB2-BD59-A6C34878D82A}">
+                    <a16:rowId xmlns:a16="http://schemas.microsoft.com/office/drawing/2014/main" val="442138100"/>
+                  </a:ext>
+                </a:extLst>
+              </a:tr>
+              <a:tr h="370840">
+                <a:tc>
+                  <a:txBody>
+                    <a:bodyPr/>
+                    <a:lstStyle/>
+                    <a:p>
+                      <a:endParaRPr kumimoji="1" lang="ja-JP" altLang="en-US" dirty="0"/>
+                    </a:p>
+                  </a:txBody>
+                  <a:tcPr/>
+                </a:tc>
+                <a:tc>
+                  <a:txBody>
+                    <a:bodyPr/>
+                    <a:lstStyle/>
+                    <a:p>
+                      <a:endParaRPr kumimoji="1" lang="ja-JP" altLang="en-US" dirty="0"/>
+                    </a:p>
+                  </a:txBody>
+                  <a:tcPr/>
+                </a:tc>
+                <a:tc>
+                  <a:txBody>
+                    <a:bodyPr/>
+                    <a:lstStyle/>
+                    <a:p>
+                      <a:endParaRPr kumimoji="1" lang="ja-JP" altLang="en-US" dirty="0"/>
+                    </a:p>
+                  </a:txBody>
+                  <a:tcPr/>
+                </a:tc>
+                <a:tc>
+                  <a:txBody>
+                    <a:bodyPr/>
+                    <a:lstStyle/>
+                    <a:p>
+                      <a:endParaRPr kumimoji="1" lang="ja-JP" altLang="en-US" dirty="0"/>
+                    </a:p>
+                  </a:txBody>
+                  <a:tcPr/>
+                </a:tc>
+                <a:extLst>
+                  <a:ext uri="{0D108BD9-81ED-4DB2-BD59-A6C34878D82A}">
+                    <a16:rowId xmlns:a16="http://schemas.microsoft.com/office/drawing/2014/main" val="2683790883"/>
+                  </a:ext>
+                </a:extLst>
+              </a:tr>
+            </a:tbl>
+          </a:graphicData>
+        </a:graphic>
+      </p:graphicFrame>
+    </p:spTree>
+    <p:extLst>
+      <p:ext uri="{BB962C8B-B14F-4D97-AF65-F5344CB8AC3E}">
+        <p14:creationId xmlns:p14="http://schemas.microsoft.com/office/powerpoint/2010/main" val="1838816175"/>
+      </p:ext>
+    </p:extLst>
+  </p:cSld>
+  <p:clrMapOvr>
+    <a:masterClrMapping/>
+  </p:clrMapOvr>
+</p:sld>
+</file>
+
+<file path=ppt/slides/slide7.xml><?xml version="1.0" encoding="utf-8"?>
 <p:sld xmlns:a="http://schemas.openxmlformats.org/drawingml/2006/main" xmlns:r="http://schemas.openxmlformats.org/officeDocument/2006/relationships" xmlns:p="http://schemas.openxmlformats.org/presentationml/2006/main">
   <p:cSld>
     <p:spTree>

</xml_diff>

<commit_message>
Preserving original font for replacing EL
</commit_message>
<xml_diff>
--- a/test/data/in.pptx
+++ b/test/data/in.pptx
@@ -163,7 +163,6 @@
           </a:p>
         </c:rich>
       </c:tx>
-      <c:layout/>
       <c:overlay val="0"/>
       <c:spPr>
         <a:noFill/>
@@ -634,7 +633,6 @@
     </c:plotArea>
     <c:legend>
       <c:legendPos val="b"/>
-      <c:layout/>
       <c:overlay val="0"/>
       <c:spPr>
         <a:noFill/>
@@ -736,7 +734,6 @@
           </a:p>
         </c:rich>
       </c:tx>
-      <c:layout/>
       <c:overlay val="0"/>
       <c:spPr>
         <a:noFill/>
@@ -1209,7 +1206,6 @@
     </c:plotArea>
     <c:legend>
       <c:legendPos val="b"/>
-      <c:layout/>
       <c:overlay val="0"/>
       <c:spPr>
         <a:noFill/>
@@ -1301,15 +1297,7 @@
             </a:pPr>
             <a:r>
               <a:rPr lang="en-US" altLang="ja-JP" dirty="0" smtClean="0"/>
-              <a:t>{</a:t>
-            </a:r>
-            <a:r>
-              <a:rPr lang="en-US" altLang="ja-JP" dirty="0" err="1" smtClean="0"/>
-              <a:t>xy</a:t>
-            </a:r>
-            <a:r>
-              <a:rPr lang="en-US" altLang="ja-JP" dirty="0" smtClean="0"/>
-              <a:t>}</a:t>
+              <a:t>{xy}</a:t>
             </a:r>
             <a:r>
               <a:rPr lang="ja-JP" altLang="en-US" dirty="0" smtClean="0"/>
@@ -1322,7 +1310,6 @@
           </a:p>
         </c:rich>
       </c:tx>
-      <c:layout/>
       <c:overlay val="0"/>
       <c:spPr>
         <a:noFill/>
@@ -1746,7 +1733,6 @@
     </c:plotArea>
     <c:legend>
       <c:legendPos val="t"/>
-      <c:layout/>
       <c:overlay val="0"/>
       <c:spPr>
         <a:noFill/>
@@ -1818,7 +1804,6 @@
   </mc:AlternateContent>
   <c:chart>
     <c:title>
-      <c:layout/>
       <c:overlay val="0"/>
       <c:spPr>
         <a:noFill/>
@@ -2242,7 +2227,6 @@
     </c:plotArea>
     <c:legend>
       <c:legendPos val="t"/>
-      <c:layout/>
       <c:overlay val="0"/>
       <c:spPr>
         <a:noFill/>
@@ -2344,7 +2328,6 @@
           </a:p>
         </c:rich>
       </c:tx>
-      <c:layout/>
       <c:overlay val="0"/>
       <c:spPr>
         <a:noFill/>
@@ -2815,7 +2798,6 @@
     </c:plotArea>
     <c:legend>
       <c:legendPos val="b"/>
-      <c:layout/>
       <c:overlay val="0"/>
       <c:spPr>
         <a:noFill/>
@@ -2917,7 +2899,6 @@
           </a:p>
         </c:rich>
       </c:tx>
-      <c:layout/>
       <c:overlay val="0"/>
       <c:spPr>
         <a:noFill/>
@@ -3390,7 +3371,6 @@
     </c:plotArea>
     <c:legend>
       <c:legendPos val="b"/>
-      <c:layout/>
       <c:overlay val="0"/>
       <c:spPr>
         <a:noFill/>
@@ -6862,9 +6842,9 @@
           <a:p>
             <a:fld id="{216FD8EB-7C38-4D9D-8BDF-3ABF2096B376}" type="datetimeFigureOut">
               <a:rPr kumimoji="1" lang="ja-JP" altLang="en-US" smtClean="0"/>
-              <a:t>2017/6/27</a:t>
+              <a:t>2017/6/29</a:t>
             </a:fld>
-            <a:endParaRPr kumimoji="1" lang="ja-JP" altLang="en-US"/>
+            <a:endParaRPr kumimoji="1" lang="ja-JP" altLang="en-US" dirty="0"/>
           </a:p>
         </p:txBody>
       </p:sp>
@@ -6883,7 +6863,7 @@
           <a:bodyPr/>
           <a:lstStyle/>
           <a:p>
-            <a:endParaRPr kumimoji="1" lang="ja-JP" altLang="en-US"/>
+            <a:endParaRPr kumimoji="1" lang="ja-JP" altLang="en-US" dirty="0"/>
           </a:p>
         </p:txBody>
       </p:sp>
@@ -6906,7 +6886,7 @@
               <a:rPr kumimoji="1" lang="ja-JP" altLang="en-US" smtClean="0"/>
               <a:t>‹#›</a:t>
             </a:fld>
-            <a:endParaRPr kumimoji="1" lang="ja-JP" altLang="en-US"/>
+            <a:endParaRPr kumimoji="1" lang="ja-JP" altLang="en-US" dirty="0"/>
           </a:p>
         </p:txBody>
       </p:sp>
@@ -7064,9 +7044,9 @@
           <a:p>
             <a:fld id="{216FD8EB-7C38-4D9D-8BDF-3ABF2096B376}" type="datetimeFigureOut">
               <a:rPr kumimoji="1" lang="ja-JP" altLang="en-US" smtClean="0"/>
-              <a:t>2017/6/27</a:t>
+              <a:t>2017/6/29</a:t>
             </a:fld>
-            <a:endParaRPr kumimoji="1" lang="ja-JP" altLang="en-US"/>
+            <a:endParaRPr kumimoji="1" lang="ja-JP" altLang="en-US" dirty="0"/>
           </a:p>
         </p:txBody>
       </p:sp>
@@ -7085,7 +7065,7 @@
           <a:bodyPr/>
           <a:lstStyle/>
           <a:p>
-            <a:endParaRPr kumimoji="1" lang="ja-JP" altLang="en-US"/>
+            <a:endParaRPr kumimoji="1" lang="ja-JP" altLang="en-US" dirty="0"/>
           </a:p>
         </p:txBody>
       </p:sp>
@@ -7108,7 +7088,7 @@
               <a:rPr kumimoji="1" lang="ja-JP" altLang="en-US" smtClean="0"/>
               <a:t>‹#›</a:t>
             </a:fld>
-            <a:endParaRPr kumimoji="1" lang="ja-JP" altLang="en-US"/>
+            <a:endParaRPr kumimoji="1" lang="ja-JP" altLang="en-US" dirty="0"/>
           </a:p>
         </p:txBody>
       </p:sp>
@@ -7276,9 +7256,9 @@
           <a:p>
             <a:fld id="{216FD8EB-7C38-4D9D-8BDF-3ABF2096B376}" type="datetimeFigureOut">
               <a:rPr kumimoji="1" lang="ja-JP" altLang="en-US" smtClean="0"/>
-              <a:t>2017/6/27</a:t>
+              <a:t>2017/6/29</a:t>
             </a:fld>
-            <a:endParaRPr kumimoji="1" lang="ja-JP" altLang="en-US"/>
+            <a:endParaRPr kumimoji="1" lang="ja-JP" altLang="en-US" dirty="0"/>
           </a:p>
         </p:txBody>
       </p:sp>
@@ -7297,7 +7277,7 @@
           <a:bodyPr/>
           <a:lstStyle/>
           <a:p>
-            <a:endParaRPr kumimoji="1" lang="ja-JP" altLang="en-US"/>
+            <a:endParaRPr kumimoji="1" lang="ja-JP" altLang="en-US" dirty="0"/>
           </a:p>
         </p:txBody>
       </p:sp>
@@ -7320,7 +7300,7 @@
               <a:rPr kumimoji="1" lang="ja-JP" altLang="en-US" smtClean="0"/>
               <a:t>‹#›</a:t>
             </a:fld>
-            <a:endParaRPr kumimoji="1" lang="ja-JP" altLang="en-US"/>
+            <a:endParaRPr kumimoji="1" lang="ja-JP" altLang="en-US" dirty="0"/>
           </a:p>
         </p:txBody>
       </p:sp>
@@ -7478,9 +7458,9 @@
           <a:p>
             <a:fld id="{216FD8EB-7C38-4D9D-8BDF-3ABF2096B376}" type="datetimeFigureOut">
               <a:rPr kumimoji="1" lang="ja-JP" altLang="en-US" smtClean="0"/>
-              <a:t>2017/6/27</a:t>
+              <a:t>2017/6/29</a:t>
             </a:fld>
-            <a:endParaRPr kumimoji="1" lang="ja-JP" altLang="en-US"/>
+            <a:endParaRPr kumimoji="1" lang="ja-JP" altLang="en-US" dirty="0"/>
           </a:p>
         </p:txBody>
       </p:sp>
@@ -7499,7 +7479,7 @@
           <a:bodyPr/>
           <a:lstStyle/>
           <a:p>
-            <a:endParaRPr kumimoji="1" lang="ja-JP" altLang="en-US"/>
+            <a:endParaRPr kumimoji="1" lang="ja-JP" altLang="en-US" dirty="0"/>
           </a:p>
         </p:txBody>
       </p:sp>
@@ -7522,7 +7502,7 @@
               <a:rPr kumimoji="1" lang="ja-JP" altLang="en-US" smtClean="0"/>
               <a:t>‹#›</a:t>
             </a:fld>
-            <a:endParaRPr kumimoji="1" lang="ja-JP" altLang="en-US"/>
+            <a:endParaRPr kumimoji="1" lang="ja-JP" altLang="en-US" dirty="0"/>
           </a:p>
         </p:txBody>
       </p:sp>
@@ -7724,9 +7704,9 @@
           <a:p>
             <a:fld id="{216FD8EB-7C38-4D9D-8BDF-3ABF2096B376}" type="datetimeFigureOut">
               <a:rPr kumimoji="1" lang="ja-JP" altLang="en-US" smtClean="0"/>
-              <a:t>2017/6/27</a:t>
+              <a:t>2017/6/29</a:t>
             </a:fld>
-            <a:endParaRPr kumimoji="1" lang="ja-JP" altLang="en-US"/>
+            <a:endParaRPr kumimoji="1" lang="ja-JP" altLang="en-US" dirty="0"/>
           </a:p>
         </p:txBody>
       </p:sp>
@@ -7745,7 +7725,7 @@
           <a:bodyPr/>
           <a:lstStyle/>
           <a:p>
-            <a:endParaRPr kumimoji="1" lang="ja-JP" altLang="en-US"/>
+            <a:endParaRPr kumimoji="1" lang="ja-JP" altLang="en-US" dirty="0"/>
           </a:p>
         </p:txBody>
       </p:sp>
@@ -7768,7 +7748,7 @@
               <a:rPr kumimoji="1" lang="ja-JP" altLang="en-US" smtClean="0"/>
               <a:t>‹#›</a:t>
             </a:fld>
-            <a:endParaRPr kumimoji="1" lang="ja-JP" altLang="en-US"/>
+            <a:endParaRPr kumimoji="1" lang="ja-JP" altLang="en-US" dirty="0"/>
           </a:p>
         </p:txBody>
       </p:sp>
@@ -8020,9 +8000,9 @@
           <a:p>
             <a:fld id="{216FD8EB-7C38-4D9D-8BDF-3ABF2096B376}" type="datetimeFigureOut">
               <a:rPr kumimoji="1" lang="ja-JP" altLang="en-US" smtClean="0"/>
-              <a:t>2017/6/27</a:t>
+              <a:t>2017/6/29</a:t>
             </a:fld>
-            <a:endParaRPr kumimoji="1" lang="ja-JP" altLang="en-US"/>
+            <a:endParaRPr kumimoji="1" lang="ja-JP" altLang="en-US" dirty="0"/>
           </a:p>
         </p:txBody>
       </p:sp>
@@ -8041,7 +8021,7 @@
           <a:bodyPr/>
           <a:lstStyle/>
           <a:p>
-            <a:endParaRPr kumimoji="1" lang="ja-JP" altLang="en-US"/>
+            <a:endParaRPr kumimoji="1" lang="ja-JP" altLang="en-US" dirty="0"/>
           </a:p>
         </p:txBody>
       </p:sp>
@@ -8064,7 +8044,7 @@
               <a:rPr kumimoji="1" lang="ja-JP" altLang="en-US" smtClean="0"/>
               <a:t>‹#›</a:t>
             </a:fld>
-            <a:endParaRPr kumimoji="1" lang="ja-JP" altLang="en-US"/>
+            <a:endParaRPr kumimoji="1" lang="ja-JP" altLang="en-US" dirty="0"/>
           </a:p>
         </p:txBody>
       </p:sp>
@@ -8451,9 +8431,9 @@
           <a:p>
             <a:fld id="{216FD8EB-7C38-4D9D-8BDF-3ABF2096B376}" type="datetimeFigureOut">
               <a:rPr kumimoji="1" lang="ja-JP" altLang="en-US" smtClean="0"/>
-              <a:t>2017/6/27</a:t>
+              <a:t>2017/6/29</a:t>
             </a:fld>
-            <a:endParaRPr kumimoji="1" lang="ja-JP" altLang="en-US"/>
+            <a:endParaRPr kumimoji="1" lang="ja-JP" altLang="en-US" dirty="0"/>
           </a:p>
         </p:txBody>
       </p:sp>
@@ -8472,7 +8452,7 @@
           <a:bodyPr/>
           <a:lstStyle/>
           <a:p>
-            <a:endParaRPr kumimoji="1" lang="ja-JP" altLang="en-US"/>
+            <a:endParaRPr kumimoji="1" lang="ja-JP" altLang="en-US" dirty="0"/>
           </a:p>
         </p:txBody>
       </p:sp>
@@ -8495,7 +8475,7 @@
               <a:rPr kumimoji="1" lang="ja-JP" altLang="en-US" smtClean="0"/>
               <a:t>‹#›</a:t>
             </a:fld>
-            <a:endParaRPr kumimoji="1" lang="ja-JP" altLang="en-US"/>
+            <a:endParaRPr kumimoji="1" lang="ja-JP" altLang="en-US" dirty="0"/>
           </a:p>
         </p:txBody>
       </p:sp>
@@ -8569,9 +8549,9 @@
           <a:p>
             <a:fld id="{216FD8EB-7C38-4D9D-8BDF-3ABF2096B376}" type="datetimeFigureOut">
               <a:rPr kumimoji="1" lang="ja-JP" altLang="en-US" smtClean="0"/>
-              <a:t>2017/6/27</a:t>
+              <a:t>2017/6/29</a:t>
             </a:fld>
-            <a:endParaRPr kumimoji="1" lang="ja-JP" altLang="en-US"/>
+            <a:endParaRPr kumimoji="1" lang="ja-JP" altLang="en-US" dirty="0"/>
           </a:p>
         </p:txBody>
       </p:sp>
@@ -8590,7 +8570,7 @@
           <a:bodyPr/>
           <a:lstStyle/>
           <a:p>
-            <a:endParaRPr kumimoji="1" lang="ja-JP" altLang="en-US"/>
+            <a:endParaRPr kumimoji="1" lang="ja-JP" altLang="en-US" dirty="0"/>
           </a:p>
         </p:txBody>
       </p:sp>
@@ -8613,7 +8593,7 @@
               <a:rPr kumimoji="1" lang="ja-JP" altLang="en-US" smtClean="0"/>
               <a:t>‹#›</a:t>
             </a:fld>
-            <a:endParaRPr kumimoji="1" lang="ja-JP" altLang="en-US"/>
+            <a:endParaRPr kumimoji="1" lang="ja-JP" altLang="en-US" dirty="0"/>
           </a:p>
         </p:txBody>
       </p:sp>
@@ -8664,9 +8644,9 @@
           <a:p>
             <a:fld id="{216FD8EB-7C38-4D9D-8BDF-3ABF2096B376}" type="datetimeFigureOut">
               <a:rPr kumimoji="1" lang="ja-JP" altLang="en-US" smtClean="0"/>
-              <a:t>2017/6/27</a:t>
+              <a:t>2017/6/29</a:t>
             </a:fld>
-            <a:endParaRPr kumimoji="1" lang="ja-JP" altLang="en-US"/>
+            <a:endParaRPr kumimoji="1" lang="ja-JP" altLang="en-US" dirty="0"/>
           </a:p>
         </p:txBody>
       </p:sp>
@@ -8685,7 +8665,7 @@
           <a:bodyPr/>
           <a:lstStyle/>
           <a:p>
-            <a:endParaRPr kumimoji="1" lang="ja-JP" altLang="en-US"/>
+            <a:endParaRPr kumimoji="1" lang="ja-JP" altLang="en-US" dirty="0"/>
           </a:p>
         </p:txBody>
       </p:sp>
@@ -8708,7 +8688,7 @@
               <a:rPr kumimoji="1" lang="ja-JP" altLang="en-US" smtClean="0"/>
               <a:t>‹#›</a:t>
             </a:fld>
-            <a:endParaRPr kumimoji="1" lang="ja-JP" altLang="en-US"/>
+            <a:endParaRPr kumimoji="1" lang="ja-JP" altLang="en-US" dirty="0"/>
           </a:p>
         </p:txBody>
       </p:sp>
@@ -8973,9 +8953,9 @@
           <a:p>
             <a:fld id="{216FD8EB-7C38-4D9D-8BDF-3ABF2096B376}" type="datetimeFigureOut">
               <a:rPr kumimoji="1" lang="ja-JP" altLang="en-US" smtClean="0"/>
-              <a:t>2017/6/27</a:t>
+              <a:t>2017/6/29</a:t>
             </a:fld>
-            <a:endParaRPr kumimoji="1" lang="ja-JP" altLang="en-US"/>
+            <a:endParaRPr kumimoji="1" lang="ja-JP" altLang="en-US" dirty="0"/>
           </a:p>
         </p:txBody>
       </p:sp>
@@ -8994,7 +8974,7 @@
           <a:bodyPr/>
           <a:lstStyle/>
           <a:p>
-            <a:endParaRPr kumimoji="1" lang="ja-JP" altLang="en-US"/>
+            <a:endParaRPr kumimoji="1" lang="ja-JP" altLang="en-US" dirty="0"/>
           </a:p>
         </p:txBody>
       </p:sp>
@@ -9017,7 +8997,7 @@
               <a:rPr kumimoji="1" lang="ja-JP" altLang="en-US" smtClean="0"/>
               <a:t>‹#›</a:t>
             </a:fld>
-            <a:endParaRPr kumimoji="1" lang="ja-JP" altLang="en-US"/>
+            <a:endParaRPr kumimoji="1" lang="ja-JP" altLang="en-US" dirty="0"/>
           </a:p>
         </p:txBody>
       </p:sp>
@@ -9140,7 +9120,7 @@
             </a:lvl9pPr>
           </a:lstStyle>
           <a:p>
-            <a:endParaRPr kumimoji="1" lang="ja-JP" altLang="en-US"/>
+            <a:endParaRPr kumimoji="1" lang="ja-JP" altLang="en-US" dirty="0"/>
           </a:p>
         </p:txBody>
       </p:sp>
@@ -9226,9 +9206,9 @@
           <a:p>
             <a:fld id="{216FD8EB-7C38-4D9D-8BDF-3ABF2096B376}" type="datetimeFigureOut">
               <a:rPr kumimoji="1" lang="ja-JP" altLang="en-US" smtClean="0"/>
-              <a:t>2017/6/27</a:t>
+              <a:t>2017/6/29</a:t>
             </a:fld>
-            <a:endParaRPr kumimoji="1" lang="ja-JP" altLang="en-US"/>
+            <a:endParaRPr kumimoji="1" lang="ja-JP" altLang="en-US" dirty="0"/>
           </a:p>
         </p:txBody>
       </p:sp>
@@ -9247,7 +9227,7 @@
           <a:bodyPr/>
           <a:lstStyle/>
           <a:p>
-            <a:endParaRPr kumimoji="1" lang="ja-JP" altLang="en-US"/>
+            <a:endParaRPr kumimoji="1" lang="ja-JP" altLang="en-US" dirty="0"/>
           </a:p>
         </p:txBody>
       </p:sp>
@@ -9270,7 +9250,7 @@
               <a:rPr kumimoji="1" lang="ja-JP" altLang="en-US" smtClean="0"/>
               <a:t>‹#›</a:t>
             </a:fld>
-            <a:endParaRPr kumimoji="1" lang="ja-JP" altLang="en-US"/>
+            <a:endParaRPr kumimoji="1" lang="ja-JP" altLang="en-US" dirty="0"/>
           </a:p>
         </p:txBody>
       </p:sp>
@@ -9471,9 +9451,9 @@
           <a:p>
             <a:fld id="{216FD8EB-7C38-4D9D-8BDF-3ABF2096B376}" type="datetimeFigureOut">
               <a:rPr kumimoji="1" lang="ja-JP" altLang="en-US" smtClean="0"/>
-              <a:t>2017/6/27</a:t>
+              <a:t>2017/6/29</a:t>
             </a:fld>
-            <a:endParaRPr kumimoji="1" lang="ja-JP" altLang="en-US"/>
+            <a:endParaRPr kumimoji="1" lang="ja-JP" altLang="en-US" dirty="0"/>
           </a:p>
         </p:txBody>
       </p:sp>
@@ -9510,7 +9490,7 @@
             </a:lvl1pPr>
           </a:lstStyle>
           <a:p>
-            <a:endParaRPr kumimoji="1" lang="ja-JP" altLang="en-US"/>
+            <a:endParaRPr kumimoji="1" lang="ja-JP" altLang="en-US" dirty="0"/>
           </a:p>
         </p:txBody>
       </p:sp>
@@ -9551,7 +9531,7 @@
               <a:rPr kumimoji="1" lang="ja-JP" altLang="en-US" smtClean="0"/>
               <a:t>‹#›</a:t>
             </a:fld>
-            <a:endParaRPr kumimoji="1" lang="ja-JP" altLang="en-US"/>
+            <a:endParaRPr kumimoji="1" lang="ja-JP" altLang="en-US" dirty="0"/>
           </a:p>
         </p:txBody>
       </p:sp>
@@ -9892,12 +9872,8 @@
           <a:lstStyle/>
           <a:p>
             <a:r>
-              <a:rPr kumimoji="1" lang="en-US" altLang="ja-JP" dirty="0" err="1" smtClean="0"/>
-              <a:t>Ppt</a:t>
-            </a:r>
-            <a:r>
               <a:rPr kumimoji="1" lang="en-US" altLang="ja-JP" dirty="0" smtClean="0"/>
-              <a:t>-template test</a:t>
+              <a:t>Ppt-template test</a:t>
             </a:r>
             <a:endParaRPr kumimoji="1" lang="ja-JP" altLang="en-US" dirty="0"/>
           </a:p>
@@ -9920,13 +9896,9 @@
           <a:p>
             <a:r>
               <a:rPr lang="en-US" altLang="ja-JP" dirty="0" smtClean="0"/>
-              <a:t>This </a:t>
-            </a:r>
-            <a:r>
-              <a:rPr lang="en-US" altLang="ja-JP" smtClean="0"/>
-              <a:t>slide will be removed</a:t>
-            </a:r>
-            <a:endParaRPr kumimoji="1" lang="ja-JP" altLang="en-US"/>
+              <a:t>This slide will be removed</a:t>
+            </a:r>
+            <a:endParaRPr kumimoji="1" lang="ja-JP" altLang="en-US" dirty="0"/>
           </a:p>
         </p:txBody>
       </p:sp>
@@ -10074,14 +10046,14 @@
       </p:sp>
       <p:sp>
         <p:nvSpPr>
-          <p:cNvPr id="6" name="テキスト ボックス 5"/>
+          <p:cNvPr id="7" name="テキスト ボックス 6"/>
           <p:cNvSpPr txBox="1"/>
           <p:nvPr/>
         </p:nvSpPr>
         <p:spPr>
           <a:xfrm>
-            <a:off x="838200" y="2290355"/>
-            <a:ext cx="1556836" cy="369332"/>
+            <a:off x="838200" y="2689724"/>
+            <a:ext cx="4108817" cy="369332"/>
           </a:xfrm>
           <a:prstGeom prst="rect">
             <a:avLst/>
@@ -10095,31 +10067,39 @@
           <a:lstStyle/>
           <a:p>
             <a:r>
-              <a:rPr kumimoji="1" lang="en-US" altLang="ja-JP" dirty="0" smtClean="0"/>
-              <a:t>{</a:t>
-            </a:r>
-            <a:r>
-              <a:rPr kumimoji="1" lang="en-US" altLang="ja-JP" dirty="0" err="1" smtClean="0"/>
-              <a:t>greeting.en</a:t>
-            </a:r>
-            <a:r>
-              <a:rPr kumimoji="1" lang="en-US" altLang="ja-JP" dirty="0" smtClean="0"/>
-              <a:t>}</a:t>
-            </a:r>
-            <a:endParaRPr kumimoji="1" lang="ja-JP" altLang="en-US" dirty="0"/>
+              <a:rPr lang="en-US" altLang="ja-JP" b="1" dirty="0" smtClean="0"/>
+              <a:t>{greeting.ja}</a:t>
+            </a:r>
+            <a:r>
+              <a:rPr lang="ja-JP" altLang="en-US" b="1" dirty="0" smtClean="0"/>
+              <a:t>よろしく</a:t>
+            </a:r>
+            <a:r>
+              <a:rPr lang="ja-JP" altLang="en-US" b="1" dirty="0" smtClean="0">
+                <a:solidFill>
+                  <a:srgbClr val="FF0000"/>
+                </a:solidFill>
+              </a:rPr>
+              <a:t>お願い</a:t>
+            </a:r>
+            <a:r>
+              <a:rPr lang="ja-JP" altLang="en-US" b="1" dirty="0" smtClean="0"/>
+              <a:t>します。</a:t>
+            </a:r>
+            <a:endParaRPr lang="ja-JP" altLang="en-US" b="1" dirty="0"/>
           </a:p>
         </p:txBody>
       </p:sp>
       <p:sp>
         <p:nvSpPr>
-          <p:cNvPr id="7" name="テキスト ボックス 6"/>
+          <p:cNvPr id="6" name="テキスト ボックス 5"/>
           <p:cNvSpPr txBox="1"/>
           <p:nvPr/>
         </p:nvSpPr>
         <p:spPr>
           <a:xfrm>
-            <a:off x="838200" y="2689724"/>
-            <a:ext cx="1569660" cy="369332"/>
+            <a:off x="838200" y="2290355"/>
+            <a:ext cx="2654894" cy="369332"/>
           </a:xfrm>
           <a:prstGeom prst="rect">
             <a:avLst/>
@@ -10133,18 +10113,14 @@
           <a:lstStyle/>
           <a:p>
             <a:r>
-              <a:rPr kumimoji="1" lang="en-US" altLang="ja-JP" b="1" dirty="0" smtClean="0"/>
-              <a:t>{</a:t>
-            </a:r>
-            <a:r>
-              <a:rPr kumimoji="1" lang="en-US" altLang="ja-JP" b="1" dirty="0" err="1" smtClean="0"/>
-              <a:t>greeting.ja</a:t>
-            </a:r>
-            <a:r>
-              <a:rPr kumimoji="1" lang="en-US" altLang="ja-JP" b="1" dirty="0" smtClean="0"/>
-              <a:t>}</a:t>
-            </a:r>
-            <a:endParaRPr kumimoji="1" lang="ja-JP" altLang="en-US" b="1" dirty="0"/>
+              <a:rPr lang="en-US" altLang="ja-JP" dirty="0" smtClean="0"/>
+              <a:t>{greeting.en} </a:t>
+            </a:r>
+            <a:r>
+              <a:rPr lang="en-US" altLang="ja-JP" dirty="0" smtClean="0"/>
+              <a:t>Everyone.</a:t>
+            </a:r>
+            <a:endParaRPr lang="ja-JP" altLang="en-US" dirty="0"/>
           </a:p>
         </p:txBody>
       </p:sp>
@@ -10157,7 +10133,7 @@
         <p:spPr>
           <a:xfrm>
             <a:off x="6224451" y="2290355"/>
-            <a:ext cx="813043" cy="369332"/>
+            <a:ext cx="1911101" cy="369332"/>
           </a:xfrm>
           <a:prstGeom prst="rect">
             <a:avLst/>
@@ -10172,7 +10148,7 @@
           <a:p>
             <a:r>
               <a:rPr lang="en-US" altLang="ja-JP" dirty="0" smtClean="0"/>
-              <a:t>Hello!</a:t>
+              <a:t>Hello! Everyone.</a:t>
             </a:r>
             <a:endParaRPr kumimoji="1" lang="ja-JP" altLang="en-US" dirty="0"/>
           </a:p>
@@ -10187,13 +10163,13 @@
           <p:nvPr>
             <p:extLst>
               <p:ext uri="{D42A27DB-BD31-4B8C-83A1-F6EECF244321}">
-                <p14:modId xmlns:p14="http://schemas.microsoft.com/office/powerpoint/2010/main" val="3558241184"/>
+                <p14:modId xmlns:p14="http://schemas.microsoft.com/office/powerpoint/2010/main" val="3422242629"/>
               </p:ext>
             </p:extLst>
           </p:nvPr>
         </p:nvGraphicFramePr>
         <p:xfrm>
-          <a:off x="838200" y="3349655"/>
+          <a:off x="838200" y="4708194"/>
           <a:ext cx="4935584" cy="1010920"/>
         </p:xfrm>
         <a:graphic>
@@ -10352,7 +10328,7 @@
                     <a:bodyPr/>
                     <a:lstStyle/>
                     <a:p>
-                      <a:endParaRPr kumimoji="1" lang="ja-JP" altLang="en-US"/>
+                      <a:endParaRPr kumimoji="1" lang="ja-JP" altLang="en-US" dirty="0"/>
                     </a:p>
                   </a:txBody>
                   <a:tcPr/>
@@ -10362,7 +10338,7 @@
                     <a:bodyPr/>
                     <a:lstStyle/>
                     <a:p>
-                      <a:endParaRPr kumimoji="1" lang="ja-JP" altLang="en-US"/>
+                      <a:endParaRPr kumimoji="1" lang="ja-JP" altLang="en-US" dirty="0"/>
                     </a:p>
                   </a:txBody>
                   <a:tcPr/>
@@ -10372,7 +10348,7 @@
                     <a:bodyPr/>
                     <a:lstStyle/>
                     <a:p>
-                      <a:endParaRPr kumimoji="1" lang="ja-JP" altLang="en-US"/>
+                      <a:endParaRPr kumimoji="1" lang="ja-JP" altLang="en-US" dirty="0"/>
                     </a:p>
                   </a:txBody>
                   <a:tcPr/>
@@ -10406,7 +10382,7 @@
         <p:spPr>
           <a:xfrm>
             <a:off x="6224451" y="2689724"/>
-            <a:ext cx="1569660" cy="369332"/>
+            <a:ext cx="4108817" cy="369332"/>
           </a:xfrm>
           <a:prstGeom prst="rect">
             <a:avLst/>
@@ -10425,9 +10401,25 @@
             </a:r>
             <a:r>
               <a:rPr lang="ja-JP" altLang="en-US" b="1" dirty="0"/>
-              <a:t>！</a:t>
-            </a:r>
-            <a:endParaRPr kumimoji="1" lang="ja-JP" altLang="en-US" b="1" dirty="0"/>
+              <a:t>！よろしく</a:t>
+            </a:r>
+            <a:r>
+              <a:rPr lang="ja-JP" altLang="en-US" b="1" dirty="0">
+                <a:solidFill>
+                  <a:srgbClr val="FF0000"/>
+                </a:solidFill>
+              </a:rPr>
+              <a:t>お願い</a:t>
+            </a:r>
+            <a:r>
+              <a:rPr lang="ja-JP" altLang="en-US" b="1" dirty="0"/>
+              <a:t>します</a:t>
+            </a:r>
+            <a:r>
+              <a:rPr lang="ja-JP" altLang="en-US" b="1" dirty="0" smtClean="0"/>
+              <a:t>。</a:t>
+            </a:r>
+            <a:endParaRPr lang="ja-JP" altLang="en-US" b="1" dirty="0"/>
           </a:p>
         </p:txBody>
       </p:sp>
@@ -10440,13 +10432,13 @@
           <p:nvPr>
             <p:extLst>
               <p:ext uri="{D42A27DB-BD31-4B8C-83A1-F6EECF244321}">
-                <p14:modId xmlns:p14="http://schemas.microsoft.com/office/powerpoint/2010/main" val="635308580"/>
+                <p14:modId xmlns:p14="http://schemas.microsoft.com/office/powerpoint/2010/main" val="3187006725"/>
               </p:ext>
             </p:extLst>
           </p:nvPr>
         </p:nvGraphicFramePr>
         <p:xfrm>
-          <a:off x="6224451" y="3349655"/>
+          <a:off x="6224451" y="4708194"/>
           <a:ext cx="4757060" cy="741680"/>
         </p:xfrm>
         <a:graphic>
@@ -10554,7 +10546,7 @@
                     <a:bodyPr/>
                     <a:lstStyle/>
                     <a:p>
-                      <a:endParaRPr kumimoji="1" lang="ja-JP" altLang="en-US"/>
+                      <a:endParaRPr kumimoji="1" lang="ja-JP" altLang="en-US" dirty="0"/>
                     </a:p>
                   </a:txBody>
                   <a:tcPr/>
@@ -10564,7 +10556,7 @@
                     <a:bodyPr/>
                     <a:lstStyle/>
                     <a:p>
-                      <a:endParaRPr kumimoji="1" lang="ja-JP" altLang="en-US"/>
+                      <a:endParaRPr kumimoji="1" lang="ja-JP" altLang="en-US" dirty="0"/>
                     </a:p>
                   </a:txBody>
                   <a:tcPr/>
@@ -10574,7 +10566,7 @@
                     <a:bodyPr/>
                     <a:lstStyle/>
                     <a:p>
-                      <a:endParaRPr kumimoji="1" lang="ja-JP" altLang="en-US"/>
+                      <a:endParaRPr kumimoji="1" lang="ja-JP" altLang="en-US" dirty="0"/>
                     </a:p>
                   </a:txBody>
                   <a:tcPr/>
@@ -10703,7 +10695,7 @@
           <a:lstStyle/>
           <a:p>
             <a:r>
-              <a:rPr lang="en-US" altLang="ja-JP" smtClean="0"/>
+              <a:rPr lang="en-US" altLang="ja-JP" dirty="0" smtClean="0"/>
               <a:t>{id:2}</a:t>
             </a:r>
             <a:endParaRPr lang="ja-JP" altLang="en-US" dirty="0"/>
@@ -10963,7 +10955,7 @@
           <p:nvPr>
             <p:extLst>
               <p:ext uri="{D42A27DB-BD31-4B8C-83A1-F6EECF244321}">
-                <p14:modId xmlns:p14="http://schemas.microsoft.com/office/powerpoint/2010/main" val="4139211845"/>
+                <p14:modId xmlns:p14="http://schemas.microsoft.com/office/powerpoint/2010/main" val="2826651418"/>
               </p:ext>
             </p:extLst>
           </p:nvPr>
@@ -11075,7 +11067,7 @@
           <a:lstStyle/>
           <a:p>
             <a:r>
-              <a:rPr lang="en-US" altLang="ja-JP" smtClean="0"/>
+              <a:rPr lang="en-US" altLang="ja-JP" dirty="0" smtClean="0"/>
               <a:t>{id:4}</a:t>
             </a:r>
             <a:endParaRPr lang="ja-JP" altLang="en-US" dirty="0"/>
@@ -11229,19 +11221,7 @@
           <a:p>
             <a:r>
               <a:rPr kumimoji="1" lang="en-US" altLang="ja-JP" dirty="0" smtClean="0"/>
-              <a:t>Test#4 </a:t>
-            </a:r>
-            <a:r>
-              <a:rPr kumimoji="1" lang="en-US" altLang="ja-JP" dirty="0" smtClean="0"/>
-              <a:t>– </a:t>
-            </a:r>
-            <a:r>
-              <a:rPr kumimoji="1" lang="en-US" altLang="ja-JP" dirty="0" smtClean="0"/>
-              <a:t>Table </a:t>
-            </a:r>
-            <a:r>
-              <a:rPr kumimoji="1" lang="en-US" altLang="ja-JP" dirty="0" smtClean="0"/>
-              <a:t>from CSV-String</a:t>
+              <a:t>Test#4 – Table from CSV-String</a:t>
             </a:r>
             <a:endParaRPr kumimoji="1" lang="ja-JP" altLang="en-US" dirty="0"/>
           </a:p>
@@ -11270,11 +11250,7 @@
           <a:p>
             <a:r>
               <a:rPr lang="en-US" altLang="ja-JP" dirty="0" smtClean="0"/>
-              <a:t>{</a:t>
-            </a:r>
-            <a:r>
-              <a:rPr lang="en-US" altLang="ja-JP" dirty="0" smtClean="0"/>
-              <a:t>id:5}</a:t>
+              <a:t>{id:5}</a:t>
             </a:r>
             <a:endParaRPr lang="ja-JP" altLang="en-US" dirty="0"/>
           </a:p>
@@ -11502,7 +11478,7 @@
                     <a:bodyPr/>
                     <a:lstStyle/>
                     <a:p>
-                      <a:endParaRPr kumimoji="1" lang="ja-JP" altLang="en-US"/>
+                      <a:endParaRPr kumimoji="1" lang="ja-JP" altLang="en-US" dirty="0"/>
                     </a:p>
                   </a:txBody>
                   <a:tcPr/>
@@ -11512,7 +11488,7 @@
                     <a:bodyPr/>
                     <a:lstStyle/>
                     <a:p>
-                      <a:endParaRPr kumimoji="1" lang="ja-JP" altLang="en-US"/>
+                      <a:endParaRPr kumimoji="1" lang="ja-JP" altLang="en-US" dirty="0"/>
                     </a:p>
                   </a:txBody>
                   <a:tcPr/>
@@ -11522,7 +11498,7 @@
                     <a:bodyPr/>
                     <a:lstStyle/>
                     <a:p>
-                      <a:endParaRPr kumimoji="1" lang="ja-JP" altLang="en-US"/>
+                      <a:endParaRPr kumimoji="1" lang="ja-JP" altLang="en-US" dirty="0"/>
                     </a:p>
                   </a:txBody>
                   <a:tcPr/>
@@ -11949,12 +11925,8 @@
           <a:lstStyle/>
           <a:p>
             <a:r>
-              <a:rPr kumimoji="1" lang="en-US" altLang="ja-JP" dirty="0" err="1" smtClean="0"/>
-              <a:t>Ppt</a:t>
-            </a:r>
-            <a:r>
               <a:rPr kumimoji="1" lang="en-US" altLang="ja-JP" dirty="0" smtClean="0"/>
-              <a:t>-template test</a:t>
+              <a:t>Ppt-template test</a:t>
             </a:r>
             <a:endParaRPr kumimoji="1" lang="ja-JP" altLang="en-US" dirty="0"/>
           </a:p>
@@ -11977,13 +11949,9 @@
           <a:p>
             <a:r>
               <a:rPr lang="en-US" altLang="ja-JP" dirty="0" smtClean="0"/>
-              <a:t>This </a:t>
-            </a:r>
-            <a:r>
-              <a:rPr lang="en-US" altLang="ja-JP" smtClean="0"/>
-              <a:t>slide will be removed</a:t>
-            </a:r>
-            <a:endParaRPr kumimoji="1" lang="ja-JP" altLang="en-US"/>
+              <a:t>This slide will be removed</a:t>
+            </a:r>
+            <a:endParaRPr kumimoji="1" lang="ja-JP" altLang="en-US" dirty="0"/>
           </a:p>
         </p:txBody>
       </p:sp>
@@ -12010,15 +11978,7 @@
           <a:p>
             <a:r>
               <a:rPr lang="en-US" altLang="ja-JP" dirty="0" smtClean="0"/>
-              <a:t>{</a:t>
-            </a:r>
-            <a:r>
-              <a:rPr lang="en-US" altLang="ja-JP" dirty="0" err="1" smtClean="0"/>
-              <a:t>id:never_used</a:t>
-            </a:r>
-            <a:r>
-              <a:rPr lang="en-US" altLang="ja-JP" dirty="0" smtClean="0"/>
-              <a:t>}</a:t>
+              <a:t>{id:never_used}</a:t>
             </a:r>
             <a:endParaRPr lang="ja-JP" altLang="en-US" dirty="0"/>
           </a:p>

</xml_diff>

<commit_message>
Rename some old regexps
</commit_message>
<xml_diff>
--- a/test/data/in.pptx
+++ b/test/data/in.pptx
@@ -6842,7 +6842,7 @@
           <a:p>
             <a:fld id="{216FD8EB-7C38-4D9D-8BDF-3ABF2096B376}" type="datetimeFigureOut">
               <a:rPr kumimoji="1" lang="ja-JP" altLang="en-US" smtClean="0"/>
-              <a:t>2017/6/29</a:t>
+              <a:t>2017/6/30</a:t>
             </a:fld>
             <a:endParaRPr kumimoji="1" lang="ja-JP" altLang="en-US" dirty="0"/>
           </a:p>
@@ -7044,7 +7044,7 @@
           <a:p>
             <a:fld id="{216FD8EB-7C38-4D9D-8BDF-3ABF2096B376}" type="datetimeFigureOut">
               <a:rPr kumimoji="1" lang="ja-JP" altLang="en-US" smtClean="0"/>
-              <a:t>2017/6/29</a:t>
+              <a:t>2017/6/30</a:t>
             </a:fld>
             <a:endParaRPr kumimoji="1" lang="ja-JP" altLang="en-US" dirty="0"/>
           </a:p>
@@ -7256,7 +7256,7 @@
           <a:p>
             <a:fld id="{216FD8EB-7C38-4D9D-8BDF-3ABF2096B376}" type="datetimeFigureOut">
               <a:rPr kumimoji="1" lang="ja-JP" altLang="en-US" smtClean="0"/>
-              <a:t>2017/6/29</a:t>
+              <a:t>2017/6/30</a:t>
             </a:fld>
             <a:endParaRPr kumimoji="1" lang="ja-JP" altLang="en-US" dirty="0"/>
           </a:p>
@@ -7458,7 +7458,7 @@
           <a:p>
             <a:fld id="{216FD8EB-7C38-4D9D-8BDF-3ABF2096B376}" type="datetimeFigureOut">
               <a:rPr kumimoji="1" lang="ja-JP" altLang="en-US" smtClean="0"/>
-              <a:t>2017/6/29</a:t>
+              <a:t>2017/6/30</a:t>
             </a:fld>
             <a:endParaRPr kumimoji="1" lang="ja-JP" altLang="en-US" dirty="0"/>
           </a:p>
@@ -7704,7 +7704,7 @@
           <a:p>
             <a:fld id="{216FD8EB-7C38-4D9D-8BDF-3ABF2096B376}" type="datetimeFigureOut">
               <a:rPr kumimoji="1" lang="ja-JP" altLang="en-US" smtClean="0"/>
-              <a:t>2017/6/29</a:t>
+              <a:t>2017/6/30</a:t>
             </a:fld>
             <a:endParaRPr kumimoji="1" lang="ja-JP" altLang="en-US" dirty="0"/>
           </a:p>
@@ -8000,7 +8000,7 @@
           <a:p>
             <a:fld id="{216FD8EB-7C38-4D9D-8BDF-3ABF2096B376}" type="datetimeFigureOut">
               <a:rPr kumimoji="1" lang="ja-JP" altLang="en-US" smtClean="0"/>
-              <a:t>2017/6/29</a:t>
+              <a:t>2017/6/30</a:t>
             </a:fld>
             <a:endParaRPr kumimoji="1" lang="ja-JP" altLang="en-US" dirty="0"/>
           </a:p>
@@ -8431,7 +8431,7 @@
           <a:p>
             <a:fld id="{216FD8EB-7C38-4D9D-8BDF-3ABF2096B376}" type="datetimeFigureOut">
               <a:rPr kumimoji="1" lang="ja-JP" altLang="en-US" smtClean="0"/>
-              <a:t>2017/6/29</a:t>
+              <a:t>2017/6/30</a:t>
             </a:fld>
             <a:endParaRPr kumimoji="1" lang="ja-JP" altLang="en-US" dirty="0"/>
           </a:p>
@@ -8549,7 +8549,7 @@
           <a:p>
             <a:fld id="{216FD8EB-7C38-4D9D-8BDF-3ABF2096B376}" type="datetimeFigureOut">
               <a:rPr kumimoji="1" lang="ja-JP" altLang="en-US" smtClean="0"/>
-              <a:t>2017/6/29</a:t>
+              <a:t>2017/6/30</a:t>
             </a:fld>
             <a:endParaRPr kumimoji="1" lang="ja-JP" altLang="en-US" dirty="0"/>
           </a:p>
@@ -8644,7 +8644,7 @@
           <a:p>
             <a:fld id="{216FD8EB-7C38-4D9D-8BDF-3ABF2096B376}" type="datetimeFigureOut">
               <a:rPr kumimoji="1" lang="ja-JP" altLang="en-US" smtClean="0"/>
-              <a:t>2017/6/29</a:t>
+              <a:t>2017/6/30</a:t>
             </a:fld>
             <a:endParaRPr kumimoji="1" lang="ja-JP" altLang="en-US" dirty="0"/>
           </a:p>
@@ -8953,7 +8953,7 @@
           <a:p>
             <a:fld id="{216FD8EB-7C38-4D9D-8BDF-3ABF2096B376}" type="datetimeFigureOut">
               <a:rPr kumimoji="1" lang="ja-JP" altLang="en-US" smtClean="0"/>
-              <a:t>2017/6/29</a:t>
+              <a:t>2017/6/30</a:t>
             </a:fld>
             <a:endParaRPr kumimoji="1" lang="ja-JP" altLang="en-US" dirty="0"/>
           </a:p>
@@ -9206,7 +9206,7 @@
           <a:p>
             <a:fld id="{216FD8EB-7C38-4D9D-8BDF-3ABF2096B376}" type="datetimeFigureOut">
               <a:rPr kumimoji="1" lang="ja-JP" altLang="en-US" smtClean="0"/>
-              <a:t>2017/6/29</a:t>
+              <a:t>2017/6/30</a:t>
             </a:fld>
             <a:endParaRPr kumimoji="1" lang="ja-JP" altLang="en-US" dirty="0"/>
           </a:p>
@@ -9451,7 +9451,7 @@
           <a:p>
             <a:fld id="{216FD8EB-7C38-4D9D-8BDF-3ABF2096B376}" type="datetimeFigureOut">
               <a:rPr kumimoji="1" lang="ja-JP" altLang="en-US" smtClean="0"/>
-              <a:t>2017/6/29</a:t>
+              <a:t>2017/6/30</a:t>
             </a:fld>
             <a:endParaRPr kumimoji="1" lang="ja-JP" altLang="en-US" dirty="0"/>
           </a:p>
@@ -10053,7 +10053,7 @@
         <p:spPr>
           <a:xfrm>
             <a:off x="838200" y="2689724"/>
-            <a:ext cx="4108817" cy="369332"/>
+            <a:ext cx="4108817" cy="646331"/>
           </a:xfrm>
           <a:prstGeom prst="rect">
             <a:avLst/>
@@ -10086,7 +10086,45 @@
               <a:rPr lang="ja-JP" altLang="en-US" b="1" dirty="0" smtClean="0"/>
               <a:t>します。</a:t>
             </a:r>
-            <a:endParaRPr lang="ja-JP" altLang="en-US" b="1" dirty="0"/>
+            <a:endParaRPr lang="en-US" altLang="ja-JP" b="1" dirty="0" smtClean="0"/>
+          </a:p>
+          <a:p>
+            <a:r>
+              <a:rPr lang="az-Cyrl-AZ" altLang="ja-JP" dirty="0">
+                <a:latin typeface="Arial" panose="020B0604020202020204" pitchFamily="34" charset="0"/>
+                <a:cs typeface="Arial" panose="020B0604020202020204" pitchFamily="34" charset="0"/>
+              </a:rPr>
+              <a:t>Разрешите </a:t>
+            </a:r>
+            <a:r>
+              <a:rPr lang="az-Cyrl-AZ" altLang="ja-JP" dirty="0">
+                <a:solidFill>
+                  <a:schemeClr val="accent6">
+                    <a:lumMod val="75000"/>
+                  </a:schemeClr>
+                </a:solidFill>
+                <a:latin typeface="Arial" panose="020B0604020202020204" pitchFamily="34" charset="0"/>
+                <a:cs typeface="Arial" panose="020B0604020202020204" pitchFamily="34" charset="0"/>
+              </a:rPr>
+              <a:t>представиться</a:t>
+            </a:r>
+            <a:r>
+              <a:rPr lang="az-Cyrl-AZ" altLang="ja-JP" dirty="0">
+                <a:solidFill>
+                  <a:schemeClr val="accent6">
+                    <a:lumMod val="75000"/>
+                  </a:schemeClr>
+                </a:solidFill>
+              </a:rPr>
+              <a:t>.</a:t>
+            </a:r>
+            <a:endParaRPr lang="ja-JP" altLang="en-US" b="1" dirty="0">
+              <a:solidFill>
+                <a:schemeClr val="accent6">
+                  <a:lumMod val="75000"/>
+                </a:schemeClr>
+              </a:solidFill>
+            </a:endParaRPr>
           </a:p>
         </p:txBody>
       </p:sp>
@@ -10098,7 +10136,7 @@
         </p:nvSpPr>
         <p:spPr>
           <a:xfrm>
-            <a:off x="838200" y="2290355"/>
+            <a:off x="838200" y="2231303"/>
             <a:ext cx="2654894" cy="369332"/>
           </a:xfrm>
           <a:prstGeom prst="rect">
@@ -10114,11 +10152,7 @@
           <a:p>
             <a:r>
               <a:rPr lang="en-US" altLang="ja-JP" dirty="0" smtClean="0"/>
-              <a:t>{greeting.en} </a:t>
-            </a:r>
-            <a:r>
-              <a:rPr lang="en-US" altLang="ja-JP" dirty="0" smtClean="0"/>
-              <a:t>Everyone.</a:t>
+              <a:t>{greeting.en} Everyone.</a:t>
             </a:r>
             <a:endParaRPr lang="ja-JP" altLang="en-US" dirty="0"/>
           </a:p>
@@ -10132,7 +10166,7 @@
         </p:nvSpPr>
         <p:spPr>
           <a:xfrm>
-            <a:off x="6224451" y="2290355"/>
+            <a:off x="6224451" y="2231303"/>
             <a:ext cx="1911101" cy="369332"/>
           </a:xfrm>
           <a:prstGeom prst="rect">
@@ -10382,7 +10416,7 @@
         <p:spPr>
           <a:xfrm>
             <a:off x="6224451" y="2689724"/>
-            <a:ext cx="4108817" cy="369332"/>
+            <a:ext cx="4108817" cy="646331"/>
           </a:xfrm>
           <a:prstGeom prst="rect">
             <a:avLst/>
@@ -10419,7 +10453,44 @@
               <a:rPr lang="ja-JP" altLang="en-US" b="1" dirty="0" smtClean="0"/>
               <a:t>。</a:t>
             </a:r>
-            <a:endParaRPr lang="ja-JP" altLang="en-US" b="1" dirty="0"/>
+          </a:p>
+          <a:p>
+            <a:r>
+              <a:rPr lang="az-Cyrl-AZ" altLang="ja-JP" dirty="0">
+                <a:latin typeface="Arial" panose="020B0604020202020204" pitchFamily="34" charset="0"/>
+                <a:cs typeface="Arial" panose="020B0604020202020204" pitchFamily="34" charset="0"/>
+              </a:rPr>
+              <a:t>Разрешите </a:t>
+            </a:r>
+            <a:r>
+              <a:rPr lang="az-Cyrl-AZ" altLang="ja-JP" dirty="0">
+                <a:solidFill>
+                  <a:schemeClr val="accent6">
+                    <a:lumMod val="75000"/>
+                  </a:schemeClr>
+                </a:solidFill>
+                <a:latin typeface="Arial" panose="020B0604020202020204" pitchFamily="34" charset="0"/>
+                <a:cs typeface="Arial" panose="020B0604020202020204" pitchFamily="34" charset="0"/>
+              </a:rPr>
+              <a:t>представиться</a:t>
+            </a:r>
+            <a:r>
+              <a:rPr lang="az-Cyrl-AZ" altLang="ja-JP" dirty="0" smtClean="0">
+                <a:solidFill>
+                  <a:schemeClr val="accent6">
+                    <a:lumMod val="75000"/>
+                  </a:schemeClr>
+                </a:solidFill>
+              </a:rPr>
+              <a:t>.</a:t>
+            </a:r>
+            <a:endParaRPr lang="ja-JP" altLang="en-US" b="1" dirty="0">
+              <a:solidFill>
+                <a:schemeClr val="accent6">
+                  <a:lumMod val="75000"/>
+                </a:schemeClr>
+              </a:solidFill>
+            </a:endParaRPr>
           </a:p>
         </p:txBody>
       </p:sp>
@@ -10617,6 +10688,184 @@
               <a:t>{id:1}</a:t>
             </a:r>
             <a:endParaRPr lang="ja-JP" altLang="en-US" dirty="0"/>
+          </a:p>
+        </p:txBody>
+      </p:sp>
+      <p:sp>
+        <p:nvSpPr>
+          <p:cNvPr id="12" name="テキスト ボックス 11"/>
+          <p:cNvSpPr txBox="1"/>
+          <p:nvPr/>
+        </p:nvSpPr>
+        <p:spPr>
+          <a:xfrm>
+            <a:off x="842550" y="3653237"/>
+            <a:ext cx="4818948" cy="646331"/>
+          </a:xfrm>
+          <a:prstGeom prst="rect">
+            <a:avLst/>
+          </a:prstGeom>
+          <a:noFill/>
+        </p:spPr>
+        <p:txBody>
+          <a:bodyPr wrap="none" rtlCol="0">
+            <a:spAutoFit/>
+          </a:bodyPr>
+          <a:lstStyle/>
+          <a:p>
+            <a:pPr marL="285750" indent="-285750">
+              <a:buFont typeface="Arial" panose="020B0604020202020204" pitchFamily="34" charset="0"/>
+              <a:buChar char="•"/>
+            </a:pPr>
+            <a:r>
+              <a:rPr lang="en-US" altLang="ja-JP" dirty="0" smtClean="0">
+                <a:solidFill>
+                  <a:srgbClr val="FF0000"/>
+                </a:solidFill>
+              </a:rPr>
+              <a:t>{</a:t>
+            </a:r>
+            <a:r>
+              <a:rPr lang="en-US" altLang="ja-JP" b="1" dirty="0" smtClean="0"/>
+              <a:t>greeting</a:t>
+            </a:r>
+            <a:r>
+              <a:rPr lang="en-US" altLang="ja-JP" dirty="0" smtClean="0"/>
+              <a:t>.en</a:t>
+            </a:r>
+            <a:r>
+              <a:rPr lang="en-US" altLang="ja-JP" dirty="0" smtClean="0">
+                <a:solidFill>
+                  <a:srgbClr val="FF0000"/>
+                </a:solidFill>
+              </a:rPr>
+              <a:t>} </a:t>
+            </a:r>
+            <a:r>
+              <a:rPr lang="en-US" altLang="ja-JP" i="1" dirty="0" smtClean="0">
+                <a:solidFill>
+                  <a:srgbClr val="FF0000"/>
+                </a:solidFill>
+              </a:rPr>
+              <a:t>mixed-style will be broken.</a:t>
+            </a:r>
+            <a:endParaRPr lang="ja-JP" altLang="en-US" i="1" dirty="0" smtClean="0">
+              <a:solidFill>
+                <a:srgbClr val="FF0000"/>
+              </a:solidFill>
+            </a:endParaRPr>
+          </a:p>
+          <a:p>
+            <a:pPr marL="285750" indent="-285750">
+              <a:buFont typeface="Arial" panose="020B0604020202020204" pitchFamily="34" charset="0"/>
+              <a:buChar char="•"/>
+            </a:pPr>
+            <a:r>
+              <a:rPr lang="en-US" altLang="ja-JP" dirty="0" smtClean="0">
+                <a:solidFill>
+                  <a:srgbClr val="FF0000"/>
+                </a:solidFill>
+              </a:rPr>
+              <a:t>Another </a:t>
+            </a:r>
+            <a:r>
+              <a:rPr lang="en-US" altLang="ja-JP" i="1" u="sng" dirty="0" smtClean="0"/>
+              <a:t>paragraph</a:t>
+            </a:r>
+            <a:r>
+              <a:rPr lang="en-US" altLang="ja-JP" i="1" dirty="0" smtClean="0">
+                <a:solidFill>
+                  <a:srgbClr val="FF0000"/>
+                </a:solidFill>
+              </a:rPr>
+              <a:t> </a:t>
+            </a:r>
+            <a:r>
+              <a:rPr lang="en-US" altLang="ja-JP" dirty="0" smtClean="0">
+                <a:solidFill>
+                  <a:srgbClr val="FF0000"/>
+                </a:solidFill>
+              </a:rPr>
+              <a:t>remains</a:t>
+            </a:r>
+            <a:endParaRPr lang="ja-JP" altLang="en-US" dirty="0">
+              <a:solidFill>
+                <a:srgbClr val="FF0000"/>
+              </a:solidFill>
+            </a:endParaRPr>
+          </a:p>
+        </p:txBody>
+      </p:sp>
+      <p:sp>
+        <p:nvSpPr>
+          <p:cNvPr id="14" name="テキスト ボックス 13"/>
+          <p:cNvSpPr txBox="1"/>
+          <p:nvPr/>
+        </p:nvSpPr>
+        <p:spPr>
+          <a:xfrm>
+            <a:off x="6224451" y="3653237"/>
+            <a:ext cx="4761240" cy="646331"/>
+          </a:xfrm>
+          <a:prstGeom prst="rect">
+            <a:avLst/>
+          </a:prstGeom>
+          <a:noFill/>
+        </p:spPr>
+        <p:txBody>
+          <a:bodyPr wrap="none" rtlCol="0">
+            <a:spAutoFit/>
+          </a:bodyPr>
+          <a:lstStyle/>
+          <a:p>
+            <a:pPr marL="285750" indent="-285750">
+              <a:buFont typeface="Arial" panose="020B0604020202020204" pitchFamily="34" charset="0"/>
+              <a:buChar char="•"/>
+            </a:pPr>
+            <a:r>
+              <a:rPr lang="en-US" altLang="ja-JP" dirty="0" smtClean="0"/>
+              <a:t>{greeting.en} mixed-style will be broken.</a:t>
+            </a:r>
+            <a:endParaRPr lang="ja-JP" altLang="en-US" dirty="0" smtClean="0"/>
+          </a:p>
+          <a:p>
+            <a:pPr marL="285750" indent="-285750">
+              <a:buFont typeface="Arial" panose="020B0604020202020204" pitchFamily="34" charset="0"/>
+              <a:buChar char="•"/>
+            </a:pPr>
+            <a:r>
+              <a:rPr lang="en-US" altLang="ja-JP" dirty="0">
+                <a:solidFill>
+                  <a:srgbClr val="FF0000"/>
+                </a:solidFill>
+              </a:rPr>
+              <a:t>Another </a:t>
+            </a:r>
+            <a:r>
+              <a:rPr lang="en-US" altLang="ja-JP" i="1" u="sng" dirty="0"/>
+              <a:t>paragraph</a:t>
+            </a:r>
+            <a:r>
+              <a:rPr lang="en-US" altLang="ja-JP" i="1" dirty="0">
+                <a:solidFill>
+                  <a:srgbClr val="FF0000"/>
+                </a:solidFill>
+              </a:rPr>
+              <a:t> </a:t>
+            </a:r>
+            <a:r>
+              <a:rPr lang="en-US" altLang="ja-JP" dirty="0" smtClean="0">
+                <a:solidFill>
+                  <a:srgbClr val="FF0000"/>
+                </a:solidFill>
+              </a:rPr>
+              <a:t>remains</a:t>
+            </a:r>
+            <a:endParaRPr lang="ja-JP" altLang="en-US" dirty="0">
+              <a:solidFill>
+                <a:srgbClr val="FF0000"/>
+              </a:solidFill>
+            </a:endParaRPr>
           </a:p>
         </p:txBody>
       </p:sp>

</xml_diff>

<commit_message>
Fix/preserve text style (#11)
* Preserving original font for replacing EL

* Extract logics for text_field and chart into respective file

* Rename some old regexps
</commit_message>
<xml_diff>
--- a/test/data/in.pptx
+++ b/test/data/in.pptx
@@ -163,7 +163,6 @@
           </a:p>
         </c:rich>
       </c:tx>
-      <c:layout/>
       <c:overlay val="0"/>
       <c:spPr>
         <a:noFill/>
@@ -634,7 +633,6 @@
     </c:plotArea>
     <c:legend>
       <c:legendPos val="b"/>
-      <c:layout/>
       <c:overlay val="0"/>
       <c:spPr>
         <a:noFill/>
@@ -736,7 +734,6 @@
           </a:p>
         </c:rich>
       </c:tx>
-      <c:layout/>
       <c:overlay val="0"/>
       <c:spPr>
         <a:noFill/>
@@ -1209,7 +1206,6 @@
     </c:plotArea>
     <c:legend>
       <c:legendPos val="b"/>
-      <c:layout/>
       <c:overlay val="0"/>
       <c:spPr>
         <a:noFill/>
@@ -1301,15 +1297,7 @@
             </a:pPr>
             <a:r>
               <a:rPr lang="en-US" altLang="ja-JP" dirty="0" smtClean="0"/>
-              <a:t>{</a:t>
-            </a:r>
-            <a:r>
-              <a:rPr lang="en-US" altLang="ja-JP" dirty="0" err="1" smtClean="0"/>
-              <a:t>xy</a:t>
-            </a:r>
-            <a:r>
-              <a:rPr lang="en-US" altLang="ja-JP" dirty="0" smtClean="0"/>
-              <a:t>}</a:t>
+              <a:t>{xy}</a:t>
             </a:r>
             <a:r>
               <a:rPr lang="ja-JP" altLang="en-US" dirty="0" smtClean="0"/>
@@ -1322,7 +1310,6 @@
           </a:p>
         </c:rich>
       </c:tx>
-      <c:layout/>
       <c:overlay val="0"/>
       <c:spPr>
         <a:noFill/>
@@ -1746,7 +1733,6 @@
     </c:plotArea>
     <c:legend>
       <c:legendPos val="t"/>
-      <c:layout/>
       <c:overlay val="0"/>
       <c:spPr>
         <a:noFill/>
@@ -1818,7 +1804,6 @@
   </mc:AlternateContent>
   <c:chart>
     <c:title>
-      <c:layout/>
       <c:overlay val="0"/>
       <c:spPr>
         <a:noFill/>
@@ -2242,7 +2227,6 @@
     </c:plotArea>
     <c:legend>
       <c:legendPos val="t"/>
-      <c:layout/>
       <c:overlay val="0"/>
       <c:spPr>
         <a:noFill/>
@@ -2344,7 +2328,6 @@
           </a:p>
         </c:rich>
       </c:tx>
-      <c:layout/>
       <c:overlay val="0"/>
       <c:spPr>
         <a:noFill/>
@@ -2815,7 +2798,6 @@
     </c:plotArea>
     <c:legend>
       <c:legendPos val="b"/>
-      <c:layout/>
       <c:overlay val="0"/>
       <c:spPr>
         <a:noFill/>
@@ -2917,7 +2899,6 @@
           </a:p>
         </c:rich>
       </c:tx>
-      <c:layout/>
       <c:overlay val="0"/>
       <c:spPr>
         <a:noFill/>
@@ -3390,7 +3371,6 @@
     </c:plotArea>
     <c:legend>
       <c:legendPos val="b"/>
-      <c:layout/>
       <c:overlay val="0"/>
       <c:spPr>
         <a:noFill/>
@@ -6862,9 +6842,9 @@
           <a:p>
             <a:fld id="{216FD8EB-7C38-4D9D-8BDF-3ABF2096B376}" type="datetimeFigureOut">
               <a:rPr kumimoji="1" lang="ja-JP" altLang="en-US" smtClean="0"/>
-              <a:t>2017/6/27</a:t>
+              <a:t>2017/6/30</a:t>
             </a:fld>
-            <a:endParaRPr kumimoji="1" lang="ja-JP" altLang="en-US"/>
+            <a:endParaRPr kumimoji="1" lang="ja-JP" altLang="en-US" dirty="0"/>
           </a:p>
         </p:txBody>
       </p:sp>
@@ -6883,7 +6863,7 @@
           <a:bodyPr/>
           <a:lstStyle/>
           <a:p>
-            <a:endParaRPr kumimoji="1" lang="ja-JP" altLang="en-US"/>
+            <a:endParaRPr kumimoji="1" lang="ja-JP" altLang="en-US" dirty="0"/>
           </a:p>
         </p:txBody>
       </p:sp>
@@ -6906,7 +6886,7 @@
               <a:rPr kumimoji="1" lang="ja-JP" altLang="en-US" smtClean="0"/>
               <a:t>‹#›</a:t>
             </a:fld>
-            <a:endParaRPr kumimoji="1" lang="ja-JP" altLang="en-US"/>
+            <a:endParaRPr kumimoji="1" lang="ja-JP" altLang="en-US" dirty="0"/>
           </a:p>
         </p:txBody>
       </p:sp>
@@ -7064,9 +7044,9 @@
           <a:p>
             <a:fld id="{216FD8EB-7C38-4D9D-8BDF-3ABF2096B376}" type="datetimeFigureOut">
               <a:rPr kumimoji="1" lang="ja-JP" altLang="en-US" smtClean="0"/>
-              <a:t>2017/6/27</a:t>
+              <a:t>2017/6/30</a:t>
             </a:fld>
-            <a:endParaRPr kumimoji="1" lang="ja-JP" altLang="en-US"/>
+            <a:endParaRPr kumimoji="1" lang="ja-JP" altLang="en-US" dirty="0"/>
           </a:p>
         </p:txBody>
       </p:sp>
@@ -7085,7 +7065,7 @@
           <a:bodyPr/>
           <a:lstStyle/>
           <a:p>
-            <a:endParaRPr kumimoji="1" lang="ja-JP" altLang="en-US"/>
+            <a:endParaRPr kumimoji="1" lang="ja-JP" altLang="en-US" dirty="0"/>
           </a:p>
         </p:txBody>
       </p:sp>
@@ -7108,7 +7088,7 @@
               <a:rPr kumimoji="1" lang="ja-JP" altLang="en-US" smtClean="0"/>
               <a:t>‹#›</a:t>
             </a:fld>
-            <a:endParaRPr kumimoji="1" lang="ja-JP" altLang="en-US"/>
+            <a:endParaRPr kumimoji="1" lang="ja-JP" altLang="en-US" dirty="0"/>
           </a:p>
         </p:txBody>
       </p:sp>
@@ -7276,9 +7256,9 @@
           <a:p>
             <a:fld id="{216FD8EB-7C38-4D9D-8BDF-3ABF2096B376}" type="datetimeFigureOut">
               <a:rPr kumimoji="1" lang="ja-JP" altLang="en-US" smtClean="0"/>
-              <a:t>2017/6/27</a:t>
+              <a:t>2017/6/30</a:t>
             </a:fld>
-            <a:endParaRPr kumimoji="1" lang="ja-JP" altLang="en-US"/>
+            <a:endParaRPr kumimoji="1" lang="ja-JP" altLang="en-US" dirty="0"/>
           </a:p>
         </p:txBody>
       </p:sp>
@@ -7297,7 +7277,7 @@
           <a:bodyPr/>
           <a:lstStyle/>
           <a:p>
-            <a:endParaRPr kumimoji="1" lang="ja-JP" altLang="en-US"/>
+            <a:endParaRPr kumimoji="1" lang="ja-JP" altLang="en-US" dirty="0"/>
           </a:p>
         </p:txBody>
       </p:sp>
@@ -7320,7 +7300,7 @@
               <a:rPr kumimoji="1" lang="ja-JP" altLang="en-US" smtClean="0"/>
               <a:t>‹#›</a:t>
             </a:fld>
-            <a:endParaRPr kumimoji="1" lang="ja-JP" altLang="en-US"/>
+            <a:endParaRPr kumimoji="1" lang="ja-JP" altLang="en-US" dirty="0"/>
           </a:p>
         </p:txBody>
       </p:sp>
@@ -7478,9 +7458,9 @@
           <a:p>
             <a:fld id="{216FD8EB-7C38-4D9D-8BDF-3ABF2096B376}" type="datetimeFigureOut">
               <a:rPr kumimoji="1" lang="ja-JP" altLang="en-US" smtClean="0"/>
-              <a:t>2017/6/27</a:t>
+              <a:t>2017/6/30</a:t>
             </a:fld>
-            <a:endParaRPr kumimoji="1" lang="ja-JP" altLang="en-US"/>
+            <a:endParaRPr kumimoji="1" lang="ja-JP" altLang="en-US" dirty="0"/>
           </a:p>
         </p:txBody>
       </p:sp>
@@ -7499,7 +7479,7 @@
           <a:bodyPr/>
           <a:lstStyle/>
           <a:p>
-            <a:endParaRPr kumimoji="1" lang="ja-JP" altLang="en-US"/>
+            <a:endParaRPr kumimoji="1" lang="ja-JP" altLang="en-US" dirty="0"/>
           </a:p>
         </p:txBody>
       </p:sp>
@@ -7522,7 +7502,7 @@
               <a:rPr kumimoji="1" lang="ja-JP" altLang="en-US" smtClean="0"/>
               <a:t>‹#›</a:t>
             </a:fld>
-            <a:endParaRPr kumimoji="1" lang="ja-JP" altLang="en-US"/>
+            <a:endParaRPr kumimoji="1" lang="ja-JP" altLang="en-US" dirty="0"/>
           </a:p>
         </p:txBody>
       </p:sp>
@@ -7724,9 +7704,9 @@
           <a:p>
             <a:fld id="{216FD8EB-7C38-4D9D-8BDF-3ABF2096B376}" type="datetimeFigureOut">
               <a:rPr kumimoji="1" lang="ja-JP" altLang="en-US" smtClean="0"/>
-              <a:t>2017/6/27</a:t>
+              <a:t>2017/6/30</a:t>
             </a:fld>
-            <a:endParaRPr kumimoji="1" lang="ja-JP" altLang="en-US"/>
+            <a:endParaRPr kumimoji="1" lang="ja-JP" altLang="en-US" dirty="0"/>
           </a:p>
         </p:txBody>
       </p:sp>
@@ -7745,7 +7725,7 @@
           <a:bodyPr/>
           <a:lstStyle/>
           <a:p>
-            <a:endParaRPr kumimoji="1" lang="ja-JP" altLang="en-US"/>
+            <a:endParaRPr kumimoji="1" lang="ja-JP" altLang="en-US" dirty="0"/>
           </a:p>
         </p:txBody>
       </p:sp>
@@ -7768,7 +7748,7 @@
               <a:rPr kumimoji="1" lang="ja-JP" altLang="en-US" smtClean="0"/>
               <a:t>‹#›</a:t>
             </a:fld>
-            <a:endParaRPr kumimoji="1" lang="ja-JP" altLang="en-US"/>
+            <a:endParaRPr kumimoji="1" lang="ja-JP" altLang="en-US" dirty="0"/>
           </a:p>
         </p:txBody>
       </p:sp>
@@ -8020,9 +8000,9 @@
           <a:p>
             <a:fld id="{216FD8EB-7C38-4D9D-8BDF-3ABF2096B376}" type="datetimeFigureOut">
               <a:rPr kumimoji="1" lang="ja-JP" altLang="en-US" smtClean="0"/>
-              <a:t>2017/6/27</a:t>
+              <a:t>2017/6/30</a:t>
             </a:fld>
-            <a:endParaRPr kumimoji="1" lang="ja-JP" altLang="en-US"/>
+            <a:endParaRPr kumimoji="1" lang="ja-JP" altLang="en-US" dirty="0"/>
           </a:p>
         </p:txBody>
       </p:sp>
@@ -8041,7 +8021,7 @@
           <a:bodyPr/>
           <a:lstStyle/>
           <a:p>
-            <a:endParaRPr kumimoji="1" lang="ja-JP" altLang="en-US"/>
+            <a:endParaRPr kumimoji="1" lang="ja-JP" altLang="en-US" dirty="0"/>
           </a:p>
         </p:txBody>
       </p:sp>
@@ -8064,7 +8044,7 @@
               <a:rPr kumimoji="1" lang="ja-JP" altLang="en-US" smtClean="0"/>
               <a:t>‹#›</a:t>
             </a:fld>
-            <a:endParaRPr kumimoji="1" lang="ja-JP" altLang="en-US"/>
+            <a:endParaRPr kumimoji="1" lang="ja-JP" altLang="en-US" dirty="0"/>
           </a:p>
         </p:txBody>
       </p:sp>
@@ -8451,9 +8431,9 @@
           <a:p>
             <a:fld id="{216FD8EB-7C38-4D9D-8BDF-3ABF2096B376}" type="datetimeFigureOut">
               <a:rPr kumimoji="1" lang="ja-JP" altLang="en-US" smtClean="0"/>
-              <a:t>2017/6/27</a:t>
+              <a:t>2017/6/30</a:t>
             </a:fld>
-            <a:endParaRPr kumimoji="1" lang="ja-JP" altLang="en-US"/>
+            <a:endParaRPr kumimoji="1" lang="ja-JP" altLang="en-US" dirty="0"/>
           </a:p>
         </p:txBody>
       </p:sp>
@@ -8472,7 +8452,7 @@
           <a:bodyPr/>
           <a:lstStyle/>
           <a:p>
-            <a:endParaRPr kumimoji="1" lang="ja-JP" altLang="en-US"/>
+            <a:endParaRPr kumimoji="1" lang="ja-JP" altLang="en-US" dirty="0"/>
           </a:p>
         </p:txBody>
       </p:sp>
@@ -8495,7 +8475,7 @@
               <a:rPr kumimoji="1" lang="ja-JP" altLang="en-US" smtClean="0"/>
               <a:t>‹#›</a:t>
             </a:fld>
-            <a:endParaRPr kumimoji="1" lang="ja-JP" altLang="en-US"/>
+            <a:endParaRPr kumimoji="1" lang="ja-JP" altLang="en-US" dirty="0"/>
           </a:p>
         </p:txBody>
       </p:sp>
@@ -8569,9 +8549,9 @@
           <a:p>
             <a:fld id="{216FD8EB-7C38-4D9D-8BDF-3ABF2096B376}" type="datetimeFigureOut">
               <a:rPr kumimoji="1" lang="ja-JP" altLang="en-US" smtClean="0"/>
-              <a:t>2017/6/27</a:t>
+              <a:t>2017/6/30</a:t>
             </a:fld>
-            <a:endParaRPr kumimoji="1" lang="ja-JP" altLang="en-US"/>
+            <a:endParaRPr kumimoji="1" lang="ja-JP" altLang="en-US" dirty="0"/>
           </a:p>
         </p:txBody>
       </p:sp>
@@ -8590,7 +8570,7 @@
           <a:bodyPr/>
           <a:lstStyle/>
           <a:p>
-            <a:endParaRPr kumimoji="1" lang="ja-JP" altLang="en-US"/>
+            <a:endParaRPr kumimoji="1" lang="ja-JP" altLang="en-US" dirty="0"/>
           </a:p>
         </p:txBody>
       </p:sp>
@@ -8613,7 +8593,7 @@
               <a:rPr kumimoji="1" lang="ja-JP" altLang="en-US" smtClean="0"/>
               <a:t>‹#›</a:t>
             </a:fld>
-            <a:endParaRPr kumimoji="1" lang="ja-JP" altLang="en-US"/>
+            <a:endParaRPr kumimoji="1" lang="ja-JP" altLang="en-US" dirty="0"/>
           </a:p>
         </p:txBody>
       </p:sp>
@@ -8664,9 +8644,9 @@
           <a:p>
             <a:fld id="{216FD8EB-7C38-4D9D-8BDF-3ABF2096B376}" type="datetimeFigureOut">
               <a:rPr kumimoji="1" lang="ja-JP" altLang="en-US" smtClean="0"/>
-              <a:t>2017/6/27</a:t>
+              <a:t>2017/6/30</a:t>
             </a:fld>
-            <a:endParaRPr kumimoji="1" lang="ja-JP" altLang="en-US"/>
+            <a:endParaRPr kumimoji="1" lang="ja-JP" altLang="en-US" dirty="0"/>
           </a:p>
         </p:txBody>
       </p:sp>
@@ -8685,7 +8665,7 @@
           <a:bodyPr/>
           <a:lstStyle/>
           <a:p>
-            <a:endParaRPr kumimoji="1" lang="ja-JP" altLang="en-US"/>
+            <a:endParaRPr kumimoji="1" lang="ja-JP" altLang="en-US" dirty="0"/>
           </a:p>
         </p:txBody>
       </p:sp>
@@ -8708,7 +8688,7 @@
               <a:rPr kumimoji="1" lang="ja-JP" altLang="en-US" smtClean="0"/>
               <a:t>‹#›</a:t>
             </a:fld>
-            <a:endParaRPr kumimoji="1" lang="ja-JP" altLang="en-US"/>
+            <a:endParaRPr kumimoji="1" lang="ja-JP" altLang="en-US" dirty="0"/>
           </a:p>
         </p:txBody>
       </p:sp>
@@ -8973,9 +8953,9 @@
           <a:p>
             <a:fld id="{216FD8EB-7C38-4D9D-8BDF-3ABF2096B376}" type="datetimeFigureOut">
               <a:rPr kumimoji="1" lang="ja-JP" altLang="en-US" smtClean="0"/>
-              <a:t>2017/6/27</a:t>
+              <a:t>2017/6/30</a:t>
             </a:fld>
-            <a:endParaRPr kumimoji="1" lang="ja-JP" altLang="en-US"/>
+            <a:endParaRPr kumimoji="1" lang="ja-JP" altLang="en-US" dirty="0"/>
           </a:p>
         </p:txBody>
       </p:sp>
@@ -8994,7 +8974,7 @@
           <a:bodyPr/>
           <a:lstStyle/>
           <a:p>
-            <a:endParaRPr kumimoji="1" lang="ja-JP" altLang="en-US"/>
+            <a:endParaRPr kumimoji="1" lang="ja-JP" altLang="en-US" dirty="0"/>
           </a:p>
         </p:txBody>
       </p:sp>
@@ -9017,7 +8997,7 @@
               <a:rPr kumimoji="1" lang="ja-JP" altLang="en-US" smtClean="0"/>
               <a:t>‹#›</a:t>
             </a:fld>
-            <a:endParaRPr kumimoji="1" lang="ja-JP" altLang="en-US"/>
+            <a:endParaRPr kumimoji="1" lang="ja-JP" altLang="en-US" dirty="0"/>
           </a:p>
         </p:txBody>
       </p:sp>
@@ -9140,7 +9120,7 @@
             </a:lvl9pPr>
           </a:lstStyle>
           <a:p>
-            <a:endParaRPr kumimoji="1" lang="ja-JP" altLang="en-US"/>
+            <a:endParaRPr kumimoji="1" lang="ja-JP" altLang="en-US" dirty="0"/>
           </a:p>
         </p:txBody>
       </p:sp>
@@ -9226,9 +9206,9 @@
           <a:p>
             <a:fld id="{216FD8EB-7C38-4D9D-8BDF-3ABF2096B376}" type="datetimeFigureOut">
               <a:rPr kumimoji="1" lang="ja-JP" altLang="en-US" smtClean="0"/>
-              <a:t>2017/6/27</a:t>
+              <a:t>2017/6/30</a:t>
             </a:fld>
-            <a:endParaRPr kumimoji="1" lang="ja-JP" altLang="en-US"/>
+            <a:endParaRPr kumimoji="1" lang="ja-JP" altLang="en-US" dirty="0"/>
           </a:p>
         </p:txBody>
       </p:sp>
@@ -9247,7 +9227,7 @@
           <a:bodyPr/>
           <a:lstStyle/>
           <a:p>
-            <a:endParaRPr kumimoji="1" lang="ja-JP" altLang="en-US"/>
+            <a:endParaRPr kumimoji="1" lang="ja-JP" altLang="en-US" dirty="0"/>
           </a:p>
         </p:txBody>
       </p:sp>
@@ -9270,7 +9250,7 @@
               <a:rPr kumimoji="1" lang="ja-JP" altLang="en-US" smtClean="0"/>
               <a:t>‹#›</a:t>
             </a:fld>
-            <a:endParaRPr kumimoji="1" lang="ja-JP" altLang="en-US"/>
+            <a:endParaRPr kumimoji="1" lang="ja-JP" altLang="en-US" dirty="0"/>
           </a:p>
         </p:txBody>
       </p:sp>
@@ -9471,9 +9451,9 @@
           <a:p>
             <a:fld id="{216FD8EB-7C38-4D9D-8BDF-3ABF2096B376}" type="datetimeFigureOut">
               <a:rPr kumimoji="1" lang="ja-JP" altLang="en-US" smtClean="0"/>
-              <a:t>2017/6/27</a:t>
+              <a:t>2017/6/30</a:t>
             </a:fld>
-            <a:endParaRPr kumimoji="1" lang="ja-JP" altLang="en-US"/>
+            <a:endParaRPr kumimoji="1" lang="ja-JP" altLang="en-US" dirty="0"/>
           </a:p>
         </p:txBody>
       </p:sp>
@@ -9510,7 +9490,7 @@
             </a:lvl1pPr>
           </a:lstStyle>
           <a:p>
-            <a:endParaRPr kumimoji="1" lang="ja-JP" altLang="en-US"/>
+            <a:endParaRPr kumimoji="1" lang="ja-JP" altLang="en-US" dirty="0"/>
           </a:p>
         </p:txBody>
       </p:sp>
@@ -9551,7 +9531,7 @@
               <a:rPr kumimoji="1" lang="ja-JP" altLang="en-US" smtClean="0"/>
               <a:t>‹#›</a:t>
             </a:fld>
-            <a:endParaRPr kumimoji="1" lang="ja-JP" altLang="en-US"/>
+            <a:endParaRPr kumimoji="1" lang="ja-JP" altLang="en-US" dirty="0"/>
           </a:p>
         </p:txBody>
       </p:sp>
@@ -9892,12 +9872,8 @@
           <a:lstStyle/>
           <a:p>
             <a:r>
-              <a:rPr kumimoji="1" lang="en-US" altLang="ja-JP" dirty="0" err="1" smtClean="0"/>
-              <a:t>Ppt</a:t>
-            </a:r>
-            <a:r>
               <a:rPr kumimoji="1" lang="en-US" altLang="ja-JP" dirty="0" smtClean="0"/>
-              <a:t>-template test</a:t>
+              <a:t>Ppt-template test</a:t>
             </a:r>
             <a:endParaRPr kumimoji="1" lang="ja-JP" altLang="en-US" dirty="0"/>
           </a:p>
@@ -9920,13 +9896,9 @@
           <a:p>
             <a:r>
               <a:rPr lang="en-US" altLang="ja-JP" dirty="0" smtClean="0"/>
-              <a:t>This </a:t>
-            </a:r>
-            <a:r>
-              <a:rPr lang="en-US" altLang="ja-JP" smtClean="0"/>
-              <a:t>slide will be removed</a:t>
-            </a:r>
-            <a:endParaRPr kumimoji="1" lang="ja-JP" altLang="en-US"/>
+              <a:t>This slide will be removed</a:t>
+            </a:r>
+            <a:endParaRPr kumimoji="1" lang="ja-JP" altLang="en-US" dirty="0"/>
           </a:p>
         </p:txBody>
       </p:sp>
@@ -10074,14 +10046,14 @@
       </p:sp>
       <p:sp>
         <p:nvSpPr>
-          <p:cNvPr id="6" name="テキスト ボックス 5"/>
+          <p:cNvPr id="7" name="テキスト ボックス 6"/>
           <p:cNvSpPr txBox="1"/>
           <p:nvPr/>
         </p:nvSpPr>
         <p:spPr>
           <a:xfrm>
-            <a:off x="838200" y="2290355"/>
-            <a:ext cx="1556836" cy="369332"/>
+            <a:off x="838200" y="2689724"/>
+            <a:ext cx="4108817" cy="646331"/>
           </a:xfrm>
           <a:prstGeom prst="rect">
             <a:avLst/>
@@ -10095,31 +10067,77 @@
           <a:lstStyle/>
           <a:p>
             <a:r>
-              <a:rPr kumimoji="1" lang="en-US" altLang="ja-JP" dirty="0" smtClean="0"/>
-              <a:t>{</a:t>
-            </a:r>
-            <a:r>
-              <a:rPr kumimoji="1" lang="en-US" altLang="ja-JP" dirty="0" err="1" smtClean="0"/>
-              <a:t>greeting.en</a:t>
-            </a:r>
-            <a:r>
-              <a:rPr kumimoji="1" lang="en-US" altLang="ja-JP" dirty="0" smtClean="0"/>
-              <a:t>}</a:t>
-            </a:r>
-            <a:endParaRPr kumimoji="1" lang="ja-JP" altLang="en-US" dirty="0"/>
+              <a:rPr lang="en-US" altLang="ja-JP" b="1" dirty="0" smtClean="0"/>
+              <a:t>{greeting.ja}</a:t>
+            </a:r>
+            <a:r>
+              <a:rPr lang="ja-JP" altLang="en-US" b="1" dirty="0" smtClean="0"/>
+              <a:t>よろしく</a:t>
+            </a:r>
+            <a:r>
+              <a:rPr lang="ja-JP" altLang="en-US" b="1" dirty="0" smtClean="0">
+                <a:solidFill>
+                  <a:srgbClr val="FF0000"/>
+                </a:solidFill>
+              </a:rPr>
+              <a:t>お願い</a:t>
+            </a:r>
+            <a:r>
+              <a:rPr lang="ja-JP" altLang="en-US" b="1" dirty="0" smtClean="0"/>
+              <a:t>します。</a:t>
+            </a:r>
+            <a:endParaRPr lang="en-US" altLang="ja-JP" b="1" dirty="0" smtClean="0"/>
+          </a:p>
+          <a:p>
+            <a:r>
+              <a:rPr lang="az-Cyrl-AZ" altLang="ja-JP" dirty="0">
+                <a:latin typeface="Arial" panose="020B0604020202020204" pitchFamily="34" charset="0"/>
+                <a:cs typeface="Arial" panose="020B0604020202020204" pitchFamily="34" charset="0"/>
+              </a:rPr>
+              <a:t>Разрешите </a:t>
+            </a:r>
+            <a:r>
+              <a:rPr lang="az-Cyrl-AZ" altLang="ja-JP" dirty="0">
+                <a:solidFill>
+                  <a:schemeClr val="accent6">
+                    <a:lumMod val="75000"/>
+                  </a:schemeClr>
+                </a:solidFill>
+                <a:latin typeface="Arial" panose="020B0604020202020204" pitchFamily="34" charset="0"/>
+                <a:cs typeface="Arial" panose="020B0604020202020204" pitchFamily="34" charset="0"/>
+              </a:rPr>
+              <a:t>представиться</a:t>
+            </a:r>
+            <a:r>
+              <a:rPr lang="az-Cyrl-AZ" altLang="ja-JP" dirty="0">
+                <a:solidFill>
+                  <a:schemeClr val="accent6">
+                    <a:lumMod val="75000"/>
+                  </a:schemeClr>
+                </a:solidFill>
+              </a:rPr>
+              <a:t>.</a:t>
+            </a:r>
+            <a:endParaRPr lang="ja-JP" altLang="en-US" b="1" dirty="0">
+              <a:solidFill>
+                <a:schemeClr val="accent6">
+                  <a:lumMod val="75000"/>
+                </a:schemeClr>
+              </a:solidFill>
+            </a:endParaRPr>
           </a:p>
         </p:txBody>
       </p:sp>
       <p:sp>
         <p:nvSpPr>
-          <p:cNvPr id="7" name="テキスト ボックス 6"/>
+          <p:cNvPr id="6" name="テキスト ボックス 5"/>
           <p:cNvSpPr txBox="1"/>
           <p:nvPr/>
         </p:nvSpPr>
         <p:spPr>
           <a:xfrm>
-            <a:off x="838200" y="2689724"/>
-            <a:ext cx="1569660" cy="369332"/>
+            <a:off x="838200" y="2231303"/>
+            <a:ext cx="2654894" cy="369332"/>
           </a:xfrm>
           <a:prstGeom prst="rect">
             <a:avLst/>
@@ -10133,18 +10151,10 @@
           <a:lstStyle/>
           <a:p>
             <a:r>
-              <a:rPr kumimoji="1" lang="en-US" altLang="ja-JP" b="1" dirty="0" smtClean="0"/>
-              <a:t>{</a:t>
-            </a:r>
-            <a:r>
-              <a:rPr kumimoji="1" lang="en-US" altLang="ja-JP" b="1" dirty="0" err="1" smtClean="0"/>
-              <a:t>greeting.ja</a:t>
-            </a:r>
-            <a:r>
-              <a:rPr kumimoji="1" lang="en-US" altLang="ja-JP" b="1" dirty="0" smtClean="0"/>
-              <a:t>}</a:t>
-            </a:r>
-            <a:endParaRPr kumimoji="1" lang="ja-JP" altLang="en-US" b="1" dirty="0"/>
+              <a:rPr lang="en-US" altLang="ja-JP" dirty="0" smtClean="0"/>
+              <a:t>{greeting.en} Everyone.</a:t>
+            </a:r>
+            <a:endParaRPr lang="ja-JP" altLang="en-US" dirty="0"/>
           </a:p>
         </p:txBody>
       </p:sp>
@@ -10156,8 +10166,8 @@
         </p:nvSpPr>
         <p:spPr>
           <a:xfrm>
-            <a:off x="6224451" y="2290355"/>
-            <a:ext cx="813043" cy="369332"/>
+            <a:off x="6224451" y="2231303"/>
+            <a:ext cx="1911101" cy="369332"/>
           </a:xfrm>
           <a:prstGeom prst="rect">
             <a:avLst/>
@@ -10172,7 +10182,7 @@
           <a:p>
             <a:r>
               <a:rPr lang="en-US" altLang="ja-JP" dirty="0" smtClean="0"/>
-              <a:t>Hello!</a:t>
+              <a:t>Hello! Everyone.</a:t>
             </a:r>
             <a:endParaRPr kumimoji="1" lang="ja-JP" altLang="en-US" dirty="0"/>
           </a:p>
@@ -10187,13 +10197,13 @@
           <p:nvPr>
             <p:extLst>
               <p:ext uri="{D42A27DB-BD31-4B8C-83A1-F6EECF244321}">
-                <p14:modId xmlns:p14="http://schemas.microsoft.com/office/powerpoint/2010/main" val="3558241184"/>
+                <p14:modId xmlns:p14="http://schemas.microsoft.com/office/powerpoint/2010/main" val="3422242629"/>
               </p:ext>
             </p:extLst>
           </p:nvPr>
         </p:nvGraphicFramePr>
         <p:xfrm>
-          <a:off x="838200" y="3349655"/>
+          <a:off x="838200" y="4708194"/>
           <a:ext cx="4935584" cy="1010920"/>
         </p:xfrm>
         <a:graphic>
@@ -10352,7 +10362,7 @@
                     <a:bodyPr/>
                     <a:lstStyle/>
                     <a:p>
-                      <a:endParaRPr kumimoji="1" lang="ja-JP" altLang="en-US"/>
+                      <a:endParaRPr kumimoji="1" lang="ja-JP" altLang="en-US" dirty="0"/>
                     </a:p>
                   </a:txBody>
                   <a:tcPr/>
@@ -10362,7 +10372,7 @@
                     <a:bodyPr/>
                     <a:lstStyle/>
                     <a:p>
-                      <a:endParaRPr kumimoji="1" lang="ja-JP" altLang="en-US"/>
+                      <a:endParaRPr kumimoji="1" lang="ja-JP" altLang="en-US" dirty="0"/>
                     </a:p>
                   </a:txBody>
                   <a:tcPr/>
@@ -10372,7 +10382,7 @@
                     <a:bodyPr/>
                     <a:lstStyle/>
                     <a:p>
-                      <a:endParaRPr kumimoji="1" lang="ja-JP" altLang="en-US"/>
+                      <a:endParaRPr kumimoji="1" lang="ja-JP" altLang="en-US" dirty="0"/>
                     </a:p>
                   </a:txBody>
                   <a:tcPr/>
@@ -10406,7 +10416,7 @@
         <p:spPr>
           <a:xfrm>
             <a:off x="6224451" y="2689724"/>
-            <a:ext cx="1569660" cy="369332"/>
+            <a:ext cx="4108817" cy="646331"/>
           </a:xfrm>
           <a:prstGeom prst="rect">
             <a:avLst/>
@@ -10425,9 +10435,62 @@
             </a:r>
             <a:r>
               <a:rPr lang="ja-JP" altLang="en-US" b="1" dirty="0"/>
-              <a:t>！</a:t>
-            </a:r>
-            <a:endParaRPr kumimoji="1" lang="ja-JP" altLang="en-US" b="1" dirty="0"/>
+              <a:t>！よろしく</a:t>
+            </a:r>
+            <a:r>
+              <a:rPr lang="ja-JP" altLang="en-US" b="1" dirty="0">
+                <a:solidFill>
+                  <a:srgbClr val="FF0000"/>
+                </a:solidFill>
+              </a:rPr>
+              <a:t>お願い</a:t>
+            </a:r>
+            <a:r>
+              <a:rPr lang="ja-JP" altLang="en-US" b="1" dirty="0"/>
+              <a:t>します</a:t>
+            </a:r>
+            <a:r>
+              <a:rPr lang="ja-JP" altLang="en-US" b="1" dirty="0" smtClean="0"/>
+              <a:t>。</a:t>
+            </a:r>
+          </a:p>
+          <a:p>
+            <a:r>
+              <a:rPr lang="az-Cyrl-AZ" altLang="ja-JP" dirty="0">
+                <a:latin typeface="Arial" panose="020B0604020202020204" pitchFamily="34" charset="0"/>
+                <a:cs typeface="Arial" panose="020B0604020202020204" pitchFamily="34" charset="0"/>
+              </a:rPr>
+              <a:t>Разрешите </a:t>
+            </a:r>
+            <a:r>
+              <a:rPr lang="az-Cyrl-AZ" altLang="ja-JP" dirty="0">
+                <a:solidFill>
+                  <a:schemeClr val="accent6">
+                    <a:lumMod val="75000"/>
+                  </a:schemeClr>
+                </a:solidFill>
+                <a:latin typeface="Arial" panose="020B0604020202020204" pitchFamily="34" charset="0"/>
+                <a:cs typeface="Arial" panose="020B0604020202020204" pitchFamily="34" charset="0"/>
+              </a:rPr>
+              <a:t>представиться</a:t>
+            </a:r>
+            <a:r>
+              <a:rPr lang="az-Cyrl-AZ" altLang="ja-JP" dirty="0" smtClean="0">
+                <a:solidFill>
+                  <a:schemeClr val="accent6">
+                    <a:lumMod val="75000"/>
+                  </a:schemeClr>
+                </a:solidFill>
+              </a:rPr>
+              <a:t>.</a:t>
+            </a:r>
+            <a:endParaRPr lang="ja-JP" altLang="en-US" b="1" dirty="0">
+              <a:solidFill>
+                <a:schemeClr val="accent6">
+                  <a:lumMod val="75000"/>
+                </a:schemeClr>
+              </a:solidFill>
+            </a:endParaRPr>
           </a:p>
         </p:txBody>
       </p:sp>
@@ -10440,13 +10503,13 @@
           <p:nvPr>
             <p:extLst>
               <p:ext uri="{D42A27DB-BD31-4B8C-83A1-F6EECF244321}">
-                <p14:modId xmlns:p14="http://schemas.microsoft.com/office/powerpoint/2010/main" val="635308580"/>
+                <p14:modId xmlns:p14="http://schemas.microsoft.com/office/powerpoint/2010/main" val="3187006725"/>
               </p:ext>
             </p:extLst>
           </p:nvPr>
         </p:nvGraphicFramePr>
         <p:xfrm>
-          <a:off x="6224451" y="3349655"/>
+          <a:off x="6224451" y="4708194"/>
           <a:ext cx="4757060" cy="741680"/>
         </p:xfrm>
         <a:graphic>
@@ -10554,7 +10617,7 @@
                     <a:bodyPr/>
                     <a:lstStyle/>
                     <a:p>
-                      <a:endParaRPr kumimoji="1" lang="ja-JP" altLang="en-US"/>
+                      <a:endParaRPr kumimoji="1" lang="ja-JP" altLang="en-US" dirty="0"/>
                     </a:p>
                   </a:txBody>
                   <a:tcPr/>
@@ -10564,7 +10627,7 @@
                     <a:bodyPr/>
                     <a:lstStyle/>
                     <a:p>
-                      <a:endParaRPr kumimoji="1" lang="ja-JP" altLang="en-US"/>
+                      <a:endParaRPr kumimoji="1" lang="ja-JP" altLang="en-US" dirty="0"/>
                     </a:p>
                   </a:txBody>
                   <a:tcPr/>
@@ -10574,7 +10637,7 @@
                     <a:bodyPr/>
                     <a:lstStyle/>
                     <a:p>
-                      <a:endParaRPr kumimoji="1" lang="ja-JP" altLang="en-US"/>
+                      <a:endParaRPr kumimoji="1" lang="ja-JP" altLang="en-US" dirty="0"/>
                     </a:p>
                   </a:txBody>
                   <a:tcPr/>
@@ -10625,6 +10688,184 @@
               <a:t>{id:1}</a:t>
             </a:r>
             <a:endParaRPr lang="ja-JP" altLang="en-US" dirty="0"/>
+          </a:p>
+        </p:txBody>
+      </p:sp>
+      <p:sp>
+        <p:nvSpPr>
+          <p:cNvPr id="12" name="テキスト ボックス 11"/>
+          <p:cNvSpPr txBox="1"/>
+          <p:nvPr/>
+        </p:nvSpPr>
+        <p:spPr>
+          <a:xfrm>
+            <a:off x="842550" y="3653237"/>
+            <a:ext cx="4818948" cy="646331"/>
+          </a:xfrm>
+          <a:prstGeom prst="rect">
+            <a:avLst/>
+          </a:prstGeom>
+          <a:noFill/>
+        </p:spPr>
+        <p:txBody>
+          <a:bodyPr wrap="none" rtlCol="0">
+            <a:spAutoFit/>
+          </a:bodyPr>
+          <a:lstStyle/>
+          <a:p>
+            <a:pPr marL="285750" indent="-285750">
+              <a:buFont typeface="Arial" panose="020B0604020202020204" pitchFamily="34" charset="0"/>
+              <a:buChar char="•"/>
+            </a:pPr>
+            <a:r>
+              <a:rPr lang="en-US" altLang="ja-JP" dirty="0" smtClean="0">
+                <a:solidFill>
+                  <a:srgbClr val="FF0000"/>
+                </a:solidFill>
+              </a:rPr>
+              <a:t>{</a:t>
+            </a:r>
+            <a:r>
+              <a:rPr lang="en-US" altLang="ja-JP" b="1" dirty="0" smtClean="0"/>
+              <a:t>greeting</a:t>
+            </a:r>
+            <a:r>
+              <a:rPr lang="en-US" altLang="ja-JP" dirty="0" smtClean="0"/>
+              <a:t>.en</a:t>
+            </a:r>
+            <a:r>
+              <a:rPr lang="en-US" altLang="ja-JP" dirty="0" smtClean="0">
+                <a:solidFill>
+                  <a:srgbClr val="FF0000"/>
+                </a:solidFill>
+              </a:rPr>
+              <a:t>} </a:t>
+            </a:r>
+            <a:r>
+              <a:rPr lang="en-US" altLang="ja-JP" i="1" dirty="0" smtClean="0">
+                <a:solidFill>
+                  <a:srgbClr val="FF0000"/>
+                </a:solidFill>
+              </a:rPr>
+              <a:t>mixed-style will be broken.</a:t>
+            </a:r>
+            <a:endParaRPr lang="ja-JP" altLang="en-US" i="1" dirty="0" smtClean="0">
+              <a:solidFill>
+                <a:srgbClr val="FF0000"/>
+              </a:solidFill>
+            </a:endParaRPr>
+          </a:p>
+          <a:p>
+            <a:pPr marL="285750" indent="-285750">
+              <a:buFont typeface="Arial" panose="020B0604020202020204" pitchFamily="34" charset="0"/>
+              <a:buChar char="•"/>
+            </a:pPr>
+            <a:r>
+              <a:rPr lang="en-US" altLang="ja-JP" dirty="0" smtClean="0">
+                <a:solidFill>
+                  <a:srgbClr val="FF0000"/>
+                </a:solidFill>
+              </a:rPr>
+              <a:t>Another </a:t>
+            </a:r>
+            <a:r>
+              <a:rPr lang="en-US" altLang="ja-JP" i="1" u="sng" dirty="0" smtClean="0"/>
+              <a:t>paragraph</a:t>
+            </a:r>
+            <a:r>
+              <a:rPr lang="en-US" altLang="ja-JP" i="1" dirty="0" smtClean="0">
+                <a:solidFill>
+                  <a:srgbClr val="FF0000"/>
+                </a:solidFill>
+              </a:rPr>
+              <a:t> </a:t>
+            </a:r>
+            <a:r>
+              <a:rPr lang="en-US" altLang="ja-JP" dirty="0" smtClean="0">
+                <a:solidFill>
+                  <a:srgbClr val="FF0000"/>
+                </a:solidFill>
+              </a:rPr>
+              <a:t>remains</a:t>
+            </a:r>
+            <a:endParaRPr lang="ja-JP" altLang="en-US" dirty="0">
+              <a:solidFill>
+                <a:srgbClr val="FF0000"/>
+              </a:solidFill>
+            </a:endParaRPr>
+          </a:p>
+        </p:txBody>
+      </p:sp>
+      <p:sp>
+        <p:nvSpPr>
+          <p:cNvPr id="14" name="テキスト ボックス 13"/>
+          <p:cNvSpPr txBox="1"/>
+          <p:nvPr/>
+        </p:nvSpPr>
+        <p:spPr>
+          <a:xfrm>
+            <a:off x="6224451" y="3653237"/>
+            <a:ext cx="4761240" cy="646331"/>
+          </a:xfrm>
+          <a:prstGeom prst="rect">
+            <a:avLst/>
+          </a:prstGeom>
+          <a:noFill/>
+        </p:spPr>
+        <p:txBody>
+          <a:bodyPr wrap="none" rtlCol="0">
+            <a:spAutoFit/>
+          </a:bodyPr>
+          <a:lstStyle/>
+          <a:p>
+            <a:pPr marL="285750" indent="-285750">
+              <a:buFont typeface="Arial" panose="020B0604020202020204" pitchFamily="34" charset="0"/>
+              <a:buChar char="•"/>
+            </a:pPr>
+            <a:r>
+              <a:rPr lang="en-US" altLang="ja-JP" dirty="0" smtClean="0"/>
+              <a:t>{greeting.en} mixed-style will be broken.</a:t>
+            </a:r>
+            <a:endParaRPr lang="ja-JP" altLang="en-US" dirty="0" smtClean="0"/>
+          </a:p>
+          <a:p>
+            <a:pPr marL="285750" indent="-285750">
+              <a:buFont typeface="Arial" panose="020B0604020202020204" pitchFamily="34" charset="0"/>
+              <a:buChar char="•"/>
+            </a:pPr>
+            <a:r>
+              <a:rPr lang="en-US" altLang="ja-JP" dirty="0">
+                <a:solidFill>
+                  <a:srgbClr val="FF0000"/>
+                </a:solidFill>
+              </a:rPr>
+              <a:t>Another </a:t>
+            </a:r>
+            <a:r>
+              <a:rPr lang="en-US" altLang="ja-JP" i="1" u="sng" dirty="0"/>
+              <a:t>paragraph</a:t>
+            </a:r>
+            <a:r>
+              <a:rPr lang="en-US" altLang="ja-JP" i="1" dirty="0">
+                <a:solidFill>
+                  <a:srgbClr val="FF0000"/>
+                </a:solidFill>
+              </a:rPr>
+              <a:t> </a:t>
+            </a:r>
+            <a:r>
+              <a:rPr lang="en-US" altLang="ja-JP" dirty="0" smtClean="0">
+                <a:solidFill>
+                  <a:srgbClr val="FF0000"/>
+                </a:solidFill>
+              </a:rPr>
+              <a:t>remains</a:t>
+            </a:r>
+            <a:endParaRPr lang="ja-JP" altLang="en-US" dirty="0">
+              <a:solidFill>
+                <a:srgbClr val="FF0000"/>
+              </a:solidFill>
+            </a:endParaRPr>
           </a:p>
         </p:txBody>
       </p:sp>
@@ -10703,7 +10944,7 @@
           <a:lstStyle/>
           <a:p>
             <a:r>
-              <a:rPr lang="en-US" altLang="ja-JP" smtClean="0"/>
+              <a:rPr lang="en-US" altLang="ja-JP" dirty="0" smtClean="0"/>
               <a:t>{id:2}</a:t>
             </a:r>
             <a:endParaRPr lang="ja-JP" altLang="en-US" dirty="0"/>
@@ -10963,7 +11204,7 @@
           <p:nvPr>
             <p:extLst>
               <p:ext uri="{D42A27DB-BD31-4B8C-83A1-F6EECF244321}">
-                <p14:modId xmlns:p14="http://schemas.microsoft.com/office/powerpoint/2010/main" val="4139211845"/>
+                <p14:modId xmlns:p14="http://schemas.microsoft.com/office/powerpoint/2010/main" val="2826651418"/>
               </p:ext>
             </p:extLst>
           </p:nvPr>
@@ -11075,7 +11316,7 @@
           <a:lstStyle/>
           <a:p>
             <a:r>
-              <a:rPr lang="en-US" altLang="ja-JP" smtClean="0"/>
+              <a:rPr lang="en-US" altLang="ja-JP" dirty="0" smtClean="0"/>
               <a:t>{id:4}</a:t>
             </a:r>
             <a:endParaRPr lang="ja-JP" altLang="en-US" dirty="0"/>
@@ -11229,19 +11470,7 @@
           <a:p>
             <a:r>
               <a:rPr kumimoji="1" lang="en-US" altLang="ja-JP" dirty="0" smtClean="0"/>
-              <a:t>Test#4 </a:t>
-            </a:r>
-            <a:r>
-              <a:rPr kumimoji="1" lang="en-US" altLang="ja-JP" dirty="0" smtClean="0"/>
-              <a:t>– </a:t>
-            </a:r>
-            <a:r>
-              <a:rPr kumimoji="1" lang="en-US" altLang="ja-JP" dirty="0" smtClean="0"/>
-              <a:t>Table </a:t>
-            </a:r>
-            <a:r>
-              <a:rPr kumimoji="1" lang="en-US" altLang="ja-JP" dirty="0" smtClean="0"/>
-              <a:t>from CSV-String</a:t>
+              <a:t>Test#4 – Table from CSV-String</a:t>
             </a:r>
             <a:endParaRPr kumimoji="1" lang="ja-JP" altLang="en-US" dirty="0"/>
           </a:p>
@@ -11270,11 +11499,7 @@
           <a:p>
             <a:r>
               <a:rPr lang="en-US" altLang="ja-JP" dirty="0" smtClean="0"/>
-              <a:t>{</a:t>
-            </a:r>
-            <a:r>
-              <a:rPr lang="en-US" altLang="ja-JP" dirty="0" smtClean="0"/>
-              <a:t>id:5}</a:t>
+              <a:t>{id:5}</a:t>
             </a:r>
             <a:endParaRPr lang="ja-JP" altLang="en-US" dirty="0"/>
           </a:p>
@@ -11502,7 +11727,7 @@
                     <a:bodyPr/>
                     <a:lstStyle/>
                     <a:p>
-                      <a:endParaRPr kumimoji="1" lang="ja-JP" altLang="en-US"/>
+                      <a:endParaRPr kumimoji="1" lang="ja-JP" altLang="en-US" dirty="0"/>
                     </a:p>
                   </a:txBody>
                   <a:tcPr/>
@@ -11512,7 +11737,7 @@
                     <a:bodyPr/>
                     <a:lstStyle/>
                     <a:p>
-                      <a:endParaRPr kumimoji="1" lang="ja-JP" altLang="en-US"/>
+                      <a:endParaRPr kumimoji="1" lang="ja-JP" altLang="en-US" dirty="0"/>
                     </a:p>
                   </a:txBody>
                   <a:tcPr/>
@@ -11522,7 +11747,7 @@
                     <a:bodyPr/>
                     <a:lstStyle/>
                     <a:p>
-                      <a:endParaRPr kumimoji="1" lang="ja-JP" altLang="en-US"/>
+                      <a:endParaRPr kumimoji="1" lang="ja-JP" altLang="en-US" dirty="0"/>
                     </a:p>
                   </a:txBody>
                   <a:tcPr/>
@@ -11949,12 +12174,8 @@
           <a:lstStyle/>
           <a:p>
             <a:r>
-              <a:rPr kumimoji="1" lang="en-US" altLang="ja-JP" dirty="0" err="1" smtClean="0"/>
-              <a:t>Ppt</a:t>
-            </a:r>
-            <a:r>
               <a:rPr kumimoji="1" lang="en-US" altLang="ja-JP" dirty="0" smtClean="0"/>
-              <a:t>-template test</a:t>
+              <a:t>Ppt-template test</a:t>
             </a:r>
             <a:endParaRPr kumimoji="1" lang="ja-JP" altLang="en-US" dirty="0"/>
           </a:p>
@@ -11977,13 +12198,9 @@
           <a:p>
             <a:r>
               <a:rPr lang="en-US" altLang="ja-JP" dirty="0" smtClean="0"/>
-              <a:t>This </a:t>
-            </a:r>
-            <a:r>
-              <a:rPr lang="en-US" altLang="ja-JP" smtClean="0"/>
-              <a:t>slide will be removed</a:t>
-            </a:r>
-            <a:endParaRPr kumimoji="1" lang="ja-JP" altLang="en-US"/>
+              <a:t>This slide will be removed</a:t>
+            </a:r>
+            <a:endParaRPr kumimoji="1" lang="ja-JP" altLang="en-US" dirty="0"/>
           </a:p>
         </p:txBody>
       </p:sp>
@@ -12010,15 +12227,7 @@
           <a:p>
             <a:r>
               <a:rPr lang="en-US" altLang="ja-JP" dirty="0" smtClean="0"/>
-              <a:t>{</a:t>
-            </a:r>
-            <a:r>
-              <a:rPr lang="en-US" altLang="ja-JP" dirty="0" err="1" smtClean="0"/>
-              <a:t>id:never_used</a:t>
-            </a:r>
-            <a:r>
-              <a:rPr lang="en-US" altLang="ja-JP" dirty="0" smtClean="0"/>
-              <a:t>}</a:t>
+              <a:t>{id:never_used}</a:t>
             </a:r>
             <a:endParaRPr lang="ja-JP" altLang="en-US" dirty="0"/>
           </a:p>

</xml_diff>

<commit_message>
More style-broken-free text substitution
</commit_message>
<xml_diff>
--- a/test/data/in.pptx
+++ b/test/data/in.pptx
@@ -6842,7 +6842,7 @@
           <a:p>
             <a:fld id="{216FD8EB-7C38-4D9D-8BDF-3ABF2096B376}" type="datetimeFigureOut">
               <a:rPr kumimoji="1" lang="ja-JP" altLang="en-US" smtClean="0"/>
-              <a:t>2017/6/30</a:t>
+              <a:t>2017/7/5</a:t>
             </a:fld>
             <a:endParaRPr kumimoji="1" lang="ja-JP" altLang="en-US" dirty="0"/>
           </a:p>
@@ -7044,7 +7044,7 @@
           <a:p>
             <a:fld id="{216FD8EB-7C38-4D9D-8BDF-3ABF2096B376}" type="datetimeFigureOut">
               <a:rPr kumimoji="1" lang="ja-JP" altLang="en-US" smtClean="0"/>
-              <a:t>2017/6/30</a:t>
+              <a:t>2017/7/5</a:t>
             </a:fld>
             <a:endParaRPr kumimoji="1" lang="ja-JP" altLang="en-US" dirty="0"/>
           </a:p>
@@ -7256,7 +7256,7 @@
           <a:p>
             <a:fld id="{216FD8EB-7C38-4D9D-8BDF-3ABF2096B376}" type="datetimeFigureOut">
               <a:rPr kumimoji="1" lang="ja-JP" altLang="en-US" smtClean="0"/>
-              <a:t>2017/6/30</a:t>
+              <a:t>2017/7/5</a:t>
             </a:fld>
             <a:endParaRPr kumimoji="1" lang="ja-JP" altLang="en-US" dirty="0"/>
           </a:p>
@@ -7458,7 +7458,7 @@
           <a:p>
             <a:fld id="{216FD8EB-7C38-4D9D-8BDF-3ABF2096B376}" type="datetimeFigureOut">
               <a:rPr kumimoji="1" lang="ja-JP" altLang="en-US" smtClean="0"/>
-              <a:t>2017/6/30</a:t>
+              <a:t>2017/7/5</a:t>
             </a:fld>
             <a:endParaRPr kumimoji="1" lang="ja-JP" altLang="en-US" dirty="0"/>
           </a:p>
@@ -7704,7 +7704,7 @@
           <a:p>
             <a:fld id="{216FD8EB-7C38-4D9D-8BDF-3ABF2096B376}" type="datetimeFigureOut">
               <a:rPr kumimoji="1" lang="ja-JP" altLang="en-US" smtClean="0"/>
-              <a:t>2017/6/30</a:t>
+              <a:t>2017/7/5</a:t>
             </a:fld>
             <a:endParaRPr kumimoji="1" lang="ja-JP" altLang="en-US" dirty="0"/>
           </a:p>
@@ -8000,7 +8000,7 @@
           <a:p>
             <a:fld id="{216FD8EB-7C38-4D9D-8BDF-3ABF2096B376}" type="datetimeFigureOut">
               <a:rPr kumimoji="1" lang="ja-JP" altLang="en-US" smtClean="0"/>
-              <a:t>2017/6/30</a:t>
+              <a:t>2017/7/5</a:t>
             </a:fld>
             <a:endParaRPr kumimoji="1" lang="ja-JP" altLang="en-US" dirty="0"/>
           </a:p>
@@ -8431,7 +8431,7 @@
           <a:p>
             <a:fld id="{216FD8EB-7C38-4D9D-8BDF-3ABF2096B376}" type="datetimeFigureOut">
               <a:rPr kumimoji="1" lang="ja-JP" altLang="en-US" smtClean="0"/>
-              <a:t>2017/6/30</a:t>
+              <a:t>2017/7/5</a:t>
             </a:fld>
             <a:endParaRPr kumimoji="1" lang="ja-JP" altLang="en-US" dirty="0"/>
           </a:p>
@@ -8549,7 +8549,7 @@
           <a:p>
             <a:fld id="{216FD8EB-7C38-4D9D-8BDF-3ABF2096B376}" type="datetimeFigureOut">
               <a:rPr kumimoji="1" lang="ja-JP" altLang="en-US" smtClean="0"/>
-              <a:t>2017/6/30</a:t>
+              <a:t>2017/7/5</a:t>
             </a:fld>
             <a:endParaRPr kumimoji="1" lang="ja-JP" altLang="en-US" dirty="0"/>
           </a:p>
@@ -8644,7 +8644,7 @@
           <a:p>
             <a:fld id="{216FD8EB-7C38-4D9D-8BDF-3ABF2096B376}" type="datetimeFigureOut">
               <a:rPr kumimoji="1" lang="ja-JP" altLang="en-US" smtClean="0"/>
-              <a:t>2017/6/30</a:t>
+              <a:t>2017/7/5</a:t>
             </a:fld>
             <a:endParaRPr kumimoji="1" lang="ja-JP" altLang="en-US" dirty="0"/>
           </a:p>
@@ -8953,7 +8953,7 @@
           <a:p>
             <a:fld id="{216FD8EB-7C38-4D9D-8BDF-3ABF2096B376}" type="datetimeFigureOut">
               <a:rPr kumimoji="1" lang="ja-JP" altLang="en-US" smtClean="0"/>
-              <a:t>2017/6/30</a:t>
+              <a:t>2017/7/5</a:t>
             </a:fld>
             <a:endParaRPr kumimoji="1" lang="ja-JP" altLang="en-US" dirty="0"/>
           </a:p>
@@ -9206,7 +9206,7 @@
           <a:p>
             <a:fld id="{216FD8EB-7C38-4D9D-8BDF-3ABF2096B376}" type="datetimeFigureOut">
               <a:rPr kumimoji="1" lang="ja-JP" altLang="en-US" smtClean="0"/>
-              <a:t>2017/6/30</a:t>
+              <a:t>2017/7/5</a:t>
             </a:fld>
             <a:endParaRPr kumimoji="1" lang="ja-JP" altLang="en-US" dirty="0"/>
           </a:p>
@@ -9451,7 +9451,7 @@
           <a:p>
             <a:fld id="{216FD8EB-7C38-4D9D-8BDF-3ABF2096B376}" type="datetimeFigureOut">
               <a:rPr kumimoji="1" lang="ja-JP" altLang="en-US" smtClean="0"/>
-              <a:t>2017/6/30</a:t>
+              <a:t>2017/7/5</a:t>
             </a:fld>
             <a:endParaRPr kumimoji="1" lang="ja-JP" altLang="en-US" dirty="0"/>
           </a:p>
@@ -10664,6 +10664,161 @@
       </p:graphicFrame>
       <p:sp>
         <p:nvSpPr>
+          <p:cNvPr id="12" name="テキスト ボックス 11"/>
+          <p:cNvSpPr txBox="1"/>
+          <p:nvPr/>
+        </p:nvSpPr>
+        <p:spPr>
+          <a:xfrm>
+            <a:off x="842550" y="3653237"/>
+            <a:ext cx="5325497" cy="800219"/>
+          </a:xfrm>
+          <a:prstGeom prst="rect">
+            <a:avLst/>
+          </a:prstGeom>
+          <a:noFill/>
+        </p:spPr>
+        <p:txBody>
+          <a:bodyPr wrap="none" rtlCol="0">
+            <a:spAutoFit/>
+          </a:bodyPr>
+          <a:lstStyle/>
+          <a:p>
+            <a:pPr marL="285750" indent="-285750">
+              <a:buFont typeface="Arial" panose="020B0604020202020204" pitchFamily="34" charset="0"/>
+              <a:buChar char="•"/>
+            </a:pPr>
+            <a:r>
+              <a:rPr lang="en-US" altLang="ja-JP" sz="1000" dirty="0" smtClean="0"/>
+              <a:t>When mixed-style is detected, apply the style for first ‘{‘ to whole substituted text.</a:t>
+            </a:r>
+          </a:p>
+          <a:p>
+            <a:pPr marL="285750" indent="-285750">
+              <a:buFont typeface="Arial" panose="020B0604020202020204" pitchFamily="34" charset="0"/>
+              <a:buChar char="•"/>
+            </a:pPr>
+            <a:r>
+              <a:rPr lang="en-US" altLang="ja-JP" dirty="0" smtClean="0">
+                <a:solidFill>
+                  <a:srgbClr val="FF0000"/>
+                </a:solidFill>
+              </a:rPr>
+              <a:t>{</a:t>
+            </a:r>
+            <a:r>
+              <a:rPr lang="en-US" altLang="ja-JP" dirty="0" err="1" smtClean="0">
+                <a:solidFill>
+                  <a:srgbClr val="FF0000"/>
+                </a:solidFill>
+              </a:rPr>
+              <a:t>gr</a:t>
+            </a:r>
+            <a:r>
+              <a:rPr lang="en-US" altLang="ja-JP" b="1" dirty="0" err="1" smtClean="0">
+                <a:solidFill>
+                  <a:srgbClr val="FF0000"/>
+                </a:solidFill>
+              </a:rPr>
+              <a:t>ee</a:t>
+            </a:r>
+            <a:r>
+              <a:rPr lang="en-US" altLang="ja-JP" b="1" dirty="0" err="1" smtClean="0"/>
+              <a:t>tin</a:t>
+            </a:r>
+            <a:r>
+              <a:rPr lang="en-US" altLang="ja-JP" b="1" dirty="0" err="1" smtClean="0">
+                <a:solidFill>
+                  <a:srgbClr val="FF0000"/>
+                </a:solidFill>
+              </a:rPr>
+              <a:t>g.e</a:t>
+            </a:r>
+            <a:r>
+              <a:rPr lang="en-US" altLang="ja-JP" dirty="0" err="1" smtClean="0">
+                <a:solidFill>
+                  <a:srgbClr val="FF0000"/>
+                </a:solidFill>
+              </a:rPr>
+              <a:t>n</a:t>
+            </a:r>
+            <a:r>
+              <a:rPr lang="en-US" altLang="ja-JP" dirty="0">
+                <a:solidFill>
+                  <a:srgbClr val="FF0000"/>
+                </a:solidFill>
+              </a:rPr>
+              <a:t>}, </a:t>
+            </a:r>
+            <a:r>
+              <a:rPr lang="en-US" altLang="ja-JP" i="1" dirty="0"/>
+              <a:t>{</a:t>
+            </a:r>
+            <a:r>
+              <a:rPr lang="en-US" altLang="ja-JP" i="1" dirty="0" err="1"/>
+              <a:t>gr</a:t>
+            </a:r>
+            <a:r>
+              <a:rPr lang="en-US" altLang="ja-JP" b="1" i="1" dirty="0" err="1"/>
+              <a:t>eeting.e</a:t>
+            </a:r>
+            <a:r>
+              <a:rPr lang="en-US" altLang="ja-JP" i="1" dirty="0" err="1"/>
+              <a:t>n</a:t>
+            </a:r>
+            <a:r>
+              <a:rPr lang="en-US" altLang="ja-JP" i="1" dirty="0" smtClean="0"/>
+              <a:t>} </a:t>
+            </a:r>
+            <a:r>
+              <a:rPr lang="en-US" altLang="ja-JP" dirty="0" smtClean="0"/>
+              <a:t>like this</a:t>
+            </a:r>
+            <a:endParaRPr lang="en-US" altLang="ja-JP" dirty="0" smtClean="0"/>
+          </a:p>
+          <a:p>
+            <a:pPr marL="285750" indent="-285750">
+              <a:buFont typeface="Arial" panose="020B0604020202020204" pitchFamily="34" charset="0"/>
+              <a:buChar char="•"/>
+            </a:pPr>
+            <a:r>
+              <a:rPr lang="en-US" altLang="ja-JP" dirty="0" smtClean="0">
+                <a:solidFill>
+                  <a:srgbClr val="FF0000"/>
+                </a:solidFill>
+              </a:rPr>
+              <a:t>Another </a:t>
+            </a:r>
+            <a:r>
+              <a:rPr lang="en-US" altLang="ja-JP" i="1" u="sng" dirty="0" smtClean="0"/>
+              <a:t>paragraph</a:t>
+            </a:r>
+            <a:r>
+              <a:rPr lang="en-US" altLang="ja-JP" i="1" dirty="0" smtClean="0">
+                <a:solidFill>
+                  <a:srgbClr val="FF0000"/>
+                </a:solidFill>
+              </a:rPr>
+              <a:t> </a:t>
+            </a:r>
+            <a:r>
+              <a:rPr lang="en-US" altLang="ja-JP" dirty="0" smtClean="0">
+                <a:solidFill>
+                  <a:srgbClr val="FF0000"/>
+                </a:solidFill>
+              </a:rPr>
+              <a:t>remains</a:t>
+            </a:r>
+            <a:endParaRPr lang="ja-JP" altLang="en-US" dirty="0">
+              <a:solidFill>
+                <a:srgbClr val="FF0000"/>
+              </a:solidFill>
+            </a:endParaRPr>
+          </a:p>
+        </p:txBody>
+      </p:sp>
+      <p:sp>
+        <p:nvSpPr>
           <p:cNvPr id="13" name="正方形/長方形 12"/>
           <p:cNvSpPr/>
           <p:nvPr/>
@@ -10693,14 +10848,14 @@
       </p:sp>
       <p:sp>
         <p:nvSpPr>
-          <p:cNvPr id="12" name="テキスト ボックス 11"/>
+          <p:cNvPr id="15" name="テキスト ボックス 14"/>
           <p:cNvSpPr txBox="1"/>
           <p:nvPr/>
         </p:nvSpPr>
         <p:spPr>
           <a:xfrm>
-            <a:off x="842550" y="3653237"/>
-            <a:ext cx="4818948" cy="646331"/>
+            <a:off x="6224451" y="3653237"/>
+            <a:ext cx="5325497" cy="800219"/>
           </a:xfrm>
           <a:prstGeom prst="rect">
             <a:avLst/>
@@ -10718,42 +10873,44 @@
               <a:buChar char="•"/>
             </a:pPr>
             <a:r>
+              <a:rPr lang="en-US" altLang="ja-JP" sz="1000" dirty="0"/>
+              <a:t>When mixed-style is detected, apply the style for first ‘{‘ to whole substituted text.</a:t>
+            </a:r>
+          </a:p>
+          <a:p>
+            <a:pPr marL="285750" indent="-285750">
+              <a:buFont typeface="Arial" panose="020B0604020202020204" pitchFamily="34" charset="0"/>
+              <a:buChar char="•"/>
+            </a:pPr>
+            <a:r>
               <a:rPr lang="en-US" altLang="ja-JP" dirty="0" smtClean="0">
                 <a:solidFill>
                   <a:srgbClr val="FF0000"/>
                 </a:solidFill>
               </a:rPr>
-              <a:t>{</a:t>
-            </a:r>
-            <a:r>
-              <a:rPr lang="en-US" altLang="ja-JP" b="1" dirty="0" smtClean="0"/>
-              <a:t>greeting</a:t>
+              <a:t>Hello!, </a:t>
+            </a:r>
+            <a:r>
+              <a:rPr lang="en-US" altLang="ja-JP" i="1" dirty="0" smtClean="0"/>
+              <a:t>Hello! </a:t>
+            </a:r>
+            <a:r>
+              <a:rPr lang="en-US" altLang="ja-JP" dirty="0"/>
+              <a:t> </a:t>
+            </a:r>
+            <a:r>
+              <a:rPr lang="en-US" altLang="ja-JP" smtClean="0"/>
+              <a:t>l</a:t>
+            </a:r>
+            <a:r>
+              <a:rPr lang="en-US" altLang="ja-JP" smtClean="0"/>
+              <a:t>ike </a:t>
             </a:r>
             <a:r>
               <a:rPr lang="en-US" altLang="ja-JP" dirty="0" smtClean="0"/>
-              <a:t>.en</a:t>
-            </a:r>
-            <a:r>
-              <a:rPr lang="en-US" altLang="ja-JP" dirty="0" smtClean="0">
-                <a:solidFill>
-                  <a:srgbClr val="FF0000"/>
-                </a:solidFill>
-              </a:rPr>
-              <a:t>} </a:t>
-            </a:r>
-            <a:r>
-              <a:rPr lang="en-US" altLang="ja-JP" i="1" dirty="0" smtClean="0">
-                <a:solidFill>
-                  <a:srgbClr val="FF0000"/>
-                </a:solidFill>
-              </a:rPr>
-              <a:t>mixed-style will be broken.</a:t>
-            </a:r>
-            <a:endParaRPr lang="ja-JP" altLang="en-US" i="1" dirty="0" smtClean="0">
-              <a:solidFill>
-                <a:srgbClr val="FF0000"/>
-              </a:solidFill>
-            </a:endParaRPr>
+              <a:t>this</a:t>
+            </a:r>
+            <a:endParaRPr lang="en-US" altLang="ja-JP" dirty="0" smtClean="0"/>
           </a:p>
           <a:p>
             <a:pPr marL="285750" indent="-285750">
@@ -10774,79 +10931,6 @@
             </a:r>
             <a:r>
               <a:rPr lang="en-US" altLang="ja-JP" i="1" dirty="0" smtClean="0">
-                <a:solidFill>
-                  <a:srgbClr val="FF0000"/>
-                </a:solidFill>
-              </a:rPr>
-              <a:t> </a:t>
-            </a:r>
-            <a:r>
-              <a:rPr lang="en-US" altLang="ja-JP" dirty="0" smtClean="0">
-                <a:solidFill>
-                  <a:srgbClr val="FF0000"/>
-                </a:solidFill>
-              </a:rPr>
-              <a:t>remains</a:t>
-            </a:r>
-            <a:endParaRPr lang="ja-JP" altLang="en-US" dirty="0">
-              <a:solidFill>
-                <a:srgbClr val="FF0000"/>
-              </a:solidFill>
-            </a:endParaRPr>
-          </a:p>
-        </p:txBody>
-      </p:sp>
-      <p:sp>
-        <p:nvSpPr>
-          <p:cNvPr id="14" name="テキスト ボックス 13"/>
-          <p:cNvSpPr txBox="1"/>
-          <p:nvPr/>
-        </p:nvSpPr>
-        <p:spPr>
-          <a:xfrm>
-            <a:off x="6224451" y="3653237"/>
-            <a:ext cx="4761240" cy="646331"/>
-          </a:xfrm>
-          <a:prstGeom prst="rect">
-            <a:avLst/>
-          </a:prstGeom>
-          <a:noFill/>
-        </p:spPr>
-        <p:txBody>
-          <a:bodyPr wrap="none" rtlCol="0">
-            <a:spAutoFit/>
-          </a:bodyPr>
-          <a:lstStyle/>
-          <a:p>
-            <a:pPr marL="285750" indent="-285750">
-              <a:buFont typeface="Arial" panose="020B0604020202020204" pitchFamily="34" charset="0"/>
-              <a:buChar char="•"/>
-            </a:pPr>
-            <a:r>
-              <a:rPr lang="en-US" altLang="ja-JP" dirty="0" smtClean="0"/>
-              <a:t>{greeting.en} mixed-style will be broken.</a:t>
-            </a:r>
-            <a:endParaRPr lang="ja-JP" altLang="en-US" dirty="0" smtClean="0"/>
-          </a:p>
-          <a:p>
-            <a:pPr marL="285750" indent="-285750">
-              <a:buFont typeface="Arial" panose="020B0604020202020204" pitchFamily="34" charset="0"/>
-              <a:buChar char="•"/>
-            </a:pPr>
-            <a:r>
-              <a:rPr lang="en-US" altLang="ja-JP" dirty="0">
-                <a:solidFill>
-                  <a:srgbClr val="FF0000"/>
-                </a:solidFill>
-              </a:rPr>
-              <a:t>Another </a:t>
-            </a:r>
-            <a:r>
-              <a:rPr lang="en-US" altLang="ja-JP" i="1" u="sng" dirty="0"/>
-              <a:t>paragraph</a:t>
-            </a:r>
-            <a:r>
-              <a:rPr lang="en-US" altLang="ja-JP" i="1" dirty="0">
                 <a:solidFill>
                   <a:srgbClr val="FF0000"/>
                 </a:solidFill>

</xml_diff>

<commit_message>
More style-broken-free text substitution (#14)
</commit_message>
<xml_diff>
--- a/test/data/in.pptx
+++ b/test/data/in.pptx
@@ -6842,7 +6842,7 @@
           <a:p>
             <a:fld id="{216FD8EB-7C38-4D9D-8BDF-3ABF2096B376}" type="datetimeFigureOut">
               <a:rPr kumimoji="1" lang="ja-JP" altLang="en-US" smtClean="0"/>
-              <a:t>2017/6/30</a:t>
+              <a:t>2017/7/5</a:t>
             </a:fld>
             <a:endParaRPr kumimoji="1" lang="ja-JP" altLang="en-US" dirty="0"/>
           </a:p>
@@ -7044,7 +7044,7 @@
           <a:p>
             <a:fld id="{216FD8EB-7C38-4D9D-8BDF-3ABF2096B376}" type="datetimeFigureOut">
               <a:rPr kumimoji="1" lang="ja-JP" altLang="en-US" smtClean="0"/>
-              <a:t>2017/6/30</a:t>
+              <a:t>2017/7/5</a:t>
             </a:fld>
             <a:endParaRPr kumimoji="1" lang="ja-JP" altLang="en-US" dirty="0"/>
           </a:p>
@@ -7256,7 +7256,7 @@
           <a:p>
             <a:fld id="{216FD8EB-7C38-4D9D-8BDF-3ABF2096B376}" type="datetimeFigureOut">
               <a:rPr kumimoji="1" lang="ja-JP" altLang="en-US" smtClean="0"/>
-              <a:t>2017/6/30</a:t>
+              <a:t>2017/7/5</a:t>
             </a:fld>
             <a:endParaRPr kumimoji="1" lang="ja-JP" altLang="en-US" dirty="0"/>
           </a:p>
@@ -7458,7 +7458,7 @@
           <a:p>
             <a:fld id="{216FD8EB-7C38-4D9D-8BDF-3ABF2096B376}" type="datetimeFigureOut">
               <a:rPr kumimoji="1" lang="ja-JP" altLang="en-US" smtClean="0"/>
-              <a:t>2017/6/30</a:t>
+              <a:t>2017/7/5</a:t>
             </a:fld>
             <a:endParaRPr kumimoji="1" lang="ja-JP" altLang="en-US" dirty="0"/>
           </a:p>
@@ -7704,7 +7704,7 @@
           <a:p>
             <a:fld id="{216FD8EB-7C38-4D9D-8BDF-3ABF2096B376}" type="datetimeFigureOut">
               <a:rPr kumimoji="1" lang="ja-JP" altLang="en-US" smtClean="0"/>
-              <a:t>2017/6/30</a:t>
+              <a:t>2017/7/5</a:t>
             </a:fld>
             <a:endParaRPr kumimoji="1" lang="ja-JP" altLang="en-US" dirty="0"/>
           </a:p>
@@ -8000,7 +8000,7 @@
           <a:p>
             <a:fld id="{216FD8EB-7C38-4D9D-8BDF-3ABF2096B376}" type="datetimeFigureOut">
               <a:rPr kumimoji="1" lang="ja-JP" altLang="en-US" smtClean="0"/>
-              <a:t>2017/6/30</a:t>
+              <a:t>2017/7/5</a:t>
             </a:fld>
             <a:endParaRPr kumimoji="1" lang="ja-JP" altLang="en-US" dirty="0"/>
           </a:p>
@@ -8431,7 +8431,7 @@
           <a:p>
             <a:fld id="{216FD8EB-7C38-4D9D-8BDF-3ABF2096B376}" type="datetimeFigureOut">
               <a:rPr kumimoji="1" lang="ja-JP" altLang="en-US" smtClean="0"/>
-              <a:t>2017/6/30</a:t>
+              <a:t>2017/7/5</a:t>
             </a:fld>
             <a:endParaRPr kumimoji="1" lang="ja-JP" altLang="en-US" dirty="0"/>
           </a:p>
@@ -8549,7 +8549,7 @@
           <a:p>
             <a:fld id="{216FD8EB-7C38-4D9D-8BDF-3ABF2096B376}" type="datetimeFigureOut">
               <a:rPr kumimoji="1" lang="ja-JP" altLang="en-US" smtClean="0"/>
-              <a:t>2017/6/30</a:t>
+              <a:t>2017/7/5</a:t>
             </a:fld>
             <a:endParaRPr kumimoji="1" lang="ja-JP" altLang="en-US" dirty="0"/>
           </a:p>
@@ -8644,7 +8644,7 @@
           <a:p>
             <a:fld id="{216FD8EB-7C38-4D9D-8BDF-3ABF2096B376}" type="datetimeFigureOut">
               <a:rPr kumimoji="1" lang="ja-JP" altLang="en-US" smtClean="0"/>
-              <a:t>2017/6/30</a:t>
+              <a:t>2017/7/5</a:t>
             </a:fld>
             <a:endParaRPr kumimoji="1" lang="ja-JP" altLang="en-US" dirty="0"/>
           </a:p>
@@ -8953,7 +8953,7 @@
           <a:p>
             <a:fld id="{216FD8EB-7C38-4D9D-8BDF-3ABF2096B376}" type="datetimeFigureOut">
               <a:rPr kumimoji="1" lang="ja-JP" altLang="en-US" smtClean="0"/>
-              <a:t>2017/6/30</a:t>
+              <a:t>2017/7/5</a:t>
             </a:fld>
             <a:endParaRPr kumimoji="1" lang="ja-JP" altLang="en-US" dirty="0"/>
           </a:p>
@@ -9206,7 +9206,7 @@
           <a:p>
             <a:fld id="{216FD8EB-7C38-4D9D-8BDF-3ABF2096B376}" type="datetimeFigureOut">
               <a:rPr kumimoji="1" lang="ja-JP" altLang="en-US" smtClean="0"/>
-              <a:t>2017/6/30</a:t>
+              <a:t>2017/7/5</a:t>
             </a:fld>
             <a:endParaRPr kumimoji="1" lang="ja-JP" altLang="en-US" dirty="0"/>
           </a:p>
@@ -9451,7 +9451,7 @@
           <a:p>
             <a:fld id="{216FD8EB-7C38-4D9D-8BDF-3ABF2096B376}" type="datetimeFigureOut">
               <a:rPr kumimoji="1" lang="ja-JP" altLang="en-US" smtClean="0"/>
-              <a:t>2017/6/30</a:t>
+              <a:t>2017/7/5</a:t>
             </a:fld>
             <a:endParaRPr kumimoji="1" lang="ja-JP" altLang="en-US" dirty="0"/>
           </a:p>
@@ -10664,6 +10664,161 @@
       </p:graphicFrame>
       <p:sp>
         <p:nvSpPr>
+          <p:cNvPr id="12" name="テキスト ボックス 11"/>
+          <p:cNvSpPr txBox="1"/>
+          <p:nvPr/>
+        </p:nvSpPr>
+        <p:spPr>
+          <a:xfrm>
+            <a:off x="842550" y="3653237"/>
+            <a:ext cx="5325497" cy="800219"/>
+          </a:xfrm>
+          <a:prstGeom prst="rect">
+            <a:avLst/>
+          </a:prstGeom>
+          <a:noFill/>
+        </p:spPr>
+        <p:txBody>
+          <a:bodyPr wrap="none" rtlCol="0">
+            <a:spAutoFit/>
+          </a:bodyPr>
+          <a:lstStyle/>
+          <a:p>
+            <a:pPr marL="285750" indent="-285750">
+              <a:buFont typeface="Arial" panose="020B0604020202020204" pitchFamily="34" charset="0"/>
+              <a:buChar char="•"/>
+            </a:pPr>
+            <a:r>
+              <a:rPr lang="en-US" altLang="ja-JP" sz="1000" dirty="0" smtClean="0"/>
+              <a:t>When mixed-style is detected, apply the style for first ‘{‘ to whole substituted text.</a:t>
+            </a:r>
+          </a:p>
+          <a:p>
+            <a:pPr marL="285750" indent="-285750">
+              <a:buFont typeface="Arial" panose="020B0604020202020204" pitchFamily="34" charset="0"/>
+              <a:buChar char="•"/>
+            </a:pPr>
+            <a:r>
+              <a:rPr lang="en-US" altLang="ja-JP" dirty="0" smtClean="0">
+                <a:solidFill>
+                  <a:srgbClr val="FF0000"/>
+                </a:solidFill>
+              </a:rPr>
+              <a:t>{</a:t>
+            </a:r>
+            <a:r>
+              <a:rPr lang="en-US" altLang="ja-JP" dirty="0" err="1" smtClean="0">
+                <a:solidFill>
+                  <a:srgbClr val="FF0000"/>
+                </a:solidFill>
+              </a:rPr>
+              <a:t>gr</a:t>
+            </a:r>
+            <a:r>
+              <a:rPr lang="en-US" altLang="ja-JP" b="1" dirty="0" err="1" smtClean="0">
+                <a:solidFill>
+                  <a:srgbClr val="FF0000"/>
+                </a:solidFill>
+              </a:rPr>
+              <a:t>ee</a:t>
+            </a:r>
+            <a:r>
+              <a:rPr lang="en-US" altLang="ja-JP" b="1" dirty="0" err="1" smtClean="0"/>
+              <a:t>tin</a:t>
+            </a:r>
+            <a:r>
+              <a:rPr lang="en-US" altLang="ja-JP" b="1" dirty="0" err="1" smtClean="0">
+                <a:solidFill>
+                  <a:srgbClr val="FF0000"/>
+                </a:solidFill>
+              </a:rPr>
+              <a:t>g.e</a:t>
+            </a:r>
+            <a:r>
+              <a:rPr lang="en-US" altLang="ja-JP" dirty="0" err="1" smtClean="0">
+                <a:solidFill>
+                  <a:srgbClr val="FF0000"/>
+                </a:solidFill>
+              </a:rPr>
+              <a:t>n</a:t>
+            </a:r>
+            <a:r>
+              <a:rPr lang="en-US" altLang="ja-JP" dirty="0">
+                <a:solidFill>
+                  <a:srgbClr val="FF0000"/>
+                </a:solidFill>
+              </a:rPr>
+              <a:t>}, </a:t>
+            </a:r>
+            <a:r>
+              <a:rPr lang="en-US" altLang="ja-JP" i="1" dirty="0"/>
+              <a:t>{</a:t>
+            </a:r>
+            <a:r>
+              <a:rPr lang="en-US" altLang="ja-JP" i="1" dirty="0" err="1"/>
+              <a:t>gr</a:t>
+            </a:r>
+            <a:r>
+              <a:rPr lang="en-US" altLang="ja-JP" b="1" i="1" dirty="0" err="1"/>
+              <a:t>eeting.e</a:t>
+            </a:r>
+            <a:r>
+              <a:rPr lang="en-US" altLang="ja-JP" i="1" dirty="0" err="1"/>
+              <a:t>n</a:t>
+            </a:r>
+            <a:r>
+              <a:rPr lang="en-US" altLang="ja-JP" i="1" dirty="0" smtClean="0"/>
+              <a:t>} </a:t>
+            </a:r>
+            <a:r>
+              <a:rPr lang="en-US" altLang="ja-JP" dirty="0" smtClean="0"/>
+              <a:t>like this</a:t>
+            </a:r>
+            <a:endParaRPr lang="en-US" altLang="ja-JP" dirty="0" smtClean="0"/>
+          </a:p>
+          <a:p>
+            <a:pPr marL="285750" indent="-285750">
+              <a:buFont typeface="Arial" panose="020B0604020202020204" pitchFamily="34" charset="0"/>
+              <a:buChar char="•"/>
+            </a:pPr>
+            <a:r>
+              <a:rPr lang="en-US" altLang="ja-JP" dirty="0" smtClean="0">
+                <a:solidFill>
+                  <a:srgbClr val="FF0000"/>
+                </a:solidFill>
+              </a:rPr>
+              <a:t>Another </a:t>
+            </a:r>
+            <a:r>
+              <a:rPr lang="en-US" altLang="ja-JP" i="1" u="sng" dirty="0" smtClean="0"/>
+              <a:t>paragraph</a:t>
+            </a:r>
+            <a:r>
+              <a:rPr lang="en-US" altLang="ja-JP" i="1" dirty="0" smtClean="0">
+                <a:solidFill>
+                  <a:srgbClr val="FF0000"/>
+                </a:solidFill>
+              </a:rPr>
+              <a:t> </a:t>
+            </a:r>
+            <a:r>
+              <a:rPr lang="en-US" altLang="ja-JP" dirty="0" smtClean="0">
+                <a:solidFill>
+                  <a:srgbClr val="FF0000"/>
+                </a:solidFill>
+              </a:rPr>
+              <a:t>remains</a:t>
+            </a:r>
+            <a:endParaRPr lang="ja-JP" altLang="en-US" dirty="0">
+              <a:solidFill>
+                <a:srgbClr val="FF0000"/>
+              </a:solidFill>
+            </a:endParaRPr>
+          </a:p>
+        </p:txBody>
+      </p:sp>
+      <p:sp>
+        <p:nvSpPr>
           <p:cNvPr id="13" name="正方形/長方形 12"/>
           <p:cNvSpPr/>
           <p:nvPr/>
@@ -10693,14 +10848,14 @@
       </p:sp>
       <p:sp>
         <p:nvSpPr>
-          <p:cNvPr id="12" name="テキスト ボックス 11"/>
+          <p:cNvPr id="15" name="テキスト ボックス 14"/>
           <p:cNvSpPr txBox="1"/>
           <p:nvPr/>
         </p:nvSpPr>
         <p:spPr>
           <a:xfrm>
-            <a:off x="842550" y="3653237"/>
-            <a:ext cx="4818948" cy="646331"/>
+            <a:off x="6224451" y="3653237"/>
+            <a:ext cx="5325497" cy="800219"/>
           </a:xfrm>
           <a:prstGeom prst="rect">
             <a:avLst/>
@@ -10718,42 +10873,44 @@
               <a:buChar char="•"/>
             </a:pPr>
             <a:r>
+              <a:rPr lang="en-US" altLang="ja-JP" sz="1000" dirty="0"/>
+              <a:t>When mixed-style is detected, apply the style for first ‘{‘ to whole substituted text.</a:t>
+            </a:r>
+          </a:p>
+          <a:p>
+            <a:pPr marL="285750" indent="-285750">
+              <a:buFont typeface="Arial" panose="020B0604020202020204" pitchFamily="34" charset="0"/>
+              <a:buChar char="•"/>
+            </a:pPr>
+            <a:r>
               <a:rPr lang="en-US" altLang="ja-JP" dirty="0" smtClean="0">
                 <a:solidFill>
                   <a:srgbClr val="FF0000"/>
                 </a:solidFill>
               </a:rPr>
-              <a:t>{</a:t>
-            </a:r>
-            <a:r>
-              <a:rPr lang="en-US" altLang="ja-JP" b="1" dirty="0" smtClean="0"/>
-              <a:t>greeting</a:t>
+              <a:t>Hello!, </a:t>
+            </a:r>
+            <a:r>
+              <a:rPr lang="en-US" altLang="ja-JP" i="1" dirty="0" smtClean="0"/>
+              <a:t>Hello! </a:t>
+            </a:r>
+            <a:r>
+              <a:rPr lang="en-US" altLang="ja-JP" dirty="0"/>
+              <a:t> </a:t>
+            </a:r>
+            <a:r>
+              <a:rPr lang="en-US" altLang="ja-JP" smtClean="0"/>
+              <a:t>l</a:t>
+            </a:r>
+            <a:r>
+              <a:rPr lang="en-US" altLang="ja-JP" smtClean="0"/>
+              <a:t>ike </a:t>
             </a:r>
             <a:r>
               <a:rPr lang="en-US" altLang="ja-JP" dirty="0" smtClean="0"/>
-              <a:t>.en</a:t>
-            </a:r>
-            <a:r>
-              <a:rPr lang="en-US" altLang="ja-JP" dirty="0" smtClean="0">
-                <a:solidFill>
-                  <a:srgbClr val="FF0000"/>
-                </a:solidFill>
-              </a:rPr>
-              <a:t>} </a:t>
-            </a:r>
-            <a:r>
-              <a:rPr lang="en-US" altLang="ja-JP" i="1" dirty="0" smtClean="0">
-                <a:solidFill>
-                  <a:srgbClr val="FF0000"/>
-                </a:solidFill>
-              </a:rPr>
-              <a:t>mixed-style will be broken.</a:t>
-            </a:r>
-            <a:endParaRPr lang="ja-JP" altLang="en-US" i="1" dirty="0" smtClean="0">
-              <a:solidFill>
-                <a:srgbClr val="FF0000"/>
-              </a:solidFill>
-            </a:endParaRPr>
+              <a:t>this</a:t>
+            </a:r>
+            <a:endParaRPr lang="en-US" altLang="ja-JP" dirty="0" smtClean="0"/>
           </a:p>
           <a:p>
             <a:pPr marL="285750" indent="-285750">
@@ -10774,79 +10931,6 @@
             </a:r>
             <a:r>
               <a:rPr lang="en-US" altLang="ja-JP" i="1" dirty="0" smtClean="0">
-                <a:solidFill>
-                  <a:srgbClr val="FF0000"/>
-                </a:solidFill>
-              </a:rPr>
-              <a:t> </a:t>
-            </a:r>
-            <a:r>
-              <a:rPr lang="en-US" altLang="ja-JP" dirty="0" smtClean="0">
-                <a:solidFill>
-                  <a:srgbClr val="FF0000"/>
-                </a:solidFill>
-              </a:rPr>
-              <a:t>remains</a:t>
-            </a:r>
-            <a:endParaRPr lang="ja-JP" altLang="en-US" dirty="0">
-              <a:solidFill>
-                <a:srgbClr val="FF0000"/>
-              </a:solidFill>
-            </a:endParaRPr>
-          </a:p>
-        </p:txBody>
-      </p:sp>
-      <p:sp>
-        <p:nvSpPr>
-          <p:cNvPr id="14" name="テキスト ボックス 13"/>
-          <p:cNvSpPr txBox="1"/>
-          <p:nvPr/>
-        </p:nvSpPr>
-        <p:spPr>
-          <a:xfrm>
-            <a:off x="6224451" y="3653237"/>
-            <a:ext cx="4761240" cy="646331"/>
-          </a:xfrm>
-          <a:prstGeom prst="rect">
-            <a:avLst/>
-          </a:prstGeom>
-          <a:noFill/>
-        </p:spPr>
-        <p:txBody>
-          <a:bodyPr wrap="none" rtlCol="0">
-            <a:spAutoFit/>
-          </a:bodyPr>
-          <a:lstStyle/>
-          <a:p>
-            <a:pPr marL="285750" indent="-285750">
-              <a:buFont typeface="Arial" panose="020B0604020202020204" pitchFamily="34" charset="0"/>
-              <a:buChar char="•"/>
-            </a:pPr>
-            <a:r>
-              <a:rPr lang="en-US" altLang="ja-JP" dirty="0" smtClean="0"/>
-              <a:t>{greeting.en} mixed-style will be broken.</a:t>
-            </a:r>
-            <a:endParaRPr lang="ja-JP" altLang="en-US" dirty="0" smtClean="0"/>
-          </a:p>
-          <a:p>
-            <a:pPr marL="285750" indent="-285750">
-              <a:buFont typeface="Arial" panose="020B0604020202020204" pitchFamily="34" charset="0"/>
-              <a:buChar char="•"/>
-            </a:pPr>
-            <a:r>
-              <a:rPr lang="en-US" altLang="ja-JP" dirty="0">
-                <a:solidFill>
-                  <a:srgbClr val="FF0000"/>
-                </a:solidFill>
-              </a:rPr>
-              <a:t>Another </a:t>
-            </a:r>
-            <a:r>
-              <a:rPr lang="en-US" altLang="ja-JP" i="1" u="sng" dirty="0"/>
-              <a:t>paragraph</a:t>
-            </a:r>
-            <a:r>
-              <a:rPr lang="en-US" altLang="ja-JP" i="1" dirty="0">
                 <a:solidFill>
                   <a:srgbClr val="FF0000"/>
                 </a:solidFill>

</xml_diff>

<commit_message>
Fix CSV loading bug
</commit_message>
<xml_diff>
--- a/test/data/in.pptx
+++ b/test/data/in.pptx
@@ -163,6 +163,7 @@
           </a:p>
         </c:rich>
       </c:tx>
+      <c:layout/>
       <c:overlay val="0"/>
       <c:spPr>
         <a:noFill/>
@@ -633,6 +634,7 @@
     </c:plotArea>
     <c:legend>
       <c:legendPos val="b"/>
+      <c:layout/>
       <c:overlay val="0"/>
       <c:spPr>
         <a:noFill/>
@@ -734,6 +736,7 @@
           </a:p>
         </c:rich>
       </c:tx>
+      <c:layout/>
       <c:overlay val="0"/>
       <c:spPr>
         <a:noFill/>
@@ -996,13 +999,13 @@
                   <c:v>0.5</c:v>
                 </c:pt>
                 <c:pt idx="1">
-                  <c:v>0.54545454545454541</c:v>
+                  <c:v>0.5</c:v>
                 </c:pt>
                 <c:pt idx="2">
-                  <c:v>0.58333333333333337</c:v>
+                  <c:v>0.5</c:v>
                 </c:pt>
                 <c:pt idx="3">
-                  <c:v>0.61538461538461542</c:v>
+                  <c:v>0.6</c:v>
                 </c:pt>
               </c:numCache>
             </c:numRef>
@@ -1206,6 +1209,7 @@
     </c:plotArea>
     <c:legend>
       <c:legendPos val="b"/>
+      <c:layout/>
       <c:overlay val="0"/>
       <c:spPr>
         <a:noFill/>
@@ -2328,6 +2332,7 @@
           </a:p>
         </c:rich>
       </c:tx>
+      <c:layout/>
       <c:overlay val="0"/>
       <c:spPr>
         <a:noFill/>
@@ -2798,6 +2803,7 @@
     </c:plotArea>
     <c:legend>
       <c:legendPos val="b"/>
+      <c:layout/>
       <c:overlay val="0"/>
       <c:spPr>
         <a:noFill/>
@@ -2899,6 +2905,7 @@
           </a:p>
         </c:rich>
       </c:tx>
+      <c:layout/>
       <c:overlay val="0"/>
       <c:spPr>
         <a:noFill/>
@@ -3161,13 +3168,13 @@
                   <c:v>0.5</c:v>
                 </c:pt>
                 <c:pt idx="1">
-                  <c:v>0.54545454545454541</c:v>
+                  <c:v>0.5</c:v>
                 </c:pt>
                 <c:pt idx="2">
-                  <c:v>0.58333333333333337</c:v>
+                  <c:v>0.5</c:v>
                 </c:pt>
                 <c:pt idx="3">
-                  <c:v>0.61538461538461542</c:v>
+                  <c:v>0.6</c:v>
                 </c:pt>
               </c:numCache>
             </c:numRef>
@@ -3371,6 +3378,7 @@
     </c:plotArea>
     <c:legend>
       <c:legendPos val="b"/>
+      <c:layout/>
       <c:overlay val="0"/>
       <c:spPr>
         <a:noFill/>
@@ -10774,7 +10782,6 @@
               <a:rPr lang="en-US" altLang="ja-JP" dirty="0" smtClean="0"/>
               <a:t>like this</a:t>
             </a:r>
-            <a:endParaRPr lang="en-US" altLang="ja-JP" dirty="0" smtClean="0"/>
           </a:p>
           <a:p>
             <a:pPr marL="285750" indent="-285750">
@@ -10900,17 +10907,12 @@
             </a:r>
             <a:r>
               <a:rPr lang="en-US" altLang="ja-JP" smtClean="0"/>
-              <a:t>l</a:t>
-            </a:r>
-            <a:r>
-              <a:rPr lang="en-US" altLang="ja-JP" smtClean="0"/>
-              <a:t>ike </a:t>
+              <a:t>like </a:t>
             </a:r>
             <a:r>
               <a:rPr lang="en-US" altLang="ja-JP" dirty="0" smtClean="0"/>
               <a:t>this</a:t>
             </a:r>
-            <a:endParaRPr lang="en-US" altLang="ja-JP" dirty="0" smtClean="0"/>
           </a:p>
           <a:p>
             <a:pPr marL="285750" indent="-285750">
@@ -11124,7 +11126,7 @@
           <p:nvPr>
             <p:extLst>
               <p:ext uri="{D42A27DB-BD31-4B8C-83A1-F6EECF244321}">
-                <p14:modId xmlns:p14="http://schemas.microsoft.com/office/powerpoint/2010/main" val="2165793561"/>
+                <p14:modId xmlns:p14="http://schemas.microsoft.com/office/powerpoint/2010/main" val="841488561"/>
               </p:ext>
             </p:extLst>
           </p:nvPr>
@@ -11494,7 +11496,11 @@
           <p:cNvPr id="8" name="グラフ 7"/>
           <p:cNvGraphicFramePr/>
           <p:nvPr>
-            <p:extLst/>
+            <p:extLst>
+              <p:ext uri="{D42A27DB-BD31-4B8C-83A1-F6EECF244321}">
+                <p14:modId xmlns:p14="http://schemas.microsoft.com/office/powerpoint/2010/main" val="1513967581"/>
+              </p:ext>
+            </p:extLst>
           </p:nvPr>
         </p:nvGraphicFramePr>
         <p:xfrm>

</xml_diff>

<commit_message>
Add pie chart test
</commit_message>
<xml_diff>
--- a/test/data/in.pptx
+++ b/test/data/in.pptx
@@ -11,7 +11,8 @@
     <p:sldId id="261" r:id="rId5"/>
     <p:sldId id="263" r:id="rId6"/>
     <p:sldId id="264" r:id="rId7"/>
-    <p:sldId id="262" r:id="rId8"/>
+    <p:sldId id="265" r:id="rId8"/>
+    <p:sldId id="262" r:id="rId9"/>
   </p:sldIdLst>
   <p:sldSz cx="12192000" cy="6858000"/>
   <p:notesSz cx="6858000" cy="9144000"/>
@@ -163,7 +164,6 @@
           </a:p>
         </c:rich>
       </c:tx>
-      <c:layout/>
       <c:overlay val="0"/>
       <c:spPr>
         <a:noFill/>
@@ -634,7 +634,6 @@
     </c:plotArea>
     <c:legend>
       <c:legendPos val="b"/>
-      <c:layout/>
       <c:overlay val="0"/>
       <c:spPr>
         <a:noFill/>
@@ -736,7 +735,6 @@
           </a:p>
         </c:rich>
       </c:tx>
-      <c:layout/>
       <c:overlay val="0"/>
       <c:spPr>
         <a:noFill/>
@@ -1209,7 +1207,6 @@
     </c:plotArea>
     <c:legend>
       <c:legendPos val="b"/>
-      <c:layout/>
       <c:overlay val="0"/>
       <c:spPr>
         <a:noFill/>
@@ -3368,6 +3365,729 @@
         <c:lblOffset val="100"/>
         <c:noMultiLvlLbl val="0"/>
       </c:catAx>
+      <c:spPr>
+        <a:noFill/>
+        <a:ln>
+          <a:noFill/>
+        </a:ln>
+        <a:effectLst/>
+      </c:spPr>
+    </c:plotArea>
+    <c:legend>
+      <c:legendPos val="b"/>
+      <c:layout/>
+      <c:overlay val="0"/>
+      <c:spPr>
+        <a:noFill/>
+        <a:ln>
+          <a:noFill/>
+        </a:ln>
+        <a:effectLst/>
+      </c:spPr>
+      <c:txPr>
+        <a:bodyPr rot="0" spcFirstLastPara="1" vertOverflow="ellipsis" vert="horz" wrap="square" anchor="ctr" anchorCtr="1"/>
+        <a:lstStyle/>
+        <a:p>
+          <a:pPr>
+            <a:defRPr sz="1197" b="0" i="0" u="none" strike="noStrike" kern="1200" baseline="0">
+              <a:solidFill>
+                <a:schemeClr val="tx1">
+                  <a:lumMod val="65000"/>
+                  <a:lumOff val="35000"/>
+                </a:schemeClr>
+              </a:solidFill>
+              <a:latin typeface="+mn-lt"/>
+              <a:ea typeface="+mn-ea"/>
+              <a:cs typeface="+mn-cs"/>
+            </a:defRPr>
+          </a:pPr>
+          <a:endParaRPr lang="ja-JP"/>
+        </a:p>
+      </c:txPr>
+    </c:legend>
+    <c:plotVisOnly val="1"/>
+    <c:dispBlanksAs val="gap"/>
+    <c:showDLblsOverMax val="0"/>
+  </c:chart>
+  <c:spPr>
+    <a:noFill/>
+    <a:ln>
+      <a:noFill/>
+    </a:ln>
+    <a:effectLst/>
+  </c:spPr>
+  <c:txPr>
+    <a:bodyPr/>
+    <a:lstStyle/>
+    <a:p>
+      <a:pPr>
+        <a:defRPr/>
+      </a:pPr>
+      <a:endParaRPr lang="ja-JP"/>
+    </a:p>
+  </c:txPr>
+  <c:externalData r:id="rId3">
+    <c:autoUpdate val="0"/>
+  </c:externalData>
+</c:chartSpace>
+</file>
+
+<file path=ppt/charts/chart7.xml><?xml version="1.0" encoding="utf-8"?>
+<c:chartSpace xmlns:c="http://schemas.openxmlformats.org/drawingml/2006/chart" xmlns:a="http://schemas.openxmlformats.org/drawingml/2006/main" xmlns:r="http://schemas.openxmlformats.org/officeDocument/2006/relationships" xmlns:c16r2="http://schemas.microsoft.com/office/drawing/2015/06/chart">
+  <c:date1904 val="0"/>
+  <c:lang val="ja-JP"/>
+  <c:roundedCorners val="0"/>
+  <mc:AlternateContent xmlns:mc="http://schemas.openxmlformats.org/markup-compatibility/2006">
+    <mc:Choice xmlns:c14="http://schemas.microsoft.com/office/drawing/2007/8/2/chart" Requires="c14">
+      <c14:style val="102"/>
+    </mc:Choice>
+    <mc:Fallback>
+      <c:style val="2"/>
+    </mc:Fallback>
+  </mc:AlternateContent>
+  <c:chart>
+    <c:title>
+      <c:tx>
+        <c:rich>
+          <a:bodyPr rot="0" spcFirstLastPara="1" vertOverflow="ellipsis" vert="horz" wrap="square" anchor="ctr" anchorCtr="1"/>
+          <a:lstStyle/>
+          <a:p>
+            <a:pPr>
+              <a:defRPr sz="1862" b="0" i="0" u="none" strike="noStrike" kern="1200" spc="0" baseline="0">
+                <a:solidFill>
+                  <a:schemeClr val="tx1">
+                    <a:lumMod val="65000"/>
+                    <a:lumOff val="35000"/>
+                  </a:schemeClr>
+                </a:solidFill>
+                <a:latin typeface="+mn-lt"/>
+                <a:ea typeface="+mn-ea"/>
+                <a:cs typeface="+mn-cs"/>
+              </a:defRPr>
+            </a:pPr>
+            <a:r>
+              <a:rPr lang="en-US" altLang="ja-JP" dirty="0" smtClean="0"/>
+              <a:t>{segment}Share</a:t>
+            </a:r>
+            <a:endParaRPr lang="ja-JP" altLang="en-US" dirty="0"/>
+          </a:p>
+        </c:rich>
+      </c:tx>
+      <c:layout/>
+      <c:overlay val="0"/>
+      <c:spPr>
+        <a:noFill/>
+        <a:ln>
+          <a:noFill/>
+        </a:ln>
+        <a:effectLst/>
+      </c:spPr>
+      <c:txPr>
+        <a:bodyPr rot="0" spcFirstLastPara="1" vertOverflow="ellipsis" vert="horz" wrap="square" anchor="ctr" anchorCtr="1"/>
+        <a:lstStyle/>
+        <a:p>
+          <a:pPr>
+            <a:defRPr sz="1862" b="0" i="0" u="none" strike="noStrike" kern="1200" spc="0" baseline="0">
+              <a:solidFill>
+                <a:schemeClr val="tx1">
+                  <a:lumMod val="65000"/>
+                  <a:lumOff val="35000"/>
+                </a:schemeClr>
+              </a:solidFill>
+              <a:latin typeface="+mn-lt"/>
+              <a:ea typeface="+mn-ea"/>
+              <a:cs typeface="+mn-cs"/>
+            </a:defRPr>
+          </a:pPr>
+          <a:endParaRPr lang="ja-JP"/>
+        </a:p>
+      </c:txPr>
+    </c:title>
+    <c:autoTitleDeleted val="0"/>
+    <c:plotArea>
+      <c:layout/>
+      <c:pieChart>
+        <c:varyColors val="1"/>
+        <c:ser>
+          <c:idx val="0"/>
+          <c:order val="0"/>
+          <c:tx>
+            <c:strRef>
+              <c:f>Sheet1!$B$1</c:f>
+              <c:strCache>
+                <c:ptCount val="1"/>
+                <c:pt idx="0">
+                  <c:v>売上高</c:v>
+                </c:pt>
+              </c:strCache>
+            </c:strRef>
+          </c:tx>
+          <c:dPt>
+            <c:idx val="0"/>
+            <c:bubble3D val="0"/>
+            <c:spPr>
+              <a:solidFill>
+                <a:schemeClr val="accent1"/>
+              </a:solidFill>
+              <a:ln w="19050">
+                <a:solidFill>
+                  <a:schemeClr val="lt1"/>
+                </a:solidFill>
+              </a:ln>
+              <a:effectLst/>
+            </c:spPr>
+          </c:dPt>
+          <c:dPt>
+            <c:idx val="1"/>
+            <c:bubble3D val="0"/>
+            <c:spPr>
+              <a:solidFill>
+                <a:schemeClr val="accent2"/>
+              </a:solidFill>
+              <a:ln w="19050">
+                <a:solidFill>
+                  <a:schemeClr val="lt1"/>
+                </a:solidFill>
+              </a:ln>
+              <a:effectLst/>
+            </c:spPr>
+          </c:dPt>
+          <c:dPt>
+            <c:idx val="2"/>
+            <c:bubble3D val="0"/>
+            <c:spPr>
+              <a:solidFill>
+                <a:schemeClr val="accent3"/>
+              </a:solidFill>
+              <a:ln w="19050">
+                <a:solidFill>
+                  <a:schemeClr val="lt1"/>
+                </a:solidFill>
+              </a:ln>
+              <a:effectLst/>
+            </c:spPr>
+          </c:dPt>
+          <c:dPt>
+            <c:idx val="3"/>
+            <c:bubble3D val="0"/>
+            <c:spPr>
+              <a:solidFill>
+                <a:schemeClr val="accent4"/>
+              </a:solidFill>
+              <a:ln w="19050">
+                <a:solidFill>
+                  <a:schemeClr val="lt1"/>
+                </a:solidFill>
+              </a:ln>
+              <a:effectLst/>
+            </c:spPr>
+          </c:dPt>
+          <c:dPt>
+            <c:idx val="4"/>
+            <c:bubble3D val="0"/>
+            <c:spPr>
+              <a:solidFill>
+                <a:schemeClr val="accent5"/>
+              </a:solidFill>
+              <a:ln w="19050">
+                <a:solidFill>
+                  <a:schemeClr val="lt1"/>
+                </a:solidFill>
+              </a:ln>
+              <a:effectLst/>
+            </c:spPr>
+          </c:dPt>
+          <c:dLbls>
+            <c:spPr>
+              <a:noFill/>
+              <a:ln>
+                <a:noFill/>
+              </a:ln>
+              <a:effectLst/>
+            </c:spPr>
+            <c:txPr>
+              <a:bodyPr rot="0" spcFirstLastPara="1" vertOverflow="ellipsis" vert="horz" wrap="square" lIns="38100" tIns="19050" rIns="38100" bIns="19050" anchor="ctr" anchorCtr="1">
+                <a:spAutoFit/>
+              </a:bodyPr>
+              <a:lstStyle/>
+              <a:p>
+                <a:pPr>
+                  <a:defRPr sz="1197" b="0" i="0" u="none" strike="noStrike" kern="1200" baseline="0">
+                    <a:solidFill>
+                      <a:schemeClr val="tx1">
+                        <a:lumMod val="75000"/>
+                        <a:lumOff val="25000"/>
+                      </a:schemeClr>
+                    </a:solidFill>
+                    <a:latin typeface="+mn-lt"/>
+                    <a:ea typeface="+mn-ea"/>
+                    <a:cs typeface="+mn-cs"/>
+                  </a:defRPr>
+                </a:pPr>
+                <a:endParaRPr lang="ja-JP"/>
+              </a:p>
+            </c:txPr>
+            <c:showLegendKey val="0"/>
+            <c:showVal val="1"/>
+            <c:showCatName val="0"/>
+            <c:showSerName val="0"/>
+            <c:showPercent val="1"/>
+            <c:showBubbleSize val="0"/>
+            <c:showLeaderLines val="1"/>
+            <c:leaderLines>
+              <c:spPr>
+                <a:ln w="9525" cap="flat" cmpd="sng" algn="ctr">
+                  <a:solidFill>
+                    <a:schemeClr val="tx1">
+                      <a:lumMod val="35000"/>
+                      <a:lumOff val="65000"/>
+                    </a:schemeClr>
+                  </a:solidFill>
+                  <a:round/>
+                </a:ln>
+                <a:effectLst/>
+              </c:spPr>
+            </c:leaderLines>
+            <c:extLst>
+              <c:ext xmlns:c15="http://schemas.microsoft.com/office/drawing/2012/chart" uri="{CE6537A1-D6FC-4f65-9D91-7224C49458BB}">
+                <c15:layout/>
+              </c:ext>
+            </c:extLst>
+          </c:dLbls>
+          <c:cat>
+            <c:strRef>
+              <c:f>Sheet1!$A$2:$A$6</c:f>
+              <c:strCache>
+                <c:ptCount val="5"/>
+                <c:pt idx="0">
+                  <c:v>A,0.10</c:v>
+                </c:pt>
+                <c:pt idx="1">
+                  <c:v>B,0.25</c:v>
+                </c:pt>
+                <c:pt idx="2">
+                  <c:v>C,0.48</c:v>
+                </c:pt>
+                <c:pt idx="3">
+                  <c:v>D,0.11</c:v>
+                </c:pt>
+                <c:pt idx="4">
+                  <c:v>E,0.06</c:v>
+                </c:pt>
+              </c:strCache>
+            </c:strRef>
+          </c:cat>
+          <c:val>
+            <c:numRef>
+              <c:f>Sheet1!$B$2:$B$6</c:f>
+              <c:numCache>
+                <c:formatCode>General</c:formatCode>
+                <c:ptCount val="5"/>
+                <c:pt idx="0">
+                  <c:v>8.1999999999999993</c:v>
+                </c:pt>
+                <c:pt idx="1">
+                  <c:v>3.2</c:v>
+                </c:pt>
+                <c:pt idx="2">
+                  <c:v>1.4</c:v>
+                </c:pt>
+                <c:pt idx="3">
+                  <c:v>1.2</c:v>
+                </c:pt>
+              </c:numCache>
+            </c:numRef>
+          </c:val>
+          <c:extLst>
+            <c:ext xmlns:c16="http://schemas.microsoft.com/office/drawing/2014/chart" uri="{C3380CC4-5D6E-409C-BE32-E72D297353CC}">
+              <c16:uniqueId val="{00000000-63F7-4CC2-94CD-259ABAF27F90}"/>
+            </c:ext>
+          </c:extLst>
+        </c:ser>
+        <c:dLbls>
+          <c:showLegendKey val="0"/>
+          <c:showVal val="0"/>
+          <c:showCatName val="0"/>
+          <c:showSerName val="0"/>
+          <c:showPercent val="0"/>
+          <c:showBubbleSize val="0"/>
+          <c:showLeaderLines val="1"/>
+        </c:dLbls>
+        <c:firstSliceAng val="0"/>
+      </c:pieChart>
+      <c:spPr>
+        <a:noFill/>
+        <a:ln>
+          <a:noFill/>
+        </a:ln>
+        <a:effectLst/>
+      </c:spPr>
+    </c:plotArea>
+    <c:legend>
+      <c:legendPos val="b"/>
+      <c:layout/>
+      <c:overlay val="0"/>
+      <c:spPr>
+        <a:noFill/>
+        <a:ln>
+          <a:noFill/>
+        </a:ln>
+        <a:effectLst/>
+      </c:spPr>
+      <c:txPr>
+        <a:bodyPr rot="0" spcFirstLastPara="1" vertOverflow="ellipsis" vert="horz" wrap="square" anchor="ctr" anchorCtr="1"/>
+        <a:lstStyle/>
+        <a:p>
+          <a:pPr>
+            <a:defRPr sz="1197" b="0" i="0" u="none" strike="noStrike" kern="1200" baseline="0">
+              <a:solidFill>
+                <a:schemeClr val="tx1">
+                  <a:lumMod val="65000"/>
+                  <a:lumOff val="35000"/>
+                </a:schemeClr>
+              </a:solidFill>
+              <a:latin typeface="+mn-lt"/>
+              <a:ea typeface="+mn-ea"/>
+              <a:cs typeface="+mn-cs"/>
+            </a:defRPr>
+          </a:pPr>
+          <a:endParaRPr lang="ja-JP"/>
+        </a:p>
+      </c:txPr>
+    </c:legend>
+    <c:plotVisOnly val="1"/>
+    <c:dispBlanksAs val="gap"/>
+    <c:showDLblsOverMax val="0"/>
+  </c:chart>
+  <c:spPr>
+    <a:noFill/>
+    <a:ln>
+      <a:noFill/>
+    </a:ln>
+    <a:effectLst/>
+  </c:spPr>
+  <c:txPr>
+    <a:bodyPr/>
+    <a:lstStyle/>
+    <a:p>
+      <a:pPr>
+        <a:defRPr/>
+      </a:pPr>
+      <a:endParaRPr lang="ja-JP"/>
+    </a:p>
+  </c:txPr>
+  <c:externalData r:id="rId3">
+    <c:autoUpdate val="0"/>
+  </c:externalData>
+</c:chartSpace>
+</file>
+
+<file path=ppt/charts/chart8.xml><?xml version="1.0" encoding="utf-8"?>
+<c:chartSpace xmlns:c="http://schemas.openxmlformats.org/drawingml/2006/chart" xmlns:a="http://schemas.openxmlformats.org/drawingml/2006/main" xmlns:r="http://schemas.openxmlformats.org/officeDocument/2006/relationships" xmlns:c16r2="http://schemas.microsoft.com/office/drawing/2015/06/chart">
+  <c:date1904 val="0"/>
+  <c:lang val="ja-JP"/>
+  <c:roundedCorners val="0"/>
+  <mc:AlternateContent xmlns:mc="http://schemas.openxmlformats.org/markup-compatibility/2006">
+    <mc:Choice xmlns:c14="http://schemas.microsoft.com/office/drawing/2007/8/2/chart" Requires="c14">
+      <c14:style val="102"/>
+    </mc:Choice>
+    <mc:Fallback>
+      <c:style val="2"/>
+    </mc:Fallback>
+  </mc:AlternateContent>
+  <c:chart>
+    <c:title>
+      <c:tx>
+        <c:rich>
+          <a:bodyPr rot="0" spcFirstLastPara="1" vertOverflow="ellipsis" vert="horz" wrap="square" anchor="ctr" anchorCtr="1"/>
+          <a:lstStyle/>
+          <a:p>
+            <a:pPr>
+              <a:defRPr sz="1862" b="0" i="0" u="none" strike="noStrike" kern="1200" spc="0" baseline="0">
+                <a:solidFill>
+                  <a:schemeClr val="tx1">
+                    <a:lumMod val="65000"/>
+                    <a:lumOff val="35000"/>
+                  </a:schemeClr>
+                </a:solidFill>
+                <a:latin typeface="+mn-lt"/>
+                <a:ea typeface="+mn-ea"/>
+                <a:cs typeface="+mn-cs"/>
+              </a:defRPr>
+            </a:pPr>
+            <a:r>
+              <a:rPr lang="en-US" altLang="ja-JP" dirty="0" smtClean="0"/>
+              <a:t>Share</a:t>
+            </a:r>
+            <a:endParaRPr lang="ja-JP" altLang="en-US" dirty="0"/>
+          </a:p>
+        </c:rich>
+      </c:tx>
+      <c:layout/>
+      <c:overlay val="0"/>
+      <c:spPr>
+        <a:noFill/>
+        <a:ln>
+          <a:noFill/>
+        </a:ln>
+        <a:effectLst/>
+      </c:spPr>
+      <c:txPr>
+        <a:bodyPr rot="0" spcFirstLastPara="1" vertOverflow="ellipsis" vert="horz" wrap="square" anchor="ctr" anchorCtr="1"/>
+        <a:lstStyle/>
+        <a:p>
+          <a:pPr>
+            <a:defRPr sz="1862" b="0" i="0" u="none" strike="noStrike" kern="1200" spc="0" baseline="0">
+              <a:solidFill>
+                <a:schemeClr val="tx1">
+                  <a:lumMod val="65000"/>
+                  <a:lumOff val="35000"/>
+                </a:schemeClr>
+              </a:solidFill>
+              <a:latin typeface="+mn-lt"/>
+              <a:ea typeface="+mn-ea"/>
+              <a:cs typeface="+mn-cs"/>
+            </a:defRPr>
+          </a:pPr>
+          <a:endParaRPr lang="ja-JP"/>
+        </a:p>
+      </c:txPr>
+    </c:title>
+    <c:autoTitleDeleted val="0"/>
+    <c:plotArea>
+      <c:layout/>
+      <c:pieChart>
+        <c:varyColors val="1"/>
+        <c:ser>
+          <c:idx val="0"/>
+          <c:order val="0"/>
+          <c:tx>
+            <c:strRef>
+              <c:f>Sheet1!$B$1</c:f>
+              <c:strCache>
+                <c:ptCount val="1"/>
+                <c:pt idx="0">
+                  <c:v>Share</c:v>
+                </c:pt>
+              </c:strCache>
+            </c:strRef>
+          </c:tx>
+          <c:dPt>
+            <c:idx val="0"/>
+            <c:bubble3D val="0"/>
+            <c:spPr>
+              <a:solidFill>
+                <a:schemeClr val="accent1"/>
+              </a:solidFill>
+              <a:ln w="19050">
+                <a:solidFill>
+                  <a:schemeClr val="lt1"/>
+                </a:solidFill>
+              </a:ln>
+              <a:effectLst/>
+            </c:spPr>
+            <c:extLst>
+              <c:ext xmlns:c16="http://schemas.microsoft.com/office/drawing/2014/chart" uri="{C3380CC4-5D6E-409C-BE32-E72D297353CC}">
+                <c16:uniqueId val="{00000001-46FC-4038-9C5F-FE63FEE3E103}"/>
+              </c:ext>
+            </c:extLst>
+          </c:dPt>
+          <c:dPt>
+            <c:idx val="1"/>
+            <c:bubble3D val="0"/>
+            <c:spPr>
+              <a:solidFill>
+                <a:schemeClr val="accent2"/>
+              </a:solidFill>
+              <a:ln w="19050">
+                <a:solidFill>
+                  <a:schemeClr val="lt1"/>
+                </a:solidFill>
+              </a:ln>
+              <a:effectLst/>
+            </c:spPr>
+            <c:extLst>
+              <c:ext xmlns:c16="http://schemas.microsoft.com/office/drawing/2014/chart" uri="{C3380CC4-5D6E-409C-BE32-E72D297353CC}">
+                <c16:uniqueId val="{00000003-46FC-4038-9C5F-FE63FEE3E103}"/>
+              </c:ext>
+            </c:extLst>
+          </c:dPt>
+          <c:dPt>
+            <c:idx val="2"/>
+            <c:bubble3D val="0"/>
+            <c:spPr>
+              <a:solidFill>
+                <a:schemeClr val="accent3"/>
+              </a:solidFill>
+              <a:ln w="19050">
+                <a:solidFill>
+                  <a:schemeClr val="lt1"/>
+                </a:solidFill>
+              </a:ln>
+              <a:effectLst/>
+            </c:spPr>
+            <c:extLst>
+              <c:ext xmlns:c16="http://schemas.microsoft.com/office/drawing/2014/chart" uri="{C3380CC4-5D6E-409C-BE32-E72D297353CC}">
+                <c16:uniqueId val="{00000005-46FC-4038-9C5F-FE63FEE3E103}"/>
+              </c:ext>
+            </c:extLst>
+          </c:dPt>
+          <c:dPt>
+            <c:idx val="3"/>
+            <c:bubble3D val="0"/>
+            <c:spPr>
+              <a:solidFill>
+                <a:schemeClr val="accent4"/>
+              </a:solidFill>
+              <a:ln w="19050">
+                <a:solidFill>
+                  <a:schemeClr val="lt1"/>
+                </a:solidFill>
+              </a:ln>
+              <a:effectLst/>
+            </c:spPr>
+            <c:extLst>
+              <c:ext xmlns:c16="http://schemas.microsoft.com/office/drawing/2014/chart" uri="{C3380CC4-5D6E-409C-BE32-E72D297353CC}">
+                <c16:uniqueId val="{00000007-46FC-4038-9C5F-FE63FEE3E103}"/>
+              </c:ext>
+            </c:extLst>
+          </c:dPt>
+          <c:dPt>
+            <c:idx val="4"/>
+            <c:bubble3D val="0"/>
+            <c:spPr>
+              <a:solidFill>
+                <a:schemeClr val="accent5"/>
+              </a:solidFill>
+              <a:ln w="19050">
+                <a:solidFill>
+                  <a:schemeClr val="lt1"/>
+                </a:solidFill>
+              </a:ln>
+              <a:effectLst/>
+            </c:spPr>
+          </c:dPt>
+          <c:dLbls>
+            <c:spPr>
+              <a:noFill/>
+              <a:ln>
+                <a:noFill/>
+              </a:ln>
+              <a:effectLst/>
+            </c:spPr>
+            <c:txPr>
+              <a:bodyPr rot="0" spcFirstLastPara="1" vertOverflow="ellipsis" vert="horz" wrap="square" lIns="38100" tIns="19050" rIns="38100" bIns="19050" anchor="ctr" anchorCtr="1">
+                <a:spAutoFit/>
+              </a:bodyPr>
+              <a:lstStyle/>
+              <a:p>
+                <a:pPr>
+                  <a:defRPr sz="1197" b="0" i="0" u="none" strike="noStrike" kern="1200" baseline="0">
+                    <a:solidFill>
+                      <a:schemeClr val="tx1">
+                        <a:lumMod val="75000"/>
+                        <a:lumOff val="25000"/>
+                      </a:schemeClr>
+                    </a:solidFill>
+                    <a:latin typeface="+mn-lt"/>
+                    <a:ea typeface="+mn-ea"/>
+                    <a:cs typeface="+mn-cs"/>
+                  </a:defRPr>
+                </a:pPr>
+                <a:endParaRPr lang="ja-JP"/>
+              </a:p>
+            </c:txPr>
+            <c:showLegendKey val="0"/>
+            <c:showVal val="1"/>
+            <c:showCatName val="0"/>
+            <c:showSerName val="0"/>
+            <c:showPercent val="1"/>
+            <c:showBubbleSize val="0"/>
+            <c:showLeaderLines val="1"/>
+            <c:leaderLines>
+              <c:spPr>
+                <a:ln w="9525" cap="flat" cmpd="sng" algn="ctr">
+                  <a:solidFill>
+                    <a:schemeClr val="tx1">
+                      <a:lumMod val="35000"/>
+                      <a:lumOff val="65000"/>
+                    </a:schemeClr>
+                  </a:solidFill>
+                  <a:round/>
+                </a:ln>
+                <a:effectLst/>
+              </c:spPr>
+            </c:leaderLines>
+            <c:extLst>
+              <c:ext xmlns:c15="http://schemas.microsoft.com/office/drawing/2012/chart" uri="{CE6537A1-D6FC-4f65-9D91-7224C49458BB}">
+                <c15:layout/>
+              </c:ext>
+            </c:extLst>
+          </c:dLbls>
+          <c:cat>
+            <c:strRef>
+              <c:f>Sheet1!$A$2:$A$6</c:f>
+              <c:strCache>
+                <c:ptCount val="5"/>
+                <c:pt idx="0">
+                  <c:v>A</c:v>
+                </c:pt>
+                <c:pt idx="1">
+                  <c:v>B</c:v>
+                </c:pt>
+                <c:pt idx="2">
+                  <c:v>C</c:v>
+                </c:pt>
+                <c:pt idx="3">
+                  <c:v>D</c:v>
+                </c:pt>
+                <c:pt idx="4">
+                  <c:v>E</c:v>
+                </c:pt>
+              </c:strCache>
+            </c:strRef>
+          </c:cat>
+          <c:val>
+            <c:numRef>
+              <c:f>Sheet1!$B$2:$B$6</c:f>
+              <c:numCache>
+                <c:formatCode>General</c:formatCode>
+                <c:ptCount val="5"/>
+                <c:pt idx="0">
+                  <c:v>0.1</c:v>
+                </c:pt>
+                <c:pt idx="1">
+                  <c:v>0.25</c:v>
+                </c:pt>
+                <c:pt idx="2">
+                  <c:v>0.48</c:v>
+                </c:pt>
+                <c:pt idx="3">
+                  <c:v>0.11</c:v>
+                </c:pt>
+                <c:pt idx="4">
+                  <c:v>0.06</c:v>
+                </c:pt>
+              </c:numCache>
+            </c:numRef>
+          </c:val>
+          <c:extLst>
+            <c:ext xmlns:c16="http://schemas.microsoft.com/office/drawing/2014/chart" uri="{C3380CC4-5D6E-409C-BE32-E72D297353CC}">
+              <c16:uniqueId val="{00000008-46FC-4038-9C5F-FE63FEE3E103}"/>
+            </c:ext>
+          </c:extLst>
+        </c:ser>
+        <c:dLbls>
+          <c:showLegendKey val="0"/>
+          <c:showVal val="0"/>
+          <c:showCatName val="0"/>
+          <c:showSerName val="0"/>
+          <c:showPercent val="0"/>
+          <c:showBubbleSize val="0"/>
+          <c:showLeaderLines val="1"/>
+        </c:dLbls>
+        <c:firstSliceAng val="0"/>
+      </c:pieChart>
       <c:spPr>
         <a:noFill/>
         <a:ln>
@@ -3675,6 +4395,86 @@
 </cs:colorStyle>
 </file>
 
+<file path=ppt/charts/colors7.xml><?xml version="1.0" encoding="utf-8"?>
+<cs:colorStyle xmlns:cs="http://schemas.microsoft.com/office/drawing/2012/chartStyle" xmlns:a="http://schemas.openxmlformats.org/drawingml/2006/main" meth="cycle" id="10">
+  <a:schemeClr val="accent1"/>
+  <a:schemeClr val="accent2"/>
+  <a:schemeClr val="accent3"/>
+  <a:schemeClr val="accent4"/>
+  <a:schemeClr val="accent5"/>
+  <a:schemeClr val="accent6"/>
+  <cs:variation/>
+  <cs:variation>
+    <a:lumMod val="60000"/>
+  </cs:variation>
+  <cs:variation>
+    <a:lumMod val="80000"/>
+    <a:lumOff val="20000"/>
+  </cs:variation>
+  <cs:variation>
+    <a:lumMod val="80000"/>
+  </cs:variation>
+  <cs:variation>
+    <a:lumMod val="60000"/>
+    <a:lumOff val="40000"/>
+  </cs:variation>
+  <cs:variation>
+    <a:lumMod val="50000"/>
+  </cs:variation>
+  <cs:variation>
+    <a:lumMod val="70000"/>
+    <a:lumOff val="30000"/>
+  </cs:variation>
+  <cs:variation>
+    <a:lumMod val="70000"/>
+  </cs:variation>
+  <cs:variation>
+    <a:lumMod val="50000"/>
+    <a:lumOff val="50000"/>
+  </cs:variation>
+</cs:colorStyle>
+</file>
+
+<file path=ppt/charts/colors8.xml><?xml version="1.0" encoding="utf-8"?>
+<cs:colorStyle xmlns:cs="http://schemas.microsoft.com/office/drawing/2012/chartStyle" xmlns:a="http://schemas.openxmlformats.org/drawingml/2006/main" meth="cycle" id="10">
+  <a:schemeClr val="accent1"/>
+  <a:schemeClr val="accent2"/>
+  <a:schemeClr val="accent3"/>
+  <a:schemeClr val="accent4"/>
+  <a:schemeClr val="accent5"/>
+  <a:schemeClr val="accent6"/>
+  <cs:variation/>
+  <cs:variation>
+    <a:lumMod val="60000"/>
+  </cs:variation>
+  <cs:variation>
+    <a:lumMod val="80000"/>
+    <a:lumOff val="20000"/>
+  </cs:variation>
+  <cs:variation>
+    <a:lumMod val="80000"/>
+  </cs:variation>
+  <cs:variation>
+    <a:lumMod val="60000"/>
+    <a:lumOff val="40000"/>
+  </cs:variation>
+  <cs:variation>
+    <a:lumMod val="50000"/>
+  </cs:variation>
+  <cs:variation>
+    <a:lumMod val="70000"/>
+    <a:lumOff val="30000"/>
+  </cs:variation>
+  <cs:variation>
+    <a:lumMod val="70000"/>
+  </cs:variation>
+  <cs:variation>
+    <a:lumMod val="50000"/>
+    <a:lumOff val="50000"/>
+  </cs:variation>
+</cs:colorStyle>
+</file>
+
 <file path=ppt/charts/style1.xml><?xml version="1.0" encoding="utf-8"?>
 <cs:chartStyle xmlns:cs="http://schemas.microsoft.com/office/drawing/2012/chartStyle" xmlns:a="http://schemas.openxmlformats.org/drawingml/2006/main" id="201">
   <cs:axisTitle>
@@ -6687,6 +7487,1044 @@
             <a:lumOff val="85000"/>
           </a:schemeClr>
         </a:solidFill>
+      </a:ln>
+    </cs:spPr>
+  </cs:upBar>
+  <cs:valueAxis>
+    <cs:lnRef idx="0"/>
+    <cs:fillRef idx="0"/>
+    <cs:effectRef idx="0"/>
+    <cs:fontRef idx="minor">
+      <a:schemeClr val="tx1">
+        <a:lumMod val="65000"/>
+        <a:lumOff val="35000"/>
+      </a:schemeClr>
+    </cs:fontRef>
+    <cs:defRPr sz="1197" kern="1200"/>
+  </cs:valueAxis>
+  <cs:wall>
+    <cs:lnRef idx="0"/>
+    <cs:fillRef idx="0"/>
+    <cs:effectRef idx="0"/>
+    <cs:fontRef idx="minor">
+      <a:schemeClr val="tx1"/>
+    </cs:fontRef>
+    <cs:spPr>
+      <a:noFill/>
+      <a:ln>
+        <a:noFill/>
+      </a:ln>
+    </cs:spPr>
+  </cs:wall>
+</cs:chartStyle>
+</file>
+
+<file path=ppt/charts/style7.xml><?xml version="1.0" encoding="utf-8"?>
+<cs:chartStyle xmlns:cs="http://schemas.microsoft.com/office/drawing/2012/chartStyle" xmlns:a="http://schemas.openxmlformats.org/drawingml/2006/main" id="251">
+  <cs:axisTitle>
+    <cs:lnRef idx="0"/>
+    <cs:fillRef idx="0"/>
+    <cs:effectRef idx="0"/>
+    <cs:fontRef idx="minor">
+      <a:schemeClr val="tx1">
+        <a:lumMod val="65000"/>
+        <a:lumOff val="35000"/>
+      </a:schemeClr>
+    </cs:fontRef>
+    <cs:defRPr sz="1330" kern="1200"/>
+  </cs:axisTitle>
+  <cs:categoryAxis>
+    <cs:lnRef idx="0"/>
+    <cs:fillRef idx="0"/>
+    <cs:effectRef idx="0"/>
+    <cs:fontRef idx="minor">
+      <a:schemeClr val="tx1">
+        <a:lumMod val="65000"/>
+        <a:lumOff val="35000"/>
+      </a:schemeClr>
+    </cs:fontRef>
+    <cs:spPr>
+      <a:ln w="9525" cap="flat" cmpd="sng" algn="ctr">
+        <a:solidFill>
+          <a:schemeClr val="tx1">
+            <a:lumMod val="15000"/>
+            <a:lumOff val="85000"/>
+          </a:schemeClr>
+        </a:solidFill>
+        <a:round/>
+      </a:ln>
+    </cs:spPr>
+    <cs:defRPr sz="1197" kern="1200"/>
+  </cs:categoryAxis>
+  <cs:chartArea mods="allowNoFillOverride allowNoLineOverride">
+    <cs:lnRef idx="0"/>
+    <cs:fillRef idx="0"/>
+    <cs:effectRef idx="0"/>
+    <cs:fontRef idx="minor">
+      <a:schemeClr val="tx1"/>
+    </cs:fontRef>
+    <cs:spPr>
+      <a:solidFill>
+        <a:schemeClr val="bg1"/>
+      </a:solidFill>
+      <a:ln w="9525" cap="flat" cmpd="sng" algn="ctr">
+        <a:solidFill>
+          <a:schemeClr val="tx1">
+            <a:lumMod val="15000"/>
+            <a:lumOff val="85000"/>
+          </a:schemeClr>
+        </a:solidFill>
+        <a:round/>
+      </a:ln>
+    </cs:spPr>
+    <cs:defRPr sz="1197" kern="1200"/>
+  </cs:chartArea>
+  <cs:dataLabel>
+    <cs:lnRef idx="0"/>
+    <cs:fillRef idx="0"/>
+    <cs:effectRef idx="0"/>
+    <cs:fontRef idx="minor">
+      <a:schemeClr val="tx1">
+        <a:lumMod val="75000"/>
+        <a:lumOff val="25000"/>
+      </a:schemeClr>
+    </cs:fontRef>
+    <cs:defRPr sz="1197" kern="1200"/>
+  </cs:dataLabel>
+  <cs:dataLabelCallout>
+    <cs:lnRef idx="0"/>
+    <cs:fillRef idx="0"/>
+    <cs:effectRef idx="0"/>
+    <cs:fontRef idx="minor">
+      <a:schemeClr val="dk1">
+        <a:lumMod val="65000"/>
+        <a:lumOff val="35000"/>
+      </a:schemeClr>
+    </cs:fontRef>
+    <cs:spPr>
+      <a:solidFill>
+        <a:schemeClr val="lt1"/>
+      </a:solidFill>
+      <a:ln>
+        <a:solidFill>
+          <a:schemeClr val="dk1">
+            <a:lumMod val="25000"/>
+            <a:lumOff val="75000"/>
+          </a:schemeClr>
+        </a:solidFill>
+      </a:ln>
+    </cs:spPr>
+    <cs:defRPr sz="1197" kern="1200"/>
+    <cs:bodyPr rot="0" spcFirstLastPara="1" vertOverflow="clip" horzOverflow="clip" vert="horz" wrap="square" lIns="36576" tIns="18288" rIns="36576" bIns="18288" anchor="ctr" anchorCtr="1">
+      <a:spAutoFit/>
+    </cs:bodyPr>
+  </cs:dataLabelCallout>
+  <cs:dataPoint>
+    <cs:lnRef idx="0"/>
+    <cs:fillRef idx="1">
+      <cs:styleClr val="auto"/>
+    </cs:fillRef>
+    <cs:effectRef idx="0"/>
+    <cs:fontRef idx="minor">
+      <a:schemeClr val="tx1"/>
+    </cs:fontRef>
+    <cs:spPr>
+      <a:ln w="19050">
+        <a:solidFill>
+          <a:schemeClr val="lt1"/>
+        </a:solidFill>
+      </a:ln>
+    </cs:spPr>
+  </cs:dataPoint>
+  <cs:dataPoint3D>
+    <cs:lnRef idx="0"/>
+    <cs:fillRef idx="1">
+      <cs:styleClr val="auto"/>
+    </cs:fillRef>
+    <cs:effectRef idx="0"/>
+    <cs:fontRef idx="minor">
+      <a:schemeClr val="tx1"/>
+    </cs:fontRef>
+    <cs:spPr>
+      <a:ln w="25400">
+        <a:solidFill>
+          <a:schemeClr val="lt1"/>
+        </a:solidFill>
+      </a:ln>
+    </cs:spPr>
+  </cs:dataPoint3D>
+  <cs:dataPointLine>
+    <cs:lnRef idx="0">
+      <cs:styleClr val="auto"/>
+    </cs:lnRef>
+    <cs:fillRef idx="0"/>
+    <cs:effectRef idx="0"/>
+    <cs:fontRef idx="minor">
+      <a:schemeClr val="tx1"/>
+    </cs:fontRef>
+    <cs:spPr>
+      <a:ln w="28575" cap="rnd">
+        <a:solidFill>
+          <a:schemeClr val="phClr"/>
+        </a:solidFill>
+        <a:round/>
+      </a:ln>
+    </cs:spPr>
+  </cs:dataPointLine>
+  <cs:dataPointMarker>
+    <cs:lnRef idx="0">
+      <cs:styleClr val="auto"/>
+    </cs:lnRef>
+    <cs:fillRef idx="1">
+      <cs:styleClr val="auto"/>
+    </cs:fillRef>
+    <cs:effectRef idx="0"/>
+    <cs:fontRef idx="minor">
+      <a:schemeClr val="tx1"/>
+    </cs:fontRef>
+    <cs:spPr>
+      <a:ln w="9525">
+        <a:solidFill>
+          <a:schemeClr val="phClr"/>
+        </a:solidFill>
+      </a:ln>
+    </cs:spPr>
+  </cs:dataPointMarker>
+  <cs:dataPointMarkerLayout symbol="circle" size="5"/>
+  <cs:dataPointWireframe>
+    <cs:lnRef idx="0">
+      <cs:styleClr val="auto"/>
+    </cs:lnRef>
+    <cs:fillRef idx="0"/>
+    <cs:effectRef idx="0"/>
+    <cs:fontRef idx="minor">
+      <a:schemeClr val="tx1"/>
+    </cs:fontRef>
+    <cs:spPr>
+      <a:ln w="9525" cap="rnd">
+        <a:solidFill>
+          <a:schemeClr val="phClr"/>
+        </a:solidFill>
+        <a:round/>
+      </a:ln>
+    </cs:spPr>
+  </cs:dataPointWireframe>
+  <cs:dataTable>
+    <cs:lnRef idx="0"/>
+    <cs:fillRef idx="0"/>
+    <cs:effectRef idx="0"/>
+    <cs:fontRef idx="minor">
+      <a:schemeClr val="tx1">
+        <a:lumMod val="65000"/>
+        <a:lumOff val="35000"/>
+      </a:schemeClr>
+    </cs:fontRef>
+    <cs:spPr>
+      <a:noFill/>
+      <a:ln w="9525" cap="flat" cmpd="sng" algn="ctr">
+        <a:solidFill>
+          <a:schemeClr val="tx1">
+            <a:lumMod val="15000"/>
+            <a:lumOff val="85000"/>
+          </a:schemeClr>
+        </a:solidFill>
+        <a:round/>
+      </a:ln>
+    </cs:spPr>
+    <cs:defRPr sz="1197" kern="1200"/>
+  </cs:dataTable>
+  <cs:downBar>
+    <cs:lnRef idx="0"/>
+    <cs:fillRef idx="0"/>
+    <cs:effectRef idx="0"/>
+    <cs:fontRef idx="minor">
+      <a:schemeClr val="tx1"/>
+    </cs:fontRef>
+    <cs:spPr>
+      <a:solidFill>
+        <a:schemeClr val="dk1">
+          <a:lumMod val="75000"/>
+          <a:lumOff val="25000"/>
+        </a:schemeClr>
+      </a:solidFill>
+      <a:ln w="9525" cap="flat" cmpd="sng" algn="ctr">
+        <a:solidFill>
+          <a:schemeClr val="tx1">
+            <a:lumMod val="65000"/>
+            <a:lumOff val="35000"/>
+          </a:schemeClr>
+        </a:solidFill>
+        <a:round/>
+      </a:ln>
+    </cs:spPr>
+  </cs:downBar>
+  <cs:dropLine>
+    <cs:lnRef idx="0"/>
+    <cs:fillRef idx="0"/>
+    <cs:effectRef idx="0"/>
+    <cs:fontRef idx="minor">
+      <a:schemeClr val="tx1"/>
+    </cs:fontRef>
+    <cs:spPr>
+      <a:ln w="9525" cap="flat" cmpd="sng" algn="ctr">
+        <a:solidFill>
+          <a:schemeClr val="tx1">
+            <a:lumMod val="35000"/>
+            <a:lumOff val="65000"/>
+          </a:schemeClr>
+        </a:solidFill>
+        <a:round/>
+      </a:ln>
+    </cs:spPr>
+  </cs:dropLine>
+  <cs:errorBar>
+    <cs:lnRef idx="0"/>
+    <cs:fillRef idx="0"/>
+    <cs:effectRef idx="0"/>
+    <cs:fontRef idx="minor">
+      <a:schemeClr val="tx1"/>
+    </cs:fontRef>
+    <cs:spPr>
+      <a:ln w="9525" cap="flat" cmpd="sng" algn="ctr">
+        <a:solidFill>
+          <a:schemeClr val="tx1">
+            <a:lumMod val="65000"/>
+            <a:lumOff val="35000"/>
+          </a:schemeClr>
+        </a:solidFill>
+        <a:round/>
+      </a:ln>
+    </cs:spPr>
+  </cs:errorBar>
+  <cs:floor>
+    <cs:lnRef idx="0"/>
+    <cs:fillRef idx="0"/>
+    <cs:effectRef idx="0"/>
+    <cs:fontRef idx="minor">
+      <a:schemeClr val="tx1"/>
+    </cs:fontRef>
+    <cs:spPr>
+      <a:noFill/>
+      <a:ln>
+        <a:noFill/>
+      </a:ln>
+    </cs:spPr>
+  </cs:floor>
+  <cs:gridlineMajor>
+    <cs:lnRef idx="0"/>
+    <cs:fillRef idx="0"/>
+    <cs:effectRef idx="0"/>
+    <cs:fontRef idx="minor">
+      <a:schemeClr val="tx1"/>
+    </cs:fontRef>
+    <cs:spPr>
+      <a:ln w="9525" cap="flat" cmpd="sng" algn="ctr">
+        <a:solidFill>
+          <a:schemeClr val="tx1">
+            <a:lumMod val="15000"/>
+            <a:lumOff val="85000"/>
+          </a:schemeClr>
+        </a:solidFill>
+        <a:round/>
+      </a:ln>
+    </cs:spPr>
+  </cs:gridlineMajor>
+  <cs:gridlineMinor>
+    <cs:lnRef idx="0"/>
+    <cs:fillRef idx="0"/>
+    <cs:effectRef idx="0"/>
+    <cs:fontRef idx="minor">
+      <a:schemeClr val="tx1"/>
+    </cs:fontRef>
+    <cs:spPr>
+      <a:ln w="9525" cap="flat" cmpd="sng" algn="ctr">
+        <a:solidFill>
+          <a:schemeClr val="tx1">
+            <a:lumMod val="5000"/>
+            <a:lumOff val="95000"/>
+          </a:schemeClr>
+        </a:solidFill>
+        <a:round/>
+      </a:ln>
+    </cs:spPr>
+  </cs:gridlineMinor>
+  <cs:hiLoLine>
+    <cs:lnRef idx="0"/>
+    <cs:fillRef idx="0"/>
+    <cs:effectRef idx="0"/>
+    <cs:fontRef idx="minor">
+      <a:schemeClr val="tx1"/>
+    </cs:fontRef>
+    <cs:spPr>
+      <a:ln w="9525" cap="flat" cmpd="sng" algn="ctr">
+        <a:solidFill>
+          <a:schemeClr val="tx1">
+            <a:lumMod val="50000"/>
+            <a:lumOff val="50000"/>
+          </a:schemeClr>
+        </a:solidFill>
+        <a:round/>
+      </a:ln>
+    </cs:spPr>
+  </cs:hiLoLine>
+  <cs:leaderLine>
+    <cs:lnRef idx="0"/>
+    <cs:fillRef idx="0"/>
+    <cs:effectRef idx="0"/>
+    <cs:fontRef idx="minor">
+      <a:schemeClr val="tx1"/>
+    </cs:fontRef>
+    <cs:spPr>
+      <a:ln w="9525" cap="flat" cmpd="sng" algn="ctr">
+        <a:solidFill>
+          <a:schemeClr val="tx1">
+            <a:lumMod val="35000"/>
+            <a:lumOff val="65000"/>
+          </a:schemeClr>
+        </a:solidFill>
+        <a:round/>
+      </a:ln>
+    </cs:spPr>
+  </cs:leaderLine>
+  <cs:legend>
+    <cs:lnRef idx="0"/>
+    <cs:fillRef idx="0"/>
+    <cs:effectRef idx="0"/>
+    <cs:fontRef idx="minor">
+      <a:schemeClr val="tx1">
+        <a:lumMod val="65000"/>
+        <a:lumOff val="35000"/>
+      </a:schemeClr>
+    </cs:fontRef>
+    <cs:defRPr sz="1197" kern="1200"/>
+  </cs:legend>
+  <cs:plotArea mods="allowNoFillOverride allowNoLineOverride">
+    <cs:lnRef idx="0"/>
+    <cs:fillRef idx="0"/>
+    <cs:effectRef idx="0"/>
+    <cs:fontRef idx="minor">
+      <a:schemeClr val="tx1"/>
+    </cs:fontRef>
+  </cs:plotArea>
+  <cs:plotArea3D mods="allowNoFillOverride allowNoLineOverride">
+    <cs:lnRef idx="0"/>
+    <cs:fillRef idx="0"/>
+    <cs:effectRef idx="0"/>
+    <cs:fontRef idx="minor">
+      <a:schemeClr val="tx1"/>
+    </cs:fontRef>
+  </cs:plotArea3D>
+  <cs:seriesAxis>
+    <cs:lnRef idx="0"/>
+    <cs:fillRef idx="0"/>
+    <cs:effectRef idx="0"/>
+    <cs:fontRef idx="minor">
+      <a:schemeClr val="tx1">
+        <a:lumMod val="65000"/>
+        <a:lumOff val="35000"/>
+      </a:schemeClr>
+    </cs:fontRef>
+    <cs:defRPr sz="1197" kern="1200"/>
+  </cs:seriesAxis>
+  <cs:seriesLine>
+    <cs:lnRef idx="0"/>
+    <cs:fillRef idx="0"/>
+    <cs:effectRef idx="0"/>
+    <cs:fontRef idx="minor">
+      <a:schemeClr val="tx1"/>
+    </cs:fontRef>
+    <cs:spPr>
+      <a:ln w="9525" cap="flat" cmpd="sng" algn="ctr">
+        <a:solidFill>
+          <a:schemeClr val="tx1">
+            <a:lumMod val="35000"/>
+            <a:lumOff val="65000"/>
+          </a:schemeClr>
+        </a:solidFill>
+        <a:round/>
+      </a:ln>
+    </cs:spPr>
+  </cs:seriesLine>
+  <cs:title>
+    <cs:lnRef idx="0"/>
+    <cs:fillRef idx="0"/>
+    <cs:effectRef idx="0"/>
+    <cs:fontRef idx="minor">
+      <a:schemeClr val="tx1">
+        <a:lumMod val="65000"/>
+        <a:lumOff val="35000"/>
+      </a:schemeClr>
+    </cs:fontRef>
+    <cs:defRPr sz="1862" b="0" kern="1200" spc="0" baseline="0"/>
+  </cs:title>
+  <cs:trendline>
+    <cs:lnRef idx="0">
+      <cs:styleClr val="auto"/>
+    </cs:lnRef>
+    <cs:fillRef idx="0"/>
+    <cs:effectRef idx="0"/>
+    <cs:fontRef idx="minor">
+      <a:schemeClr val="tx1"/>
+    </cs:fontRef>
+    <cs:spPr>
+      <a:ln w="19050" cap="rnd">
+        <a:solidFill>
+          <a:schemeClr val="phClr"/>
+        </a:solidFill>
+        <a:prstDash val="sysDot"/>
+      </a:ln>
+    </cs:spPr>
+  </cs:trendline>
+  <cs:trendlineLabel>
+    <cs:lnRef idx="0"/>
+    <cs:fillRef idx="0"/>
+    <cs:effectRef idx="0"/>
+    <cs:fontRef idx="minor">
+      <a:schemeClr val="tx1">
+        <a:lumMod val="65000"/>
+        <a:lumOff val="35000"/>
+      </a:schemeClr>
+    </cs:fontRef>
+    <cs:defRPr sz="1197" kern="1200"/>
+  </cs:trendlineLabel>
+  <cs:upBar>
+    <cs:lnRef idx="0"/>
+    <cs:fillRef idx="0"/>
+    <cs:effectRef idx="0"/>
+    <cs:fontRef idx="minor">
+      <a:schemeClr val="tx1"/>
+    </cs:fontRef>
+    <cs:spPr>
+      <a:solidFill>
+        <a:schemeClr val="lt1"/>
+      </a:solidFill>
+      <a:ln w="9525" cap="flat" cmpd="sng" algn="ctr">
+        <a:solidFill>
+          <a:schemeClr val="tx1">
+            <a:lumMod val="65000"/>
+            <a:lumOff val="35000"/>
+          </a:schemeClr>
+        </a:solidFill>
+        <a:round/>
+      </a:ln>
+    </cs:spPr>
+  </cs:upBar>
+  <cs:valueAxis>
+    <cs:lnRef idx="0"/>
+    <cs:fillRef idx="0"/>
+    <cs:effectRef idx="0"/>
+    <cs:fontRef idx="minor">
+      <a:schemeClr val="tx1">
+        <a:lumMod val="65000"/>
+        <a:lumOff val="35000"/>
+      </a:schemeClr>
+    </cs:fontRef>
+    <cs:defRPr sz="1197" kern="1200"/>
+  </cs:valueAxis>
+  <cs:wall>
+    <cs:lnRef idx="0"/>
+    <cs:fillRef idx="0"/>
+    <cs:effectRef idx="0"/>
+    <cs:fontRef idx="minor">
+      <a:schemeClr val="tx1"/>
+    </cs:fontRef>
+    <cs:spPr>
+      <a:noFill/>
+      <a:ln>
+        <a:noFill/>
+      </a:ln>
+    </cs:spPr>
+  </cs:wall>
+</cs:chartStyle>
+</file>
+
+<file path=ppt/charts/style8.xml><?xml version="1.0" encoding="utf-8"?>
+<cs:chartStyle xmlns:cs="http://schemas.microsoft.com/office/drawing/2012/chartStyle" xmlns:a="http://schemas.openxmlformats.org/drawingml/2006/main" id="251">
+  <cs:axisTitle>
+    <cs:lnRef idx="0"/>
+    <cs:fillRef idx="0"/>
+    <cs:effectRef idx="0"/>
+    <cs:fontRef idx="minor">
+      <a:schemeClr val="tx1">
+        <a:lumMod val="65000"/>
+        <a:lumOff val="35000"/>
+      </a:schemeClr>
+    </cs:fontRef>
+    <cs:defRPr sz="1330" kern="1200"/>
+  </cs:axisTitle>
+  <cs:categoryAxis>
+    <cs:lnRef idx="0"/>
+    <cs:fillRef idx="0"/>
+    <cs:effectRef idx="0"/>
+    <cs:fontRef idx="minor">
+      <a:schemeClr val="tx1">
+        <a:lumMod val="65000"/>
+        <a:lumOff val="35000"/>
+      </a:schemeClr>
+    </cs:fontRef>
+    <cs:spPr>
+      <a:ln w="9525" cap="flat" cmpd="sng" algn="ctr">
+        <a:solidFill>
+          <a:schemeClr val="tx1">
+            <a:lumMod val="15000"/>
+            <a:lumOff val="85000"/>
+          </a:schemeClr>
+        </a:solidFill>
+        <a:round/>
+      </a:ln>
+    </cs:spPr>
+    <cs:defRPr sz="1197" kern="1200"/>
+  </cs:categoryAxis>
+  <cs:chartArea mods="allowNoFillOverride allowNoLineOverride">
+    <cs:lnRef idx="0"/>
+    <cs:fillRef idx="0"/>
+    <cs:effectRef idx="0"/>
+    <cs:fontRef idx="minor">
+      <a:schemeClr val="tx1"/>
+    </cs:fontRef>
+    <cs:spPr>
+      <a:solidFill>
+        <a:schemeClr val="bg1"/>
+      </a:solidFill>
+      <a:ln w="9525" cap="flat" cmpd="sng" algn="ctr">
+        <a:solidFill>
+          <a:schemeClr val="tx1">
+            <a:lumMod val="15000"/>
+            <a:lumOff val="85000"/>
+          </a:schemeClr>
+        </a:solidFill>
+        <a:round/>
+      </a:ln>
+    </cs:spPr>
+    <cs:defRPr sz="1197" kern="1200"/>
+  </cs:chartArea>
+  <cs:dataLabel>
+    <cs:lnRef idx="0"/>
+    <cs:fillRef idx="0"/>
+    <cs:effectRef idx="0"/>
+    <cs:fontRef idx="minor">
+      <a:schemeClr val="tx1">
+        <a:lumMod val="75000"/>
+        <a:lumOff val="25000"/>
+      </a:schemeClr>
+    </cs:fontRef>
+    <cs:defRPr sz="1197" kern="1200"/>
+  </cs:dataLabel>
+  <cs:dataLabelCallout>
+    <cs:lnRef idx="0"/>
+    <cs:fillRef idx="0"/>
+    <cs:effectRef idx="0"/>
+    <cs:fontRef idx="minor">
+      <a:schemeClr val="dk1">
+        <a:lumMod val="65000"/>
+        <a:lumOff val="35000"/>
+      </a:schemeClr>
+    </cs:fontRef>
+    <cs:spPr>
+      <a:solidFill>
+        <a:schemeClr val="lt1"/>
+      </a:solidFill>
+      <a:ln>
+        <a:solidFill>
+          <a:schemeClr val="dk1">
+            <a:lumMod val="25000"/>
+            <a:lumOff val="75000"/>
+          </a:schemeClr>
+        </a:solidFill>
+      </a:ln>
+    </cs:spPr>
+    <cs:defRPr sz="1197" kern="1200"/>
+    <cs:bodyPr rot="0" spcFirstLastPara="1" vertOverflow="clip" horzOverflow="clip" vert="horz" wrap="square" lIns="36576" tIns="18288" rIns="36576" bIns="18288" anchor="ctr" anchorCtr="1">
+      <a:spAutoFit/>
+    </cs:bodyPr>
+  </cs:dataLabelCallout>
+  <cs:dataPoint>
+    <cs:lnRef idx="0"/>
+    <cs:fillRef idx="1">
+      <cs:styleClr val="auto"/>
+    </cs:fillRef>
+    <cs:effectRef idx="0"/>
+    <cs:fontRef idx="minor">
+      <a:schemeClr val="tx1"/>
+    </cs:fontRef>
+    <cs:spPr>
+      <a:ln w="19050">
+        <a:solidFill>
+          <a:schemeClr val="lt1"/>
+        </a:solidFill>
+      </a:ln>
+    </cs:spPr>
+  </cs:dataPoint>
+  <cs:dataPoint3D>
+    <cs:lnRef idx="0"/>
+    <cs:fillRef idx="1">
+      <cs:styleClr val="auto"/>
+    </cs:fillRef>
+    <cs:effectRef idx="0"/>
+    <cs:fontRef idx="minor">
+      <a:schemeClr val="tx1"/>
+    </cs:fontRef>
+    <cs:spPr>
+      <a:ln w="25400">
+        <a:solidFill>
+          <a:schemeClr val="lt1"/>
+        </a:solidFill>
+      </a:ln>
+    </cs:spPr>
+  </cs:dataPoint3D>
+  <cs:dataPointLine>
+    <cs:lnRef idx="0">
+      <cs:styleClr val="auto"/>
+    </cs:lnRef>
+    <cs:fillRef idx="0"/>
+    <cs:effectRef idx="0"/>
+    <cs:fontRef idx="minor">
+      <a:schemeClr val="tx1"/>
+    </cs:fontRef>
+    <cs:spPr>
+      <a:ln w="28575" cap="rnd">
+        <a:solidFill>
+          <a:schemeClr val="phClr"/>
+        </a:solidFill>
+        <a:round/>
+      </a:ln>
+    </cs:spPr>
+  </cs:dataPointLine>
+  <cs:dataPointMarker>
+    <cs:lnRef idx="0">
+      <cs:styleClr val="auto"/>
+    </cs:lnRef>
+    <cs:fillRef idx="1">
+      <cs:styleClr val="auto"/>
+    </cs:fillRef>
+    <cs:effectRef idx="0"/>
+    <cs:fontRef idx="minor">
+      <a:schemeClr val="tx1"/>
+    </cs:fontRef>
+    <cs:spPr>
+      <a:ln w="9525">
+        <a:solidFill>
+          <a:schemeClr val="phClr"/>
+        </a:solidFill>
+      </a:ln>
+    </cs:spPr>
+  </cs:dataPointMarker>
+  <cs:dataPointMarkerLayout symbol="circle" size="5"/>
+  <cs:dataPointWireframe>
+    <cs:lnRef idx="0">
+      <cs:styleClr val="auto"/>
+    </cs:lnRef>
+    <cs:fillRef idx="0"/>
+    <cs:effectRef idx="0"/>
+    <cs:fontRef idx="minor">
+      <a:schemeClr val="tx1"/>
+    </cs:fontRef>
+    <cs:spPr>
+      <a:ln w="9525" cap="rnd">
+        <a:solidFill>
+          <a:schemeClr val="phClr"/>
+        </a:solidFill>
+        <a:round/>
+      </a:ln>
+    </cs:spPr>
+  </cs:dataPointWireframe>
+  <cs:dataTable>
+    <cs:lnRef idx="0"/>
+    <cs:fillRef idx="0"/>
+    <cs:effectRef idx="0"/>
+    <cs:fontRef idx="minor">
+      <a:schemeClr val="tx1">
+        <a:lumMod val="65000"/>
+        <a:lumOff val="35000"/>
+      </a:schemeClr>
+    </cs:fontRef>
+    <cs:spPr>
+      <a:noFill/>
+      <a:ln w="9525" cap="flat" cmpd="sng" algn="ctr">
+        <a:solidFill>
+          <a:schemeClr val="tx1">
+            <a:lumMod val="15000"/>
+            <a:lumOff val="85000"/>
+          </a:schemeClr>
+        </a:solidFill>
+        <a:round/>
+      </a:ln>
+    </cs:spPr>
+    <cs:defRPr sz="1197" kern="1200"/>
+  </cs:dataTable>
+  <cs:downBar>
+    <cs:lnRef idx="0"/>
+    <cs:fillRef idx="0"/>
+    <cs:effectRef idx="0"/>
+    <cs:fontRef idx="minor">
+      <a:schemeClr val="tx1"/>
+    </cs:fontRef>
+    <cs:spPr>
+      <a:solidFill>
+        <a:schemeClr val="dk1">
+          <a:lumMod val="75000"/>
+          <a:lumOff val="25000"/>
+        </a:schemeClr>
+      </a:solidFill>
+      <a:ln w="9525" cap="flat" cmpd="sng" algn="ctr">
+        <a:solidFill>
+          <a:schemeClr val="tx1">
+            <a:lumMod val="65000"/>
+            <a:lumOff val="35000"/>
+          </a:schemeClr>
+        </a:solidFill>
+        <a:round/>
+      </a:ln>
+    </cs:spPr>
+  </cs:downBar>
+  <cs:dropLine>
+    <cs:lnRef idx="0"/>
+    <cs:fillRef idx="0"/>
+    <cs:effectRef idx="0"/>
+    <cs:fontRef idx="minor">
+      <a:schemeClr val="tx1"/>
+    </cs:fontRef>
+    <cs:spPr>
+      <a:ln w="9525" cap="flat" cmpd="sng" algn="ctr">
+        <a:solidFill>
+          <a:schemeClr val="tx1">
+            <a:lumMod val="35000"/>
+            <a:lumOff val="65000"/>
+          </a:schemeClr>
+        </a:solidFill>
+        <a:round/>
+      </a:ln>
+    </cs:spPr>
+  </cs:dropLine>
+  <cs:errorBar>
+    <cs:lnRef idx="0"/>
+    <cs:fillRef idx="0"/>
+    <cs:effectRef idx="0"/>
+    <cs:fontRef idx="minor">
+      <a:schemeClr val="tx1"/>
+    </cs:fontRef>
+    <cs:spPr>
+      <a:ln w="9525" cap="flat" cmpd="sng" algn="ctr">
+        <a:solidFill>
+          <a:schemeClr val="tx1">
+            <a:lumMod val="65000"/>
+            <a:lumOff val="35000"/>
+          </a:schemeClr>
+        </a:solidFill>
+        <a:round/>
+      </a:ln>
+    </cs:spPr>
+  </cs:errorBar>
+  <cs:floor>
+    <cs:lnRef idx="0"/>
+    <cs:fillRef idx="0"/>
+    <cs:effectRef idx="0"/>
+    <cs:fontRef idx="minor">
+      <a:schemeClr val="tx1"/>
+    </cs:fontRef>
+    <cs:spPr>
+      <a:noFill/>
+      <a:ln>
+        <a:noFill/>
+      </a:ln>
+    </cs:spPr>
+  </cs:floor>
+  <cs:gridlineMajor>
+    <cs:lnRef idx="0"/>
+    <cs:fillRef idx="0"/>
+    <cs:effectRef idx="0"/>
+    <cs:fontRef idx="minor">
+      <a:schemeClr val="tx1"/>
+    </cs:fontRef>
+    <cs:spPr>
+      <a:ln w="9525" cap="flat" cmpd="sng" algn="ctr">
+        <a:solidFill>
+          <a:schemeClr val="tx1">
+            <a:lumMod val="15000"/>
+            <a:lumOff val="85000"/>
+          </a:schemeClr>
+        </a:solidFill>
+        <a:round/>
+      </a:ln>
+    </cs:spPr>
+  </cs:gridlineMajor>
+  <cs:gridlineMinor>
+    <cs:lnRef idx="0"/>
+    <cs:fillRef idx="0"/>
+    <cs:effectRef idx="0"/>
+    <cs:fontRef idx="minor">
+      <a:schemeClr val="tx1"/>
+    </cs:fontRef>
+    <cs:spPr>
+      <a:ln w="9525" cap="flat" cmpd="sng" algn="ctr">
+        <a:solidFill>
+          <a:schemeClr val="tx1">
+            <a:lumMod val="5000"/>
+            <a:lumOff val="95000"/>
+          </a:schemeClr>
+        </a:solidFill>
+        <a:round/>
+      </a:ln>
+    </cs:spPr>
+  </cs:gridlineMinor>
+  <cs:hiLoLine>
+    <cs:lnRef idx="0"/>
+    <cs:fillRef idx="0"/>
+    <cs:effectRef idx="0"/>
+    <cs:fontRef idx="minor">
+      <a:schemeClr val="tx1"/>
+    </cs:fontRef>
+    <cs:spPr>
+      <a:ln w="9525" cap="flat" cmpd="sng" algn="ctr">
+        <a:solidFill>
+          <a:schemeClr val="tx1">
+            <a:lumMod val="50000"/>
+            <a:lumOff val="50000"/>
+          </a:schemeClr>
+        </a:solidFill>
+        <a:round/>
+      </a:ln>
+    </cs:spPr>
+  </cs:hiLoLine>
+  <cs:leaderLine>
+    <cs:lnRef idx="0"/>
+    <cs:fillRef idx="0"/>
+    <cs:effectRef idx="0"/>
+    <cs:fontRef idx="minor">
+      <a:schemeClr val="tx1"/>
+    </cs:fontRef>
+    <cs:spPr>
+      <a:ln w="9525" cap="flat" cmpd="sng" algn="ctr">
+        <a:solidFill>
+          <a:schemeClr val="tx1">
+            <a:lumMod val="35000"/>
+            <a:lumOff val="65000"/>
+          </a:schemeClr>
+        </a:solidFill>
+        <a:round/>
+      </a:ln>
+    </cs:spPr>
+  </cs:leaderLine>
+  <cs:legend>
+    <cs:lnRef idx="0"/>
+    <cs:fillRef idx="0"/>
+    <cs:effectRef idx="0"/>
+    <cs:fontRef idx="minor">
+      <a:schemeClr val="tx1">
+        <a:lumMod val="65000"/>
+        <a:lumOff val="35000"/>
+      </a:schemeClr>
+    </cs:fontRef>
+    <cs:defRPr sz="1197" kern="1200"/>
+  </cs:legend>
+  <cs:plotArea mods="allowNoFillOverride allowNoLineOverride">
+    <cs:lnRef idx="0"/>
+    <cs:fillRef idx="0"/>
+    <cs:effectRef idx="0"/>
+    <cs:fontRef idx="minor">
+      <a:schemeClr val="tx1"/>
+    </cs:fontRef>
+  </cs:plotArea>
+  <cs:plotArea3D mods="allowNoFillOverride allowNoLineOverride">
+    <cs:lnRef idx="0"/>
+    <cs:fillRef idx="0"/>
+    <cs:effectRef idx="0"/>
+    <cs:fontRef idx="minor">
+      <a:schemeClr val="tx1"/>
+    </cs:fontRef>
+  </cs:plotArea3D>
+  <cs:seriesAxis>
+    <cs:lnRef idx="0"/>
+    <cs:fillRef idx="0"/>
+    <cs:effectRef idx="0"/>
+    <cs:fontRef idx="minor">
+      <a:schemeClr val="tx1">
+        <a:lumMod val="65000"/>
+        <a:lumOff val="35000"/>
+      </a:schemeClr>
+    </cs:fontRef>
+    <cs:defRPr sz="1197" kern="1200"/>
+  </cs:seriesAxis>
+  <cs:seriesLine>
+    <cs:lnRef idx="0"/>
+    <cs:fillRef idx="0"/>
+    <cs:effectRef idx="0"/>
+    <cs:fontRef idx="minor">
+      <a:schemeClr val="tx1"/>
+    </cs:fontRef>
+    <cs:spPr>
+      <a:ln w="9525" cap="flat" cmpd="sng" algn="ctr">
+        <a:solidFill>
+          <a:schemeClr val="tx1">
+            <a:lumMod val="35000"/>
+            <a:lumOff val="65000"/>
+          </a:schemeClr>
+        </a:solidFill>
+        <a:round/>
+      </a:ln>
+    </cs:spPr>
+  </cs:seriesLine>
+  <cs:title>
+    <cs:lnRef idx="0"/>
+    <cs:fillRef idx="0"/>
+    <cs:effectRef idx="0"/>
+    <cs:fontRef idx="minor">
+      <a:schemeClr val="tx1">
+        <a:lumMod val="65000"/>
+        <a:lumOff val="35000"/>
+      </a:schemeClr>
+    </cs:fontRef>
+    <cs:defRPr sz="1862" b="0" kern="1200" spc="0" baseline="0"/>
+  </cs:title>
+  <cs:trendline>
+    <cs:lnRef idx="0">
+      <cs:styleClr val="auto"/>
+    </cs:lnRef>
+    <cs:fillRef idx="0"/>
+    <cs:effectRef idx="0"/>
+    <cs:fontRef idx="minor">
+      <a:schemeClr val="tx1"/>
+    </cs:fontRef>
+    <cs:spPr>
+      <a:ln w="19050" cap="rnd">
+        <a:solidFill>
+          <a:schemeClr val="phClr"/>
+        </a:solidFill>
+        <a:prstDash val="sysDot"/>
+      </a:ln>
+    </cs:spPr>
+  </cs:trendline>
+  <cs:trendlineLabel>
+    <cs:lnRef idx="0"/>
+    <cs:fillRef idx="0"/>
+    <cs:effectRef idx="0"/>
+    <cs:fontRef idx="minor">
+      <a:schemeClr val="tx1">
+        <a:lumMod val="65000"/>
+        <a:lumOff val="35000"/>
+      </a:schemeClr>
+    </cs:fontRef>
+    <cs:defRPr sz="1197" kern="1200"/>
+  </cs:trendlineLabel>
+  <cs:upBar>
+    <cs:lnRef idx="0"/>
+    <cs:fillRef idx="0"/>
+    <cs:effectRef idx="0"/>
+    <cs:fontRef idx="minor">
+      <a:schemeClr val="tx1"/>
+    </cs:fontRef>
+    <cs:spPr>
+      <a:solidFill>
+        <a:schemeClr val="lt1"/>
+      </a:solidFill>
+      <a:ln w="9525" cap="flat" cmpd="sng" algn="ctr">
+        <a:solidFill>
+          <a:schemeClr val="tx1">
+            <a:lumMod val="65000"/>
+            <a:lumOff val="35000"/>
+          </a:schemeClr>
+        </a:solidFill>
+        <a:round/>
       </a:ln>
     </cs:spPr>
   </cs:upBar>
@@ -12255,6 +14093,205 @@
             <a:spLocks noGrp="1"/>
           </p:cNvSpPr>
           <p:nvPr>
+            <p:ph type="title"/>
+          </p:nvPr>
+        </p:nvSpPr>
+        <p:spPr/>
+        <p:txBody>
+          <a:bodyPr/>
+          <a:lstStyle/>
+          <a:p>
+            <a:r>
+              <a:rPr lang="en-US" altLang="ja-JP" dirty="0" smtClean="0"/>
+              <a:t>Test - Pie chart</a:t>
+            </a:r>
+            <a:endParaRPr kumimoji="1" lang="ja-JP" altLang="en-US" dirty="0"/>
+          </a:p>
+        </p:txBody>
+      </p:sp>
+      <p:graphicFrame>
+        <p:nvGraphicFramePr>
+          <p:cNvPr id="7" name="コンテンツ プレースホルダー 6"/>
+          <p:cNvGraphicFramePr>
+            <a:graphicFrameLocks noGrp="1"/>
+          </p:cNvGraphicFramePr>
+          <p:nvPr>
+            <p:ph idx="1"/>
+            <p:extLst>
+              <p:ext uri="{D42A27DB-BD31-4B8C-83A1-F6EECF244321}">
+                <p14:modId xmlns:p14="http://schemas.microsoft.com/office/powerpoint/2010/main" val="3813082738"/>
+              </p:ext>
+            </p:extLst>
+          </p:nvPr>
+        </p:nvGraphicFramePr>
+        <p:xfrm>
+          <a:off x="838200" y="1825625"/>
+          <a:ext cx="4676775" cy="4351338"/>
+        </p:xfrm>
+        <a:graphic>
+          <a:graphicData uri="http://schemas.openxmlformats.org/drawingml/2006/chart">
+            <c:chart xmlns:c="http://schemas.openxmlformats.org/drawingml/2006/chart" xmlns:r="http://schemas.openxmlformats.org/officeDocument/2006/relationships" r:id="rId2"/>
+          </a:graphicData>
+        </a:graphic>
+      </p:graphicFrame>
+      <p:sp>
+        <p:nvSpPr>
+          <p:cNvPr id="4" name="正方形/長方形 3"/>
+          <p:cNvSpPr/>
+          <p:nvPr/>
+        </p:nvSpPr>
+        <p:spPr>
+          <a:xfrm>
+            <a:off x="0" y="9033"/>
+            <a:ext cx="947695" cy="369332"/>
+          </a:xfrm>
+          <a:prstGeom prst="rect">
+            <a:avLst/>
+          </a:prstGeom>
+        </p:spPr>
+        <p:txBody>
+          <a:bodyPr wrap="none">
+            <a:spAutoFit/>
+          </a:bodyPr>
+          <a:lstStyle/>
+          <a:p>
+            <a:r>
+              <a:rPr lang="en-US" altLang="ja-JP" dirty="0" smtClean="0"/>
+              <a:t>{</a:t>
+            </a:r>
+            <a:r>
+              <a:rPr lang="en-US" altLang="ja-JP" dirty="0" err="1" smtClean="0"/>
+              <a:t>id:pie</a:t>
+            </a:r>
+            <a:r>
+              <a:rPr lang="en-US" altLang="ja-JP" dirty="0" smtClean="0"/>
+              <a:t>}</a:t>
+            </a:r>
+            <a:endParaRPr lang="ja-JP" altLang="en-US" dirty="0"/>
+          </a:p>
+        </p:txBody>
+      </p:sp>
+      <p:sp>
+        <p:nvSpPr>
+          <p:cNvPr id="9" name="テキスト ボックス 8"/>
+          <p:cNvSpPr txBox="1"/>
+          <p:nvPr/>
+        </p:nvSpPr>
+        <p:spPr>
+          <a:xfrm>
+            <a:off x="6224451" y="1690688"/>
+            <a:ext cx="1226618" cy="369332"/>
+          </a:xfrm>
+          <a:prstGeom prst="rect">
+            <a:avLst/>
+          </a:prstGeom>
+          <a:noFill/>
+        </p:spPr>
+        <p:txBody>
+          <a:bodyPr wrap="none" rtlCol="0">
+            <a:spAutoFit/>
+          </a:bodyPr>
+          <a:lstStyle/>
+          <a:p>
+            <a:r>
+              <a:rPr kumimoji="1" lang="en-US" altLang="ja-JP" b="1" dirty="0" smtClean="0"/>
+              <a:t>Expected</a:t>
+            </a:r>
+            <a:endParaRPr kumimoji="1" lang="ja-JP" altLang="en-US" b="1" dirty="0"/>
+          </a:p>
+        </p:txBody>
+      </p:sp>
+      <p:sp>
+        <p:nvSpPr>
+          <p:cNvPr id="10" name="テキスト ボックス 9"/>
+          <p:cNvSpPr txBox="1"/>
+          <p:nvPr/>
+        </p:nvSpPr>
+        <p:spPr>
+          <a:xfrm>
+            <a:off x="838200" y="1690688"/>
+            <a:ext cx="902811" cy="369332"/>
+          </a:xfrm>
+          <a:prstGeom prst="rect">
+            <a:avLst/>
+          </a:prstGeom>
+          <a:noFill/>
+        </p:spPr>
+        <p:txBody>
+          <a:bodyPr wrap="none" rtlCol="0">
+            <a:spAutoFit/>
+          </a:bodyPr>
+          <a:lstStyle/>
+          <a:p>
+            <a:r>
+              <a:rPr kumimoji="1" lang="en-US" altLang="ja-JP" b="1" dirty="0" smtClean="0"/>
+              <a:t>Result</a:t>
+            </a:r>
+            <a:endParaRPr kumimoji="1" lang="ja-JP" altLang="en-US" b="1" dirty="0"/>
+          </a:p>
+        </p:txBody>
+      </p:sp>
+      <p:graphicFrame>
+        <p:nvGraphicFramePr>
+          <p:cNvPr id="11" name="コンテンツ プレースホルダー 6"/>
+          <p:cNvGraphicFramePr>
+            <a:graphicFrameLocks/>
+          </p:cNvGraphicFramePr>
+          <p:nvPr>
+            <p:extLst>
+              <p:ext uri="{D42A27DB-BD31-4B8C-83A1-F6EECF244321}">
+                <p14:modId xmlns:p14="http://schemas.microsoft.com/office/powerpoint/2010/main" val="1388102054"/>
+              </p:ext>
+            </p:extLst>
+          </p:nvPr>
+        </p:nvGraphicFramePr>
+        <p:xfrm>
+          <a:off x="6677025" y="1825625"/>
+          <a:ext cx="4676775" cy="4351338"/>
+        </p:xfrm>
+        <a:graphic>
+          <a:graphicData uri="http://schemas.openxmlformats.org/drawingml/2006/chart">
+            <c:chart xmlns:c="http://schemas.openxmlformats.org/drawingml/2006/chart" xmlns:r="http://schemas.openxmlformats.org/officeDocument/2006/relationships" r:id="rId3"/>
+          </a:graphicData>
+        </a:graphic>
+      </p:graphicFrame>
+    </p:spTree>
+    <p:extLst>
+      <p:ext uri="{BB962C8B-B14F-4D97-AF65-F5344CB8AC3E}">
+        <p14:creationId xmlns:p14="http://schemas.microsoft.com/office/powerpoint/2010/main" val="3056688646"/>
+      </p:ext>
+    </p:extLst>
+  </p:cSld>
+  <p:clrMapOvr>
+    <a:masterClrMapping/>
+  </p:clrMapOvr>
+</p:sld>
+</file>
+
+<file path=ppt/slides/slide8.xml><?xml version="1.0" encoding="utf-8"?>
+<p:sld xmlns:a="http://schemas.openxmlformats.org/drawingml/2006/main" xmlns:r="http://schemas.openxmlformats.org/officeDocument/2006/relationships" xmlns:p="http://schemas.openxmlformats.org/presentationml/2006/main">
+  <p:cSld>
+    <p:spTree>
+      <p:nvGrpSpPr>
+        <p:cNvPr id="1" name=""/>
+        <p:cNvGrpSpPr/>
+        <p:nvPr/>
+      </p:nvGrpSpPr>
+      <p:grpSpPr>
+        <a:xfrm>
+          <a:off x="0" y="0"/>
+          <a:ext cx="0" cy="0"/>
+          <a:chOff x="0" y="0"/>
+          <a:chExt cx="0" cy="0"/>
+        </a:xfrm>
+      </p:grpSpPr>
+      <p:sp>
+        <p:nvSpPr>
+          <p:cNvPr id="2" name="タイトル 1"/>
+          <p:cNvSpPr>
+            <a:spLocks noGrp="1"/>
+          </p:cNvSpPr>
+          <p:nvPr>
             <p:ph type="ctrTitle"/>
           </p:nvPr>
         </p:nvSpPr>

</xml_diff>

<commit_message>
Use empty string for null category name instead of naming by automatic sequenece
</commit_message>
<xml_diff>
--- a/test/data/in.pptx
+++ b/test/data/in.pptx
@@ -12,7 +12,8 @@
     <p:sldId id="263" r:id="rId6"/>
     <p:sldId id="264" r:id="rId7"/>
     <p:sldId id="265" r:id="rId8"/>
-    <p:sldId id="262" r:id="rId9"/>
+    <p:sldId id="266" r:id="rId9"/>
+    <p:sldId id="262" r:id="rId10"/>
   </p:sldIdLst>
   <p:sldSz cx="12192000" cy="6858000"/>
   <p:notesSz cx="6858000" cy="9144000"/>
@@ -619,6 +620,569 @@
         <c:minorTickMark val="none"/>
         <c:tickLblPos val="nextTo"/>
         <c:crossAx val="209466448"/>
+        <c:crosses val="autoZero"/>
+        <c:auto val="1"/>
+        <c:lblAlgn val="ctr"/>
+        <c:lblOffset val="100"/>
+        <c:noMultiLvlLbl val="0"/>
+      </c:catAx>
+      <c:spPr>
+        <a:noFill/>
+        <a:ln>
+          <a:noFill/>
+        </a:ln>
+        <a:effectLst/>
+      </c:spPr>
+    </c:plotArea>
+    <c:legend>
+      <c:legendPos val="b"/>
+      <c:layout/>
+      <c:overlay val="0"/>
+      <c:spPr>
+        <a:noFill/>
+        <a:ln>
+          <a:noFill/>
+        </a:ln>
+        <a:effectLst/>
+      </c:spPr>
+      <c:txPr>
+        <a:bodyPr rot="0" spcFirstLastPara="1" vertOverflow="ellipsis" vert="horz" wrap="square" anchor="ctr" anchorCtr="1"/>
+        <a:lstStyle/>
+        <a:p>
+          <a:pPr>
+            <a:defRPr sz="1197" b="0" i="0" u="none" strike="noStrike" kern="1200" baseline="0">
+              <a:solidFill>
+                <a:schemeClr val="tx1">
+                  <a:lumMod val="65000"/>
+                  <a:lumOff val="35000"/>
+                </a:schemeClr>
+              </a:solidFill>
+              <a:latin typeface="+mn-lt"/>
+              <a:ea typeface="+mn-ea"/>
+              <a:cs typeface="+mn-cs"/>
+            </a:defRPr>
+          </a:pPr>
+          <a:endParaRPr lang="ja-JP"/>
+        </a:p>
+      </c:txPr>
+    </c:legend>
+    <c:plotVisOnly val="1"/>
+    <c:dispBlanksAs val="gap"/>
+    <c:showDLblsOverMax val="0"/>
+  </c:chart>
+  <c:spPr>
+    <a:noFill/>
+    <a:ln>
+      <a:noFill/>
+    </a:ln>
+    <a:effectLst/>
+  </c:spPr>
+  <c:txPr>
+    <a:bodyPr/>
+    <a:lstStyle/>
+    <a:p>
+      <a:pPr>
+        <a:defRPr/>
+      </a:pPr>
+      <a:endParaRPr lang="ja-JP"/>
+    </a:p>
+  </c:txPr>
+  <c:externalData r:id="rId3">
+    <c:autoUpdate val="0"/>
+  </c:externalData>
+</c:chartSpace>
+</file>
+
+<file path=ppt/charts/chart10.xml><?xml version="1.0" encoding="utf-8"?>
+<c:chartSpace xmlns:c="http://schemas.openxmlformats.org/drawingml/2006/chart" xmlns:a="http://schemas.openxmlformats.org/drawingml/2006/main" xmlns:r="http://schemas.openxmlformats.org/officeDocument/2006/relationships" xmlns:c16r2="http://schemas.microsoft.com/office/drawing/2015/06/chart">
+  <c:date1904 val="0"/>
+  <c:lang val="ja-JP"/>
+  <c:roundedCorners val="0"/>
+  <mc:AlternateContent xmlns:mc="http://schemas.openxmlformats.org/markup-compatibility/2006">
+    <mc:Choice xmlns:c14="http://schemas.microsoft.com/office/drawing/2007/8/2/chart" Requires="c14">
+      <c14:style val="102"/>
+    </mc:Choice>
+    <mc:Fallback>
+      <c:style val="2"/>
+    </mc:Fallback>
+  </mc:AlternateContent>
+  <c:chart>
+    <c:title>
+      <c:tx>
+        <c:rich>
+          <a:bodyPr rot="0" spcFirstLastPara="1" vertOverflow="ellipsis" vert="horz" wrap="square" anchor="ctr" anchorCtr="1"/>
+          <a:lstStyle/>
+          <a:p>
+            <a:pPr>
+              <a:defRPr sz="1862" b="0" i="0" u="none" strike="noStrike" kern="1200" spc="0" baseline="0">
+                <a:solidFill>
+                  <a:schemeClr val="tx1">
+                    <a:lumMod val="65000"/>
+                    <a:lumOff val="35000"/>
+                  </a:schemeClr>
+                </a:solidFill>
+                <a:latin typeface="+mn-lt"/>
+                <a:ea typeface="+mn-ea"/>
+                <a:cs typeface="+mn-cs"/>
+              </a:defRPr>
+            </a:pPr>
+            <a:r>
+              <a:rPr lang="en-US" altLang="ja-JP" dirty="0" smtClean="0"/>
+              <a:t>Sales</a:t>
+            </a:r>
+            <a:r>
+              <a:rPr lang="ja-JP" altLang="en-US" dirty="0" smtClean="0"/>
+              <a:t>販売</a:t>
+            </a:r>
+            <a:endParaRPr lang="ja-JP" altLang="en-US" dirty="0"/>
+          </a:p>
+        </c:rich>
+      </c:tx>
+      <c:layout/>
+      <c:overlay val="0"/>
+      <c:spPr>
+        <a:noFill/>
+        <a:ln>
+          <a:noFill/>
+        </a:ln>
+        <a:effectLst/>
+      </c:spPr>
+      <c:txPr>
+        <a:bodyPr rot="0" spcFirstLastPara="1" vertOverflow="ellipsis" vert="horz" wrap="square" anchor="ctr" anchorCtr="1"/>
+        <a:lstStyle/>
+        <a:p>
+          <a:pPr>
+            <a:defRPr sz="1862" b="0" i="0" u="none" strike="noStrike" kern="1200" spc="0" baseline="0">
+              <a:solidFill>
+                <a:schemeClr val="tx1">
+                  <a:lumMod val="65000"/>
+                  <a:lumOff val="35000"/>
+                </a:schemeClr>
+              </a:solidFill>
+              <a:latin typeface="+mn-lt"/>
+              <a:ea typeface="+mn-ea"/>
+              <a:cs typeface="+mn-cs"/>
+            </a:defRPr>
+          </a:pPr>
+          <a:endParaRPr lang="ja-JP"/>
+        </a:p>
+      </c:txPr>
+    </c:title>
+    <c:autoTitleDeleted val="0"/>
+    <c:plotArea>
+      <c:layout/>
+      <c:barChart>
+        <c:barDir val="col"/>
+        <c:grouping val="clustered"/>
+        <c:varyColors val="0"/>
+        <c:ser>
+          <c:idx val="0"/>
+          <c:order val="0"/>
+          <c:tx>
+            <c:strRef>
+              <c:f>Sheet1!$B$1</c:f>
+              <c:strCache>
+                <c:ptCount val="1"/>
+                <c:pt idx="0">
+                  <c:v>売り上げ</c:v>
+                </c:pt>
+              </c:strCache>
+            </c:strRef>
+          </c:tx>
+          <c:spPr>
+            <a:solidFill>
+              <a:schemeClr val="accent1"/>
+            </a:solidFill>
+            <a:ln>
+              <a:noFill/>
+            </a:ln>
+            <a:effectLst/>
+          </c:spPr>
+          <c:invertIfNegative val="0"/>
+          <c:cat>
+            <c:strRef>
+              <c:f>Sheet1!$A$2:$A$5</c:f>
+              <c:strCache>
+                <c:ptCount val="4"/>
+                <c:pt idx="0">
+                  <c:v>春</c:v>
+                </c:pt>
+                <c:pt idx="2">
+                  <c:v>秋</c:v>
+                </c:pt>
+                <c:pt idx="3">
+                  <c:v>冬</c:v>
+                </c:pt>
+              </c:strCache>
+            </c:strRef>
+          </c:cat>
+          <c:val>
+            <c:numRef>
+              <c:f>Sheet1!$B$2:$B$5</c:f>
+              <c:numCache>
+                <c:formatCode>General</c:formatCode>
+                <c:ptCount val="4"/>
+                <c:pt idx="0">
+                  <c:v>100</c:v>
+                </c:pt>
+                <c:pt idx="1">
+                  <c:v>110</c:v>
+                </c:pt>
+                <c:pt idx="2">
+                  <c:v>120</c:v>
+                </c:pt>
+                <c:pt idx="3">
+                  <c:v>130</c:v>
+                </c:pt>
+              </c:numCache>
+            </c:numRef>
+          </c:val>
+          <c:extLst>
+            <c:ext xmlns:c16="http://schemas.microsoft.com/office/drawing/2014/chart" uri="{C3380CC4-5D6E-409C-BE32-E72D297353CC}">
+              <c16:uniqueId val="{00000000-4E85-4B38-93F8-D581561C12C5}"/>
+            </c:ext>
+          </c:extLst>
+        </c:ser>
+        <c:ser>
+          <c:idx val="1"/>
+          <c:order val="1"/>
+          <c:tx>
+            <c:strRef>
+              <c:f>Sheet1!$C$1</c:f>
+              <c:strCache>
+                <c:ptCount val="1"/>
+                <c:pt idx="0">
+                  <c:v>利益</c:v>
+                </c:pt>
+              </c:strCache>
+            </c:strRef>
+          </c:tx>
+          <c:spPr>
+            <a:solidFill>
+              <a:schemeClr val="accent2"/>
+            </a:solidFill>
+            <a:ln>
+              <a:noFill/>
+            </a:ln>
+            <a:effectLst/>
+          </c:spPr>
+          <c:invertIfNegative val="0"/>
+          <c:cat>
+            <c:strRef>
+              <c:f>Sheet1!$A$2:$A$5</c:f>
+              <c:strCache>
+                <c:ptCount val="4"/>
+                <c:pt idx="0">
+                  <c:v>春</c:v>
+                </c:pt>
+                <c:pt idx="2">
+                  <c:v>秋</c:v>
+                </c:pt>
+                <c:pt idx="3">
+                  <c:v>冬</c:v>
+                </c:pt>
+              </c:strCache>
+            </c:strRef>
+          </c:cat>
+          <c:val>
+            <c:numRef>
+              <c:f>Sheet1!$C$2:$C$5</c:f>
+              <c:numCache>
+                <c:formatCode>General</c:formatCode>
+                <c:ptCount val="4"/>
+                <c:pt idx="0">
+                  <c:v>50</c:v>
+                </c:pt>
+                <c:pt idx="1">
+                  <c:v>60</c:v>
+                </c:pt>
+                <c:pt idx="2">
+                  <c:v>70</c:v>
+                </c:pt>
+              </c:numCache>
+            </c:numRef>
+          </c:val>
+          <c:extLst>
+            <c:ext xmlns:c16="http://schemas.microsoft.com/office/drawing/2014/chart" uri="{C3380CC4-5D6E-409C-BE32-E72D297353CC}">
+              <c16:uniqueId val="{00000001-4E85-4B38-93F8-D581561C12C5}"/>
+            </c:ext>
+          </c:extLst>
+        </c:ser>
+        <c:dLbls>
+          <c:showLegendKey val="0"/>
+          <c:showVal val="0"/>
+          <c:showCatName val="0"/>
+          <c:showSerName val="0"/>
+          <c:showPercent val="0"/>
+          <c:showBubbleSize val="0"/>
+        </c:dLbls>
+        <c:gapWidth val="219"/>
+        <c:overlap val="-27"/>
+        <c:axId val="306136656"/>
+        <c:axId val="424804560"/>
+      </c:barChart>
+      <c:lineChart>
+        <c:grouping val="standard"/>
+        <c:varyColors val="0"/>
+        <c:ser>
+          <c:idx val="2"/>
+          <c:order val="2"/>
+          <c:tx>
+            <c:strRef>
+              <c:f>Sheet1!$D$1</c:f>
+              <c:strCache>
+                <c:ptCount val="1"/>
+                <c:pt idx="0">
+                  <c:v>Unnamed: 3</c:v>
+                </c:pt>
+              </c:strCache>
+            </c:strRef>
+          </c:tx>
+          <c:spPr>
+            <a:ln w="28575" cap="rnd">
+              <a:solidFill>
+                <a:schemeClr val="accent3"/>
+              </a:solidFill>
+              <a:round/>
+            </a:ln>
+            <a:effectLst/>
+          </c:spPr>
+          <c:marker>
+            <c:symbol val="circle"/>
+            <c:size val="5"/>
+            <c:spPr>
+              <a:solidFill>
+                <a:schemeClr val="accent3"/>
+              </a:solidFill>
+              <a:ln w="9525">
+                <a:solidFill>
+                  <a:schemeClr val="accent3"/>
+                </a:solidFill>
+              </a:ln>
+              <a:effectLst/>
+            </c:spPr>
+          </c:marker>
+          <c:cat>
+            <c:strRef>
+              <c:f>Sheet1!$A$2:$A$5</c:f>
+              <c:strCache>
+                <c:ptCount val="4"/>
+                <c:pt idx="0">
+                  <c:v>春</c:v>
+                </c:pt>
+                <c:pt idx="2">
+                  <c:v>秋</c:v>
+                </c:pt>
+                <c:pt idx="3">
+                  <c:v>冬</c:v>
+                </c:pt>
+              </c:strCache>
+            </c:strRef>
+          </c:cat>
+          <c:val>
+            <c:numRef>
+              <c:f>Sheet1!$D$2:$D$5</c:f>
+              <c:numCache>
+                <c:formatCode>General</c:formatCode>
+                <c:ptCount val="4"/>
+                <c:pt idx="0">
+                  <c:v>0.5</c:v>
+                </c:pt>
+                <c:pt idx="1">
+                  <c:v>0.5</c:v>
+                </c:pt>
+                <c:pt idx="2">
+                  <c:v>0.5</c:v>
+                </c:pt>
+                <c:pt idx="3">
+                  <c:v>0.6</c:v>
+                </c:pt>
+              </c:numCache>
+            </c:numRef>
+          </c:val>
+          <c:smooth val="0"/>
+          <c:extLst>
+            <c:ext xmlns:c16="http://schemas.microsoft.com/office/drawing/2014/chart" uri="{C3380CC4-5D6E-409C-BE32-E72D297353CC}">
+              <c16:uniqueId val="{00000002-4E85-4B38-93F8-D581561C12C5}"/>
+            </c:ext>
+          </c:extLst>
+        </c:ser>
+        <c:dLbls>
+          <c:showLegendKey val="0"/>
+          <c:showVal val="0"/>
+          <c:showCatName val="0"/>
+          <c:showSerName val="0"/>
+          <c:showPercent val="0"/>
+          <c:showBubbleSize val="0"/>
+        </c:dLbls>
+        <c:marker val="1"/>
+        <c:smooth val="0"/>
+        <c:axId val="308751744"/>
+        <c:axId val="209467696"/>
+      </c:lineChart>
+      <c:catAx>
+        <c:axId val="306136656"/>
+        <c:scaling>
+          <c:orientation val="minMax"/>
+        </c:scaling>
+        <c:delete val="0"/>
+        <c:axPos val="b"/>
+        <c:numFmt formatCode="General" sourceLinked="1"/>
+        <c:majorTickMark val="none"/>
+        <c:minorTickMark val="none"/>
+        <c:tickLblPos val="nextTo"/>
+        <c:spPr>
+          <a:noFill/>
+          <a:ln w="9525" cap="flat" cmpd="sng" algn="ctr">
+            <a:solidFill>
+              <a:schemeClr val="tx1">
+                <a:lumMod val="15000"/>
+                <a:lumOff val="85000"/>
+              </a:schemeClr>
+            </a:solidFill>
+            <a:round/>
+          </a:ln>
+          <a:effectLst/>
+        </c:spPr>
+        <c:txPr>
+          <a:bodyPr rot="-60000000" spcFirstLastPara="1" vertOverflow="ellipsis" vert="horz" wrap="square" anchor="ctr" anchorCtr="1"/>
+          <a:lstStyle/>
+          <a:p>
+            <a:pPr>
+              <a:defRPr sz="1197" b="0" i="0" u="none" strike="noStrike" kern="1200" baseline="0">
+                <a:solidFill>
+                  <a:schemeClr val="tx1">
+                    <a:lumMod val="65000"/>
+                    <a:lumOff val="35000"/>
+                  </a:schemeClr>
+                </a:solidFill>
+                <a:latin typeface="+mn-lt"/>
+                <a:ea typeface="+mn-ea"/>
+                <a:cs typeface="+mn-cs"/>
+              </a:defRPr>
+            </a:pPr>
+            <a:endParaRPr lang="ja-JP"/>
+          </a:p>
+        </c:txPr>
+        <c:crossAx val="424804560"/>
+        <c:crosses val="autoZero"/>
+        <c:auto val="1"/>
+        <c:lblAlgn val="ctr"/>
+        <c:lblOffset val="100"/>
+        <c:noMultiLvlLbl val="0"/>
+      </c:catAx>
+      <c:valAx>
+        <c:axId val="424804560"/>
+        <c:scaling>
+          <c:orientation val="minMax"/>
+          <c:max val="150"/>
+          <c:min val="50"/>
+        </c:scaling>
+        <c:delete val="0"/>
+        <c:axPos val="l"/>
+        <c:majorGridlines>
+          <c:spPr>
+            <a:ln w="9525" cap="flat" cmpd="sng" algn="ctr">
+              <a:solidFill>
+                <a:schemeClr val="tx1">
+                  <a:lumMod val="15000"/>
+                  <a:lumOff val="85000"/>
+                </a:schemeClr>
+              </a:solidFill>
+              <a:round/>
+            </a:ln>
+            <a:effectLst/>
+          </c:spPr>
+        </c:majorGridlines>
+        <c:numFmt formatCode="General" sourceLinked="1"/>
+        <c:majorTickMark val="none"/>
+        <c:minorTickMark val="none"/>
+        <c:tickLblPos val="nextTo"/>
+        <c:spPr>
+          <a:noFill/>
+          <a:ln>
+            <a:noFill/>
+          </a:ln>
+          <a:effectLst/>
+        </c:spPr>
+        <c:txPr>
+          <a:bodyPr rot="-60000000" spcFirstLastPara="1" vertOverflow="ellipsis" vert="horz" wrap="square" anchor="ctr" anchorCtr="1"/>
+          <a:lstStyle/>
+          <a:p>
+            <a:pPr>
+              <a:defRPr sz="1197" b="0" i="0" u="none" strike="noStrike" kern="1200" baseline="0">
+                <a:solidFill>
+                  <a:schemeClr val="tx1">
+                    <a:lumMod val="65000"/>
+                    <a:lumOff val="35000"/>
+                  </a:schemeClr>
+                </a:solidFill>
+                <a:latin typeface="+mn-lt"/>
+                <a:ea typeface="+mn-ea"/>
+                <a:cs typeface="+mn-cs"/>
+              </a:defRPr>
+            </a:pPr>
+            <a:endParaRPr lang="ja-JP"/>
+          </a:p>
+        </c:txPr>
+        <c:crossAx val="306136656"/>
+        <c:crosses val="autoZero"/>
+        <c:crossBetween val="between"/>
+      </c:valAx>
+      <c:valAx>
+        <c:axId val="209467696"/>
+        <c:scaling>
+          <c:orientation val="minMax"/>
+        </c:scaling>
+        <c:delete val="0"/>
+        <c:axPos val="r"/>
+        <c:numFmt formatCode="0%" sourceLinked="0"/>
+        <c:majorTickMark val="out"/>
+        <c:minorTickMark val="none"/>
+        <c:tickLblPos val="nextTo"/>
+        <c:spPr>
+          <a:noFill/>
+          <a:ln>
+            <a:noFill/>
+          </a:ln>
+          <a:effectLst/>
+        </c:spPr>
+        <c:txPr>
+          <a:bodyPr rot="-60000000" spcFirstLastPara="1" vertOverflow="ellipsis" vert="horz" wrap="square" anchor="ctr" anchorCtr="1"/>
+          <a:lstStyle/>
+          <a:p>
+            <a:pPr>
+              <a:defRPr sz="1197" b="0" i="0" u="none" strike="noStrike" kern="1200" baseline="0">
+                <a:solidFill>
+                  <a:schemeClr val="tx1">
+                    <a:lumMod val="65000"/>
+                    <a:lumOff val="35000"/>
+                  </a:schemeClr>
+                </a:solidFill>
+                <a:latin typeface="+mn-lt"/>
+                <a:ea typeface="+mn-ea"/>
+                <a:cs typeface="+mn-cs"/>
+              </a:defRPr>
+            </a:pPr>
+            <a:endParaRPr lang="ja-JP"/>
+          </a:p>
+        </c:txPr>
+        <c:crossAx val="308751744"/>
+        <c:crosses val="max"/>
+        <c:crossBetween val="between"/>
+      </c:valAx>
+      <c:catAx>
+        <c:axId val="308751744"/>
+        <c:scaling>
+          <c:orientation val="minMax"/>
+        </c:scaling>
+        <c:delete val="1"/>
+        <c:axPos val="b"/>
+        <c:numFmt formatCode="General" sourceLinked="1"/>
+        <c:majorTickMark val="out"/>
+        <c:minorTickMark val="none"/>
+        <c:tickLblPos val="nextTo"/>
+        <c:crossAx val="209467696"/>
         <c:crosses val="autoZero"/>
         <c:auto val="1"/>
         <c:lblAlgn val="ctr"/>
@@ -2331,6 +2895,7 @@
           </a:p>
         </c:rich>
       </c:tx>
+      <c:layout/>
       <c:overlay val="0"/>
       <c:spPr>
         <a:noFill/>
@@ -2801,6 +3366,7 @@
     </c:plotArea>
     <c:legend>
       <c:legendPos val="b"/>
+      <c:layout/>
       <c:overlay val="0"/>
       <c:spPr>
         <a:noFill/>
@@ -2902,6 +3468,7 @@
           </a:p>
         </c:rich>
       </c:tx>
+      <c:layout/>
       <c:overlay val="0"/>
       <c:spPr>
         <a:noFill/>
@@ -3374,6 +3941,7 @@
     </c:plotArea>
     <c:legend>
       <c:legendPos val="b"/>
+      <c:layout/>
       <c:overlay val="0"/>
       <c:spPr>
         <a:noFill/>
@@ -3471,6 +4039,7 @@
           </a:p>
         </c:rich>
       </c:tx>
+      <c:layout/>
       <c:overlay val="0"/>
       <c:spPr>
         <a:noFill/>
@@ -3671,7 +4240,9 @@
               </c:spPr>
             </c:leaderLines>
             <c:extLst>
-              <c:ext xmlns:c15="http://schemas.microsoft.com/office/drawing/2012/chart" uri="{CE6537A1-D6FC-4f65-9D91-7224C49458BB}"/>
+              <c:ext xmlns:c15="http://schemas.microsoft.com/office/drawing/2012/chart" uri="{CE6537A1-D6FC-4f65-9D91-7224C49458BB}">
+                <c15:layout/>
+              </c:ext>
             </c:extLst>
           </c:dLbls>
           <c:cat>
@@ -3745,6 +4316,7 @@
     </c:plotArea>
     <c:legend>
       <c:legendPos val="b"/>
+      <c:layout/>
       <c:overlay val="0"/>
       <c:spPr>
         <a:noFill/>
@@ -3842,6 +4414,7 @@
           </a:p>
         </c:rich>
       </c:tx>
+      <c:layout/>
       <c:overlay val="0"/>
       <c:spPr>
         <a:noFill/>
@@ -4042,7 +4615,9 @@
               </c:spPr>
             </c:leaderLines>
             <c:extLst>
-              <c:ext xmlns:c15="http://schemas.microsoft.com/office/drawing/2012/chart" uri="{CE6537A1-D6FC-4f65-9D91-7224C49458BB}"/>
+              <c:ext xmlns:c15="http://schemas.microsoft.com/office/drawing/2012/chart" uri="{CE6537A1-D6FC-4f65-9D91-7224C49458BB}">
+                <c15:layout/>
+              </c:ext>
             </c:extLst>
           </c:dLbls>
           <c:cat>
@@ -4119,6 +4694,580 @@
     </c:plotArea>
     <c:legend>
       <c:legendPos val="b"/>
+      <c:layout/>
+      <c:overlay val="0"/>
+      <c:spPr>
+        <a:noFill/>
+        <a:ln>
+          <a:noFill/>
+        </a:ln>
+        <a:effectLst/>
+      </c:spPr>
+      <c:txPr>
+        <a:bodyPr rot="0" spcFirstLastPara="1" vertOverflow="ellipsis" vert="horz" wrap="square" anchor="ctr" anchorCtr="1"/>
+        <a:lstStyle/>
+        <a:p>
+          <a:pPr>
+            <a:defRPr sz="1197" b="0" i="0" u="none" strike="noStrike" kern="1200" baseline="0">
+              <a:solidFill>
+                <a:schemeClr val="tx1">
+                  <a:lumMod val="65000"/>
+                  <a:lumOff val="35000"/>
+                </a:schemeClr>
+              </a:solidFill>
+              <a:latin typeface="+mn-lt"/>
+              <a:ea typeface="+mn-ea"/>
+              <a:cs typeface="+mn-cs"/>
+            </a:defRPr>
+          </a:pPr>
+          <a:endParaRPr lang="ja-JP"/>
+        </a:p>
+      </c:txPr>
+    </c:legend>
+    <c:plotVisOnly val="1"/>
+    <c:dispBlanksAs val="gap"/>
+    <c:showDLblsOverMax val="0"/>
+  </c:chart>
+  <c:spPr>
+    <a:noFill/>
+    <a:ln>
+      <a:noFill/>
+    </a:ln>
+    <a:effectLst/>
+  </c:spPr>
+  <c:txPr>
+    <a:bodyPr/>
+    <a:lstStyle/>
+    <a:p>
+      <a:pPr>
+        <a:defRPr/>
+      </a:pPr>
+      <a:endParaRPr lang="ja-JP"/>
+    </a:p>
+  </c:txPr>
+  <c:externalData r:id="rId3">
+    <c:autoUpdate val="0"/>
+  </c:externalData>
+</c:chartSpace>
+</file>
+
+<file path=ppt/charts/chart9.xml><?xml version="1.0" encoding="utf-8"?>
+<c:chartSpace xmlns:c="http://schemas.openxmlformats.org/drawingml/2006/chart" xmlns:a="http://schemas.openxmlformats.org/drawingml/2006/main" xmlns:r="http://schemas.openxmlformats.org/officeDocument/2006/relationships" xmlns:c16r2="http://schemas.microsoft.com/office/drawing/2015/06/chart">
+  <c:date1904 val="0"/>
+  <c:lang val="ja-JP"/>
+  <c:roundedCorners val="0"/>
+  <mc:AlternateContent xmlns:mc="http://schemas.openxmlformats.org/markup-compatibility/2006">
+    <mc:Choice xmlns:c14="http://schemas.microsoft.com/office/drawing/2007/8/2/chart" Requires="c14">
+      <c14:style val="102"/>
+    </mc:Choice>
+    <mc:Fallback>
+      <c:style val="2"/>
+    </mc:Fallback>
+  </mc:AlternateContent>
+  <c:chart>
+    <c:title>
+      <c:tx>
+        <c:rich>
+          <a:bodyPr rot="0" spcFirstLastPara="1" vertOverflow="ellipsis" vert="horz" wrap="square" anchor="ctr" anchorCtr="1"/>
+          <a:lstStyle/>
+          <a:p>
+            <a:pPr>
+              <a:defRPr sz="1862" b="0" i="0" u="none" strike="noStrike" kern="1200" spc="0" baseline="0">
+                <a:solidFill>
+                  <a:schemeClr val="tx1">
+                    <a:lumMod val="65000"/>
+                    <a:lumOff val="35000"/>
+                  </a:schemeClr>
+                </a:solidFill>
+                <a:latin typeface="+mn-lt"/>
+                <a:ea typeface="+mn-ea"/>
+                <a:cs typeface="+mn-cs"/>
+              </a:defRPr>
+            </a:pPr>
+            <a:r>
+              <a:rPr lang="en-US" altLang="ja-JP" dirty="0" smtClean="0"/>
+              <a:t>{bars}Sales</a:t>
+            </a:r>
+            <a:r>
+              <a:rPr lang="ja-JP" altLang="en-US" dirty="0" smtClean="0"/>
+              <a:t>販売</a:t>
+            </a:r>
+            <a:endParaRPr lang="ja-JP" altLang="en-US" dirty="0"/>
+          </a:p>
+        </c:rich>
+      </c:tx>
+      <c:layout/>
+      <c:overlay val="0"/>
+      <c:spPr>
+        <a:noFill/>
+        <a:ln>
+          <a:noFill/>
+        </a:ln>
+        <a:effectLst/>
+      </c:spPr>
+      <c:txPr>
+        <a:bodyPr rot="0" spcFirstLastPara="1" vertOverflow="ellipsis" vert="horz" wrap="square" anchor="ctr" anchorCtr="1"/>
+        <a:lstStyle/>
+        <a:p>
+          <a:pPr>
+            <a:defRPr sz="1862" b="0" i="0" u="none" strike="noStrike" kern="1200" spc="0" baseline="0">
+              <a:solidFill>
+                <a:schemeClr val="tx1">
+                  <a:lumMod val="65000"/>
+                  <a:lumOff val="35000"/>
+                </a:schemeClr>
+              </a:solidFill>
+              <a:latin typeface="+mn-lt"/>
+              <a:ea typeface="+mn-ea"/>
+              <a:cs typeface="+mn-cs"/>
+            </a:defRPr>
+          </a:pPr>
+          <a:endParaRPr lang="ja-JP"/>
+        </a:p>
+      </c:txPr>
+    </c:title>
+    <c:autoTitleDeleted val="0"/>
+    <c:plotArea>
+      <c:layout/>
+      <c:barChart>
+        <c:barDir val="col"/>
+        <c:grouping val="clustered"/>
+        <c:varyColors val="0"/>
+        <c:ser>
+          <c:idx val="0"/>
+          <c:order val="0"/>
+          <c:tx>
+            <c:strRef>
+              <c:f>Sheet1!$B$1</c:f>
+              <c:strCache>
+                <c:ptCount val="1"/>
+                <c:pt idx="0">
+                  <c:v>系列 1</c:v>
+                </c:pt>
+              </c:strCache>
+            </c:strRef>
+          </c:tx>
+          <c:spPr>
+            <a:solidFill>
+              <a:schemeClr val="accent1"/>
+            </a:solidFill>
+            <a:ln>
+              <a:noFill/>
+            </a:ln>
+            <a:effectLst/>
+          </c:spPr>
+          <c:invertIfNegative val="0"/>
+          <c:cat>
+            <c:strRef>
+              <c:f>Sheet1!$A$2:$A$5</c:f>
+              <c:strCache>
+                <c:ptCount val="4"/>
+                <c:pt idx="0">
+                  <c:v>分類 1</c:v>
+                </c:pt>
+                <c:pt idx="1">
+                  <c:v>分類 2</c:v>
+                </c:pt>
+                <c:pt idx="2">
+                  <c:v>分類 3</c:v>
+                </c:pt>
+                <c:pt idx="3">
+                  <c:v>分類 4</c:v>
+                </c:pt>
+              </c:strCache>
+            </c:strRef>
+          </c:cat>
+          <c:val>
+            <c:numRef>
+              <c:f>Sheet1!$B$2:$B$5</c:f>
+              <c:numCache>
+                <c:formatCode>General</c:formatCode>
+                <c:ptCount val="4"/>
+                <c:pt idx="0">
+                  <c:v>4.3</c:v>
+                </c:pt>
+                <c:pt idx="1">
+                  <c:v>2.5</c:v>
+                </c:pt>
+                <c:pt idx="2">
+                  <c:v>3.5</c:v>
+                </c:pt>
+                <c:pt idx="3">
+                  <c:v>4.5</c:v>
+                </c:pt>
+              </c:numCache>
+            </c:numRef>
+          </c:val>
+          <c:extLst>
+            <c:ext xmlns:c16="http://schemas.microsoft.com/office/drawing/2014/chart" uri="{C3380CC4-5D6E-409C-BE32-E72D297353CC}">
+              <c16:uniqueId val="{00000000-0326-4CA4-96E1-F416A1964CB4}"/>
+            </c:ext>
+          </c:extLst>
+        </c:ser>
+        <c:ser>
+          <c:idx val="1"/>
+          <c:order val="1"/>
+          <c:tx>
+            <c:strRef>
+              <c:f>Sheet1!$C$1</c:f>
+              <c:strCache>
+                <c:ptCount val="1"/>
+                <c:pt idx="0">
+                  <c:v>系列 2</c:v>
+                </c:pt>
+              </c:strCache>
+            </c:strRef>
+          </c:tx>
+          <c:spPr>
+            <a:solidFill>
+              <a:schemeClr val="accent2"/>
+            </a:solidFill>
+            <a:ln>
+              <a:noFill/>
+            </a:ln>
+            <a:effectLst/>
+          </c:spPr>
+          <c:invertIfNegative val="0"/>
+          <c:cat>
+            <c:strRef>
+              <c:f>Sheet1!$A$2:$A$5</c:f>
+              <c:strCache>
+                <c:ptCount val="4"/>
+                <c:pt idx="0">
+                  <c:v>分類 1</c:v>
+                </c:pt>
+                <c:pt idx="1">
+                  <c:v>分類 2</c:v>
+                </c:pt>
+                <c:pt idx="2">
+                  <c:v>分類 3</c:v>
+                </c:pt>
+                <c:pt idx="3">
+                  <c:v>分類 4</c:v>
+                </c:pt>
+              </c:strCache>
+            </c:strRef>
+          </c:cat>
+          <c:val>
+            <c:numRef>
+              <c:f>Sheet1!$C$2:$C$5</c:f>
+              <c:numCache>
+                <c:formatCode>General</c:formatCode>
+                <c:ptCount val="4"/>
+                <c:pt idx="0">
+                  <c:v>2.4</c:v>
+                </c:pt>
+                <c:pt idx="1">
+                  <c:v>4.4000000000000004</c:v>
+                </c:pt>
+                <c:pt idx="2">
+                  <c:v>1.8</c:v>
+                </c:pt>
+                <c:pt idx="3">
+                  <c:v>2.8</c:v>
+                </c:pt>
+              </c:numCache>
+            </c:numRef>
+          </c:val>
+          <c:extLst>
+            <c:ext xmlns:c16="http://schemas.microsoft.com/office/drawing/2014/chart" uri="{C3380CC4-5D6E-409C-BE32-E72D297353CC}">
+              <c16:uniqueId val="{00000001-0326-4CA4-96E1-F416A1964CB4}"/>
+            </c:ext>
+          </c:extLst>
+        </c:ser>
+        <c:dLbls>
+          <c:showLegendKey val="0"/>
+          <c:showVal val="0"/>
+          <c:showCatName val="0"/>
+          <c:showSerName val="0"/>
+          <c:showPercent val="0"/>
+          <c:showBubbleSize val="0"/>
+        </c:dLbls>
+        <c:gapWidth val="219"/>
+        <c:overlap val="-27"/>
+        <c:axId val="306136656"/>
+        <c:axId val="424804560"/>
+      </c:barChart>
+      <c:lineChart>
+        <c:grouping val="standard"/>
+        <c:varyColors val="0"/>
+        <c:ser>
+          <c:idx val="2"/>
+          <c:order val="2"/>
+          <c:tx>
+            <c:strRef>
+              <c:f>Sheet1!$D$1</c:f>
+              <c:strCache>
+                <c:ptCount val="1"/>
+                <c:pt idx="0">
+                  <c:v>系列 3</c:v>
+                </c:pt>
+              </c:strCache>
+            </c:strRef>
+          </c:tx>
+          <c:spPr>
+            <a:ln w="28575" cap="rnd">
+              <a:solidFill>
+                <a:schemeClr val="accent3"/>
+              </a:solidFill>
+              <a:round/>
+            </a:ln>
+            <a:effectLst/>
+          </c:spPr>
+          <c:marker>
+            <c:symbol val="circle"/>
+            <c:size val="5"/>
+            <c:spPr>
+              <a:solidFill>
+                <a:schemeClr val="accent3"/>
+              </a:solidFill>
+              <a:ln w="9525">
+                <a:solidFill>
+                  <a:schemeClr val="accent3"/>
+                </a:solidFill>
+              </a:ln>
+              <a:effectLst/>
+            </c:spPr>
+          </c:marker>
+          <c:cat>
+            <c:strRef>
+              <c:f>Sheet1!$A$2:$A$5</c:f>
+              <c:strCache>
+                <c:ptCount val="4"/>
+                <c:pt idx="0">
+                  <c:v>分類 1</c:v>
+                </c:pt>
+                <c:pt idx="1">
+                  <c:v>分類 2</c:v>
+                </c:pt>
+                <c:pt idx="2">
+                  <c:v>分類 3</c:v>
+                </c:pt>
+                <c:pt idx="3">
+                  <c:v>分類 4</c:v>
+                </c:pt>
+              </c:strCache>
+            </c:strRef>
+          </c:cat>
+          <c:val>
+            <c:numRef>
+              <c:f>Sheet1!$D$2:$D$5</c:f>
+              <c:numCache>
+                <c:formatCode>General</c:formatCode>
+                <c:ptCount val="4"/>
+                <c:pt idx="0">
+                  <c:v>2</c:v>
+                </c:pt>
+                <c:pt idx="1">
+                  <c:v>2</c:v>
+                </c:pt>
+                <c:pt idx="2">
+                  <c:v>3</c:v>
+                </c:pt>
+                <c:pt idx="3">
+                  <c:v>5</c:v>
+                </c:pt>
+              </c:numCache>
+            </c:numRef>
+          </c:val>
+          <c:smooth val="0"/>
+          <c:extLst>
+            <c:ext xmlns:c16="http://schemas.microsoft.com/office/drawing/2014/chart" uri="{C3380CC4-5D6E-409C-BE32-E72D297353CC}">
+              <c16:uniqueId val="{00000002-0326-4CA4-96E1-F416A1964CB4}"/>
+            </c:ext>
+          </c:extLst>
+        </c:ser>
+        <c:dLbls>
+          <c:showLegendKey val="0"/>
+          <c:showVal val="0"/>
+          <c:showCatName val="0"/>
+          <c:showSerName val="0"/>
+          <c:showPercent val="0"/>
+          <c:showBubbleSize val="0"/>
+        </c:dLbls>
+        <c:marker val="1"/>
+        <c:smooth val="0"/>
+        <c:axId val="308281872"/>
+        <c:axId val="209466448"/>
+      </c:lineChart>
+      <c:catAx>
+        <c:axId val="306136656"/>
+        <c:scaling>
+          <c:orientation val="minMax"/>
+        </c:scaling>
+        <c:delete val="0"/>
+        <c:axPos val="b"/>
+        <c:numFmt formatCode="General" sourceLinked="1"/>
+        <c:majorTickMark val="none"/>
+        <c:minorTickMark val="none"/>
+        <c:tickLblPos val="nextTo"/>
+        <c:spPr>
+          <a:noFill/>
+          <a:ln w="9525" cap="flat" cmpd="sng" algn="ctr">
+            <a:solidFill>
+              <a:schemeClr val="tx1">
+                <a:lumMod val="15000"/>
+                <a:lumOff val="85000"/>
+              </a:schemeClr>
+            </a:solidFill>
+            <a:round/>
+          </a:ln>
+          <a:effectLst/>
+        </c:spPr>
+        <c:txPr>
+          <a:bodyPr rot="-60000000" spcFirstLastPara="1" vertOverflow="ellipsis" vert="horz" wrap="square" anchor="ctr" anchorCtr="1"/>
+          <a:lstStyle/>
+          <a:p>
+            <a:pPr>
+              <a:defRPr sz="1197" b="0" i="0" u="none" strike="noStrike" kern="1200" baseline="0">
+                <a:solidFill>
+                  <a:schemeClr val="tx1">
+                    <a:lumMod val="65000"/>
+                    <a:lumOff val="35000"/>
+                  </a:schemeClr>
+                </a:solidFill>
+                <a:latin typeface="+mn-lt"/>
+                <a:ea typeface="+mn-ea"/>
+                <a:cs typeface="+mn-cs"/>
+              </a:defRPr>
+            </a:pPr>
+            <a:endParaRPr lang="ja-JP"/>
+          </a:p>
+        </c:txPr>
+        <c:crossAx val="424804560"/>
+        <c:crosses val="autoZero"/>
+        <c:auto val="1"/>
+        <c:lblAlgn val="ctr"/>
+        <c:lblOffset val="100"/>
+        <c:noMultiLvlLbl val="0"/>
+      </c:catAx>
+      <c:valAx>
+        <c:axId val="424804560"/>
+        <c:scaling>
+          <c:orientation val="minMax"/>
+        </c:scaling>
+        <c:delete val="0"/>
+        <c:axPos val="l"/>
+        <c:majorGridlines>
+          <c:spPr>
+            <a:ln w="9525" cap="flat" cmpd="sng" algn="ctr">
+              <a:solidFill>
+                <a:schemeClr val="tx1">
+                  <a:lumMod val="15000"/>
+                  <a:lumOff val="85000"/>
+                </a:schemeClr>
+              </a:solidFill>
+              <a:round/>
+            </a:ln>
+            <a:effectLst/>
+          </c:spPr>
+        </c:majorGridlines>
+        <c:numFmt formatCode="General" sourceLinked="1"/>
+        <c:majorTickMark val="none"/>
+        <c:minorTickMark val="none"/>
+        <c:tickLblPos val="nextTo"/>
+        <c:spPr>
+          <a:noFill/>
+          <a:ln>
+            <a:noFill/>
+          </a:ln>
+          <a:effectLst/>
+        </c:spPr>
+        <c:txPr>
+          <a:bodyPr rot="-60000000" spcFirstLastPara="1" vertOverflow="ellipsis" vert="horz" wrap="square" anchor="ctr" anchorCtr="1"/>
+          <a:lstStyle/>
+          <a:p>
+            <a:pPr>
+              <a:defRPr sz="1197" b="0" i="0" u="none" strike="noStrike" kern="1200" baseline="0">
+                <a:solidFill>
+                  <a:schemeClr val="tx1">
+                    <a:lumMod val="65000"/>
+                    <a:lumOff val="35000"/>
+                  </a:schemeClr>
+                </a:solidFill>
+                <a:latin typeface="+mn-lt"/>
+                <a:ea typeface="+mn-ea"/>
+                <a:cs typeface="+mn-cs"/>
+              </a:defRPr>
+            </a:pPr>
+            <a:endParaRPr lang="ja-JP"/>
+          </a:p>
+        </c:txPr>
+        <c:crossAx val="306136656"/>
+        <c:crosses val="autoZero"/>
+        <c:crossBetween val="between"/>
+      </c:valAx>
+      <c:valAx>
+        <c:axId val="209466448"/>
+        <c:scaling>
+          <c:orientation val="minMax"/>
+        </c:scaling>
+        <c:delete val="0"/>
+        <c:axPos val="r"/>
+        <c:numFmt formatCode="0%" sourceLinked="0"/>
+        <c:majorTickMark val="out"/>
+        <c:minorTickMark val="none"/>
+        <c:tickLblPos val="nextTo"/>
+        <c:spPr>
+          <a:noFill/>
+          <a:ln>
+            <a:noFill/>
+          </a:ln>
+          <a:effectLst/>
+        </c:spPr>
+        <c:txPr>
+          <a:bodyPr rot="-60000000" spcFirstLastPara="1" vertOverflow="ellipsis" vert="horz" wrap="square" anchor="ctr" anchorCtr="1"/>
+          <a:lstStyle/>
+          <a:p>
+            <a:pPr>
+              <a:defRPr sz="1197" b="0" i="0" u="none" strike="noStrike" kern="1200" baseline="0">
+                <a:solidFill>
+                  <a:schemeClr val="tx1">
+                    <a:lumMod val="65000"/>
+                    <a:lumOff val="35000"/>
+                  </a:schemeClr>
+                </a:solidFill>
+                <a:latin typeface="+mn-lt"/>
+                <a:ea typeface="+mn-ea"/>
+                <a:cs typeface="+mn-cs"/>
+              </a:defRPr>
+            </a:pPr>
+            <a:endParaRPr lang="ja-JP"/>
+          </a:p>
+        </c:txPr>
+        <c:crossAx val="308281872"/>
+        <c:crosses val="max"/>
+        <c:crossBetween val="between"/>
+      </c:valAx>
+      <c:catAx>
+        <c:axId val="308281872"/>
+        <c:scaling>
+          <c:orientation val="minMax"/>
+        </c:scaling>
+        <c:delete val="1"/>
+        <c:axPos val="b"/>
+        <c:numFmt formatCode="General" sourceLinked="1"/>
+        <c:majorTickMark val="out"/>
+        <c:minorTickMark val="none"/>
+        <c:tickLblPos val="nextTo"/>
+        <c:crossAx val="209466448"/>
+        <c:crosses val="autoZero"/>
+        <c:auto val="1"/>
+        <c:lblAlgn val="ctr"/>
+        <c:lblOffset val="100"/>
+        <c:noMultiLvlLbl val="0"/>
+      </c:catAx>
+      <c:spPr>
+        <a:noFill/>
+        <a:ln>
+          <a:noFill/>
+        </a:ln>
+        <a:effectLst/>
+      </c:spPr>
+    </c:plotArea>
+    <c:legend>
+      <c:legendPos val="b"/>
+      <c:layout/>
       <c:overlay val="0"/>
       <c:spPr>
         <a:noFill/>
@@ -4176,6 +5325,46 @@
 </file>
 
 <file path=ppt/charts/colors1.xml><?xml version="1.0" encoding="utf-8"?>
+<cs:colorStyle xmlns:cs="http://schemas.microsoft.com/office/drawing/2012/chartStyle" xmlns:a="http://schemas.openxmlformats.org/drawingml/2006/main" meth="cycle" id="10">
+  <a:schemeClr val="accent1"/>
+  <a:schemeClr val="accent2"/>
+  <a:schemeClr val="accent3"/>
+  <a:schemeClr val="accent4"/>
+  <a:schemeClr val="accent5"/>
+  <a:schemeClr val="accent6"/>
+  <cs:variation/>
+  <cs:variation>
+    <a:lumMod val="60000"/>
+  </cs:variation>
+  <cs:variation>
+    <a:lumMod val="80000"/>
+    <a:lumOff val="20000"/>
+  </cs:variation>
+  <cs:variation>
+    <a:lumMod val="80000"/>
+  </cs:variation>
+  <cs:variation>
+    <a:lumMod val="60000"/>
+    <a:lumOff val="40000"/>
+  </cs:variation>
+  <cs:variation>
+    <a:lumMod val="50000"/>
+  </cs:variation>
+  <cs:variation>
+    <a:lumMod val="70000"/>
+    <a:lumOff val="30000"/>
+  </cs:variation>
+  <cs:variation>
+    <a:lumMod val="70000"/>
+  </cs:variation>
+  <cs:variation>
+    <a:lumMod val="50000"/>
+    <a:lumOff val="50000"/>
+  </cs:variation>
+</cs:colorStyle>
+</file>
+
+<file path=ppt/charts/colors10.xml><?xml version="1.0" encoding="utf-8"?>
 <cs:colorStyle xmlns:cs="http://schemas.microsoft.com/office/drawing/2012/chartStyle" xmlns:a="http://schemas.openxmlformats.org/drawingml/2006/main" meth="cycle" id="10">
   <a:schemeClr val="accent1"/>
   <a:schemeClr val="accent2"/>
@@ -4495,6 +5684,46 @@
 </cs:colorStyle>
 </file>
 
+<file path=ppt/charts/colors9.xml><?xml version="1.0" encoding="utf-8"?>
+<cs:colorStyle xmlns:cs="http://schemas.microsoft.com/office/drawing/2012/chartStyle" xmlns:a="http://schemas.openxmlformats.org/drawingml/2006/main" meth="cycle" id="10">
+  <a:schemeClr val="accent1"/>
+  <a:schemeClr val="accent2"/>
+  <a:schemeClr val="accent3"/>
+  <a:schemeClr val="accent4"/>
+  <a:schemeClr val="accent5"/>
+  <a:schemeClr val="accent6"/>
+  <cs:variation/>
+  <cs:variation>
+    <a:lumMod val="60000"/>
+  </cs:variation>
+  <cs:variation>
+    <a:lumMod val="80000"/>
+    <a:lumOff val="20000"/>
+  </cs:variation>
+  <cs:variation>
+    <a:lumMod val="80000"/>
+  </cs:variation>
+  <cs:variation>
+    <a:lumMod val="60000"/>
+    <a:lumOff val="40000"/>
+  </cs:variation>
+  <cs:variation>
+    <a:lumMod val="50000"/>
+  </cs:variation>
+  <cs:variation>
+    <a:lumMod val="70000"/>
+    <a:lumOff val="30000"/>
+  </cs:variation>
+  <cs:variation>
+    <a:lumMod val="70000"/>
+  </cs:variation>
+  <cs:variation>
+    <a:lumMod val="50000"/>
+    <a:lumOff val="50000"/>
+  </cs:variation>
+</cs:colorStyle>
+</file>
+
 <file path=ppt/charts/style1.xml><?xml version="1.0" encoding="utf-8"?>
 <cs:chartStyle xmlns:cs="http://schemas.microsoft.com/office/drawing/2012/chartStyle" xmlns:a="http://schemas.openxmlformats.org/drawingml/2006/main" id="201">
   <cs:axisTitle>
@@ -4998,7 +6227,7 @@
 </cs:chartStyle>
 </file>
 
-<file path=ppt/charts/style2.xml><?xml version="1.0" encoding="utf-8"?>
+<file path=ppt/charts/style10.xml><?xml version="1.0" encoding="utf-8"?>
 <cs:chartStyle xmlns:cs="http://schemas.microsoft.com/office/drawing/2012/chartStyle" xmlns:a="http://schemas.openxmlformats.org/drawingml/2006/main" id="201">
   <cs:axisTitle>
     <cs:lnRef idx="0"/>
@@ -5501,8 +6730,8 @@
 </cs:chartStyle>
 </file>
 
-<file path=ppt/charts/style3.xml><?xml version="1.0" encoding="utf-8"?>
-<cs:chartStyle xmlns:cs="http://schemas.microsoft.com/office/drawing/2012/chartStyle" xmlns:a="http://schemas.openxmlformats.org/drawingml/2006/main" id="240">
+<file path=ppt/charts/style2.xml><?xml version="1.0" encoding="utf-8"?>
+<cs:chartStyle xmlns:cs="http://schemas.microsoft.com/office/drawing/2012/chartStyle" xmlns:a="http://schemas.openxmlformats.org/drawingml/2006/main" id="201">
   <cs:axisTitle>
     <cs:lnRef idx="0"/>
     <cs:fillRef idx="0"/>
@@ -5529,8 +6758,8 @@
       <a:ln w="9525" cap="flat" cmpd="sng" algn="ctr">
         <a:solidFill>
           <a:schemeClr val="tx1">
-            <a:lumMod val="25000"/>
-            <a:lumOff val="75000"/>
+            <a:lumMod val="15000"/>
+            <a:lumOff val="85000"/>
           </a:schemeClr>
         </a:solidFill>
         <a:round/>
@@ -5631,7 +6860,7 @@
       <a:schemeClr val="tx1"/>
     </cs:fontRef>
     <cs:spPr>
-      <a:ln w="19050" cap="rnd">
+      <a:ln w="28575" cap="rnd">
         <a:solidFill>
           <a:schemeClr val="phClr"/>
         </a:solidFill>
@@ -5663,10 +6892,10 @@
     <cs:lnRef idx="0">
       <cs:styleClr val="auto"/>
     </cs:lnRef>
-    <cs:fillRef idx="0"/>
-    <cs:effectRef idx="0"/>
-    <cs:fontRef idx="minor">
-      <a:schemeClr val="dk1"/>
+    <cs:fillRef idx="1"/>
+    <cs:effectRef idx="0"/>
+    <cs:fontRef idx="minor">
+      <a:schemeClr val="tx1"/>
     </cs:fontRef>
     <cs:spPr>
       <a:ln w="9525" cap="rnd">
@@ -5706,23 +6935,22 @@
     <cs:fillRef idx="0"/>
     <cs:effectRef idx="0"/>
     <cs:fontRef idx="minor">
-      <a:schemeClr val="tx1"/>
+      <a:schemeClr val="dk1"/>
     </cs:fontRef>
     <cs:spPr>
       <a:solidFill>
         <a:schemeClr val="dk1">
-          <a:lumMod val="75000"/>
-          <a:lumOff val="25000"/>
+          <a:lumMod val="65000"/>
+          <a:lumOff val="35000"/>
         </a:schemeClr>
       </a:solidFill>
-      <a:ln w="9525" cap="flat" cmpd="sng" algn="ctr">
+      <a:ln w="9525">
         <a:solidFill>
           <a:schemeClr val="tx1">
             <a:lumMod val="65000"/>
             <a:lumOff val="35000"/>
           </a:schemeClr>
         </a:solidFill>
-        <a:round/>
       </a:ln>
     </cs:spPr>
   </cs:downBar>
@@ -5827,8 +7055,8 @@
       <a:ln w="9525" cap="flat" cmpd="sng" algn="ctr">
         <a:solidFill>
           <a:schemeClr val="tx1">
-            <a:lumMod val="50000"/>
-            <a:lumOff val="50000"/>
+            <a:lumMod val="75000"/>
+            <a:lumOff val="25000"/>
           </a:schemeClr>
         </a:solidFill>
         <a:round/>
@@ -5960,20 +7188,19 @@
     <cs:fillRef idx="0"/>
     <cs:effectRef idx="0"/>
     <cs:fontRef idx="minor">
-      <a:schemeClr val="tx1"/>
+      <a:schemeClr val="dk1"/>
     </cs:fontRef>
     <cs:spPr>
       <a:solidFill>
         <a:schemeClr val="lt1"/>
       </a:solidFill>
-      <a:ln w="9525" cap="flat" cmpd="sng" algn="ctr">
+      <a:ln w="9525">
         <a:solidFill>
           <a:schemeClr val="tx1">
-            <a:lumMod val="65000"/>
-            <a:lumOff val="35000"/>
+            <a:lumMod val="15000"/>
+            <a:lumOff val="85000"/>
           </a:schemeClr>
         </a:solidFill>
-        <a:round/>
       </a:ln>
     </cs:spPr>
   </cs:upBar>
@@ -5987,17 +7214,6 @@
         <a:lumOff val="35000"/>
       </a:schemeClr>
     </cs:fontRef>
-    <cs:spPr>
-      <a:ln w="9525" cap="flat" cmpd="sng" algn="ctr">
-        <a:solidFill>
-          <a:schemeClr val="tx1">
-            <a:lumMod val="25000"/>
-            <a:lumOff val="75000"/>
-          </a:schemeClr>
-        </a:solidFill>
-        <a:round/>
-      </a:ln>
-    </cs:spPr>
     <cs:defRPr sz="1197" kern="1200"/>
   </cs:valueAxis>
   <cs:wall>
@@ -6017,7 +7233,7 @@
 </cs:chartStyle>
 </file>
 
-<file path=ppt/charts/style4.xml><?xml version="1.0" encoding="utf-8"?>
+<file path=ppt/charts/style3.xml><?xml version="1.0" encoding="utf-8"?>
 <cs:chartStyle xmlns:cs="http://schemas.microsoft.com/office/drawing/2012/chartStyle" xmlns:a="http://schemas.openxmlformats.org/drawingml/2006/main" id="240">
   <cs:axisTitle>
     <cs:lnRef idx="0"/>
@@ -6533,8 +7749,8 @@
 </cs:chartStyle>
 </file>
 
-<file path=ppt/charts/style5.xml><?xml version="1.0" encoding="utf-8"?>
-<cs:chartStyle xmlns:cs="http://schemas.microsoft.com/office/drawing/2012/chartStyle" xmlns:a="http://schemas.openxmlformats.org/drawingml/2006/main" id="201">
+<file path=ppt/charts/style4.xml><?xml version="1.0" encoding="utf-8"?>
+<cs:chartStyle xmlns:cs="http://schemas.microsoft.com/office/drawing/2012/chartStyle" xmlns:a="http://schemas.openxmlformats.org/drawingml/2006/main" id="240">
   <cs:axisTitle>
     <cs:lnRef idx="0"/>
     <cs:fillRef idx="0"/>
@@ -6561,8 +7777,8 @@
       <a:ln w="9525" cap="flat" cmpd="sng" algn="ctr">
         <a:solidFill>
           <a:schemeClr val="tx1">
-            <a:lumMod val="15000"/>
-            <a:lumOff val="85000"/>
+            <a:lumMod val="25000"/>
+            <a:lumOff val="75000"/>
           </a:schemeClr>
         </a:solidFill>
         <a:round/>
@@ -6663,7 +7879,7 @@
       <a:schemeClr val="tx1"/>
     </cs:fontRef>
     <cs:spPr>
-      <a:ln w="28575" cap="rnd">
+      <a:ln w="19050" cap="rnd">
         <a:solidFill>
           <a:schemeClr val="phClr"/>
         </a:solidFill>
@@ -6695,10 +7911,10 @@
     <cs:lnRef idx="0">
       <cs:styleClr val="auto"/>
     </cs:lnRef>
-    <cs:fillRef idx="1"/>
-    <cs:effectRef idx="0"/>
-    <cs:fontRef idx="minor">
-      <a:schemeClr val="tx1"/>
+    <cs:fillRef idx="0"/>
+    <cs:effectRef idx="0"/>
+    <cs:fontRef idx="minor">
+      <a:schemeClr val="dk1"/>
     </cs:fontRef>
     <cs:spPr>
       <a:ln w="9525" cap="rnd">
@@ -6738,22 +7954,23 @@
     <cs:fillRef idx="0"/>
     <cs:effectRef idx="0"/>
     <cs:fontRef idx="minor">
-      <a:schemeClr val="dk1"/>
+      <a:schemeClr val="tx1"/>
     </cs:fontRef>
     <cs:spPr>
       <a:solidFill>
         <a:schemeClr val="dk1">
-          <a:lumMod val="65000"/>
-          <a:lumOff val="35000"/>
+          <a:lumMod val="75000"/>
+          <a:lumOff val="25000"/>
         </a:schemeClr>
       </a:solidFill>
-      <a:ln w="9525">
+      <a:ln w="9525" cap="flat" cmpd="sng" algn="ctr">
         <a:solidFill>
           <a:schemeClr val="tx1">
             <a:lumMod val="65000"/>
             <a:lumOff val="35000"/>
           </a:schemeClr>
         </a:solidFill>
+        <a:round/>
       </a:ln>
     </cs:spPr>
   </cs:downBar>
@@ -6858,8 +8075,8 @@
       <a:ln w="9525" cap="flat" cmpd="sng" algn="ctr">
         <a:solidFill>
           <a:schemeClr val="tx1">
-            <a:lumMod val="75000"/>
-            <a:lumOff val="25000"/>
+            <a:lumMod val="50000"/>
+            <a:lumOff val="50000"/>
           </a:schemeClr>
         </a:solidFill>
         <a:round/>
@@ -6991,19 +8208,20 @@
     <cs:fillRef idx="0"/>
     <cs:effectRef idx="0"/>
     <cs:fontRef idx="minor">
-      <a:schemeClr val="dk1"/>
+      <a:schemeClr val="tx1"/>
     </cs:fontRef>
     <cs:spPr>
       <a:solidFill>
         <a:schemeClr val="lt1"/>
       </a:solidFill>
-      <a:ln w="9525">
+      <a:ln w="9525" cap="flat" cmpd="sng" algn="ctr">
         <a:solidFill>
           <a:schemeClr val="tx1">
-            <a:lumMod val="15000"/>
-            <a:lumOff val="85000"/>
+            <a:lumMod val="65000"/>
+            <a:lumOff val="35000"/>
           </a:schemeClr>
         </a:solidFill>
+        <a:round/>
       </a:ln>
     </cs:spPr>
   </cs:upBar>
@@ -7017,6 +8235,17 @@
         <a:lumOff val="35000"/>
       </a:schemeClr>
     </cs:fontRef>
+    <cs:spPr>
+      <a:ln w="9525" cap="flat" cmpd="sng" algn="ctr">
+        <a:solidFill>
+          <a:schemeClr val="tx1">
+            <a:lumMod val="25000"/>
+            <a:lumOff val="75000"/>
+          </a:schemeClr>
+        </a:solidFill>
+        <a:round/>
+      </a:ln>
+    </cs:spPr>
     <cs:defRPr sz="1197" kern="1200"/>
   </cs:valueAxis>
   <cs:wall>
@@ -7036,7 +8265,7 @@
 </cs:chartStyle>
 </file>
 
-<file path=ppt/charts/style6.xml><?xml version="1.0" encoding="utf-8"?>
+<file path=ppt/charts/style5.xml><?xml version="1.0" encoding="utf-8"?>
 <cs:chartStyle xmlns:cs="http://schemas.microsoft.com/office/drawing/2012/chartStyle" xmlns:a="http://schemas.openxmlformats.org/drawingml/2006/main" id="201">
   <cs:axisTitle>
     <cs:lnRef idx="0"/>
@@ -7539,8 +8768,8 @@
 </cs:chartStyle>
 </file>
 
-<file path=ppt/charts/style7.xml><?xml version="1.0" encoding="utf-8"?>
-<cs:chartStyle xmlns:cs="http://schemas.microsoft.com/office/drawing/2012/chartStyle" xmlns:a="http://schemas.openxmlformats.org/drawingml/2006/main" id="251">
+<file path=ppt/charts/style6.xml><?xml version="1.0" encoding="utf-8"?>
+<cs:chartStyle xmlns:cs="http://schemas.microsoft.com/office/drawing/2012/chartStyle" xmlns:a="http://schemas.openxmlformats.org/drawingml/2006/main" id="201">
   <cs:axisTitle>
     <cs:lnRef idx="0"/>
     <cs:fillRef idx="0"/>
@@ -7597,7 +8826,7 @@
         <a:round/>
       </a:ln>
     </cs:spPr>
-    <cs:defRPr sz="1197" kern="1200"/>
+    <cs:defRPr sz="1330" kern="1200"/>
   </cs:chartArea>
   <cs:dataLabel>
     <cs:lnRef idx="0"/>
@@ -7648,13 +8877,6 @@
     <cs:fontRef idx="minor">
       <a:schemeClr val="tx1"/>
     </cs:fontRef>
-    <cs:spPr>
-      <a:ln w="19050">
-        <a:solidFill>
-          <a:schemeClr val="lt1"/>
-        </a:solidFill>
-      </a:ln>
-    </cs:spPr>
   </cs:dataPoint>
   <cs:dataPoint3D>
     <cs:lnRef idx="0"/>
@@ -7665,19 +8887,12 @@
     <cs:fontRef idx="minor">
       <a:schemeClr val="tx1"/>
     </cs:fontRef>
-    <cs:spPr>
-      <a:ln w="25400">
-        <a:solidFill>
-          <a:schemeClr val="lt1"/>
-        </a:solidFill>
-      </a:ln>
-    </cs:spPr>
   </cs:dataPoint3D>
   <cs:dataPointLine>
     <cs:lnRef idx="0">
       <cs:styleClr val="auto"/>
     </cs:lnRef>
-    <cs:fillRef idx="0"/>
+    <cs:fillRef idx="1"/>
     <cs:effectRef idx="0"/>
     <cs:fontRef idx="minor">
       <a:schemeClr val="tx1"/>
@@ -7715,7 +8930,7 @@
     <cs:lnRef idx="0">
       <cs:styleClr val="auto"/>
     </cs:lnRef>
-    <cs:fillRef idx="0"/>
+    <cs:fillRef idx="1"/>
     <cs:effectRef idx="0"/>
     <cs:fontRef idx="minor">
       <a:schemeClr val="tx1"/>
@@ -7758,23 +8973,22 @@
     <cs:fillRef idx="0"/>
     <cs:effectRef idx="0"/>
     <cs:fontRef idx="minor">
-      <a:schemeClr val="tx1"/>
+      <a:schemeClr val="dk1"/>
     </cs:fontRef>
     <cs:spPr>
       <a:solidFill>
         <a:schemeClr val="dk1">
-          <a:lumMod val="75000"/>
-          <a:lumOff val="25000"/>
+          <a:lumMod val="65000"/>
+          <a:lumOff val="35000"/>
         </a:schemeClr>
       </a:solidFill>
-      <a:ln w="9525" cap="flat" cmpd="sng" algn="ctr">
+      <a:ln w="9525">
         <a:solidFill>
           <a:schemeClr val="tx1">
             <a:lumMod val="65000"/>
             <a:lumOff val="35000"/>
           </a:schemeClr>
         </a:solidFill>
-        <a:round/>
       </a:ln>
     </cs:spPr>
   </cs:downBar>
@@ -7879,8 +9093,8 @@
       <a:ln w="9525" cap="flat" cmpd="sng" algn="ctr">
         <a:solidFill>
           <a:schemeClr val="tx1">
-            <a:lumMod val="50000"/>
-            <a:lumOff val="50000"/>
+            <a:lumMod val="75000"/>
+            <a:lumOff val="25000"/>
           </a:schemeClr>
         </a:solidFill>
         <a:round/>
@@ -8012,20 +9226,19 @@
     <cs:fillRef idx="0"/>
     <cs:effectRef idx="0"/>
     <cs:fontRef idx="minor">
-      <a:schemeClr val="tx1"/>
+      <a:schemeClr val="dk1"/>
     </cs:fontRef>
     <cs:spPr>
       <a:solidFill>
         <a:schemeClr val="lt1"/>
       </a:solidFill>
-      <a:ln w="9525" cap="flat" cmpd="sng" algn="ctr">
+      <a:ln w="9525">
         <a:solidFill>
           <a:schemeClr val="tx1">
-            <a:lumMod val="65000"/>
-            <a:lumOff val="35000"/>
+            <a:lumMod val="15000"/>
+            <a:lumOff val="85000"/>
           </a:schemeClr>
         </a:solidFill>
-        <a:round/>
       </a:ln>
     </cs:spPr>
   </cs:upBar>
@@ -8058,7 +9271,7 @@
 </cs:chartStyle>
 </file>
 
-<file path=ppt/charts/style8.xml><?xml version="1.0" encoding="utf-8"?>
+<file path=ppt/charts/style7.xml><?xml version="1.0" encoding="utf-8"?>
 <cs:chartStyle xmlns:cs="http://schemas.microsoft.com/office/drawing/2012/chartStyle" xmlns:a="http://schemas.openxmlformats.org/drawingml/2006/main" id="251">
   <cs:axisTitle>
     <cs:lnRef idx="0"/>
@@ -8545,6 +9758,1028 @@
           </a:schemeClr>
         </a:solidFill>
         <a:round/>
+      </a:ln>
+    </cs:spPr>
+  </cs:upBar>
+  <cs:valueAxis>
+    <cs:lnRef idx="0"/>
+    <cs:fillRef idx="0"/>
+    <cs:effectRef idx="0"/>
+    <cs:fontRef idx="minor">
+      <a:schemeClr val="tx1">
+        <a:lumMod val="65000"/>
+        <a:lumOff val="35000"/>
+      </a:schemeClr>
+    </cs:fontRef>
+    <cs:defRPr sz="1197" kern="1200"/>
+  </cs:valueAxis>
+  <cs:wall>
+    <cs:lnRef idx="0"/>
+    <cs:fillRef idx="0"/>
+    <cs:effectRef idx="0"/>
+    <cs:fontRef idx="minor">
+      <a:schemeClr val="tx1"/>
+    </cs:fontRef>
+    <cs:spPr>
+      <a:noFill/>
+      <a:ln>
+        <a:noFill/>
+      </a:ln>
+    </cs:spPr>
+  </cs:wall>
+</cs:chartStyle>
+</file>
+
+<file path=ppt/charts/style8.xml><?xml version="1.0" encoding="utf-8"?>
+<cs:chartStyle xmlns:cs="http://schemas.microsoft.com/office/drawing/2012/chartStyle" xmlns:a="http://schemas.openxmlformats.org/drawingml/2006/main" id="251">
+  <cs:axisTitle>
+    <cs:lnRef idx="0"/>
+    <cs:fillRef idx="0"/>
+    <cs:effectRef idx="0"/>
+    <cs:fontRef idx="minor">
+      <a:schemeClr val="tx1">
+        <a:lumMod val="65000"/>
+        <a:lumOff val="35000"/>
+      </a:schemeClr>
+    </cs:fontRef>
+    <cs:defRPr sz="1330" kern="1200"/>
+  </cs:axisTitle>
+  <cs:categoryAxis>
+    <cs:lnRef idx="0"/>
+    <cs:fillRef idx="0"/>
+    <cs:effectRef idx="0"/>
+    <cs:fontRef idx="minor">
+      <a:schemeClr val="tx1">
+        <a:lumMod val="65000"/>
+        <a:lumOff val="35000"/>
+      </a:schemeClr>
+    </cs:fontRef>
+    <cs:spPr>
+      <a:ln w="9525" cap="flat" cmpd="sng" algn="ctr">
+        <a:solidFill>
+          <a:schemeClr val="tx1">
+            <a:lumMod val="15000"/>
+            <a:lumOff val="85000"/>
+          </a:schemeClr>
+        </a:solidFill>
+        <a:round/>
+      </a:ln>
+    </cs:spPr>
+    <cs:defRPr sz="1197" kern="1200"/>
+  </cs:categoryAxis>
+  <cs:chartArea mods="allowNoFillOverride allowNoLineOverride">
+    <cs:lnRef idx="0"/>
+    <cs:fillRef idx="0"/>
+    <cs:effectRef idx="0"/>
+    <cs:fontRef idx="minor">
+      <a:schemeClr val="tx1"/>
+    </cs:fontRef>
+    <cs:spPr>
+      <a:solidFill>
+        <a:schemeClr val="bg1"/>
+      </a:solidFill>
+      <a:ln w="9525" cap="flat" cmpd="sng" algn="ctr">
+        <a:solidFill>
+          <a:schemeClr val="tx1">
+            <a:lumMod val="15000"/>
+            <a:lumOff val="85000"/>
+          </a:schemeClr>
+        </a:solidFill>
+        <a:round/>
+      </a:ln>
+    </cs:spPr>
+    <cs:defRPr sz="1197" kern="1200"/>
+  </cs:chartArea>
+  <cs:dataLabel>
+    <cs:lnRef idx="0"/>
+    <cs:fillRef idx="0"/>
+    <cs:effectRef idx="0"/>
+    <cs:fontRef idx="minor">
+      <a:schemeClr val="tx1">
+        <a:lumMod val="75000"/>
+        <a:lumOff val="25000"/>
+      </a:schemeClr>
+    </cs:fontRef>
+    <cs:defRPr sz="1197" kern="1200"/>
+  </cs:dataLabel>
+  <cs:dataLabelCallout>
+    <cs:lnRef idx="0"/>
+    <cs:fillRef idx="0"/>
+    <cs:effectRef idx="0"/>
+    <cs:fontRef idx="minor">
+      <a:schemeClr val="dk1">
+        <a:lumMod val="65000"/>
+        <a:lumOff val="35000"/>
+      </a:schemeClr>
+    </cs:fontRef>
+    <cs:spPr>
+      <a:solidFill>
+        <a:schemeClr val="lt1"/>
+      </a:solidFill>
+      <a:ln>
+        <a:solidFill>
+          <a:schemeClr val="dk1">
+            <a:lumMod val="25000"/>
+            <a:lumOff val="75000"/>
+          </a:schemeClr>
+        </a:solidFill>
+      </a:ln>
+    </cs:spPr>
+    <cs:defRPr sz="1197" kern="1200"/>
+    <cs:bodyPr rot="0" spcFirstLastPara="1" vertOverflow="clip" horzOverflow="clip" vert="horz" wrap="square" lIns="36576" tIns="18288" rIns="36576" bIns="18288" anchor="ctr" anchorCtr="1">
+      <a:spAutoFit/>
+    </cs:bodyPr>
+  </cs:dataLabelCallout>
+  <cs:dataPoint>
+    <cs:lnRef idx="0"/>
+    <cs:fillRef idx="1">
+      <cs:styleClr val="auto"/>
+    </cs:fillRef>
+    <cs:effectRef idx="0"/>
+    <cs:fontRef idx="minor">
+      <a:schemeClr val="tx1"/>
+    </cs:fontRef>
+    <cs:spPr>
+      <a:ln w="19050">
+        <a:solidFill>
+          <a:schemeClr val="lt1"/>
+        </a:solidFill>
+      </a:ln>
+    </cs:spPr>
+  </cs:dataPoint>
+  <cs:dataPoint3D>
+    <cs:lnRef idx="0"/>
+    <cs:fillRef idx="1">
+      <cs:styleClr val="auto"/>
+    </cs:fillRef>
+    <cs:effectRef idx="0"/>
+    <cs:fontRef idx="minor">
+      <a:schemeClr val="tx1"/>
+    </cs:fontRef>
+    <cs:spPr>
+      <a:ln w="25400">
+        <a:solidFill>
+          <a:schemeClr val="lt1"/>
+        </a:solidFill>
+      </a:ln>
+    </cs:spPr>
+  </cs:dataPoint3D>
+  <cs:dataPointLine>
+    <cs:lnRef idx="0">
+      <cs:styleClr val="auto"/>
+    </cs:lnRef>
+    <cs:fillRef idx="0"/>
+    <cs:effectRef idx="0"/>
+    <cs:fontRef idx="minor">
+      <a:schemeClr val="tx1"/>
+    </cs:fontRef>
+    <cs:spPr>
+      <a:ln w="28575" cap="rnd">
+        <a:solidFill>
+          <a:schemeClr val="phClr"/>
+        </a:solidFill>
+        <a:round/>
+      </a:ln>
+    </cs:spPr>
+  </cs:dataPointLine>
+  <cs:dataPointMarker>
+    <cs:lnRef idx="0">
+      <cs:styleClr val="auto"/>
+    </cs:lnRef>
+    <cs:fillRef idx="1">
+      <cs:styleClr val="auto"/>
+    </cs:fillRef>
+    <cs:effectRef idx="0"/>
+    <cs:fontRef idx="minor">
+      <a:schemeClr val="tx1"/>
+    </cs:fontRef>
+    <cs:spPr>
+      <a:ln w="9525">
+        <a:solidFill>
+          <a:schemeClr val="phClr"/>
+        </a:solidFill>
+      </a:ln>
+    </cs:spPr>
+  </cs:dataPointMarker>
+  <cs:dataPointMarkerLayout symbol="circle" size="5"/>
+  <cs:dataPointWireframe>
+    <cs:lnRef idx="0">
+      <cs:styleClr val="auto"/>
+    </cs:lnRef>
+    <cs:fillRef idx="0"/>
+    <cs:effectRef idx="0"/>
+    <cs:fontRef idx="minor">
+      <a:schemeClr val="tx1"/>
+    </cs:fontRef>
+    <cs:spPr>
+      <a:ln w="9525" cap="rnd">
+        <a:solidFill>
+          <a:schemeClr val="phClr"/>
+        </a:solidFill>
+        <a:round/>
+      </a:ln>
+    </cs:spPr>
+  </cs:dataPointWireframe>
+  <cs:dataTable>
+    <cs:lnRef idx="0"/>
+    <cs:fillRef idx="0"/>
+    <cs:effectRef idx="0"/>
+    <cs:fontRef idx="minor">
+      <a:schemeClr val="tx1">
+        <a:lumMod val="65000"/>
+        <a:lumOff val="35000"/>
+      </a:schemeClr>
+    </cs:fontRef>
+    <cs:spPr>
+      <a:noFill/>
+      <a:ln w="9525" cap="flat" cmpd="sng" algn="ctr">
+        <a:solidFill>
+          <a:schemeClr val="tx1">
+            <a:lumMod val="15000"/>
+            <a:lumOff val="85000"/>
+          </a:schemeClr>
+        </a:solidFill>
+        <a:round/>
+      </a:ln>
+    </cs:spPr>
+    <cs:defRPr sz="1197" kern="1200"/>
+  </cs:dataTable>
+  <cs:downBar>
+    <cs:lnRef idx="0"/>
+    <cs:fillRef idx="0"/>
+    <cs:effectRef idx="0"/>
+    <cs:fontRef idx="minor">
+      <a:schemeClr val="tx1"/>
+    </cs:fontRef>
+    <cs:spPr>
+      <a:solidFill>
+        <a:schemeClr val="dk1">
+          <a:lumMod val="75000"/>
+          <a:lumOff val="25000"/>
+        </a:schemeClr>
+      </a:solidFill>
+      <a:ln w="9525" cap="flat" cmpd="sng" algn="ctr">
+        <a:solidFill>
+          <a:schemeClr val="tx1">
+            <a:lumMod val="65000"/>
+            <a:lumOff val="35000"/>
+          </a:schemeClr>
+        </a:solidFill>
+        <a:round/>
+      </a:ln>
+    </cs:spPr>
+  </cs:downBar>
+  <cs:dropLine>
+    <cs:lnRef idx="0"/>
+    <cs:fillRef idx="0"/>
+    <cs:effectRef idx="0"/>
+    <cs:fontRef idx="minor">
+      <a:schemeClr val="tx1"/>
+    </cs:fontRef>
+    <cs:spPr>
+      <a:ln w="9525" cap="flat" cmpd="sng" algn="ctr">
+        <a:solidFill>
+          <a:schemeClr val="tx1">
+            <a:lumMod val="35000"/>
+            <a:lumOff val="65000"/>
+          </a:schemeClr>
+        </a:solidFill>
+        <a:round/>
+      </a:ln>
+    </cs:spPr>
+  </cs:dropLine>
+  <cs:errorBar>
+    <cs:lnRef idx="0"/>
+    <cs:fillRef idx="0"/>
+    <cs:effectRef idx="0"/>
+    <cs:fontRef idx="minor">
+      <a:schemeClr val="tx1"/>
+    </cs:fontRef>
+    <cs:spPr>
+      <a:ln w="9525" cap="flat" cmpd="sng" algn="ctr">
+        <a:solidFill>
+          <a:schemeClr val="tx1">
+            <a:lumMod val="65000"/>
+            <a:lumOff val="35000"/>
+          </a:schemeClr>
+        </a:solidFill>
+        <a:round/>
+      </a:ln>
+    </cs:spPr>
+  </cs:errorBar>
+  <cs:floor>
+    <cs:lnRef idx="0"/>
+    <cs:fillRef idx="0"/>
+    <cs:effectRef idx="0"/>
+    <cs:fontRef idx="minor">
+      <a:schemeClr val="tx1"/>
+    </cs:fontRef>
+    <cs:spPr>
+      <a:noFill/>
+      <a:ln>
+        <a:noFill/>
+      </a:ln>
+    </cs:spPr>
+  </cs:floor>
+  <cs:gridlineMajor>
+    <cs:lnRef idx="0"/>
+    <cs:fillRef idx="0"/>
+    <cs:effectRef idx="0"/>
+    <cs:fontRef idx="minor">
+      <a:schemeClr val="tx1"/>
+    </cs:fontRef>
+    <cs:spPr>
+      <a:ln w="9525" cap="flat" cmpd="sng" algn="ctr">
+        <a:solidFill>
+          <a:schemeClr val="tx1">
+            <a:lumMod val="15000"/>
+            <a:lumOff val="85000"/>
+          </a:schemeClr>
+        </a:solidFill>
+        <a:round/>
+      </a:ln>
+    </cs:spPr>
+  </cs:gridlineMajor>
+  <cs:gridlineMinor>
+    <cs:lnRef idx="0"/>
+    <cs:fillRef idx="0"/>
+    <cs:effectRef idx="0"/>
+    <cs:fontRef idx="minor">
+      <a:schemeClr val="tx1"/>
+    </cs:fontRef>
+    <cs:spPr>
+      <a:ln w="9525" cap="flat" cmpd="sng" algn="ctr">
+        <a:solidFill>
+          <a:schemeClr val="tx1">
+            <a:lumMod val="5000"/>
+            <a:lumOff val="95000"/>
+          </a:schemeClr>
+        </a:solidFill>
+        <a:round/>
+      </a:ln>
+    </cs:spPr>
+  </cs:gridlineMinor>
+  <cs:hiLoLine>
+    <cs:lnRef idx="0"/>
+    <cs:fillRef idx="0"/>
+    <cs:effectRef idx="0"/>
+    <cs:fontRef idx="minor">
+      <a:schemeClr val="tx1"/>
+    </cs:fontRef>
+    <cs:spPr>
+      <a:ln w="9525" cap="flat" cmpd="sng" algn="ctr">
+        <a:solidFill>
+          <a:schemeClr val="tx1">
+            <a:lumMod val="50000"/>
+            <a:lumOff val="50000"/>
+          </a:schemeClr>
+        </a:solidFill>
+        <a:round/>
+      </a:ln>
+    </cs:spPr>
+  </cs:hiLoLine>
+  <cs:leaderLine>
+    <cs:lnRef idx="0"/>
+    <cs:fillRef idx="0"/>
+    <cs:effectRef idx="0"/>
+    <cs:fontRef idx="minor">
+      <a:schemeClr val="tx1"/>
+    </cs:fontRef>
+    <cs:spPr>
+      <a:ln w="9525" cap="flat" cmpd="sng" algn="ctr">
+        <a:solidFill>
+          <a:schemeClr val="tx1">
+            <a:lumMod val="35000"/>
+            <a:lumOff val="65000"/>
+          </a:schemeClr>
+        </a:solidFill>
+        <a:round/>
+      </a:ln>
+    </cs:spPr>
+  </cs:leaderLine>
+  <cs:legend>
+    <cs:lnRef idx="0"/>
+    <cs:fillRef idx="0"/>
+    <cs:effectRef idx="0"/>
+    <cs:fontRef idx="minor">
+      <a:schemeClr val="tx1">
+        <a:lumMod val="65000"/>
+        <a:lumOff val="35000"/>
+      </a:schemeClr>
+    </cs:fontRef>
+    <cs:defRPr sz="1197" kern="1200"/>
+  </cs:legend>
+  <cs:plotArea mods="allowNoFillOverride allowNoLineOverride">
+    <cs:lnRef idx="0"/>
+    <cs:fillRef idx="0"/>
+    <cs:effectRef idx="0"/>
+    <cs:fontRef idx="minor">
+      <a:schemeClr val="tx1"/>
+    </cs:fontRef>
+  </cs:plotArea>
+  <cs:plotArea3D mods="allowNoFillOverride allowNoLineOverride">
+    <cs:lnRef idx="0"/>
+    <cs:fillRef idx="0"/>
+    <cs:effectRef idx="0"/>
+    <cs:fontRef idx="minor">
+      <a:schemeClr val="tx1"/>
+    </cs:fontRef>
+  </cs:plotArea3D>
+  <cs:seriesAxis>
+    <cs:lnRef idx="0"/>
+    <cs:fillRef idx="0"/>
+    <cs:effectRef idx="0"/>
+    <cs:fontRef idx="minor">
+      <a:schemeClr val="tx1">
+        <a:lumMod val="65000"/>
+        <a:lumOff val="35000"/>
+      </a:schemeClr>
+    </cs:fontRef>
+    <cs:defRPr sz="1197" kern="1200"/>
+  </cs:seriesAxis>
+  <cs:seriesLine>
+    <cs:lnRef idx="0"/>
+    <cs:fillRef idx="0"/>
+    <cs:effectRef idx="0"/>
+    <cs:fontRef idx="minor">
+      <a:schemeClr val="tx1"/>
+    </cs:fontRef>
+    <cs:spPr>
+      <a:ln w="9525" cap="flat" cmpd="sng" algn="ctr">
+        <a:solidFill>
+          <a:schemeClr val="tx1">
+            <a:lumMod val="35000"/>
+            <a:lumOff val="65000"/>
+          </a:schemeClr>
+        </a:solidFill>
+        <a:round/>
+      </a:ln>
+    </cs:spPr>
+  </cs:seriesLine>
+  <cs:title>
+    <cs:lnRef idx="0"/>
+    <cs:fillRef idx="0"/>
+    <cs:effectRef idx="0"/>
+    <cs:fontRef idx="minor">
+      <a:schemeClr val="tx1">
+        <a:lumMod val="65000"/>
+        <a:lumOff val="35000"/>
+      </a:schemeClr>
+    </cs:fontRef>
+    <cs:defRPr sz="1862" b="0" kern="1200" spc="0" baseline="0"/>
+  </cs:title>
+  <cs:trendline>
+    <cs:lnRef idx="0">
+      <cs:styleClr val="auto"/>
+    </cs:lnRef>
+    <cs:fillRef idx="0"/>
+    <cs:effectRef idx="0"/>
+    <cs:fontRef idx="minor">
+      <a:schemeClr val="tx1"/>
+    </cs:fontRef>
+    <cs:spPr>
+      <a:ln w="19050" cap="rnd">
+        <a:solidFill>
+          <a:schemeClr val="phClr"/>
+        </a:solidFill>
+        <a:prstDash val="sysDot"/>
+      </a:ln>
+    </cs:spPr>
+  </cs:trendline>
+  <cs:trendlineLabel>
+    <cs:lnRef idx="0"/>
+    <cs:fillRef idx="0"/>
+    <cs:effectRef idx="0"/>
+    <cs:fontRef idx="minor">
+      <a:schemeClr val="tx1">
+        <a:lumMod val="65000"/>
+        <a:lumOff val="35000"/>
+      </a:schemeClr>
+    </cs:fontRef>
+    <cs:defRPr sz="1197" kern="1200"/>
+  </cs:trendlineLabel>
+  <cs:upBar>
+    <cs:lnRef idx="0"/>
+    <cs:fillRef idx="0"/>
+    <cs:effectRef idx="0"/>
+    <cs:fontRef idx="minor">
+      <a:schemeClr val="tx1"/>
+    </cs:fontRef>
+    <cs:spPr>
+      <a:solidFill>
+        <a:schemeClr val="lt1"/>
+      </a:solidFill>
+      <a:ln w="9525" cap="flat" cmpd="sng" algn="ctr">
+        <a:solidFill>
+          <a:schemeClr val="tx1">
+            <a:lumMod val="65000"/>
+            <a:lumOff val="35000"/>
+          </a:schemeClr>
+        </a:solidFill>
+        <a:round/>
+      </a:ln>
+    </cs:spPr>
+  </cs:upBar>
+  <cs:valueAxis>
+    <cs:lnRef idx="0"/>
+    <cs:fillRef idx="0"/>
+    <cs:effectRef idx="0"/>
+    <cs:fontRef idx="minor">
+      <a:schemeClr val="tx1">
+        <a:lumMod val="65000"/>
+        <a:lumOff val="35000"/>
+      </a:schemeClr>
+    </cs:fontRef>
+    <cs:defRPr sz="1197" kern="1200"/>
+  </cs:valueAxis>
+  <cs:wall>
+    <cs:lnRef idx="0"/>
+    <cs:fillRef idx="0"/>
+    <cs:effectRef idx="0"/>
+    <cs:fontRef idx="minor">
+      <a:schemeClr val="tx1"/>
+    </cs:fontRef>
+    <cs:spPr>
+      <a:noFill/>
+      <a:ln>
+        <a:noFill/>
+      </a:ln>
+    </cs:spPr>
+  </cs:wall>
+</cs:chartStyle>
+</file>
+
+<file path=ppt/charts/style9.xml><?xml version="1.0" encoding="utf-8"?>
+<cs:chartStyle xmlns:cs="http://schemas.microsoft.com/office/drawing/2012/chartStyle" xmlns:a="http://schemas.openxmlformats.org/drawingml/2006/main" id="201">
+  <cs:axisTitle>
+    <cs:lnRef idx="0"/>
+    <cs:fillRef idx="0"/>
+    <cs:effectRef idx="0"/>
+    <cs:fontRef idx="minor">
+      <a:schemeClr val="tx1">
+        <a:lumMod val="65000"/>
+        <a:lumOff val="35000"/>
+      </a:schemeClr>
+    </cs:fontRef>
+    <cs:defRPr sz="1330" kern="1200"/>
+  </cs:axisTitle>
+  <cs:categoryAxis>
+    <cs:lnRef idx="0"/>
+    <cs:fillRef idx="0"/>
+    <cs:effectRef idx="0"/>
+    <cs:fontRef idx="minor">
+      <a:schemeClr val="tx1">
+        <a:lumMod val="65000"/>
+        <a:lumOff val="35000"/>
+      </a:schemeClr>
+    </cs:fontRef>
+    <cs:spPr>
+      <a:ln w="9525" cap="flat" cmpd="sng" algn="ctr">
+        <a:solidFill>
+          <a:schemeClr val="tx1">
+            <a:lumMod val="15000"/>
+            <a:lumOff val="85000"/>
+          </a:schemeClr>
+        </a:solidFill>
+        <a:round/>
+      </a:ln>
+    </cs:spPr>
+    <cs:defRPr sz="1197" kern="1200"/>
+  </cs:categoryAxis>
+  <cs:chartArea mods="allowNoFillOverride allowNoLineOverride">
+    <cs:lnRef idx="0"/>
+    <cs:fillRef idx="0"/>
+    <cs:effectRef idx="0"/>
+    <cs:fontRef idx="minor">
+      <a:schemeClr val="tx1"/>
+    </cs:fontRef>
+    <cs:spPr>
+      <a:solidFill>
+        <a:schemeClr val="bg1"/>
+      </a:solidFill>
+      <a:ln w="9525" cap="flat" cmpd="sng" algn="ctr">
+        <a:solidFill>
+          <a:schemeClr val="tx1">
+            <a:lumMod val="15000"/>
+            <a:lumOff val="85000"/>
+          </a:schemeClr>
+        </a:solidFill>
+        <a:round/>
+      </a:ln>
+    </cs:spPr>
+    <cs:defRPr sz="1330" kern="1200"/>
+  </cs:chartArea>
+  <cs:dataLabel>
+    <cs:lnRef idx="0"/>
+    <cs:fillRef idx="0"/>
+    <cs:effectRef idx="0"/>
+    <cs:fontRef idx="minor">
+      <a:schemeClr val="tx1">
+        <a:lumMod val="75000"/>
+        <a:lumOff val="25000"/>
+      </a:schemeClr>
+    </cs:fontRef>
+    <cs:defRPr sz="1197" kern="1200"/>
+  </cs:dataLabel>
+  <cs:dataLabelCallout>
+    <cs:lnRef idx="0"/>
+    <cs:fillRef idx="0"/>
+    <cs:effectRef idx="0"/>
+    <cs:fontRef idx="minor">
+      <a:schemeClr val="dk1">
+        <a:lumMod val="65000"/>
+        <a:lumOff val="35000"/>
+      </a:schemeClr>
+    </cs:fontRef>
+    <cs:spPr>
+      <a:solidFill>
+        <a:schemeClr val="lt1"/>
+      </a:solidFill>
+      <a:ln>
+        <a:solidFill>
+          <a:schemeClr val="dk1">
+            <a:lumMod val="25000"/>
+            <a:lumOff val="75000"/>
+          </a:schemeClr>
+        </a:solidFill>
+      </a:ln>
+    </cs:spPr>
+    <cs:defRPr sz="1197" kern="1200"/>
+    <cs:bodyPr rot="0" spcFirstLastPara="1" vertOverflow="clip" horzOverflow="clip" vert="horz" wrap="square" lIns="36576" tIns="18288" rIns="36576" bIns="18288" anchor="ctr" anchorCtr="1">
+      <a:spAutoFit/>
+    </cs:bodyPr>
+  </cs:dataLabelCallout>
+  <cs:dataPoint>
+    <cs:lnRef idx="0"/>
+    <cs:fillRef idx="1">
+      <cs:styleClr val="auto"/>
+    </cs:fillRef>
+    <cs:effectRef idx="0"/>
+    <cs:fontRef idx="minor">
+      <a:schemeClr val="tx1"/>
+    </cs:fontRef>
+  </cs:dataPoint>
+  <cs:dataPoint3D>
+    <cs:lnRef idx="0"/>
+    <cs:fillRef idx="1">
+      <cs:styleClr val="auto"/>
+    </cs:fillRef>
+    <cs:effectRef idx="0"/>
+    <cs:fontRef idx="minor">
+      <a:schemeClr val="tx1"/>
+    </cs:fontRef>
+  </cs:dataPoint3D>
+  <cs:dataPointLine>
+    <cs:lnRef idx="0">
+      <cs:styleClr val="auto"/>
+    </cs:lnRef>
+    <cs:fillRef idx="1"/>
+    <cs:effectRef idx="0"/>
+    <cs:fontRef idx="minor">
+      <a:schemeClr val="tx1"/>
+    </cs:fontRef>
+    <cs:spPr>
+      <a:ln w="28575" cap="rnd">
+        <a:solidFill>
+          <a:schemeClr val="phClr"/>
+        </a:solidFill>
+        <a:round/>
+      </a:ln>
+    </cs:spPr>
+  </cs:dataPointLine>
+  <cs:dataPointMarker>
+    <cs:lnRef idx="0">
+      <cs:styleClr val="auto"/>
+    </cs:lnRef>
+    <cs:fillRef idx="1">
+      <cs:styleClr val="auto"/>
+    </cs:fillRef>
+    <cs:effectRef idx="0"/>
+    <cs:fontRef idx="minor">
+      <a:schemeClr val="tx1"/>
+    </cs:fontRef>
+    <cs:spPr>
+      <a:ln w="9525">
+        <a:solidFill>
+          <a:schemeClr val="phClr"/>
+        </a:solidFill>
+      </a:ln>
+    </cs:spPr>
+  </cs:dataPointMarker>
+  <cs:dataPointMarkerLayout symbol="circle" size="5"/>
+  <cs:dataPointWireframe>
+    <cs:lnRef idx="0">
+      <cs:styleClr val="auto"/>
+    </cs:lnRef>
+    <cs:fillRef idx="1"/>
+    <cs:effectRef idx="0"/>
+    <cs:fontRef idx="minor">
+      <a:schemeClr val="tx1"/>
+    </cs:fontRef>
+    <cs:spPr>
+      <a:ln w="9525" cap="rnd">
+        <a:solidFill>
+          <a:schemeClr val="phClr"/>
+        </a:solidFill>
+        <a:round/>
+      </a:ln>
+    </cs:spPr>
+  </cs:dataPointWireframe>
+  <cs:dataTable>
+    <cs:lnRef idx="0"/>
+    <cs:fillRef idx="0"/>
+    <cs:effectRef idx="0"/>
+    <cs:fontRef idx="minor">
+      <a:schemeClr val="tx1">
+        <a:lumMod val="65000"/>
+        <a:lumOff val="35000"/>
+      </a:schemeClr>
+    </cs:fontRef>
+    <cs:spPr>
+      <a:noFill/>
+      <a:ln w="9525" cap="flat" cmpd="sng" algn="ctr">
+        <a:solidFill>
+          <a:schemeClr val="tx1">
+            <a:lumMod val="15000"/>
+            <a:lumOff val="85000"/>
+          </a:schemeClr>
+        </a:solidFill>
+        <a:round/>
+      </a:ln>
+    </cs:spPr>
+    <cs:defRPr sz="1197" kern="1200"/>
+  </cs:dataTable>
+  <cs:downBar>
+    <cs:lnRef idx="0"/>
+    <cs:fillRef idx="0"/>
+    <cs:effectRef idx="0"/>
+    <cs:fontRef idx="minor">
+      <a:schemeClr val="dk1"/>
+    </cs:fontRef>
+    <cs:spPr>
+      <a:solidFill>
+        <a:schemeClr val="dk1">
+          <a:lumMod val="65000"/>
+          <a:lumOff val="35000"/>
+        </a:schemeClr>
+      </a:solidFill>
+      <a:ln w="9525">
+        <a:solidFill>
+          <a:schemeClr val="tx1">
+            <a:lumMod val="65000"/>
+            <a:lumOff val="35000"/>
+          </a:schemeClr>
+        </a:solidFill>
+      </a:ln>
+    </cs:spPr>
+  </cs:downBar>
+  <cs:dropLine>
+    <cs:lnRef idx="0"/>
+    <cs:fillRef idx="0"/>
+    <cs:effectRef idx="0"/>
+    <cs:fontRef idx="minor">
+      <a:schemeClr val="tx1"/>
+    </cs:fontRef>
+    <cs:spPr>
+      <a:ln w="9525" cap="flat" cmpd="sng" algn="ctr">
+        <a:solidFill>
+          <a:schemeClr val="tx1">
+            <a:lumMod val="35000"/>
+            <a:lumOff val="65000"/>
+          </a:schemeClr>
+        </a:solidFill>
+        <a:round/>
+      </a:ln>
+    </cs:spPr>
+  </cs:dropLine>
+  <cs:errorBar>
+    <cs:lnRef idx="0"/>
+    <cs:fillRef idx="0"/>
+    <cs:effectRef idx="0"/>
+    <cs:fontRef idx="minor">
+      <a:schemeClr val="tx1"/>
+    </cs:fontRef>
+    <cs:spPr>
+      <a:ln w="9525" cap="flat" cmpd="sng" algn="ctr">
+        <a:solidFill>
+          <a:schemeClr val="tx1">
+            <a:lumMod val="65000"/>
+            <a:lumOff val="35000"/>
+          </a:schemeClr>
+        </a:solidFill>
+        <a:round/>
+      </a:ln>
+    </cs:spPr>
+  </cs:errorBar>
+  <cs:floor>
+    <cs:lnRef idx="0"/>
+    <cs:fillRef idx="0"/>
+    <cs:effectRef idx="0"/>
+    <cs:fontRef idx="minor">
+      <a:schemeClr val="tx1"/>
+    </cs:fontRef>
+    <cs:spPr>
+      <a:noFill/>
+      <a:ln>
+        <a:noFill/>
+      </a:ln>
+    </cs:spPr>
+  </cs:floor>
+  <cs:gridlineMajor>
+    <cs:lnRef idx="0"/>
+    <cs:fillRef idx="0"/>
+    <cs:effectRef idx="0"/>
+    <cs:fontRef idx="minor">
+      <a:schemeClr val="tx1"/>
+    </cs:fontRef>
+    <cs:spPr>
+      <a:ln w="9525" cap="flat" cmpd="sng" algn="ctr">
+        <a:solidFill>
+          <a:schemeClr val="tx1">
+            <a:lumMod val="15000"/>
+            <a:lumOff val="85000"/>
+          </a:schemeClr>
+        </a:solidFill>
+        <a:round/>
+      </a:ln>
+    </cs:spPr>
+  </cs:gridlineMajor>
+  <cs:gridlineMinor>
+    <cs:lnRef idx="0"/>
+    <cs:fillRef idx="0"/>
+    <cs:effectRef idx="0"/>
+    <cs:fontRef idx="minor">
+      <a:schemeClr val="tx1"/>
+    </cs:fontRef>
+    <cs:spPr>
+      <a:ln w="9525" cap="flat" cmpd="sng" algn="ctr">
+        <a:solidFill>
+          <a:schemeClr val="tx1">
+            <a:lumMod val="5000"/>
+            <a:lumOff val="95000"/>
+          </a:schemeClr>
+        </a:solidFill>
+        <a:round/>
+      </a:ln>
+    </cs:spPr>
+  </cs:gridlineMinor>
+  <cs:hiLoLine>
+    <cs:lnRef idx="0"/>
+    <cs:fillRef idx="0"/>
+    <cs:effectRef idx="0"/>
+    <cs:fontRef idx="minor">
+      <a:schemeClr val="tx1"/>
+    </cs:fontRef>
+    <cs:spPr>
+      <a:ln w="9525" cap="flat" cmpd="sng" algn="ctr">
+        <a:solidFill>
+          <a:schemeClr val="tx1">
+            <a:lumMod val="75000"/>
+            <a:lumOff val="25000"/>
+          </a:schemeClr>
+        </a:solidFill>
+        <a:round/>
+      </a:ln>
+    </cs:spPr>
+  </cs:hiLoLine>
+  <cs:leaderLine>
+    <cs:lnRef idx="0"/>
+    <cs:fillRef idx="0"/>
+    <cs:effectRef idx="0"/>
+    <cs:fontRef idx="minor">
+      <a:schemeClr val="tx1"/>
+    </cs:fontRef>
+    <cs:spPr>
+      <a:ln w="9525" cap="flat" cmpd="sng" algn="ctr">
+        <a:solidFill>
+          <a:schemeClr val="tx1">
+            <a:lumMod val="35000"/>
+            <a:lumOff val="65000"/>
+          </a:schemeClr>
+        </a:solidFill>
+        <a:round/>
+      </a:ln>
+    </cs:spPr>
+  </cs:leaderLine>
+  <cs:legend>
+    <cs:lnRef idx="0"/>
+    <cs:fillRef idx="0"/>
+    <cs:effectRef idx="0"/>
+    <cs:fontRef idx="minor">
+      <a:schemeClr val="tx1">
+        <a:lumMod val="65000"/>
+        <a:lumOff val="35000"/>
+      </a:schemeClr>
+    </cs:fontRef>
+    <cs:defRPr sz="1197" kern="1200"/>
+  </cs:legend>
+  <cs:plotArea mods="allowNoFillOverride allowNoLineOverride">
+    <cs:lnRef idx="0"/>
+    <cs:fillRef idx="0"/>
+    <cs:effectRef idx="0"/>
+    <cs:fontRef idx="minor">
+      <a:schemeClr val="tx1"/>
+    </cs:fontRef>
+  </cs:plotArea>
+  <cs:plotArea3D mods="allowNoFillOverride allowNoLineOverride">
+    <cs:lnRef idx="0"/>
+    <cs:fillRef idx="0"/>
+    <cs:effectRef idx="0"/>
+    <cs:fontRef idx="minor">
+      <a:schemeClr val="tx1"/>
+    </cs:fontRef>
+  </cs:plotArea3D>
+  <cs:seriesAxis>
+    <cs:lnRef idx="0"/>
+    <cs:fillRef idx="0"/>
+    <cs:effectRef idx="0"/>
+    <cs:fontRef idx="minor">
+      <a:schemeClr val="tx1">
+        <a:lumMod val="65000"/>
+        <a:lumOff val="35000"/>
+      </a:schemeClr>
+    </cs:fontRef>
+    <cs:defRPr sz="1197" kern="1200"/>
+  </cs:seriesAxis>
+  <cs:seriesLine>
+    <cs:lnRef idx="0"/>
+    <cs:fillRef idx="0"/>
+    <cs:effectRef idx="0"/>
+    <cs:fontRef idx="minor">
+      <a:schemeClr val="tx1"/>
+    </cs:fontRef>
+    <cs:spPr>
+      <a:ln w="9525" cap="flat" cmpd="sng" algn="ctr">
+        <a:solidFill>
+          <a:schemeClr val="tx1">
+            <a:lumMod val="35000"/>
+            <a:lumOff val="65000"/>
+          </a:schemeClr>
+        </a:solidFill>
+        <a:round/>
+      </a:ln>
+    </cs:spPr>
+  </cs:seriesLine>
+  <cs:title>
+    <cs:lnRef idx="0"/>
+    <cs:fillRef idx="0"/>
+    <cs:effectRef idx="0"/>
+    <cs:fontRef idx="minor">
+      <a:schemeClr val="tx1">
+        <a:lumMod val="65000"/>
+        <a:lumOff val="35000"/>
+      </a:schemeClr>
+    </cs:fontRef>
+    <cs:defRPr sz="1862" b="0" kern="1200" spc="0" baseline="0"/>
+  </cs:title>
+  <cs:trendline>
+    <cs:lnRef idx="0">
+      <cs:styleClr val="auto"/>
+    </cs:lnRef>
+    <cs:fillRef idx="0"/>
+    <cs:effectRef idx="0"/>
+    <cs:fontRef idx="minor">
+      <a:schemeClr val="tx1"/>
+    </cs:fontRef>
+    <cs:spPr>
+      <a:ln w="19050" cap="rnd">
+        <a:solidFill>
+          <a:schemeClr val="phClr"/>
+        </a:solidFill>
+        <a:prstDash val="sysDot"/>
+      </a:ln>
+    </cs:spPr>
+  </cs:trendline>
+  <cs:trendlineLabel>
+    <cs:lnRef idx="0"/>
+    <cs:fillRef idx="0"/>
+    <cs:effectRef idx="0"/>
+    <cs:fontRef idx="minor">
+      <a:schemeClr val="tx1">
+        <a:lumMod val="65000"/>
+        <a:lumOff val="35000"/>
+      </a:schemeClr>
+    </cs:fontRef>
+    <cs:defRPr sz="1197" kern="1200"/>
+  </cs:trendlineLabel>
+  <cs:upBar>
+    <cs:lnRef idx="0"/>
+    <cs:fillRef idx="0"/>
+    <cs:effectRef idx="0"/>
+    <cs:fontRef idx="minor">
+      <a:schemeClr val="dk1"/>
+    </cs:fontRef>
+    <cs:spPr>
+      <a:solidFill>
+        <a:schemeClr val="lt1"/>
+      </a:solidFill>
+      <a:ln w="9525">
+        <a:solidFill>
+          <a:schemeClr val="tx1">
+            <a:lumMod val="15000"/>
+            <a:lumOff val="85000"/>
+          </a:schemeClr>
+        </a:solidFill>
       </a:ln>
     </cs:spPr>
   </cs:upBar>
@@ -8708,7 +10943,7 @@
           <a:p>
             <a:fld id="{216FD8EB-7C38-4D9D-8BDF-3ABF2096B376}" type="datetimeFigureOut">
               <a:rPr kumimoji="1" lang="ja-JP" altLang="en-US" smtClean="0"/>
-              <a:t>2017/7/11</a:t>
+              <a:t>2017/7/20</a:t>
             </a:fld>
             <a:endParaRPr kumimoji="1" lang="ja-JP" altLang="en-US" dirty="0"/>
           </a:p>
@@ -8910,7 +11145,7 @@
           <a:p>
             <a:fld id="{216FD8EB-7C38-4D9D-8BDF-3ABF2096B376}" type="datetimeFigureOut">
               <a:rPr kumimoji="1" lang="ja-JP" altLang="en-US" smtClean="0"/>
-              <a:t>2017/7/11</a:t>
+              <a:t>2017/7/20</a:t>
             </a:fld>
             <a:endParaRPr kumimoji="1" lang="ja-JP" altLang="en-US" dirty="0"/>
           </a:p>
@@ -9122,7 +11357,7 @@
           <a:p>
             <a:fld id="{216FD8EB-7C38-4D9D-8BDF-3ABF2096B376}" type="datetimeFigureOut">
               <a:rPr kumimoji="1" lang="ja-JP" altLang="en-US" smtClean="0"/>
-              <a:t>2017/7/11</a:t>
+              <a:t>2017/7/20</a:t>
             </a:fld>
             <a:endParaRPr kumimoji="1" lang="ja-JP" altLang="en-US" dirty="0"/>
           </a:p>
@@ -9324,7 +11559,7 @@
           <a:p>
             <a:fld id="{216FD8EB-7C38-4D9D-8BDF-3ABF2096B376}" type="datetimeFigureOut">
               <a:rPr kumimoji="1" lang="ja-JP" altLang="en-US" smtClean="0"/>
-              <a:t>2017/7/11</a:t>
+              <a:t>2017/7/20</a:t>
             </a:fld>
             <a:endParaRPr kumimoji="1" lang="ja-JP" altLang="en-US" dirty="0"/>
           </a:p>
@@ -9570,7 +11805,7 @@
           <a:p>
             <a:fld id="{216FD8EB-7C38-4D9D-8BDF-3ABF2096B376}" type="datetimeFigureOut">
               <a:rPr kumimoji="1" lang="ja-JP" altLang="en-US" smtClean="0"/>
-              <a:t>2017/7/11</a:t>
+              <a:t>2017/7/20</a:t>
             </a:fld>
             <a:endParaRPr kumimoji="1" lang="ja-JP" altLang="en-US" dirty="0"/>
           </a:p>
@@ -9866,7 +12101,7 @@
           <a:p>
             <a:fld id="{216FD8EB-7C38-4D9D-8BDF-3ABF2096B376}" type="datetimeFigureOut">
               <a:rPr kumimoji="1" lang="ja-JP" altLang="en-US" smtClean="0"/>
-              <a:t>2017/7/11</a:t>
+              <a:t>2017/7/20</a:t>
             </a:fld>
             <a:endParaRPr kumimoji="1" lang="ja-JP" altLang="en-US" dirty="0"/>
           </a:p>
@@ -10297,7 +12532,7 @@
           <a:p>
             <a:fld id="{216FD8EB-7C38-4D9D-8BDF-3ABF2096B376}" type="datetimeFigureOut">
               <a:rPr kumimoji="1" lang="ja-JP" altLang="en-US" smtClean="0"/>
-              <a:t>2017/7/11</a:t>
+              <a:t>2017/7/20</a:t>
             </a:fld>
             <a:endParaRPr kumimoji="1" lang="ja-JP" altLang="en-US" dirty="0"/>
           </a:p>
@@ -10415,7 +12650,7 @@
           <a:p>
             <a:fld id="{216FD8EB-7C38-4D9D-8BDF-3ABF2096B376}" type="datetimeFigureOut">
               <a:rPr kumimoji="1" lang="ja-JP" altLang="en-US" smtClean="0"/>
-              <a:t>2017/7/11</a:t>
+              <a:t>2017/7/20</a:t>
             </a:fld>
             <a:endParaRPr kumimoji="1" lang="ja-JP" altLang="en-US" dirty="0"/>
           </a:p>
@@ -10510,7 +12745,7 @@
           <a:p>
             <a:fld id="{216FD8EB-7C38-4D9D-8BDF-3ABF2096B376}" type="datetimeFigureOut">
               <a:rPr kumimoji="1" lang="ja-JP" altLang="en-US" smtClean="0"/>
-              <a:t>2017/7/11</a:t>
+              <a:t>2017/7/20</a:t>
             </a:fld>
             <a:endParaRPr kumimoji="1" lang="ja-JP" altLang="en-US" dirty="0"/>
           </a:p>
@@ -10819,7 +13054,7 @@
           <a:p>
             <a:fld id="{216FD8EB-7C38-4D9D-8BDF-3ABF2096B376}" type="datetimeFigureOut">
               <a:rPr kumimoji="1" lang="ja-JP" altLang="en-US" smtClean="0"/>
-              <a:t>2017/7/11</a:t>
+              <a:t>2017/7/20</a:t>
             </a:fld>
             <a:endParaRPr kumimoji="1" lang="ja-JP" altLang="en-US" dirty="0"/>
           </a:p>
@@ -11072,7 +13307,7 @@
           <a:p>
             <a:fld id="{216FD8EB-7C38-4D9D-8BDF-3ABF2096B376}" type="datetimeFigureOut">
               <a:rPr kumimoji="1" lang="ja-JP" altLang="en-US" smtClean="0"/>
-              <a:t>2017/7/11</a:t>
+              <a:t>2017/7/20</a:t>
             </a:fld>
             <a:endParaRPr kumimoji="1" lang="ja-JP" altLang="en-US" dirty="0"/>
           </a:p>
@@ -11317,7 +13552,7 @@
           <a:p>
             <a:fld id="{216FD8EB-7C38-4D9D-8BDF-3ABF2096B376}" type="datetimeFigureOut">
               <a:rPr kumimoji="1" lang="ja-JP" altLang="en-US" smtClean="0"/>
-              <a:t>2017/7/11</a:t>
+              <a:t>2017/7/20</a:t>
             </a:fld>
             <a:endParaRPr kumimoji="1" lang="ja-JP" altLang="en-US" dirty="0"/>
           </a:p>
@@ -14312,6 +16547,196 @@
             <a:spLocks noGrp="1"/>
           </p:cNvSpPr>
           <p:nvPr>
+            <p:ph type="title"/>
+          </p:nvPr>
+        </p:nvSpPr>
+        <p:spPr/>
+        <p:txBody>
+          <a:bodyPr/>
+          <a:lstStyle/>
+          <a:p>
+            <a:r>
+              <a:rPr kumimoji="1" lang="en-US" altLang="ja-JP" dirty="0" smtClean="0"/>
+              <a:t>Test#1 – Charts</a:t>
+            </a:r>
+            <a:endParaRPr kumimoji="1" lang="ja-JP" altLang="en-US" dirty="0"/>
+          </a:p>
+        </p:txBody>
+      </p:sp>
+      <p:sp>
+        <p:nvSpPr>
+          <p:cNvPr id="13" name="正方形/長方形 12"/>
+          <p:cNvSpPr/>
+          <p:nvPr/>
+        </p:nvSpPr>
+        <p:spPr>
+          <a:xfrm>
+            <a:off x="0" y="9033"/>
+            <a:ext cx="1021433" cy="369332"/>
+          </a:xfrm>
+          <a:prstGeom prst="rect">
+            <a:avLst/>
+          </a:prstGeom>
+        </p:spPr>
+        <p:txBody>
+          <a:bodyPr wrap="none">
+            <a:spAutoFit/>
+          </a:bodyPr>
+          <a:lstStyle/>
+          <a:p>
+            <a:r>
+              <a:rPr lang="en-US" altLang="ja-JP" dirty="0" smtClean="0"/>
+              <a:t>{</a:t>
+            </a:r>
+            <a:r>
+              <a:rPr lang="en-US" altLang="ja-JP" dirty="0" err="1" smtClean="0"/>
+              <a:t>id:nan</a:t>
+            </a:r>
+            <a:r>
+              <a:rPr lang="en-US" altLang="ja-JP" dirty="0" smtClean="0"/>
+              <a:t>}</a:t>
+            </a:r>
+            <a:endParaRPr lang="ja-JP" altLang="en-US" dirty="0"/>
+          </a:p>
+        </p:txBody>
+      </p:sp>
+      <p:sp>
+        <p:nvSpPr>
+          <p:cNvPr id="17" name="テキスト ボックス 16"/>
+          <p:cNvSpPr txBox="1"/>
+          <p:nvPr/>
+        </p:nvSpPr>
+        <p:spPr>
+          <a:xfrm>
+            <a:off x="6224451" y="1690688"/>
+            <a:ext cx="1226618" cy="369332"/>
+          </a:xfrm>
+          <a:prstGeom prst="rect">
+            <a:avLst/>
+          </a:prstGeom>
+          <a:noFill/>
+        </p:spPr>
+        <p:txBody>
+          <a:bodyPr wrap="none" rtlCol="0">
+            <a:spAutoFit/>
+          </a:bodyPr>
+          <a:lstStyle/>
+          <a:p>
+            <a:r>
+              <a:rPr kumimoji="1" lang="en-US" altLang="ja-JP" b="1" dirty="0" smtClean="0"/>
+              <a:t>Expected</a:t>
+            </a:r>
+            <a:endParaRPr kumimoji="1" lang="ja-JP" altLang="en-US" b="1" dirty="0"/>
+          </a:p>
+        </p:txBody>
+      </p:sp>
+      <p:sp>
+        <p:nvSpPr>
+          <p:cNvPr id="18" name="テキスト ボックス 17"/>
+          <p:cNvSpPr txBox="1"/>
+          <p:nvPr/>
+        </p:nvSpPr>
+        <p:spPr>
+          <a:xfrm>
+            <a:off x="838200" y="1690688"/>
+            <a:ext cx="902811" cy="369332"/>
+          </a:xfrm>
+          <a:prstGeom prst="rect">
+            <a:avLst/>
+          </a:prstGeom>
+          <a:noFill/>
+        </p:spPr>
+        <p:txBody>
+          <a:bodyPr wrap="none" rtlCol="0">
+            <a:spAutoFit/>
+          </a:bodyPr>
+          <a:lstStyle/>
+          <a:p>
+            <a:r>
+              <a:rPr kumimoji="1" lang="en-US" altLang="ja-JP" b="1" dirty="0" smtClean="0"/>
+              <a:t>Result</a:t>
+            </a:r>
+            <a:endParaRPr kumimoji="1" lang="ja-JP" altLang="en-US" b="1" dirty="0"/>
+          </a:p>
+        </p:txBody>
+      </p:sp>
+      <p:graphicFrame>
+        <p:nvGraphicFramePr>
+          <p:cNvPr id="7" name="グラフ 6"/>
+          <p:cNvGraphicFramePr/>
+          <p:nvPr>
+            <p:extLst/>
+          </p:nvPr>
+        </p:nvGraphicFramePr>
+        <p:xfrm>
+          <a:off x="838200" y="2318798"/>
+          <a:ext cx="4752703" cy="3716249"/>
+        </p:xfrm>
+        <a:graphic>
+          <a:graphicData uri="http://schemas.openxmlformats.org/drawingml/2006/chart">
+            <c:chart xmlns:c="http://schemas.openxmlformats.org/drawingml/2006/chart" xmlns:r="http://schemas.openxmlformats.org/officeDocument/2006/relationships" r:id="rId2"/>
+          </a:graphicData>
+        </a:graphic>
+      </p:graphicFrame>
+      <p:graphicFrame>
+        <p:nvGraphicFramePr>
+          <p:cNvPr id="8" name="グラフ 7"/>
+          <p:cNvGraphicFramePr/>
+          <p:nvPr>
+            <p:extLst>
+              <p:ext uri="{D42A27DB-BD31-4B8C-83A1-F6EECF244321}">
+                <p14:modId xmlns:p14="http://schemas.microsoft.com/office/powerpoint/2010/main" val="488136513"/>
+              </p:ext>
+            </p:extLst>
+          </p:nvPr>
+        </p:nvGraphicFramePr>
+        <p:xfrm>
+          <a:off x="6096000" y="2318797"/>
+          <a:ext cx="4752703" cy="3716249"/>
+        </p:xfrm>
+        <a:graphic>
+          <a:graphicData uri="http://schemas.openxmlformats.org/drawingml/2006/chart">
+            <c:chart xmlns:c="http://schemas.openxmlformats.org/drawingml/2006/chart" xmlns:r="http://schemas.openxmlformats.org/officeDocument/2006/relationships" r:id="rId3"/>
+          </a:graphicData>
+        </a:graphic>
+      </p:graphicFrame>
+    </p:spTree>
+    <p:extLst>
+      <p:ext uri="{BB962C8B-B14F-4D97-AF65-F5344CB8AC3E}">
+        <p14:creationId xmlns:p14="http://schemas.microsoft.com/office/powerpoint/2010/main" val="469656591"/>
+      </p:ext>
+    </p:extLst>
+  </p:cSld>
+  <p:clrMapOvr>
+    <a:masterClrMapping/>
+  </p:clrMapOvr>
+</p:sld>
+</file>
+
+<file path=ppt/slides/slide9.xml><?xml version="1.0" encoding="utf-8"?>
+<p:sld xmlns:a="http://schemas.openxmlformats.org/drawingml/2006/main" xmlns:r="http://schemas.openxmlformats.org/officeDocument/2006/relationships" xmlns:p="http://schemas.openxmlformats.org/presentationml/2006/main">
+  <p:cSld>
+    <p:spTree>
+      <p:nvGrpSpPr>
+        <p:cNvPr id="1" name=""/>
+        <p:cNvGrpSpPr/>
+        <p:nvPr/>
+      </p:nvGrpSpPr>
+      <p:grpSpPr>
+        <a:xfrm>
+          <a:off x="0" y="0"/>
+          <a:ext cx="0" cy="0"/>
+          <a:chOff x="0" y="0"/>
+          <a:chExt cx="0" cy="0"/>
+        </a:xfrm>
+      </p:grpSpPr>
+      <p:sp>
+        <p:nvSpPr>
+          <p:cNvPr id="2" name="タイトル 1"/>
+          <p:cNvSpPr>
+            <a:spLocks noGrp="1"/>
+          </p:cNvSpPr>
+          <p:nvPr>
             <p:ph type="ctrTitle"/>
           </p:nvPr>
         </p:nvSpPr>

</xml_diff>